<commit_message>
push it to the limit
</commit_message>
<xml_diff>
--- a/01 Dokumentation/slutredovisning.pptx
+++ b/01 Dokumentation/slutredovisning.pptx
@@ -225,7 +225,7 @@
           <a:p>
             <a:fld id="{78657D70-8167-4127-866D-BAA56A2DFFEF}" type="datetimeFigureOut">
               <a:rPr lang="sv-SE" smtClean="0"/>
-              <a:t>2017-10-19</a:t>
+              <a:t>2017-10-20</a:t>
             </a:fld>
             <a:endParaRPr lang="sv-SE"/>
           </a:p>
@@ -384,7 +384,7 @@
           <a:p>
             <a:fld id="{8667F948-D2CB-486C-A2EA-FEABC2DAAE8D}" type="slidenum">
               <a:rPr lang="sv-SE" smtClean="0"/>
-              <a:t>‹Nr.›</a:t>
+              <a:t>‹#›</a:t>
             </a:fld>
             <a:endParaRPr lang="sv-SE"/>
           </a:p>
@@ -3652,7 +3652,7 @@
           <a:p>
             <a:fld id="{B4C653A3-D7FF-4AF7-943B-34A467C3139E}" type="datetimeFigureOut">
               <a:rPr lang="sv-SE" smtClean="0"/>
-              <a:t>2017-10-19</a:t>
+              <a:t>2017-10-20</a:t>
             </a:fld>
             <a:endParaRPr lang="sv-SE"/>
           </a:p>
@@ -3694,7 +3694,7 @@
           <a:p>
             <a:fld id="{36FE6EAF-707E-454E-841A-E111EB854EEC}" type="slidenum">
               <a:rPr lang="sv-SE" smtClean="0"/>
-              <a:t>‹Nr.›</a:t>
+              <a:t>‹#›</a:t>
             </a:fld>
             <a:endParaRPr lang="sv-SE"/>
           </a:p>
@@ -3822,7 +3822,7 @@
           <a:p>
             <a:fld id="{B4C653A3-D7FF-4AF7-943B-34A467C3139E}" type="datetimeFigureOut">
               <a:rPr lang="sv-SE" smtClean="0"/>
-              <a:t>2017-10-19</a:t>
+              <a:t>2017-10-20</a:t>
             </a:fld>
             <a:endParaRPr lang="sv-SE"/>
           </a:p>
@@ -3864,7 +3864,7 @@
           <a:p>
             <a:fld id="{36FE6EAF-707E-454E-841A-E111EB854EEC}" type="slidenum">
               <a:rPr lang="sv-SE" smtClean="0"/>
-              <a:t>‹Nr.›</a:t>
+              <a:t>‹#›</a:t>
             </a:fld>
             <a:endParaRPr lang="sv-SE"/>
           </a:p>
@@ -4002,7 +4002,7 @@
           <a:p>
             <a:fld id="{B4C653A3-D7FF-4AF7-943B-34A467C3139E}" type="datetimeFigureOut">
               <a:rPr lang="sv-SE" smtClean="0"/>
-              <a:t>2017-10-19</a:t>
+              <a:t>2017-10-20</a:t>
             </a:fld>
             <a:endParaRPr lang="sv-SE"/>
           </a:p>
@@ -4044,7 +4044,7 @@
           <a:p>
             <a:fld id="{36FE6EAF-707E-454E-841A-E111EB854EEC}" type="slidenum">
               <a:rPr lang="sv-SE" smtClean="0"/>
-              <a:t>‹Nr.›</a:t>
+              <a:t>‹#›</a:t>
             </a:fld>
             <a:endParaRPr lang="sv-SE"/>
           </a:p>
@@ -4172,7 +4172,7 @@
           <a:p>
             <a:fld id="{B4C653A3-D7FF-4AF7-943B-34A467C3139E}" type="datetimeFigureOut">
               <a:rPr lang="sv-SE" smtClean="0"/>
-              <a:t>2017-10-19</a:t>
+              <a:t>2017-10-20</a:t>
             </a:fld>
             <a:endParaRPr lang="sv-SE"/>
           </a:p>
@@ -4214,7 +4214,7 @@
           <a:p>
             <a:fld id="{36FE6EAF-707E-454E-841A-E111EB854EEC}" type="slidenum">
               <a:rPr lang="sv-SE" smtClean="0"/>
-              <a:t>‹Nr.›</a:t>
+              <a:t>‹#›</a:t>
             </a:fld>
             <a:endParaRPr lang="sv-SE"/>
           </a:p>
@@ -4418,7 +4418,7 @@
           <a:p>
             <a:fld id="{B4C653A3-D7FF-4AF7-943B-34A467C3139E}" type="datetimeFigureOut">
               <a:rPr lang="sv-SE" smtClean="0"/>
-              <a:t>2017-10-19</a:t>
+              <a:t>2017-10-20</a:t>
             </a:fld>
             <a:endParaRPr lang="sv-SE"/>
           </a:p>
@@ -4460,7 +4460,7 @@
           <a:p>
             <a:fld id="{36FE6EAF-707E-454E-841A-E111EB854EEC}" type="slidenum">
               <a:rPr lang="sv-SE" smtClean="0"/>
-              <a:t>‹Nr.›</a:t>
+              <a:t>‹#›</a:t>
             </a:fld>
             <a:endParaRPr lang="sv-SE"/>
           </a:p>
@@ -4650,7 +4650,7 @@
           <a:p>
             <a:fld id="{B4C653A3-D7FF-4AF7-943B-34A467C3139E}" type="datetimeFigureOut">
               <a:rPr lang="sv-SE" smtClean="0"/>
-              <a:t>2017-10-19</a:t>
+              <a:t>2017-10-20</a:t>
             </a:fld>
             <a:endParaRPr lang="sv-SE"/>
           </a:p>
@@ -4692,7 +4692,7 @@
           <a:p>
             <a:fld id="{36FE6EAF-707E-454E-841A-E111EB854EEC}" type="slidenum">
               <a:rPr lang="sv-SE" smtClean="0"/>
-              <a:t>‹Nr.›</a:t>
+              <a:t>‹#›</a:t>
             </a:fld>
             <a:endParaRPr lang="sv-SE"/>
           </a:p>
@@ -5017,7 +5017,7 @@
           <a:p>
             <a:fld id="{B4C653A3-D7FF-4AF7-943B-34A467C3139E}" type="datetimeFigureOut">
               <a:rPr lang="sv-SE" smtClean="0"/>
-              <a:t>2017-10-19</a:t>
+              <a:t>2017-10-20</a:t>
             </a:fld>
             <a:endParaRPr lang="sv-SE"/>
           </a:p>
@@ -5059,7 +5059,7 @@
           <a:p>
             <a:fld id="{36FE6EAF-707E-454E-841A-E111EB854EEC}" type="slidenum">
               <a:rPr lang="sv-SE" smtClean="0"/>
-              <a:t>‹Nr.›</a:t>
+              <a:t>‹#›</a:t>
             </a:fld>
             <a:endParaRPr lang="sv-SE"/>
           </a:p>
@@ -5135,7 +5135,7 @@
           <a:p>
             <a:fld id="{B4C653A3-D7FF-4AF7-943B-34A467C3139E}" type="datetimeFigureOut">
               <a:rPr lang="sv-SE" smtClean="0"/>
-              <a:t>2017-10-19</a:t>
+              <a:t>2017-10-20</a:t>
             </a:fld>
             <a:endParaRPr lang="sv-SE"/>
           </a:p>
@@ -5177,7 +5177,7 @@
           <a:p>
             <a:fld id="{36FE6EAF-707E-454E-841A-E111EB854EEC}" type="slidenum">
               <a:rPr lang="sv-SE" smtClean="0"/>
-              <a:t>‹Nr.›</a:t>
+              <a:t>‹#›</a:t>
             </a:fld>
             <a:endParaRPr lang="sv-SE"/>
           </a:p>
@@ -5230,7 +5230,7 @@
           <a:p>
             <a:fld id="{B4C653A3-D7FF-4AF7-943B-34A467C3139E}" type="datetimeFigureOut">
               <a:rPr lang="sv-SE" smtClean="0"/>
-              <a:t>2017-10-19</a:t>
+              <a:t>2017-10-20</a:t>
             </a:fld>
             <a:endParaRPr lang="sv-SE"/>
           </a:p>
@@ -5272,7 +5272,7 @@
           <a:p>
             <a:fld id="{36FE6EAF-707E-454E-841A-E111EB854EEC}" type="slidenum">
               <a:rPr lang="sv-SE" smtClean="0"/>
-              <a:t>‹Nr.›</a:t>
+              <a:t>‹#›</a:t>
             </a:fld>
             <a:endParaRPr lang="sv-SE"/>
           </a:p>
@@ -5507,7 +5507,7 @@
           <a:p>
             <a:fld id="{B4C653A3-D7FF-4AF7-943B-34A467C3139E}" type="datetimeFigureOut">
               <a:rPr lang="sv-SE" smtClean="0"/>
-              <a:t>2017-10-19</a:t>
+              <a:t>2017-10-20</a:t>
             </a:fld>
             <a:endParaRPr lang="sv-SE"/>
           </a:p>
@@ -5549,7 +5549,7 @@
           <a:p>
             <a:fld id="{36FE6EAF-707E-454E-841A-E111EB854EEC}" type="slidenum">
               <a:rPr lang="sv-SE" smtClean="0"/>
-              <a:t>‹Nr.›</a:t>
+              <a:t>‹#›</a:t>
             </a:fld>
             <a:endParaRPr lang="sv-SE"/>
           </a:p>
@@ -5760,7 +5760,7 @@
           <a:p>
             <a:fld id="{B4C653A3-D7FF-4AF7-943B-34A467C3139E}" type="datetimeFigureOut">
               <a:rPr lang="sv-SE" smtClean="0"/>
-              <a:t>2017-10-19</a:t>
+              <a:t>2017-10-20</a:t>
             </a:fld>
             <a:endParaRPr lang="sv-SE"/>
           </a:p>
@@ -5802,7 +5802,7 @@
           <a:p>
             <a:fld id="{36FE6EAF-707E-454E-841A-E111EB854EEC}" type="slidenum">
               <a:rPr lang="sv-SE" smtClean="0"/>
-              <a:t>‹Nr.›</a:t>
+              <a:t>‹#›</a:t>
             </a:fld>
             <a:endParaRPr lang="sv-SE"/>
           </a:p>
@@ -5973,7 +5973,7 @@
           <a:p>
             <a:fld id="{B4C653A3-D7FF-4AF7-943B-34A467C3139E}" type="datetimeFigureOut">
               <a:rPr lang="sv-SE" smtClean="0"/>
-              <a:t>2017-10-19</a:t>
+              <a:t>2017-10-20</a:t>
             </a:fld>
             <a:endParaRPr lang="sv-SE"/>
           </a:p>
@@ -6051,7 +6051,7 @@
           <a:p>
             <a:fld id="{36FE6EAF-707E-454E-841A-E111EB854EEC}" type="slidenum">
               <a:rPr lang="sv-SE" smtClean="0"/>
-              <a:t>‹Nr.›</a:t>
+              <a:t>‹#›</a:t>
             </a:fld>
             <a:endParaRPr lang="sv-SE"/>
           </a:p>
@@ -6401,85 +6401,95 @@
               <a:rPr lang="sv-SE" dirty="0"/>
               <a:t>1</a:t>
             </a:r>
+          </a:p>
+        </p:txBody>
+      </p:sp>
+      <p:sp>
+        <p:nvSpPr>
+          <p:cNvPr id="5" name="Platshållare för innehåll 4"/>
+          <p:cNvSpPr>
+            <a:spLocks noGrp="1"/>
+          </p:cNvSpPr>
+          <p:nvPr>
+            <p:ph idx="1"/>
+          </p:nvPr>
+        </p:nvSpPr>
+        <p:spPr>
+          <a:xfrm>
+            <a:off x="1120302" y="1815897"/>
+            <a:ext cx="10515600" cy="4351338"/>
+          </a:xfrm>
+        </p:spPr>
+        <p:txBody>
+          <a:bodyPr/>
+          <a:lstStyle/>
+          <a:p>
+            <a:r>
+              <a:rPr lang="sv-SE" dirty="0" smtClean="0"/>
+              <a:t>Lukas Varli </a:t>
+            </a:r>
+            <a:r>
+              <a:rPr lang="sv-SE" dirty="0" smtClean="0">
+                <a:hlinkClick r:id="rId4"/>
+              </a:rPr>
+              <a:t>Lukas.varli@hotmail.com</a:t>
+            </a:r>
+            <a:endParaRPr lang="sv-SE" dirty="0" smtClean="0"/>
+          </a:p>
+          <a:p>
+            <a:r>
+              <a:rPr lang="sv-SE" dirty="0" smtClean="0"/>
+              <a:t>Peter Yakob </a:t>
+            </a:r>
+            <a:r>
+              <a:rPr lang="sv-SE" dirty="0" smtClean="0">
+                <a:hlinkClick r:id="rId5"/>
+              </a:rPr>
+              <a:t>peteryakobte11@gmail.com</a:t>
+            </a:r>
+            <a:endParaRPr lang="sv-SE" dirty="0" smtClean="0"/>
+          </a:p>
+          <a:p>
+            <a:r>
+              <a:rPr lang="sv-SE" dirty="0" smtClean="0"/>
+              <a:t>Emil Rosell </a:t>
+            </a:r>
+            <a:r>
+              <a:rPr lang="sv-SE" dirty="0" smtClean="0">
+                <a:hlinkClick r:id="rId6"/>
+              </a:rPr>
+              <a:t>emil.rosell@outlook.com</a:t>
+            </a:r>
+            <a:endParaRPr lang="sv-SE" dirty="0" smtClean="0"/>
+          </a:p>
+          <a:p>
+            <a:r>
+              <a:rPr lang="sv-SE" dirty="0" smtClean="0"/>
+              <a:t>Oscar Törnquist </a:t>
+            </a:r>
+            <a:r>
+              <a:rPr lang="sv-SE" dirty="0" smtClean="0">
+                <a:hlinkClick r:id="rId7"/>
+              </a:rPr>
+              <a:t>tornquist@gmail.com</a:t>
+            </a:r>
+            <a:endParaRPr lang="sv-SE" dirty="0" smtClean="0"/>
+          </a:p>
+          <a:p>
+            <a:r>
+              <a:rPr lang="sv-SE" dirty="0" smtClean="0"/>
+              <a:t>Robert Grubesic </a:t>
+            </a:r>
+            <a:r>
+              <a:rPr lang="sv-SE" dirty="0" smtClean="0">
+                <a:hlinkClick r:id="rId8"/>
+              </a:rPr>
+              <a:t>robertgrubesic@hotmail.com</a:t>
+            </a:r>
+            <a:endParaRPr lang="sv-SE" dirty="0" smtClean="0"/>
+          </a:p>
+          <a:p>
             <a:endParaRPr lang="sv-SE" dirty="0"/>
-          </a:p>
-        </p:txBody>
-      </p:sp>
-      <p:sp>
-        <p:nvSpPr>
-          <p:cNvPr id="5" name="Platshållare för innehåll 4"/>
-          <p:cNvSpPr>
-            <a:spLocks noGrp="1"/>
-          </p:cNvSpPr>
-          <p:nvPr>
-            <p:ph idx="1"/>
-          </p:nvPr>
-        </p:nvSpPr>
-        <p:spPr/>
-        <p:txBody>
-          <a:bodyPr/>
-          <a:lstStyle/>
-          <a:p>
-            <a:r>
-              <a:rPr lang="sv-SE" dirty="0" smtClean="0"/>
-              <a:t>Namn och e-post till samtliga gruppmedlemmar</a:t>
-            </a:r>
-            <a:endParaRPr lang="sv-SE" dirty="0"/>
-          </a:p>
-        </p:txBody>
-      </p:sp>
-      <p:sp>
-        <p:nvSpPr>
-          <p:cNvPr id="2" name="Rektangel 1"/>
-          <p:cNvSpPr/>
-          <p:nvPr/>
-        </p:nvSpPr>
-        <p:spPr>
-          <a:xfrm rot="18863735">
-            <a:off x="5015754" y="3329474"/>
-            <a:ext cx="8244437" cy="923330"/>
-          </a:xfrm>
-          <a:prstGeom prst="rect">
-            <a:avLst/>
-          </a:prstGeom>
-          <a:noFill/>
-        </p:spPr>
-        <p:txBody>
-          <a:bodyPr wrap="none" lIns="91440" tIns="45720" rIns="91440" bIns="45720">
-            <a:spAutoFit/>
-          </a:bodyPr>
-          <a:lstStyle/>
-          <a:p>
-            <a:pPr algn="ctr"/>
-            <a:r>
-              <a:rPr lang="sv-SE" sz="5400" b="0" cap="none" spc="0" dirty="0" smtClean="0">
-                <a:ln w="0"/>
-                <a:solidFill>
-                  <a:schemeClr val="tx1"/>
-                </a:solidFill>
-                <a:effectLst>
-                  <a:outerShdw blurRad="38100" dist="19050" dir="2700000" algn="tl" rotWithShape="0">
-                    <a:schemeClr val="dk1">
-                      <a:alpha val="40000"/>
-                    </a:schemeClr>
-                  </a:outerShdw>
-                </a:effectLst>
-              </a:rPr>
-              <a:t>OBS! Lämnas in i PDF-format</a:t>
-            </a:r>
-            <a:endParaRPr lang="sv-SE" sz="5400" b="0" cap="none" spc="0" dirty="0">
-              <a:ln w="0"/>
-              <a:solidFill>
-                <a:schemeClr val="tx1"/>
-              </a:solidFill>
-              <a:effectLst>
-                <a:outerShdw blurRad="38100" dist="19050" dir="2700000" algn="tl" rotWithShape="0">
-                  <a:schemeClr val="dk1">
-                    <a:alpha val="40000"/>
-                  </a:schemeClr>
-                </a:outerShdw>
-              </a:effectLst>
-            </a:endParaRPr>
           </a:p>
         </p:txBody>
       </p:sp>
@@ -7424,7 +7434,6 @@
               <a:rPr lang="sv-SE" b="1" dirty="0" smtClean="0"/>
               <a:t>Kodkritiksystem:</a:t>
             </a:r>
-            <a:endParaRPr lang="sv-SE" b="1" dirty="0" smtClean="0"/>
           </a:p>
           <a:p>
             <a:pPr marL="0" lvl="0" indent="0">
@@ -8391,11 +8400,7 @@
             </a:r>
             <a:r>
               <a:rPr lang="sv-SE" dirty="0" smtClean="0"/>
-              <a:t> klassen anges namnet på vad kartan ska heta samt bredden och höjden.</a:t>
-            </a:r>
-            <a:r>
-              <a:rPr lang="sv-SE" dirty="0" smtClean="0"/>
-              <a:t> Vi har därför delat upp ekvivalensklasserna i </a:t>
+              <a:t> klassen anges namnet på vad kartan ska heta samt bredden och höjden. Vi har därför delat upp ekvivalensklasserna i </a:t>
             </a:r>
             <a:r>
               <a:rPr lang="sv-SE" dirty="0" err="1" smtClean="0"/>

</xml_diff>

<commit_message>
lade till byggscript i rapporten
</commit_message>
<xml_diff>
--- a/01 Dokumentation/slutredovisning.pptx
+++ b/01 Dokumentation/slutredovisning.pptx
@@ -5,7 +5,7 @@
     <p:sldMasterId id="2147483648" r:id="rId1"/>
   </p:sldMasterIdLst>
   <p:notesMasterIdLst>
-    <p:notesMasterId r:id="rId22"/>
+    <p:notesMasterId r:id="rId23"/>
   </p:notesMasterIdLst>
   <p:sldIdLst>
     <p:sldId id="256" r:id="rId2"/>
@@ -26,13 +26,14 @@
     <p:sldId id="277" r:id="rId17"/>
     <p:sldId id="278" r:id="rId18"/>
     <p:sldId id="279" r:id="rId19"/>
-    <p:sldId id="280" r:id="rId20"/>
-    <p:sldId id="281" r:id="rId21"/>
+    <p:sldId id="282" r:id="rId20"/>
+    <p:sldId id="280" r:id="rId21"/>
+    <p:sldId id="281" r:id="rId22"/>
   </p:sldIdLst>
   <p:sldSz cx="12192000" cy="6858000"/>
   <p:notesSz cx="6858000" cy="9144000"/>
   <p:custDataLst>
-    <p:tags r:id="rId23"/>
+    <p:tags r:id="rId24"/>
   </p:custDataLst>
   <p:defaultTextStyle>
     <a:defPPr>
@@ -1848,7 +1849,7 @@
           <a:p>
             <a:fld id="{8667F948-D2CB-486C-A2EA-FEABC2DAAE8D}" type="slidenum">
               <a:rPr lang="sv-SE" smtClean="0"/>
-              <a:t>19</a:t>
+              <a:t>20</a:t>
             </a:fld>
             <a:endParaRPr lang="sv-SE"/>
           </a:p>
@@ -2047,7 +2048,7 @@
           <a:p>
             <a:fld id="{8667F948-D2CB-486C-A2EA-FEABC2DAAE8D}" type="slidenum">
               <a:rPr lang="sv-SE" smtClean="0"/>
-              <a:t>20</a:t>
+              <a:t>21</a:t>
             </a:fld>
             <a:endParaRPr lang="sv-SE"/>
           </a:p>
@@ -6615,9 +6616,38 @@
           <a:chExt cx="0" cy="0"/>
         </a:xfrm>
       </p:grpSpPr>
-      <p:sp>
-        <p:nvSpPr>
-          <p:cNvPr id="2" name="Rubrik 1"/>
+      <p:pic>
+        <p:nvPicPr>
+          <p:cNvPr id="4" name="Platshållare för innehåll 3"/>
+          <p:cNvPicPr>
+            <a:picLocks noGrp="1" noChangeAspect="1"/>
+          </p:cNvPicPr>
+          <p:nvPr>
+            <p:ph idx="1"/>
+          </p:nvPr>
+        </p:nvPicPr>
+        <p:blipFill>
+          <a:blip r:embed="rId2">
+            <a:extLst>
+              <a:ext uri="{28A0092B-C50C-407E-A947-70E740481C1C}">
+                <a14:useLocalDpi xmlns:a14="http://schemas.microsoft.com/office/drawing/2010/main" val="0"/>
+              </a:ext>
+            </a:extLst>
+          </a:blip>
+          <a:stretch>
+            <a:fillRect/>
+          </a:stretch>
+        </p:blipFill>
+        <p:spPr>
+          <a:xfrm>
+            <a:off x="3460831" y="0"/>
+            <a:ext cx="8731170" cy="6830210"/>
+          </a:xfrm>
+        </p:spPr>
+      </p:pic>
+      <p:sp>
+        <p:nvSpPr>
+          <p:cNvPr id="5" name="Rubrik 1"/>
           <p:cNvSpPr>
             <a:spLocks noGrp="1"/>
           </p:cNvSpPr>
@@ -6625,45 +6655,28 @@
             <p:ph type="title"/>
           </p:nvPr>
         </p:nvSpPr>
-        <p:spPr/>
+        <p:spPr>
+          <a:xfrm>
+            <a:off x="-134074" y="2610613"/>
+            <a:ext cx="10515600" cy="1325563"/>
+          </a:xfrm>
+        </p:spPr>
         <p:txBody>
           <a:bodyPr/>
           <a:lstStyle/>
           <a:p>
             <a:r>
               <a:rPr lang="sv-SE" dirty="0" smtClean="0"/>
-              <a:t>Byggscript</a:t>
+              <a:t>Byggscript före</a:t>
             </a:r>
             <a:endParaRPr lang="sv-SE" dirty="0"/>
           </a:p>
         </p:txBody>
       </p:sp>
-      <p:sp>
-        <p:nvSpPr>
-          <p:cNvPr id="3" name="Platshållare för innehåll 2"/>
-          <p:cNvSpPr>
-            <a:spLocks noGrp="1"/>
-          </p:cNvSpPr>
-          <p:nvPr>
-            <p:ph idx="1"/>
-          </p:nvPr>
-        </p:nvSpPr>
-        <p:spPr/>
-        <p:txBody>
-          <a:bodyPr/>
-          <a:lstStyle/>
-          <a:p>
-            <a:endParaRPr lang="sv-SE"/>
-          </a:p>
-        </p:txBody>
-      </p:sp>
     </p:spTree>
-    <p:custDataLst>
-      <p:tags r:id="rId1"/>
-    </p:custDataLst>
     <p:extLst>
       <p:ext uri="{BB962C8B-B14F-4D97-AF65-F5344CB8AC3E}">
-        <p14:creationId xmlns:p14="http://schemas.microsoft.com/office/powerpoint/2010/main" val="963717311"/>
+        <p14:creationId xmlns:p14="http://schemas.microsoft.com/office/powerpoint/2010/main" val="170185678"/>
       </p:ext>
     </p:extLst>
   </p:cSld>
@@ -6937,6 +6950,96 @@
 </file>
 
 <file path=ppt/slides/slide20.xml><?xml version="1.0" encoding="utf-8"?>
+<p:sld xmlns:a="http://schemas.openxmlformats.org/drawingml/2006/main" xmlns:r="http://schemas.openxmlformats.org/officeDocument/2006/relationships" xmlns:p="http://schemas.openxmlformats.org/presentationml/2006/main">
+  <p:cSld>
+    <p:spTree>
+      <p:nvGrpSpPr>
+        <p:cNvPr id="1" name=""/>
+        <p:cNvGrpSpPr/>
+        <p:nvPr/>
+      </p:nvGrpSpPr>
+      <p:grpSpPr>
+        <a:xfrm>
+          <a:off x="0" y="0"/>
+          <a:ext cx="0" cy="0"/>
+          <a:chOff x="0" y="0"/>
+          <a:chExt cx="0" cy="0"/>
+        </a:xfrm>
+      </p:grpSpPr>
+      <p:sp>
+        <p:nvSpPr>
+          <p:cNvPr id="9" name="Rubrik 1"/>
+          <p:cNvSpPr>
+            <a:spLocks noGrp="1"/>
+          </p:cNvSpPr>
+          <p:nvPr>
+            <p:ph type="title"/>
+          </p:nvPr>
+        </p:nvSpPr>
+        <p:spPr>
+          <a:xfrm>
+            <a:off x="-153365" y="2471717"/>
+            <a:ext cx="10515600" cy="1325563"/>
+          </a:xfrm>
+        </p:spPr>
+        <p:txBody>
+          <a:bodyPr/>
+          <a:lstStyle/>
+          <a:p>
+            <a:r>
+              <a:rPr lang="sv-SE" dirty="0" smtClean="0"/>
+              <a:t>Byggscript slutliga</a:t>
+            </a:r>
+            <a:endParaRPr lang="sv-SE" dirty="0"/>
+          </a:p>
+        </p:txBody>
+      </p:sp>
+      <p:pic>
+        <p:nvPicPr>
+          <p:cNvPr id="11" name="Platshållare för innehåll 10"/>
+          <p:cNvPicPr>
+            <a:picLocks noGrp="1" noChangeAspect="1"/>
+          </p:cNvPicPr>
+          <p:nvPr>
+            <p:ph idx="1"/>
+          </p:nvPr>
+        </p:nvPicPr>
+        <p:blipFill>
+          <a:blip r:embed="rId4">
+            <a:extLst>
+              <a:ext uri="{28A0092B-C50C-407E-A947-70E740481C1C}">
+                <a14:useLocalDpi xmlns:a14="http://schemas.microsoft.com/office/drawing/2010/main" val="0"/>
+              </a:ext>
+            </a:extLst>
+          </a:blip>
+          <a:stretch>
+            <a:fillRect/>
+          </a:stretch>
+        </p:blipFill>
+        <p:spPr>
+          <a:xfrm>
+            <a:off x="4051139" y="33327"/>
+            <a:ext cx="8140861" cy="6824673"/>
+          </a:xfrm>
+        </p:spPr>
+      </p:pic>
+    </p:spTree>
+    <p:custDataLst>
+      <p:tags r:id="rId1"/>
+    </p:custDataLst>
+    <p:extLst>
+      <p:ext uri="{BB962C8B-B14F-4D97-AF65-F5344CB8AC3E}">
+        <p14:creationId xmlns:p14="http://schemas.microsoft.com/office/powerpoint/2010/main" val="963717311"/>
+      </p:ext>
+    </p:extLst>
+  </p:cSld>
+  <p:clrMapOvr>
+    <a:masterClrMapping/>
+  </p:clrMapOvr>
+</p:sld>
+</file>
+
+<file path=ppt/slides/slide21.xml><?xml version="1.0" encoding="utf-8"?>
 <p:sld xmlns:a="http://schemas.openxmlformats.org/drawingml/2006/main" xmlns:r="http://schemas.openxmlformats.org/officeDocument/2006/relationships" xmlns:p="http://schemas.openxmlformats.org/presentationml/2006/main">
   <p:cSld>
     <p:spTree>

</xml_diff>

<commit_message>
Lagt till mina tdd-exempel
</commit_message>
<xml_diff>
--- a/01 Dokumentation/slutredovisning.pptx
+++ b/01 Dokumentation/slutredovisning.pptx
@@ -5,41 +5,42 @@
     <p:sldMasterId id="2147483648" r:id="rId1"/>
   </p:sldMasterIdLst>
   <p:notesMasterIdLst>
-    <p:notesMasterId r:id="rId29"/>
+    <p:notesMasterId r:id="rId30"/>
   </p:notesMasterIdLst>
   <p:sldIdLst>
     <p:sldId id="256" r:id="rId2"/>
     <p:sldId id="257" r:id="rId3"/>
     <p:sldId id="258" r:id="rId4"/>
     <p:sldId id="259" r:id="rId5"/>
-    <p:sldId id="287" r:id="rId6"/>
-    <p:sldId id="288" r:id="rId7"/>
-    <p:sldId id="283" r:id="rId8"/>
-    <p:sldId id="284" r:id="rId9"/>
-    <p:sldId id="260" r:id="rId10"/>
-    <p:sldId id="285" r:id="rId11"/>
-    <p:sldId id="286" r:id="rId12"/>
-    <p:sldId id="261" r:id="rId13"/>
-    <p:sldId id="262" r:id="rId14"/>
-    <p:sldId id="265" r:id="rId15"/>
-    <p:sldId id="266" r:id="rId16"/>
-    <p:sldId id="267" r:id="rId17"/>
-    <p:sldId id="268" r:id="rId18"/>
-    <p:sldId id="273" r:id="rId19"/>
-    <p:sldId id="274" r:id="rId20"/>
-    <p:sldId id="275" r:id="rId21"/>
-    <p:sldId id="276" r:id="rId22"/>
-    <p:sldId id="277" r:id="rId23"/>
-    <p:sldId id="278" r:id="rId24"/>
-    <p:sldId id="279" r:id="rId25"/>
-    <p:sldId id="282" r:id="rId26"/>
-    <p:sldId id="280" r:id="rId27"/>
-    <p:sldId id="281" r:id="rId28"/>
+    <p:sldId id="289" r:id="rId6"/>
+    <p:sldId id="287" r:id="rId7"/>
+    <p:sldId id="288" r:id="rId8"/>
+    <p:sldId id="283" r:id="rId9"/>
+    <p:sldId id="284" r:id="rId10"/>
+    <p:sldId id="260" r:id="rId11"/>
+    <p:sldId id="285" r:id="rId12"/>
+    <p:sldId id="286" r:id="rId13"/>
+    <p:sldId id="261" r:id="rId14"/>
+    <p:sldId id="262" r:id="rId15"/>
+    <p:sldId id="265" r:id="rId16"/>
+    <p:sldId id="266" r:id="rId17"/>
+    <p:sldId id="267" r:id="rId18"/>
+    <p:sldId id="268" r:id="rId19"/>
+    <p:sldId id="273" r:id="rId20"/>
+    <p:sldId id="274" r:id="rId21"/>
+    <p:sldId id="275" r:id="rId22"/>
+    <p:sldId id="276" r:id="rId23"/>
+    <p:sldId id="277" r:id="rId24"/>
+    <p:sldId id="278" r:id="rId25"/>
+    <p:sldId id="279" r:id="rId26"/>
+    <p:sldId id="282" r:id="rId27"/>
+    <p:sldId id="280" r:id="rId28"/>
+    <p:sldId id="281" r:id="rId29"/>
   </p:sldIdLst>
   <p:sldSz cx="12192000" cy="6858000"/>
   <p:notesSz cx="6858000" cy="9144000"/>
   <p:custDataLst>
-    <p:tags r:id="rId30"/>
+    <p:tags r:id="rId31"/>
   </p:custDataLst>
   <p:defaultTextStyle>
     <a:defPPr>
@@ -678,7 +679,7 @@
     </p:spTree>
     <p:extLst>
       <p:ext uri="{BB962C8B-B14F-4D97-AF65-F5344CB8AC3E}">
-        <p14:creationId xmlns:p14="http://schemas.microsoft.com/office/powerpoint/2010/main" val="3138013813"/>
+        <p14:creationId xmlns:p14="http://schemas.microsoft.com/office/powerpoint/2010/main" val="4160569562"/>
       </p:ext>
     </p:extLst>
   </p:cSld>
@@ -785,7 +786,7 @@
     </p:spTree>
     <p:extLst>
       <p:ext uri="{BB962C8B-B14F-4D97-AF65-F5344CB8AC3E}">
-        <p14:creationId xmlns:p14="http://schemas.microsoft.com/office/powerpoint/2010/main" val="1466515987"/>
+        <p14:creationId xmlns:p14="http://schemas.microsoft.com/office/powerpoint/2010/main" val="3138013813"/>
       </p:ext>
     </p:extLst>
   </p:cSld>
@@ -857,16 +858,8 @@
               <a:defRPr/>
             </a:pPr>
             <a:r>
-              <a:rPr lang="sv-SE" sz="1200" kern="1200" dirty="0">
-                <a:solidFill>
-                  <a:schemeClr val="tx1"/>
-                </a:solidFill>
-                <a:effectLst/>
-                <a:latin typeface="+mn-lt"/>
-                <a:ea typeface="+mn-ea"/>
-                <a:cs typeface="+mn-cs"/>
-              </a:rPr>
-              <a:t>En kort textuell presentation av vad ni valt ut för att tillämpa ekvivalensklassuppdelning på. Ni ska kort motivera valet, och ge tillräckligt med information för att det ska gå att bedöma er. Detta avsnitt och de följande (till och med testmatrisen) ska finnas för samtliga delar ni tillämpat ekvivalensklassuppdelning på. Om ni inte tillämpat ekvivalensklassuppdelning tar ni bort dessa bilder.</a:t>
+              <a:rPr lang="sv-SE" dirty="0"/>
+              <a:t>En diskussion om vilka era erfarenheter ni dragit av att tillämpa TDD. Det finns inget rätt eller fel här. Enda sättet att bli underkända är att bara fuska över punkten och säga något pliktskyldigt.</a:t>
             </a:r>
           </a:p>
           <a:p>
@@ -900,7 +893,7 @@
     </p:spTree>
     <p:extLst>
       <p:ext uri="{BB962C8B-B14F-4D97-AF65-F5344CB8AC3E}">
-        <p14:creationId xmlns:p14="http://schemas.microsoft.com/office/powerpoint/2010/main" val="2473427308"/>
+        <p14:creationId xmlns:p14="http://schemas.microsoft.com/office/powerpoint/2010/main" val="1466515987"/>
       </p:ext>
     </p:extLst>
   </p:cSld>
@@ -981,29 +974,8 @@
                 <a:ea typeface="+mn-ea"/>
                 <a:cs typeface="+mn-cs"/>
               </a:rPr>
-              <a:t>Samtliga ekvivalensklasser för denna del presenterade på ett tydligt sätt. Använd</a:t>
-            </a:r>
-            <a:r>
-              <a:rPr lang="sv-SE" sz="1200" kern="1200" baseline="0" dirty="0">
-                <a:solidFill>
-                  <a:schemeClr val="tx1"/>
-                </a:solidFill>
-                <a:effectLst/>
-                <a:latin typeface="+mn-lt"/>
-                <a:ea typeface="+mn-ea"/>
-                <a:cs typeface="+mn-cs"/>
-              </a:rPr>
-              <a:t> gärna flera sidor om det behövs.</a:t>
-            </a:r>
-            <a:endParaRPr lang="sv-SE" sz="1200" kern="1200" dirty="0">
-              <a:solidFill>
-                <a:schemeClr val="tx1"/>
-              </a:solidFill>
-              <a:effectLst/>
-              <a:latin typeface="+mn-lt"/>
-              <a:ea typeface="+mn-ea"/>
-              <a:cs typeface="+mn-cs"/>
-            </a:endParaRPr>
+              <a:t>En kort textuell presentation av vad ni valt ut för att tillämpa ekvivalensklassuppdelning på. Ni ska kort motivera valet, och ge tillräckligt med information för att det ska gå att bedöma er. Detta avsnitt och de följande (till och med testmatrisen) ska finnas för samtliga delar ni tillämpat ekvivalensklassuppdelning på. Om ni inte tillämpat ekvivalensklassuppdelning tar ni bort dessa bilder.</a:t>
+            </a:r>
           </a:p>
           <a:p>
             <a:endParaRPr lang="sv-SE" dirty="0"/>
@@ -1036,7 +1008,7 @@
     </p:spTree>
     <p:extLst>
       <p:ext uri="{BB962C8B-B14F-4D97-AF65-F5344CB8AC3E}">
-        <p14:creationId xmlns:p14="http://schemas.microsoft.com/office/powerpoint/2010/main" val="2613784504"/>
+        <p14:creationId xmlns:p14="http://schemas.microsoft.com/office/powerpoint/2010/main" val="2473427308"/>
       </p:ext>
     </p:extLst>
   </p:cSld>
@@ -1117,8 +1089,29 @@
                 <a:ea typeface="+mn-ea"/>
                 <a:cs typeface="+mn-cs"/>
               </a:rPr>
-              <a:t>En kort textuell presentation av vad ni valt ut för att tillämpa tillståndsmaskiner på och vilket eller vilka kriterier ni använder för att ta fram testfall från maskinen. Ni ska kort motivera valet, och ge tillräckligt med information för att det ska gå att bedöma er. Detta avsnitt och de följande ska finnas för samtliga delar ni tillämpat tillståndsmaskiner på. Om ni inte tillämpat tillståndsmaskiner tar ni bort dessa bilder.</a:t>
-            </a:r>
+              <a:t>Samtliga ekvivalensklasser för denna del presenterade på ett tydligt sätt. Använd</a:t>
+            </a:r>
+            <a:r>
+              <a:rPr lang="sv-SE" sz="1200" kern="1200" baseline="0" dirty="0">
+                <a:solidFill>
+                  <a:schemeClr val="tx1"/>
+                </a:solidFill>
+                <a:effectLst/>
+                <a:latin typeface="+mn-lt"/>
+                <a:ea typeface="+mn-ea"/>
+                <a:cs typeface="+mn-cs"/>
+              </a:rPr>
+              <a:t> gärna flera sidor om det behövs.</a:t>
+            </a:r>
+            <a:endParaRPr lang="sv-SE" sz="1200" kern="1200" dirty="0">
+              <a:solidFill>
+                <a:schemeClr val="tx1"/>
+              </a:solidFill>
+              <a:effectLst/>
+              <a:latin typeface="+mn-lt"/>
+              <a:ea typeface="+mn-ea"/>
+              <a:cs typeface="+mn-cs"/>
+            </a:endParaRPr>
           </a:p>
           <a:p>
             <a:endParaRPr lang="sv-SE" dirty="0"/>
@@ -1151,7 +1144,7 @@
     </p:spTree>
     <p:extLst>
       <p:ext uri="{BB962C8B-B14F-4D97-AF65-F5344CB8AC3E}">
-        <p14:creationId xmlns:p14="http://schemas.microsoft.com/office/powerpoint/2010/main" val="2041626993"/>
+        <p14:creationId xmlns:p14="http://schemas.microsoft.com/office/powerpoint/2010/main" val="2613784504"/>
       </p:ext>
     </p:extLst>
   </p:cSld>
@@ -1205,10 +1198,38 @@
           <a:bodyPr/>
           <a:lstStyle/>
           <a:p>
-            <a:r>
-              <a:rPr lang="sv-SE" dirty="0"/>
-              <a:t>Själva tillståndsmaskinen</a:t>
-            </a:r>
+            <a:pPr marL="0" marR="0" lvl="0" indent="0" algn="l" defTabSz="914400" rtl="0" eaLnBrk="1" fontAlgn="auto" latinLnBrk="0" hangingPunct="1">
+              <a:lnSpc>
+                <a:spcPct val="100000"/>
+              </a:lnSpc>
+              <a:spcBef>
+                <a:spcPts val="0"/>
+              </a:spcBef>
+              <a:spcAft>
+                <a:spcPts val="0"/>
+              </a:spcAft>
+              <a:buClrTx/>
+              <a:buSzTx/>
+              <a:buFontTx/>
+              <a:buNone/>
+              <a:tabLst/>
+              <a:defRPr/>
+            </a:pPr>
+            <a:r>
+              <a:rPr lang="sv-SE" sz="1200" kern="1200" dirty="0">
+                <a:solidFill>
+                  <a:schemeClr val="tx1"/>
+                </a:solidFill>
+                <a:effectLst/>
+                <a:latin typeface="+mn-lt"/>
+                <a:ea typeface="+mn-ea"/>
+                <a:cs typeface="+mn-cs"/>
+              </a:rPr>
+              <a:t>En kort textuell presentation av vad ni valt ut för att tillämpa tillståndsmaskiner på och vilket eller vilka kriterier ni använder för att ta fram testfall från maskinen. Ni ska kort motivera valet, och ge tillräckligt med information för att det ska gå att bedöma er. Detta avsnitt och de följande ska finnas för samtliga delar ni tillämpat tillståndsmaskiner på. Om ni inte tillämpat tillståndsmaskiner tar ni bort dessa bilder.</a:t>
+            </a:r>
+          </a:p>
+          <a:p>
+            <a:endParaRPr lang="sv-SE" dirty="0"/>
           </a:p>
         </p:txBody>
       </p:sp>
@@ -1238,7 +1259,7 @@
     </p:spTree>
     <p:extLst>
       <p:ext uri="{BB962C8B-B14F-4D97-AF65-F5344CB8AC3E}">
-        <p14:creationId xmlns:p14="http://schemas.microsoft.com/office/powerpoint/2010/main" val="1235134485"/>
+        <p14:creationId xmlns:p14="http://schemas.microsoft.com/office/powerpoint/2010/main" val="2041626993"/>
       </p:ext>
     </p:extLst>
   </p:cSld>
@@ -1292,39 +1313,10 @@
           <a:bodyPr/>
           <a:lstStyle/>
           <a:p>
-            <a:pPr marL="0" marR="0" lvl="0" indent="0" algn="l" defTabSz="914400" rtl="0" eaLnBrk="1" fontAlgn="auto" latinLnBrk="0" hangingPunct="1">
-              <a:lnSpc>
-                <a:spcPct val="100000"/>
-              </a:lnSpc>
-              <a:spcBef>
-                <a:spcPts val="0"/>
-              </a:spcBef>
-              <a:spcAft>
-                <a:spcPts val="0"/>
-              </a:spcAft>
-              <a:buClrTx/>
-              <a:buSzTx/>
-              <a:buFontTx/>
-              <a:buNone/>
-              <a:tabLst/>
-              <a:defRPr/>
-            </a:pPr>
-            <a:r>
-              <a:rPr lang="sv-SE" sz="1200" kern="1200" dirty="0">
-                <a:solidFill>
-                  <a:schemeClr val="tx1"/>
-                </a:solidFill>
-                <a:effectLst/>
-                <a:latin typeface="+mn-lt"/>
-                <a:ea typeface="+mn-ea"/>
-                <a:cs typeface="+mn-cs"/>
-              </a:rPr>
-              <a:t>Testfallen som ni fått fram från tillståndsmaskinen. Observera att vi inte vill ha någon kod här, utan bara en tydlig presentation av testfallen i någon lämplig tabellform. </a:t>
-            </a:r>
-            <a:endParaRPr lang="sv-SE" dirty="0"/>
-          </a:p>
-          <a:p>
-            <a:endParaRPr lang="sv-SE" dirty="0"/>
+            <a:r>
+              <a:rPr lang="sv-SE" dirty="0"/>
+              <a:t>Själva tillståndsmaskinen</a:t>
+            </a:r>
           </a:p>
         </p:txBody>
       </p:sp>
@@ -1354,7 +1346,7 @@
     </p:spTree>
     <p:extLst>
       <p:ext uri="{BB962C8B-B14F-4D97-AF65-F5344CB8AC3E}">
-        <p14:creationId xmlns:p14="http://schemas.microsoft.com/office/powerpoint/2010/main" val="556359333"/>
+        <p14:creationId xmlns:p14="http://schemas.microsoft.com/office/powerpoint/2010/main" val="1235134485"/>
       </p:ext>
     </p:extLst>
   </p:cSld>
@@ -1435,77 +1427,9 @@
                 <a:ea typeface="+mn-ea"/>
                 <a:cs typeface="+mn-cs"/>
               </a:rPr>
-              <a:t>En testmatris (eller annan</a:t>
-            </a:r>
-            <a:r>
-              <a:rPr lang="sv-SE" sz="1200" kern="1200" baseline="0" dirty="0">
-                <a:solidFill>
-                  <a:schemeClr val="tx1"/>
-                </a:solidFill>
-                <a:effectLst/>
-                <a:latin typeface="+mn-lt"/>
-                <a:ea typeface="+mn-ea"/>
-                <a:cs typeface="+mn-cs"/>
-              </a:rPr>
-              <a:t> lämplig form)</a:t>
-            </a:r>
-            <a:r>
-              <a:rPr lang="sv-SE" sz="1200" kern="1200" dirty="0">
-                <a:solidFill>
-                  <a:schemeClr val="tx1"/>
-                </a:solidFill>
-                <a:effectLst/>
-                <a:latin typeface="+mn-lt"/>
-                <a:ea typeface="+mn-ea"/>
-                <a:cs typeface="+mn-cs"/>
-              </a:rPr>
-              <a:t> som visar sambandet mellan tillståndsmaskinen och testfallen för denna del så att det går att se att ni tillämpat de kriterier</a:t>
-            </a:r>
-            <a:r>
-              <a:rPr lang="sv-SE" sz="1200" kern="1200" baseline="0" dirty="0">
-                <a:solidFill>
-                  <a:schemeClr val="tx1"/>
-                </a:solidFill>
-                <a:effectLst/>
-                <a:latin typeface="+mn-lt"/>
-                <a:ea typeface="+mn-ea"/>
-                <a:cs typeface="+mn-cs"/>
-              </a:rPr>
-              <a:t> ni satt upp för att ta fram testfall</a:t>
-            </a:r>
-            <a:r>
-              <a:rPr lang="sv-SE" sz="1200" kern="1200" dirty="0">
-                <a:solidFill>
-                  <a:schemeClr val="tx1"/>
-                </a:solidFill>
-                <a:effectLst/>
-                <a:latin typeface="+mn-lt"/>
-                <a:ea typeface="+mn-ea"/>
-                <a:cs typeface="+mn-cs"/>
-              </a:rPr>
-              <a:t>. Om detta tydligt framgår från testfallen</a:t>
-            </a:r>
-            <a:r>
-              <a:rPr lang="sv-SE" sz="1200" kern="1200" baseline="0" dirty="0">
-                <a:solidFill>
-                  <a:schemeClr val="tx1"/>
-                </a:solidFill>
-                <a:effectLst/>
-                <a:latin typeface="+mn-lt"/>
-                <a:ea typeface="+mn-ea"/>
-                <a:cs typeface="+mn-cs"/>
-              </a:rPr>
-              <a:t> så kan denna bild plockas bort.</a:t>
-            </a:r>
-            <a:endParaRPr lang="sv-SE" sz="1200" kern="1200" dirty="0">
-              <a:solidFill>
-                <a:schemeClr val="tx1"/>
-              </a:solidFill>
-              <a:effectLst/>
-              <a:latin typeface="+mn-lt"/>
-              <a:ea typeface="+mn-ea"/>
-              <a:cs typeface="+mn-cs"/>
-            </a:endParaRPr>
+              <a:t>Testfallen som ni fått fram från tillståndsmaskinen. Observera att vi inte vill ha någon kod här, utan bara en tydlig presentation av testfallen i någon lämplig tabellform. </a:t>
+            </a:r>
+            <a:endParaRPr lang="sv-SE" dirty="0"/>
           </a:p>
           <a:p>
             <a:endParaRPr lang="sv-SE" dirty="0"/>
@@ -1538,7 +1462,7 @@
     </p:spTree>
     <p:extLst>
       <p:ext uri="{BB962C8B-B14F-4D97-AF65-F5344CB8AC3E}">
-        <p14:creationId xmlns:p14="http://schemas.microsoft.com/office/powerpoint/2010/main" val="61413010"/>
+        <p14:creationId xmlns:p14="http://schemas.microsoft.com/office/powerpoint/2010/main" val="556359333"/>
       </p:ext>
     </p:extLst>
   </p:cSld>
@@ -1619,10 +1543,10 @@
                 <a:ea typeface="+mn-ea"/>
                 <a:cs typeface="+mn-cs"/>
               </a:rPr>
-              <a:t>En kort presentation av den del av koden ni valt ut för att göra en formell granskning av och processen ni använt er av inklusive eventuella checklistor, scenarier, </a:t>
-            </a:r>
-            <a:r>
-              <a:rPr lang="sv-SE" sz="1200" kern="1200" dirty="0" err="1">
+              <a:t>En testmatris (eller annan</a:t>
+            </a:r>
+            <a:r>
+              <a:rPr lang="sv-SE" sz="1200" kern="1200" baseline="0" dirty="0">
                 <a:solidFill>
                   <a:schemeClr val="tx1"/>
                 </a:solidFill>
@@ -1631,7 +1555,7 @@
                 <a:ea typeface="+mn-ea"/>
                 <a:cs typeface="+mn-cs"/>
               </a:rPr>
-              <a:t>edyl</a:t>
+              <a:t> lämplig form)</a:t>
             </a:r>
             <a:r>
               <a:rPr lang="sv-SE" sz="1200" kern="1200" dirty="0">
@@ -1643,8 +1567,53 @@
                 <a:ea typeface="+mn-ea"/>
                 <a:cs typeface="+mn-cs"/>
               </a:rPr>
-              <a:t>. Ni ska kort motivera valen, och ge tillräckligt med information för att det ska gå att bedöma er. </a:t>
-            </a:r>
+              <a:t> som visar sambandet mellan tillståndsmaskinen och testfallen för denna del så att det går att se att ni tillämpat de kriterier</a:t>
+            </a:r>
+            <a:r>
+              <a:rPr lang="sv-SE" sz="1200" kern="1200" baseline="0" dirty="0">
+                <a:solidFill>
+                  <a:schemeClr val="tx1"/>
+                </a:solidFill>
+                <a:effectLst/>
+                <a:latin typeface="+mn-lt"/>
+                <a:ea typeface="+mn-ea"/>
+                <a:cs typeface="+mn-cs"/>
+              </a:rPr>
+              <a:t> ni satt upp för att ta fram testfall</a:t>
+            </a:r>
+            <a:r>
+              <a:rPr lang="sv-SE" sz="1200" kern="1200" dirty="0">
+                <a:solidFill>
+                  <a:schemeClr val="tx1"/>
+                </a:solidFill>
+                <a:effectLst/>
+                <a:latin typeface="+mn-lt"/>
+                <a:ea typeface="+mn-ea"/>
+                <a:cs typeface="+mn-cs"/>
+              </a:rPr>
+              <a:t>. Om detta tydligt framgår från testfallen</a:t>
+            </a:r>
+            <a:r>
+              <a:rPr lang="sv-SE" sz="1200" kern="1200" baseline="0" dirty="0">
+                <a:solidFill>
+                  <a:schemeClr val="tx1"/>
+                </a:solidFill>
+                <a:effectLst/>
+                <a:latin typeface="+mn-lt"/>
+                <a:ea typeface="+mn-ea"/>
+                <a:cs typeface="+mn-cs"/>
+              </a:rPr>
+              <a:t> så kan denna bild plockas bort.</a:t>
+            </a:r>
+            <a:endParaRPr lang="sv-SE" sz="1200" kern="1200" dirty="0">
+              <a:solidFill>
+                <a:schemeClr val="tx1"/>
+              </a:solidFill>
+              <a:effectLst/>
+              <a:latin typeface="+mn-lt"/>
+              <a:ea typeface="+mn-ea"/>
+              <a:cs typeface="+mn-cs"/>
+            </a:endParaRPr>
           </a:p>
           <a:p>
             <a:endParaRPr lang="sv-SE" dirty="0"/>
@@ -1677,7 +1646,7 @@
     </p:spTree>
     <p:extLst>
       <p:ext uri="{BB962C8B-B14F-4D97-AF65-F5344CB8AC3E}">
-        <p14:creationId xmlns:p14="http://schemas.microsoft.com/office/powerpoint/2010/main" val="1836920504"/>
+        <p14:creationId xmlns:p14="http://schemas.microsoft.com/office/powerpoint/2010/main" val="61413010"/>
       </p:ext>
     </p:extLst>
   </p:cSld>
@@ -1758,7 +1727,31 @@
                 <a:ea typeface="+mn-ea"/>
                 <a:cs typeface="+mn-cs"/>
               </a:rPr>
-              <a:t>En lista över de påträffade felen och hur pass allvarliga ni bedömer dem.</a:t>
+              <a:t>En kort presentation av den del av koden ni valt ut för att göra en formell granskning av och processen ni använt er av inklusive eventuella checklistor, scenarier, </a:t>
+            </a:r>
+            <a:r>
+              <a:rPr lang="sv-SE" sz="1200" kern="1200" dirty="0" err="1">
+                <a:solidFill>
+                  <a:schemeClr val="tx1"/>
+                </a:solidFill>
+                <a:effectLst/>
+                <a:latin typeface="+mn-lt"/>
+                <a:ea typeface="+mn-ea"/>
+                <a:cs typeface="+mn-cs"/>
+              </a:rPr>
+              <a:t>edyl</a:t>
+            </a:r>
+            <a:r>
+              <a:rPr lang="sv-SE" sz="1200" kern="1200" dirty="0">
+                <a:solidFill>
+                  <a:schemeClr val="tx1"/>
+                </a:solidFill>
+                <a:effectLst/>
+                <a:latin typeface="+mn-lt"/>
+                <a:ea typeface="+mn-ea"/>
+                <a:cs typeface="+mn-cs"/>
+              </a:rPr>
+              <a:t>. Ni ska kort motivera valen, och ge tillräckligt med information för att det ska gå att bedöma er. </a:t>
             </a:r>
           </a:p>
           <a:p>
@@ -1792,7 +1785,7 @@
     </p:spTree>
     <p:extLst>
       <p:ext uri="{BB962C8B-B14F-4D97-AF65-F5344CB8AC3E}">
-        <p14:creationId xmlns:p14="http://schemas.microsoft.com/office/powerpoint/2010/main" val="1645734220"/>
+        <p14:creationId xmlns:p14="http://schemas.microsoft.com/office/powerpoint/2010/main" val="1836920504"/>
       </p:ext>
     </p:extLst>
   </p:cSld>
@@ -1957,31 +1950,7 @@
                 <a:ea typeface="+mn-ea"/>
                 <a:cs typeface="+mn-cs"/>
               </a:rPr>
-              <a:t>En diskussion om vilka era erfarenheter ni dragit av att tillämpa granskning. Det finns inget rätt eller fel här. Enda sättet att bli underkända är att bara fuska över punkten och bara säga något pliktskyldigt. Ni förväntas förhålla er till såväl kursböckerna som utdelat material och IEEE </a:t>
-            </a:r>
-            <a:r>
-              <a:rPr lang="sv-SE" sz="1200" kern="1200" dirty="0" err="1">
-                <a:solidFill>
-                  <a:schemeClr val="tx1"/>
-                </a:solidFill>
-                <a:effectLst/>
-                <a:latin typeface="+mn-lt"/>
-                <a:ea typeface="+mn-ea"/>
-                <a:cs typeface="+mn-cs"/>
-              </a:rPr>
-              <a:t>Std</a:t>
-            </a:r>
-            <a:r>
-              <a:rPr lang="sv-SE" sz="1200" kern="1200" dirty="0">
-                <a:solidFill>
-                  <a:schemeClr val="tx1"/>
-                </a:solidFill>
-                <a:effectLst/>
-                <a:latin typeface="+mn-lt"/>
-                <a:ea typeface="+mn-ea"/>
-                <a:cs typeface="+mn-cs"/>
-              </a:rPr>
-              <a:t> 1028.</a:t>
+              <a:t>En lista över de påträffade felen och hur pass allvarliga ni bedömer dem.</a:t>
             </a:r>
           </a:p>
           <a:p>
@@ -2015,7 +1984,7 @@
     </p:spTree>
     <p:extLst>
       <p:ext uri="{BB962C8B-B14F-4D97-AF65-F5344CB8AC3E}">
-        <p14:creationId xmlns:p14="http://schemas.microsoft.com/office/powerpoint/2010/main" val="393491449"/>
+        <p14:creationId xmlns:p14="http://schemas.microsoft.com/office/powerpoint/2010/main" val="1645734220"/>
       </p:ext>
     </p:extLst>
   </p:cSld>
@@ -2096,7 +2065,31 @@
                 <a:ea typeface="+mn-ea"/>
                 <a:cs typeface="+mn-cs"/>
               </a:rPr>
-              <a:t>En presentation av de problem som hittats med hjälp av verktyg för statisk analys och en diskussion av dem enligt anvisningarna. Det räcker alltså inte med att bara lista problemen, ni måste förhålla er till dem också. Tänk också på att ni ska göra detta både på koden som den såg ut före granskningen och på koden efter att ni rättat det som kommit fram under granskningen.</a:t>
+              <a:t>En diskussion om vilka era erfarenheter ni dragit av att tillämpa granskning. Det finns inget rätt eller fel här. Enda sättet att bli underkända är att bara fuska över punkten och bara säga något pliktskyldigt. Ni förväntas förhålla er till såväl kursböckerna som utdelat material och IEEE </a:t>
+            </a:r>
+            <a:r>
+              <a:rPr lang="sv-SE" sz="1200" kern="1200" dirty="0" err="1">
+                <a:solidFill>
+                  <a:schemeClr val="tx1"/>
+                </a:solidFill>
+                <a:effectLst/>
+                <a:latin typeface="+mn-lt"/>
+                <a:ea typeface="+mn-ea"/>
+                <a:cs typeface="+mn-cs"/>
+              </a:rPr>
+              <a:t>Std</a:t>
+            </a:r>
+            <a:r>
+              <a:rPr lang="sv-SE" sz="1200" kern="1200" dirty="0">
+                <a:solidFill>
+                  <a:schemeClr val="tx1"/>
+                </a:solidFill>
+                <a:effectLst/>
+                <a:latin typeface="+mn-lt"/>
+                <a:ea typeface="+mn-ea"/>
+                <a:cs typeface="+mn-cs"/>
+              </a:rPr>
+              <a:t> 1028.</a:t>
             </a:r>
           </a:p>
           <a:p>
@@ -2130,7 +2123,7 @@
     </p:spTree>
     <p:extLst>
       <p:ext uri="{BB962C8B-B14F-4D97-AF65-F5344CB8AC3E}">
-        <p14:creationId xmlns:p14="http://schemas.microsoft.com/office/powerpoint/2010/main" val="1343433812"/>
+        <p14:creationId xmlns:p14="http://schemas.microsoft.com/office/powerpoint/2010/main" val="393491449"/>
       </p:ext>
     </p:extLst>
   </p:cSld>
@@ -2211,7 +2204,7 @@
                 <a:ea typeface="+mn-ea"/>
                 <a:cs typeface="+mn-cs"/>
               </a:rPr>
-              <a:t>En presentation och diskussion kring ett antal lämpliga statiska mått på koden. Att vi inte specificerar exakt vilka mått som ska tas upp beror på att olika verktyg har olika uppsättningar, men vi förväntar oss fler och mer intressanta mått än bara rena storleksmått som LOC, #klasser, #metoder, etc. Även här är det viktigt att förhållas sig till måtten, inte bara lista dem.</a:t>
+              <a:t>En presentation av de problem som hittats med hjälp av verktyg för statisk analys och en diskussion av dem enligt anvisningarna. Det räcker alltså inte med att bara lista problemen, ni måste förhålla er till dem också. Tänk också på att ni ska göra detta både på koden som den såg ut före granskningen och på koden efter att ni rättat det som kommit fram under granskningen.</a:t>
             </a:r>
           </a:p>
           <a:p>
@@ -2245,7 +2238,7 @@
     </p:spTree>
     <p:extLst>
       <p:ext uri="{BB962C8B-B14F-4D97-AF65-F5344CB8AC3E}">
-        <p14:creationId xmlns:p14="http://schemas.microsoft.com/office/powerpoint/2010/main" val="247082709"/>
+        <p14:creationId xmlns:p14="http://schemas.microsoft.com/office/powerpoint/2010/main" val="1343433812"/>
       </p:ext>
     </p:extLst>
   </p:cSld>
@@ -2326,7 +2319,7 @@
                 <a:ea typeface="+mn-ea"/>
                 <a:cs typeface="+mn-cs"/>
               </a:rPr>
-              <a:t>En översikt över vilken täckningsgrad era testfall uppnått. Denna kan antagligen tas rakt av från verktyget ni använt för att mäta den. Om ni inte uppnått fullständig täckning så ska detta förklaras och motiveras.</a:t>
+              <a:t>En presentation och diskussion kring ett antal lämpliga statiska mått på koden. Att vi inte specificerar exakt vilka mått som ska tas upp beror på att olika verktyg har olika uppsättningar, men vi förväntar oss fler och mer intressanta mått än bara rena storleksmått som LOC, #klasser, #metoder, etc. Även här är det viktigt att förhållas sig till måtten, inte bara lista dem.</a:t>
             </a:r>
           </a:p>
           <a:p>
@@ -2360,7 +2353,7 @@
     </p:spTree>
     <p:extLst>
       <p:ext uri="{BB962C8B-B14F-4D97-AF65-F5344CB8AC3E}">
-        <p14:creationId xmlns:p14="http://schemas.microsoft.com/office/powerpoint/2010/main" val="169751880"/>
+        <p14:creationId xmlns:p14="http://schemas.microsoft.com/office/powerpoint/2010/main" val="247082709"/>
       </p:ext>
     </p:extLst>
   </p:cSld>
@@ -2441,6 +2434,121 @@
                 <a:ea typeface="+mn-ea"/>
                 <a:cs typeface="+mn-cs"/>
               </a:rPr>
+              <a:t>En översikt över vilken täckningsgrad era testfall uppnått. Denna kan antagligen tas rakt av från verktyget ni använt för att mäta den. Om ni inte uppnått fullständig täckning så ska detta förklaras och motiveras.</a:t>
+            </a:r>
+          </a:p>
+          <a:p>
+            <a:endParaRPr lang="sv-SE" dirty="0"/>
+          </a:p>
+        </p:txBody>
+      </p:sp>
+      <p:sp>
+        <p:nvSpPr>
+          <p:cNvPr id="4" name="Platshållare för bildnummer 3"/>
+          <p:cNvSpPr>
+            <a:spLocks noGrp="1"/>
+          </p:cNvSpPr>
+          <p:nvPr>
+            <p:ph type="sldNum" sz="quarter" idx="10"/>
+          </p:nvPr>
+        </p:nvSpPr>
+        <p:spPr/>
+        <p:txBody>
+          <a:bodyPr/>
+          <a:lstStyle/>
+          <a:p>
+            <a:fld id="{8667F948-D2CB-486C-A2EA-FEABC2DAAE8D}" type="slidenum">
+              <a:rPr lang="sv-SE" smtClean="0"/>
+              <a:t>24</a:t>
+            </a:fld>
+            <a:endParaRPr lang="sv-SE"/>
+          </a:p>
+        </p:txBody>
+      </p:sp>
+    </p:spTree>
+    <p:extLst>
+      <p:ext uri="{BB962C8B-B14F-4D97-AF65-F5344CB8AC3E}">
+        <p14:creationId xmlns:p14="http://schemas.microsoft.com/office/powerpoint/2010/main" val="169751880"/>
+      </p:ext>
+    </p:extLst>
+  </p:cSld>
+  <p:clrMapOvr>
+    <a:masterClrMapping/>
+  </p:clrMapOvr>
+</p:notes>
+</file>
+
+<file path=ppt/notesSlides/notesSlide25.xml><?xml version="1.0" encoding="utf-8"?>
+<p:notes xmlns:a="http://schemas.openxmlformats.org/drawingml/2006/main" xmlns:r="http://schemas.openxmlformats.org/officeDocument/2006/relationships" xmlns:p="http://schemas.openxmlformats.org/presentationml/2006/main">
+  <p:cSld>
+    <p:spTree>
+      <p:nvGrpSpPr>
+        <p:cNvPr id="1" name=""/>
+        <p:cNvGrpSpPr/>
+        <p:nvPr/>
+      </p:nvGrpSpPr>
+      <p:grpSpPr>
+        <a:xfrm>
+          <a:off x="0" y="0"/>
+          <a:ext cx="0" cy="0"/>
+          <a:chOff x="0" y="0"/>
+          <a:chExt cx="0" cy="0"/>
+        </a:xfrm>
+      </p:grpSpPr>
+      <p:sp>
+        <p:nvSpPr>
+          <p:cNvPr id="2" name="Platshållare för bildobjekt 1"/>
+          <p:cNvSpPr>
+            <a:spLocks noGrp="1" noRot="1" noChangeAspect="1"/>
+          </p:cNvSpPr>
+          <p:nvPr>
+            <p:ph type="sldImg"/>
+          </p:nvPr>
+        </p:nvSpPr>
+        <p:spPr/>
+      </p:sp>
+      <p:sp>
+        <p:nvSpPr>
+          <p:cNvPr id="3" name="Platshållare för anteckningar 2"/>
+          <p:cNvSpPr>
+            <a:spLocks noGrp="1"/>
+          </p:cNvSpPr>
+          <p:nvPr>
+            <p:ph type="body" idx="1"/>
+          </p:nvPr>
+        </p:nvSpPr>
+        <p:spPr/>
+        <p:txBody>
+          <a:bodyPr/>
+          <a:lstStyle/>
+          <a:p>
+            <a:pPr marL="0" marR="0" lvl="0" indent="0" algn="l" defTabSz="914400" rtl="0" eaLnBrk="1" fontAlgn="auto" latinLnBrk="0" hangingPunct="1">
+              <a:lnSpc>
+                <a:spcPct val="100000"/>
+              </a:lnSpc>
+              <a:spcBef>
+                <a:spcPts val="0"/>
+              </a:spcBef>
+              <a:spcAft>
+                <a:spcPts val="0"/>
+              </a:spcAft>
+              <a:buClrTx/>
+              <a:buSzTx/>
+              <a:buFontTx/>
+              <a:buNone/>
+              <a:tabLst/>
+              <a:defRPr/>
+            </a:pPr>
+            <a:r>
+              <a:rPr lang="sv-SE" sz="1200" kern="1200" dirty="0">
+                <a:solidFill>
+                  <a:schemeClr val="tx1"/>
+                </a:solidFill>
+                <a:effectLst/>
+                <a:latin typeface="+mn-lt"/>
+                <a:ea typeface="+mn-ea"/>
+                <a:cs typeface="+mn-cs"/>
+              </a:rPr>
               <a:t>En kort presentation av hur ni gått tillväga för att testa koden med en profiler och vilka resultat ni fick fram. Även här är det viktigt att förhållas sig till måtten, inte bara presentera dem.</a:t>
             </a:r>
           </a:p>
@@ -2494,7 +2602,7 @@
           <a:p>
             <a:fld id="{8667F948-D2CB-486C-A2EA-FEABC2DAAE8D}" type="slidenum">
               <a:rPr lang="sv-SE" smtClean="0"/>
-              <a:t>24</a:t>
+              <a:t>25</a:t>
             </a:fld>
             <a:endParaRPr lang="sv-SE"/>
           </a:p>
@@ -2504,121 +2612,6 @@
     <p:extLst>
       <p:ext uri="{BB962C8B-B14F-4D97-AF65-F5344CB8AC3E}">
         <p14:creationId xmlns:p14="http://schemas.microsoft.com/office/powerpoint/2010/main" val="1278246246"/>
-      </p:ext>
-    </p:extLst>
-  </p:cSld>
-  <p:clrMapOvr>
-    <a:masterClrMapping/>
-  </p:clrMapOvr>
-</p:notes>
-</file>
-
-<file path=ppt/notesSlides/notesSlide25.xml><?xml version="1.0" encoding="utf-8"?>
-<p:notes xmlns:a="http://schemas.openxmlformats.org/drawingml/2006/main" xmlns:r="http://schemas.openxmlformats.org/officeDocument/2006/relationships" xmlns:p="http://schemas.openxmlformats.org/presentationml/2006/main">
-  <p:cSld>
-    <p:spTree>
-      <p:nvGrpSpPr>
-        <p:cNvPr id="1" name=""/>
-        <p:cNvGrpSpPr/>
-        <p:nvPr/>
-      </p:nvGrpSpPr>
-      <p:grpSpPr>
-        <a:xfrm>
-          <a:off x="0" y="0"/>
-          <a:ext cx="0" cy="0"/>
-          <a:chOff x="0" y="0"/>
-          <a:chExt cx="0" cy="0"/>
-        </a:xfrm>
-      </p:grpSpPr>
-      <p:sp>
-        <p:nvSpPr>
-          <p:cNvPr id="2" name="Platshållare för bildobjekt 1"/>
-          <p:cNvSpPr>
-            <a:spLocks noGrp="1" noRot="1" noChangeAspect="1"/>
-          </p:cNvSpPr>
-          <p:nvPr>
-            <p:ph type="sldImg"/>
-          </p:nvPr>
-        </p:nvSpPr>
-        <p:spPr/>
-      </p:sp>
-      <p:sp>
-        <p:nvSpPr>
-          <p:cNvPr id="3" name="Platshållare för anteckningar 2"/>
-          <p:cNvSpPr>
-            <a:spLocks noGrp="1"/>
-          </p:cNvSpPr>
-          <p:nvPr>
-            <p:ph type="body" idx="1"/>
-          </p:nvPr>
-        </p:nvSpPr>
-        <p:spPr/>
-        <p:txBody>
-          <a:bodyPr/>
-          <a:lstStyle/>
-          <a:p>
-            <a:pPr marL="0" marR="0" lvl="0" indent="0" algn="l" defTabSz="914400" rtl="0" eaLnBrk="1" fontAlgn="auto" latinLnBrk="0" hangingPunct="1">
-              <a:lnSpc>
-                <a:spcPct val="100000"/>
-              </a:lnSpc>
-              <a:spcBef>
-                <a:spcPts val="0"/>
-              </a:spcBef>
-              <a:spcAft>
-                <a:spcPts val="0"/>
-              </a:spcAft>
-              <a:buClrTx/>
-              <a:buSzTx/>
-              <a:buFontTx/>
-              <a:buNone/>
-              <a:tabLst/>
-              <a:defRPr/>
-            </a:pPr>
-            <a:r>
-              <a:rPr lang="sv-SE" sz="1200" kern="1200" dirty="0">
-                <a:solidFill>
-                  <a:schemeClr val="tx1"/>
-                </a:solidFill>
-                <a:effectLst/>
-                <a:latin typeface="+mn-lt"/>
-                <a:ea typeface="+mn-ea"/>
-                <a:cs typeface="+mn-cs"/>
-              </a:rPr>
-              <a:t>Byggscriptets första (seriösa) version, och den slutliga.</a:t>
-            </a:r>
-          </a:p>
-          <a:p>
-            <a:endParaRPr lang="sv-SE" dirty="0"/>
-          </a:p>
-        </p:txBody>
-      </p:sp>
-      <p:sp>
-        <p:nvSpPr>
-          <p:cNvPr id="4" name="Platshållare för bildnummer 3"/>
-          <p:cNvSpPr>
-            <a:spLocks noGrp="1"/>
-          </p:cNvSpPr>
-          <p:nvPr>
-            <p:ph type="sldNum" sz="quarter" idx="10"/>
-          </p:nvPr>
-        </p:nvSpPr>
-        <p:spPr/>
-        <p:txBody>
-          <a:bodyPr/>
-          <a:lstStyle/>
-          <a:p>
-            <a:fld id="{8667F948-D2CB-486C-A2EA-FEABC2DAAE8D}" type="slidenum">
-              <a:rPr lang="sv-SE" smtClean="0"/>
-              <a:t>26</a:t>
-            </a:fld>
-            <a:endParaRPr lang="sv-SE"/>
-          </a:p>
-        </p:txBody>
-      </p:sp>
-    </p:spTree>
-    <p:extLst>
-      <p:ext uri="{BB962C8B-B14F-4D97-AF65-F5344CB8AC3E}">
-        <p14:creationId xmlns:p14="http://schemas.microsoft.com/office/powerpoint/2010/main" val="109849433"/>
       </p:ext>
     </p:extLst>
   </p:cSld>
@@ -2699,7 +2692,7 @@
                 <a:ea typeface="+mn-ea"/>
                 <a:cs typeface="+mn-cs"/>
               </a:rPr>
-              <a:t>Här kan ni ta upp övrigt av relevans för bedömningen av ert arbete. Om avsnittet inte behövs kan det plockas bort.</a:t>
+              <a:t>Byggscriptets första (seriösa) version, och den slutliga.</a:t>
             </a:r>
           </a:p>
           <a:p>
@@ -2725,6 +2718,121 @@
             <a:fld id="{8667F948-D2CB-486C-A2EA-FEABC2DAAE8D}" type="slidenum">
               <a:rPr lang="sv-SE" smtClean="0"/>
               <a:t>27</a:t>
+            </a:fld>
+            <a:endParaRPr lang="sv-SE"/>
+          </a:p>
+        </p:txBody>
+      </p:sp>
+    </p:spTree>
+    <p:extLst>
+      <p:ext uri="{BB962C8B-B14F-4D97-AF65-F5344CB8AC3E}">
+        <p14:creationId xmlns:p14="http://schemas.microsoft.com/office/powerpoint/2010/main" val="109849433"/>
+      </p:ext>
+    </p:extLst>
+  </p:cSld>
+  <p:clrMapOvr>
+    <a:masterClrMapping/>
+  </p:clrMapOvr>
+</p:notes>
+</file>
+
+<file path=ppt/notesSlides/notesSlide27.xml><?xml version="1.0" encoding="utf-8"?>
+<p:notes xmlns:a="http://schemas.openxmlformats.org/drawingml/2006/main" xmlns:r="http://schemas.openxmlformats.org/officeDocument/2006/relationships" xmlns:p="http://schemas.openxmlformats.org/presentationml/2006/main">
+  <p:cSld>
+    <p:spTree>
+      <p:nvGrpSpPr>
+        <p:cNvPr id="1" name=""/>
+        <p:cNvGrpSpPr/>
+        <p:nvPr/>
+      </p:nvGrpSpPr>
+      <p:grpSpPr>
+        <a:xfrm>
+          <a:off x="0" y="0"/>
+          <a:ext cx="0" cy="0"/>
+          <a:chOff x="0" y="0"/>
+          <a:chExt cx="0" cy="0"/>
+        </a:xfrm>
+      </p:grpSpPr>
+      <p:sp>
+        <p:nvSpPr>
+          <p:cNvPr id="2" name="Platshållare för bildobjekt 1"/>
+          <p:cNvSpPr>
+            <a:spLocks noGrp="1" noRot="1" noChangeAspect="1"/>
+          </p:cNvSpPr>
+          <p:nvPr>
+            <p:ph type="sldImg"/>
+          </p:nvPr>
+        </p:nvSpPr>
+        <p:spPr/>
+      </p:sp>
+      <p:sp>
+        <p:nvSpPr>
+          <p:cNvPr id="3" name="Platshållare för anteckningar 2"/>
+          <p:cNvSpPr>
+            <a:spLocks noGrp="1"/>
+          </p:cNvSpPr>
+          <p:nvPr>
+            <p:ph type="body" idx="1"/>
+          </p:nvPr>
+        </p:nvSpPr>
+        <p:spPr/>
+        <p:txBody>
+          <a:bodyPr/>
+          <a:lstStyle/>
+          <a:p>
+            <a:pPr marL="0" marR="0" lvl="0" indent="0" algn="l" defTabSz="914400" rtl="0" eaLnBrk="1" fontAlgn="auto" latinLnBrk="0" hangingPunct="1">
+              <a:lnSpc>
+                <a:spcPct val="100000"/>
+              </a:lnSpc>
+              <a:spcBef>
+                <a:spcPts val="0"/>
+              </a:spcBef>
+              <a:spcAft>
+                <a:spcPts val="0"/>
+              </a:spcAft>
+              <a:buClrTx/>
+              <a:buSzTx/>
+              <a:buFontTx/>
+              <a:buNone/>
+              <a:tabLst/>
+              <a:defRPr/>
+            </a:pPr>
+            <a:r>
+              <a:rPr lang="sv-SE" sz="1200" kern="1200" dirty="0">
+                <a:solidFill>
+                  <a:schemeClr val="tx1"/>
+                </a:solidFill>
+                <a:effectLst/>
+                <a:latin typeface="+mn-lt"/>
+                <a:ea typeface="+mn-ea"/>
+                <a:cs typeface="+mn-cs"/>
+              </a:rPr>
+              <a:t>Här kan ni ta upp övrigt av relevans för bedömningen av ert arbete. Om avsnittet inte behövs kan det plockas bort.</a:t>
+            </a:r>
+          </a:p>
+          <a:p>
+            <a:endParaRPr lang="sv-SE" dirty="0"/>
+          </a:p>
+        </p:txBody>
+      </p:sp>
+      <p:sp>
+        <p:nvSpPr>
+          <p:cNvPr id="4" name="Platshållare för bildnummer 3"/>
+          <p:cNvSpPr>
+            <a:spLocks noGrp="1"/>
+          </p:cNvSpPr>
+          <p:nvPr>
+            <p:ph type="sldNum" sz="quarter" idx="10"/>
+          </p:nvPr>
+        </p:nvSpPr>
+        <p:spPr/>
+        <p:txBody>
+          <a:bodyPr/>
+          <a:lstStyle/>
+          <a:p>
+            <a:fld id="{8667F948-D2CB-486C-A2EA-FEABC2DAAE8D}" type="slidenum">
+              <a:rPr lang="sv-SE" smtClean="0"/>
+              <a:t>28</a:t>
             </a:fld>
             <a:endParaRPr lang="sv-SE"/>
           </a:p>
@@ -3166,7 +3274,7 @@
     </p:spTree>
     <p:extLst>
       <p:ext uri="{BB962C8B-B14F-4D97-AF65-F5344CB8AC3E}">
-        <p14:creationId xmlns:p14="http://schemas.microsoft.com/office/powerpoint/2010/main" val="1704264600"/>
+        <p14:creationId xmlns:p14="http://schemas.microsoft.com/office/powerpoint/2010/main" val="3474236988"/>
       </p:ext>
     </p:extLst>
   </p:cSld>
@@ -3329,7 +3437,7 @@
     </p:spTree>
     <p:extLst>
       <p:ext uri="{BB962C8B-B14F-4D97-AF65-F5344CB8AC3E}">
-        <p14:creationId xmlns:p14="http://schemas.microsoft.com/office/powerpoint/2010/main" val="3363262152"/>
+        <p14:creationId xmlns:p14="http://schemas.microsoft.com/office/powerpoint/2010/main" val="1704264600"/>
       </p:ext>
     </p:extLst>
   </p:cSld>
@@ -3492,7 +3600,7 @@
     </p:spTree>
     <p:extLst>
       <p:ext uri="{BB962C8B-B14F-4D97-AF65-F5344CB8AC3E}">
-        <p14:creationId xmlns:p14="http://schemas.microsoft.com/office/powerpoint/2010/main" val="2906159421"/>
+        <p14:creationId xmlns:p14="http://schemas.microsoft.com/office/powerpoint/2010/main" val="3363262152"/>
       </p:ext>
     </p:extLst>
   </p:cSld>
@@ -3655,7 +3763,7 @@
     </p:spTree>
     <p:extLst>
       <p:ext uri="{BB962C8B-B14F-4D97-AF65-F5344CB8AC3E}">
-        <p14:creationId xmlns:p14="http://schemas.microsoft.com/office/powerpoint/2010/main" val="3805628052"/>
+        <p14:creationId xmlns:p14="http://schemas.microsoft.com/office/powerpoint/2010/main" val="2906159421"/>
       </p:ext>
     </p:extLst>
   </p:cSld>
@@ -3727,8 +3835,64 @@
               <a:defRPr/>
             </a:pPr>
             <a:r>
-              <a:rPr lang="sv-SE" dirty="0"/>
-              <a:t>En diskussion om vilka era erfarenheter ni dragit av att tillämpa TDD. Det finns inget rätt eller fel här. Enda sättet att bli underkända är att bara fuska över punkten och säga något pliktskyldigt.</a:t>
+              <a:rPr lang="sv-SE" sz="1200" kern="1200" dirty="0">
+                <a:solidFill>
+                  <a:schemeClr val="tx1"/>
+                </a:solidFill>
+                <a:effectLst/>
+                <a:latin typeface="+mn-lt"/>
+                <a:ea typeface="+mn-ea"/>
+                <a:cs typeface="+mn-cs"/>
+              </a:rPr>
+              <a:t>Två eller tre exempel per</a:t>
+            </a:r>
+            <a:r>
+              <a:rPr lang="sv-SE" sz="1200" kern="1200" baseline="0" dirty="0">
+                <a:solidFill>
+                  <a:schemeClr val="tx1"/>
+                </a:solidFill>
+                <a:effectLst/>
+                <a:latin typeface="+mn-lt"/>
+                <a:ea typeface="+mn-ea"/>
+                <a:cs typeface="+mn-cs"/>
+              </a:rPr>
+              <a:t> person i projektet på hur ni tillämpat TDD med koden för såväl testfallen som koden som ska testas. (Det kan alltså bli upp till 15 sidor för en fempersonersgrupp.) Exemplen ska vara från olika </a:t>
+            </a:r>
+            <a:r>
+              <a:rPr lang="sv-SE" sz="1200" kern="1200" baseline="0" dirty="0" err="1">
+                <a:solidFill>
+                  <a:schemeClr val="tx1"/>
+                </a:solidFill>
+                <a:effectLst/>
+                <a:latin typeface="+mn-lt"/>
+                <a:ea typeface="+mn-ea"/>
+                <a:cs typeface="+mn-cs"/>
+              </a:rPr>
+              <a:t>faser</a:t>
+            </a:r>
+            <a:r>
+              <a:rPr lang="sv-SE" sz="1200" kern="1200" dirty="0" err="1">
+                <a:solidFill>
+                  <a:schemeClr val="tx1"/>
+                </a:solidFill>
+                <a:effectLst/>
+                <a:latin typeface="+mn-lt"/>
+                <a:ea typeface="+mn-ea"/>
+                <a:cs typeface="+mn-cs"/>
+              </a:rPr>
+              <a:t>i</a:t>
+            </a:r>
+            <a:r>
+              <a:rPr lang="sv-SE" sz="1200" kern="1200" dirty="0">
+                <a:solidFill>
+                  <a:schemeClr val="tx1"/>
+                </a:solidFill>
+                <a:effectLst/>
+                <a:latin typeface="+mn-lt"/>
+                <a:ea typeface="+mn-ea"/>
+                <a:cs typeface="+mn-cs"/>
+              </a:rPr>
+              <a:t> projektet. Om ni har använt versionshanteringssystemet ordentligt bör all information som efterfrågas här finnas i det. Tänk på att kodexemplen ska vara läsbara. </a:t>
             </a:r>
           </a:p>
           <a:p>
@@ -3762,7 +3926,7 @@
     </p:spTree>
     <p:extLst>
       <p:ext uri="{BB962C8B-B14F-4D97-AF65-F5344CB8AC3E}">
-        <p14:creationId xmlns:p14="http://schemas.microsoft.com/office/powerpoint/2010/main" val="4160569562"/>
+        <p14:creationId xmlns:p14="http://schemas.microsoft.com/office/powerpoint/2010/main" val="3805628052"/>
       </p:ext>
     </p:extLst>
   </p:cSld>
@@ -6799,7 +6963,7 @@
     </p:custDataLst>
     <p:extLst>
       <p:ext uri="{BB962C8B-B14F-4D97-AF65-F5344CB8AC3E}">
-        <p14:creationId xmlns:p14="http://schemas.microsoft.com/office/powerpoint/2010/main" val="3632093194"/>
+        <p14:creationId xmlns:p14="http://schemas.microsoft.com/office/powerpoint/2010/main" val="1458286633"/>
       </p:ext>
     </p:extLst>
   </p:cSld>
@@ -6873,7 +7037,7 @@
     </p:custDataLst>
     <p:extLst>
       <p:ext uri="{BB962C8B-B14F-4D97-AF65-F5344CB8AC3E}">
-        <p14:creationId xmlns:p14="http://schemas.microsoft.com/office/powerpoint/2010/main" val="3311918635"/>
+        <p14:creationId xmlns:p14="http://schemas.microsoft.com/office/powerpoint/2010/main" val="3632093194"/>
       </p:ext>
     </p:extLst>
   </p:cSld>
@@ -6902,6 +7066,80 @@
       </p:grpSpPr>
       <p:sp>
         <p:nvSpPr>
+          <p:cNvPr id="9" name="Rubrik 8"/>
+          <p:cNvSpPr>
+            <a:spLocks noGrp="1"/>
+          </p:cNvSpPr>
+          <p:nvPr>
+            <p:ph type="title"/>
+          </p:nvPr>
+        </p:nvSpPr>
+        <p:spPr/>
+        <p:txBody>
+          <a:bodyPr/>
+          <a:lstStyle/>
+          <a:p>
+            <a:r>
+              <a:rPr lang="sv-SE" dirty="0"/>
+              <a:t>TDD erfarenheter</a:t>
+            </a:r>
+          </a:p>
+        </p:txBody>
+      </p:sp>
+      <p:sp>
+        <p:nvSpPr>
+          <p:cNvPr id="10" name="Platshållare för innehåll 9"/>
+          <p:cNvSpPr>
+            <a:spLocks noGrp="1"/>
+          </p:cNvSpPr>
+          <p:nvPr>
+            <p:ph idx="1"/>
+          </p:nvPr>
+        </p:nvSpPr>
+        <p:spPr/>
+        <p:txBody>
+          <a:bodyPr/>
+          <a:lstStyle/>
+          <a:p>
+            <a:endParaRPr lang="sv-SE" dirty="0"/>
+          </a:p>
+        </p:txBody>
+      </p:sp>
+    </p:spTree>
+    <p:custDataLst>
+      <p:tags r:id="rId1"/>
+    </p:custDataLst>
+    <p:extLst>
+      <p:ext uri="{BB962C8B-B14F-4D97-AF65-F5344CB8AC3E}">
+        <p14:creationId xmlns:p14="http://schemas.microsoft.com/office/powerpoint/2010/main" val="3311918635"/>
+      </p:ext>
+    </p:extLst>
+  </p:cSld>
+  <p:clrMapOvr>
+    <a:masterClrMapping/>
+  </p:clrMapOvr>
+</p:sld>
+</file>
+
+<file path=ppt/slides/slide13.xml><?xml version="1.0" encoding="utf-8"?>
+<p:sld xmlns:a="http://schemas.openxmlformats.org/drawingml/2006/main" xmlns:r="http://schemas.openxmlformats.org/officeDocument/2006/relationships" xmlns:p="http://schemas.openxmlformats.org/presentationml/2006/main">
+  <p:cSld>
+    <p:spTree>
+      <p:nvGrpSpPr>
+        <p:cNvPr id="1" name=""/>
+        <p:cNvGrpSpPr/>
+        <p:nvPr/>
+      </p:nvGrpSpPr>
+      <p:grpSpPr>
+        <a:xfrm>
+          <a:off x="0" y="0"/>
+          <a:ext cx="0" cy="0"/>
+          <a:chOff x="0" y="0"/>
+          <a:chExt cx="0" cy="0"/>
+        </a:xfrm>
+      </p:grpSpPr>
+      <p:sp>
+        <p:nvSpPr>
           <p:cNvPr id="2" name="Rubrik 1"/>
           <p:cNvSpPr>
             <a:spLocks noGrp="1"/>
@@ -7000,7 +7238,7 @@
 </p:sld>
 </file>
 
-<file path=ppt/slides/slide13.xml><?xml version="1.0" encoding="utf-8"?>
+<file path=ppt/slides/slide14.xml><?xml version="1.0" encoding="utf-8"?>
 <p:sld xmlns:a="http://schemas.openxmlformats.org/drawingml/2006/main" xmlns:r="http://schemas.openxmlformats.org/officeDocument/2006/relationships" xmlns:p="http://schemas.openxmlformats.org/presentationml/2006/main">
   <p:cSld>
     <p:spTree>
@@ -7088,80 +7326,6 @@
 </p:sld>
 </file>
 
-<file path=ppt/slides/slide14.xml><?xml version="1.0" encoding="utf-8"?>
-<p:sld xmlns:a="http://schemas.openxmlformats.org/drawingml/2006/main" xmlns:r="http://schemas.openxmlformats.org/officeDocument/2006/relationships" xmlns:p="http://schemas.openxmlformats.org/presentationml/2006/main">
-  <p:cSld>
-    <p:spTree>
-      <p:nvGrpSpPr>
-        <p:cNvPr id="1" name=""/>
-        <p:cNvGrpSpPr/>
-        <p:nvPr/>
-      </p:nvGrpSpPr>
-      <p:grpSpPr>
-        <a:xfrm>
-          <a:off x="0" y="0"/>
-          <a:ext cx="0" cy="0"/>
-          <a:chOff x="0" y="0"/>
-          <a:chExt cx="0" cy="0"/>
-        </a:xfrm>
-      </p:grpSpPr>
-      <p:sp>
-        <p:nvSpPr>
-          <p:cNvPr id="2" name="Rubrik 1"/>
-          <p:cNvSpPr>
-            <a:spLocks noGrp="1"/>
-          </p:cNvSpPr>
-          <p:nvPr>
-            <p:ph type="title"/>
-          </p:nvPr>
-        </p:nvSpPr>
-        <p:spPr/>
-        <p:txBody>
-          <a:bodyPr/>
-          <a:lstStyle/>
-          <a:p>
-            <a:r>
-              <a:rPr lang="sv-SE" dirty="0"/>
-              <a:t>Tillståndsmaskiner</a:t>
-            </a:r>
-          </a:p>
-        </p:txBody>
-      </p:sp>
-      <p:sp>
-        <p:nvSpPr>
-          <p:cNvPr id="3" name="Platshållare för innehåll 2"/>
-          <p:cNvSpPr>
-            <a:spLocks noGrp="1"/>
-          </p:cNvSpPr>
-          <p:nvPr>
-            <p:ph idx="1"/>
-          </p:nvPr>
-        </p:nvSpPr>
-        <p:spPr/>
-        <p:txBody>
-          <a:bodyPr/>
-          <a:lstStyle/>
-          <a:p>
-            <a:endParaRPr lang="sv-SE"/>
-          </a:p>
-        </p:txBody>
-      </p:sp>
-    </p:spTree>
-    <p:custDataLst>
-      <p:tags r:id="rId1"/>
-    </p:custDataLst>
-    <p:extLst>
-      <p:ext uri="{BB962C8B-B14F-4D97-AF65-F5344CB8AC3E}">
-        <p14:creationId xmlns:p14="http://schemas.microsoft.com/office/powerpoint/2010/main" val="1230194705"/>
-      </p:ext>
-    </p:extLst>
-  </p:cSld>
-  <p:clrMapOvr>
-    <a:masterClrMapping/>
-  </p:clrMapOvr>
-</p:sld>
-</file>
-
 <file path=ppt/slides/slide15.xml><?xml version="1.0" encoding="utf-8"?>
 <p:sld xmlns:a="http://schemas.openxmlformats.org/drawingml/2006/main" xmlns:r="http://schemas.openxmlformats.org/officeDocument/2006/relationships" xmlns:p="http://schemas.openxmlformats.org/presentationml/2006/main">
   <p:cSld>
@@ -7196,7 +7360,7 @@
           <a:p>
             <a:r>
               <a:rPr lang="sv-SE" dirty="0"/>
-              <a:t>Tillståndsmaskinen</a:t>
+              <a:t>Tillståndsmaskiner</a:t>
             </a:r>
           </a:p>
         </p:txBody>
@@ -7226,7 +7390,7 @@
     </p:custDataLst>
     <p:extLst>
       <p:ext uri="{BB962C8B-B14F-4D97-AF65-F5344CB8AC3E}">
-        <p14:creationId xmlns:p14="http://schemas.microsoft.com/office/powerpoint/2010/main" val="2924590265"/>
+        <p14:creationId xmlns:p14="http://schemas.microsoft.com/office/powerpoint/2010/main" val="1230194705"/>
       </p:ext>
     </p:extLst>
   </p:cSld>
@@ -7270,7 +7434,7 @@
           <a:p>
             <a:r>
               <a:rPr lang="sv-SE" dirty="0"/>
-              <a:t>Testfall</a:t>
+              <a:t>Tillståndsmaskinen</a:t>
             </a:r>
           </a:p>
         </p:txBody>
@@ -7290,35 +7454,7 @@
           <a:bodyPr/>
           <a:lstStyle/>
           <a:p>
-            <a:r>
-              <a:rPr lang="sv-SE" dirty="0"/>
-              <a:t>Karaktären kan droppa item under </a:t>
-            </a:r>
-            <a:r>
-              <a:rPr lang="sv-SE" dirty="0" err="1"/>
-              <a:t>combat</a:t>
-            </a:r>
-            <a:r>
-              <a:rPr lang="sv-SE" dirty="0"/>
-              <a:t>.</a:t>
-            </a:r>
-          </a:p>
-          <a:p>
-            <a:r>
-              <a:rPr lang="sv-SE" dirty="0"/>
-              <a:t>Karaktären kan inte plocka upp item under </a:t>
-            </a:r>
-            <a:r>
-              <a:rPr lang="sv-SE" dirty="0" err="1"/>
-              <a:t>combat</a:t>
-            </a:r>
-            <a:r>
-              <a:rPr lang="sv-SE" dirty="0"/>
-              <a:t>.</a:t>
-            </a:r>
-          </a:p>
-          <a:p>
-            <a:endParaRPr lang="sv-SE" dirty="0"/>
+            <a:endParaRPr lang="sv-SE"/>
           </a:p>
         </p:txBody>
       </p:sp>
@@ -7328,7 +7464,7 @@
     </p:custDataLst>
     <p:extLst>
       <p:ext uri="{BB962C8B-B14F-4D97-AF65-F5344CB8AC3E}">
-        <p14:creationId xmlns:p14="http://schemas.microsoft.com/office/powerpoint/2010/main" val="1268711775"/>
+        <p14:creationId xmlns:p14="http://schemas.microsoft.com/office/powerpoint/2010/main" val="2924590265"/>
       </p:ext>
     </p:extLst>
   </p:cSld>
@@ -7372,7 +7508,7 @@
           <a:p>
             <a:r>
               <a:rPr lang="sv-SE" dirty="0"/>
-              <a:t>Testmatris</a:t>
+              <a:t>Testfall</a:t>
             </a:r>
           </a:p>
         </p:txBody>
@@ -7392,7 +7528,35 @@
           <a:bodyPr/>
           <a:lstStyle/>
           <a:p>
-            <a:endParaRPr lang="sv-SE"/>
+            <a:r>
+              <a:rPr lang="sv-SE" dirty="0"/>
+              <a:t>Karaktären kan droppa item under </a:t>
+            </a:r>
+            <a:r>
+              <a:rPr lang="sv-SE" dirty="0" err="1"/>
+              <a:t>combat</a:t>
+            </a:r>
+            <a:r>
+              <a:rPr lang="sv-SE" dirty="0"/>
+              <a:t>.</a:t>
+            </a:r>
+          </a:p>
+          <a:p>
+            <a:r>
+              <a:rPr lang="sv-SE" dirty="0"/>
+              <a:t>Karaktären kan inte plocka upp item under </a:t>
+            </a:r>
+            <a:r>
+              <a:rPr lang="sv-SE" dirty="0" err="1"/>
+              <a:t>combat</a:t>
+            </a:r>
+            <a:r>
+              <a:rPr lang="sv-SE" dirty="0"/>
+              <a:t>.</a:t>
+            </a:r>
+          </a:p>
+          <a:p>
+            <a:endParaRPr lang="sv-SE" dirty="0"/>
           </a:p>
         </p:txBody>
       </p:sp>
@@ -7402,7 +7566,7 @@
     </p:custDataLst>
     <p:extLst>
       <p:ext uri="{BB962C8B-B14F-4D97-AF65-F5344CB8AC3E}">
-        <p14:creationId xmlns:p14="http://schemas.microsoft.com/office/powerpoint/2010/main" val="2129764329"/>
+        <p14:creationId xmlns:p14="http://schemas.microsoft.com/office/powerpoint/2010/main" val="1268711775"/>
       </p:ext>
     </p:extLst>
   </p:cSld>
@@ -7446,7 +7610,7 @@
           <a:p>
             <a:r>
               <a:rPr lang="sv-SE" dirty="0"/>
-              <a:t>Granskning</a:t>
+              <a:t>Testmatris</a:t>
             </a:r>
           </a:p>
         </p:txBody>
@@ -7476,7 +7640,7 @@
     </p:custDataLst>
     <p:extLst>
       <p:ext uri="{BB962C8B-B14F-4D97-AF65-F5344CB8AC3E}">
-        <p14:creationId xmlns:p14="http://schemas.microsoft.com/office/powerpoint/2010/main" val="3427005653"/>
+        <p14:creationId xmlns:p14="http://schemas.microsoft.com/office/powerpoint/2010/main" val="2129764329"/>
       </p:ext>
     </p:extLst>
   </p:cSld>
@@ -7520,7 +7684,7 @@
           <a:p>
             <a:r>
               <a:rPr lang="sv-SE" dirty="0"/>
-              <a:t>Granskningsrapport</a:t>
+              <a:t>Granskning</a:t>
             </a:r>
           </a:p>
         </p:txBody>
@@ -7550,7 +7714,7 @@
     </p:custDataLst>
     <p:extLst>
       <p:ext uri="{BB962C8B-B14F-4D97-AF65-F5344CB8AC3E}">
-        <p14:creationId xmlns:p14="http://schemas.microsoft.com/office/powerpoint/2010/main" val="3874197174"/>
+        <p14:creationId xmlns:p14="http://schemas.microsoft.com/office/powerpoint/2010/main" val="3427005653"/>
       </p:ext>
     </p:extLst>
   </p:cSld>
@@ -7854,7 +8018,7 @@
           <a:p>
             <a:r>
               <a:rPr lang="sv-SE" dirty="0"/>
-              <a:t>Erfarenheter av granskning</a:t>
+              <a:t>Granskningsrapport</a:t>
             </a:r>
           </a:p>
         </p:txBody>
@@ -7884,7 +8048,7 @@
     </p:custDataLst>
     <p:extLst>
       <p:ext uri="{BB962C8B-B14F-4D97-AF65-F5344CB8AC3E}">
-        <p14:creationId xmlns:p14="http://schemas.microsoft.com/office/powerpoint/2010/main" val="724679724"/>
+        <p14:creationId xmlns:p14="http://schemas.microsoft.com/office/powerpoint/2010/main" val="3874197174"/>
       </p:ext>
     </p:extLst>
   </p:cSld>
@@ -7928,7 +8092,7 @@
           <a:p>
             <a:r>
               <a:rPr lang="sv-SE" dirty="0"/>
-              <a:t>Kodkritiksystem</a:t>
+              <a:t>Erfarenheter av granskning</a:t>
             </a:r>
           </a:p>
         </p:txBody>
@@ -7958,7 +8122,7 @@
     </p:custDataLst>
     <p:extLst>
       <p:ext uri="{BB962C8B-B14F-4D97-AF65-F5344CB8AC3E}">
-        <p14:creationId xmlns:p14="http://schemas.microsoft.com/office/powerpoint/2010/main" val="847618868"/>
+        <p14:creationId xmlns:p14="http://schemas.microsoft.com/office/powerpoint/2010/main" val="724679724"/>
       </p:ext>
     </p:extLst>
   </p:cSld>
@@ -8002,6 +8166,80 @@
           <a:p>
             <a:r>
               <a:rPr lang="sv-SE" dirty="0"/>
+              <a:t>Kodkritiksystem</a:t>
+            </a:r>
+          </a:p>
+        </p:txBody>
+      </p:sp>
+      <p:sp>
+        <p:nvSpPr>
+          <p:cNvPr id="3" name="Platshållare för innehåll 2"/>
+          <p:cNvSpPr>
+            <a:spLocks noGrp="1"/>
+          </p:cNvSpPr>
+          <p:nvPr>
+            <p:ph idx="1"/>
+          </p:nvPr>
+        </p:nvSpPr>
+        <p:spPr/>
+        <p:txBody>
+          <a:bodyPr/>
+          <a:lstStyle/>
+          <a:p>
+            <a:endParaRPr lang="sv-SE"/>
+          </a:p>
+        </p:txBody>
+      </p:sp>
+    </p:spTree>
+    <p:custDataLst>
+      <p:tags r:id="rId1"/>
+    </p:custDataLst>
+    <p:extLst>
+      <p:ext uri="{BB962C8B-B14F-4D97-AF65-F5344CB8AC3E}">
+        <p14:creationId xmlns:p14="http://schemas.microsoft.com/office/powerpoint/2010/main" val="847618868"/>
+      </p:ext>
+    </p:extLst>
+  </p:cSld>
+  <p:clrMapOvr>
+    <a:masterClrMapping/>
+  </p:clrMapOvr>
+</p:sld>
+</file>
+
+<file path=ppt/slides/slide23.xml><?xml version="1.0" encoding="utf-8"?>
+<p:sld xmlns:a="http://schemas.openxmlformats.org/drawingml/2006/main" xmlns:r="http://schemas.openxmlformats.org/officeDocument/2006/relationships" xmlns:p="http://schemas.openxmlformats.org/presentationml/2006/main">
+  <p:cSld>
+    <p:spTree>
+      <p:nvGrpSpPr>
+        <p:cNvPr id="1" name=""/>
+        <p:cNvGrpSpPr/>
+        <p:nvPr/>
+      </p:nvGrpSpPr>
+      <p:grpSpPr>
+        <a:xfrm>
+          <a:off x="0" y="0"/>
+          <a:ext cx="0" cy="0"/>
+          <a:chOff x="0" y="0"/>
+          <a:chExt cx="0" cy="0"/>
+        </a:xfrm>
+      </p:grpSpPr>
+      <p:sp>
+        <p:nvSpPr>
+          <p:cNvPr id="2" name="Rubrik 1"/>
+          <p:cNvSpPr>
+            <a:spLocks noGrp="1"/>
+          </p:cNvSpPr>
+          <p:nvPr>
+            <p:ph type="title"/>
+          </p:nvPr>
+        </p:nvSpPr>
+        <p:spPr/>
+        <p:txBody>
+          <a:bodyPr/>
+          <a:lstStyle/>
+          <a:p>
+            <a:r>
+              <a:rPr lang="sv-SE" dirty="0"/>
               <a:t>Statiska mått</a:t>
             </a:r>
           </a:p>
@@ -8042,7 +8280,7 @@
 </p:sld>
 </file>
 
-<file path=ppt/slides/slide23.xml><?xml version="1.0" encoding="utf-8"?>
+<file path=ppt/slides/slide24.xml><?xml version="1.0" encoding="utf-8"?>
 <p:sld xmlns:a="http://schemas.openxmlformats.org/drawingml/2006/main" xmlns:r="http://schemas.openxmlformats.org/officeDocument/2006/relationships" xmlns:p="http://schemas.openxmlformats.org/presentationml/2006/main">
   <p:cSld>
     <p:spTree>
@@ -8126,7 +8364,7 @@
 </p:sld>
 </file>
 
-<file path=ppt/slides/slide24.xml><?xml version="1.0" encoding="utf-8"?>
+<file path=ppt/slides/slide25.xml><?xml version="1.0" encoding="utf-8"?>
 <p:sld xmlns:a="http://schemas.openxmlformats.org/drawingml/2006/main" xmlns:r="http://schemas.openxmlformats.org/officeDocument/2006/relationships" xmlns:p="http://schemas.openxmlformats.org/presentationml/2006/main">
   <p:cSld>
     <p:spTree>
@@ -8200,7 +8438,7 @@
 </p:sld>
 </file>
 
-<file path=ppt/slides/slide25.xml><?xml version="1.0" encoding="utf-8"?>
+<file path=ppt/slides/slide26.xml><?xml version="1.0" encoding="utf-8"?>
 <p:sld xmlns:a="http://schemas.openxmlformats.org/drawingml/2006/main" xmlns:r="http://schemas.openxmlformats.org/officeDocument/2006/relationships" xmlns:p="http://schemas.openxmlformats.org/presentationml/2006/main">
   <p:cSld>
     <p:spTree>
@@ -8286,7 +8524,7 @@
 </p:sld>
 </file>
 
-<file path=ppt/slides/slide26.xml><?xml version="1.0" encoding="utf-8"?>
+<file path=ppt/slides/slide27.xml><?xml version="1.0" encoding="utf-8"?>
 <p:sld xmlns:a="http://schemas.openxmlformats.org/drawingml/2006/main" xmlns:r="http://schemas.openxmlformats.org/officeDocument/2006/relationships" xmlns:p="http://schemas.openxmlformats.org/presentationml/2006/main">
   <p:cSld>
     <p:spTree>
@@ -8375,7 +8613,7 @@
 </p:sld>
 </file>
 
-<file path=ppt/slides/slide27.xml><?xml version="1.0" encoding="utf-8"?>
+<file path=ppt/slides/slide28.xml><?xml version="1.0" encoding="utf-8"?>
 <p:sld xmlns:a="http://schemas.openxmlformats.org/drawingml/2006/main" xmlns:r="http://schemas.openxmlformats.org/officeDocument/2006/relationships" xmlns:p="http://schemas.openxmlformats.org/presentationml/2006/main">
   <p:cSld>
     <p:spTree>
@@ -8550,7 +8788,12 @@
             <p:ph type="title"/>
           </p:nvPr>
         </p:nvSpPr>
-        <p:spPr/>
+        <p:spPr>
+          <a:xfrm>
+            <a:off x="839788" y="312574"/>
+            <a:ext cx="10515600" cy="1325563"/>
+          </a:xfrm>
+        </p:spPr>
         <p:txBody>
           <a:bodyPr/>
           <a:lstStyle/>
@@ -8587,25 +8830,6 @@
       </p:sp>
       <p:sp>
         <p:nvSpPr>
-          <p:cNvPr id="5" name="Platshållare för innehåll 4"/>
-          <p:cNvSpPr>
-            <a:spLocks noGrp="1"/>
-          </p:cNvSpPr>
-          <p:nvPr>
-            <p:ph sz="half" idx="2"/>
-          </p:nvPr>
-        </p:nvSpPr>
-        <p:spPr/>
-        <p:txBody>
-          <a:bodyPr/>
-          <a:lstStyle/>
-          <a:p>
-            <a:endParaRPr lang="sv-SE"/>
-          </a:p>
-        </p:txBody>
-      </p:sp>
-      <p:sp>
-        <p:nvSpPr>
           <p:cNvPr id="6" name="Platshållare för text 5"/>
           <p:cNvSpPr>
             <a:spLocks noGrp="1"/>
@@ -8628,20 +8852,1127 @@
       </p:sp>
       <p:sp>
         <p:nvSpPr>
-          <p:cNvPr id="7" name="Platshållare för innehåll 6"/>
-          <p:cNvSpPr>
-            <a:spLocks noGrp="1"/>
+          <p:cNvPr id="3" name="Rectangle 1">
+            <a:extLst>
+              <a:ext uri="{FF2B5EF4-FFF2-40B4-BE49-F238E27FC236}">
+                <a16:creationId xmlns:a16="http://schemas.microsoft.com/office/drawing/2014/main" id="{D07CAB29-ED84-405F-8AEE-BA728CB84C43}"/>
+              </a:ext>
+            </a:extLst>
+          </p:cNvPr>
+          <p:cNvSpPr>
+            <a:spLocks noGrp="1" noChangeArrowheads="1"/>
+          </p:cNvSpPr>
+          <p:nvPr>
+            <p:ph sz="half" idx="2"/>
+          </p:nvPr>
+        </p:nvSpPr>
+        <p:spPr bwMode="auto">
+          <a:prstGeom prst="rect">
+            <a:avLst/>
+          </a:prstGeom>
+          <a:solidFill>
+            <a:srgbClr val="2B2B2B"/>
+          </a:solidFill>
+          <a:ln>
+            <a:noFill/>
+          </a:ln>
+          <a:effectLst/>
+          <a:extLst>
+            <a:ext uri="{91240B29-F687-4F45-9708-019B960494DF}">
+              <a14:hiddenLine xmlns:a14="http://schemas.microsoft.com/office/drawing/2010/main" w="9525">
+                <a:solidFill>
+                  <a:schemeClr val="tx1"/>
+                </a:solidFill>
+                <a:miter lim="800000"/>
+                <a:headEnd/>
+                <a:tailEnd/>
+              </a14:hiddenLine>
+            </a:ext>
+            <a:ext uri="{AF507438-7753-43E0-B8FC-AC1667EBCBE1}">
+              <a14:hiddenEffects xmlns:a14="http://schemas.microsoft.com/office/drawing/2010/main">
+                <a:effectLst>
+                  <a:outerShdw dist="35921" dir="2700000" algn="ctr" rotWithShape="0">
+                    <a:schemeClr val="bg2"/>
+                  </a:outerShdw>
+                </a:effectLst>
+              </a14:hiddenEffects>
+            </a:ext>
+          </a:extLst>
+        </p:spPr>
+        <p:txBody>
+          <a:bodyPr vert="horz" wrap="none" lIns="91440" tIns="45720" rIns="91440" bIns="45720" numCol="1" anchor="ctr" anchorCtr="0" compatLnSpc="1">
+            <a:prstTxWarp prst="textNoShape">
+              <a:avLst/>
+            </a:prstTxWarp>
+            <a:spAutoFit/>
+          </a:bodyPr>
+          <a:lstStyle/>
+          <a:p>
+            <a:pPr marL="0" marR="0" lvl="0" indent="0" algn="l" defTabSz="914400" rtl="0" eaLnBrk="0" fontAlgn="base" latinLnBrk="0" hangingPunct="0">
+              <a:lnSpc>
+                <a:spcPct val="100000"/>
+              </a:lnSpc>
+              <a:spcBef>
+                <a:spcPct val="0"/>
+              </a:spcBef>
+              <a:spcAft>
+                <a:spcPct val="0"/>
+              </a:spcAft>
+              <a:buClrTx/>
+              <a:buSzTx/>
+              <a:buFontTx/>
+              <a:buNone/>
+              <a:tabLst/>
+            </a:pPr>
+            <a:r>
+              <a:rPr kumimoji="0" lang="sv-SE" altLang="sv-SE" sz="1000" b="0" i="0" u="none" strike="noStrike" cap="none" normalizeH="0" baseline="0">
+                <a:ln>
+                  <a:noFill/>
+                </a:ln>
+                <a:solidFill>
+                  <a:srgbClr val="BBB529"/>
+                </a:solidFill>
+                <a:effectLst/>
+                <a:latin typeface="Courier New" panose="02070309020205020404" pitchFamily="49" charset="0"/>
+                <a:cs typeface="Courier New" panose="02070309020205020404" pitchFamily="49" charset="0"/>
+              </a:rPr>
+              <a:t>@Test</a:t>
+            </a:r>
+            <a:br>
+              <a:rPr kumimoji="0" lang="sv-SE" altLang="sv-SE" sz="1000" b="0" i="0" u="none" strike="noStrike" cap="none" normalizeH="0" baseline="0">
+                <a:ln>
+                  <a:noFill/>
+                </a:ln>
+                <a:solidFill>
+                  <a:srgbClr val="BBB529"/>
+                </a:solidFill>
+                <a:effectLst/>
+                <a:latin typeface="Courier New" panose="02070309020205020404" pitchFamily="49" charset="0"/>
+                <a:cs typeface="Courier New" panose="02070309020205020404" pitchFamily="49" charset="0"/>
+              </a:rPr>
+            </a:br>
+            <a:r>
+              <a:rPr kumimoji="0" lang="sv-SE" altLang="sv-SE" sz="1000" b="0" i="0" u="none" strike="noStrike" cap="none" normalizeH="0" baseline="0">
+                <a:ln>
+                  <a:noFill/>
+                </a:ln>
+                <a:solidFill>
+                  <a:srgbClr val="CC7832"/>
+                </a:solidFill>
+                <a:effectLst/>
+                <a:latin typeface="Courier New" panose="02070309020205020404" pitchFamily="49" charset="0"/>
+                <a:cs typeface="Courier New" panose="02070309020205020404" pitchFamily="49" charset="0"/>
+              </a:rPr>
+              <a:t>public void </a:t>
+            </a:r>
+            <a:r>
+              <a:rPr kumimoji="0" lang="sv-SE" altLang="sv-SE" sz="1000" b="0" i="0" u="none" strike="noStrike" cap="none" normalizeH="0" baseline="0">
+                <a:ln>
+                  <a:noFill/>
+                </a:ln>
+                <a:solidFill>
+                  <a:srgbClr val="FFC66D"/>
+                </a:solidFill>
+                <a:effectLst/>
+                <a:latin typeface="Courier New" panose="02070309020205020404" pitchFamily="49" charset="0"/>
+                <a:cs typeface="Courier New" panose="02070309020205020404" pitchFamily="49" charset="0"/>
+              </a:rPr>
+              <a:t>testCheckExperienceAfterCharacterIsDead</a:t>
+            </a:r>
+            <a:r>
+              <a:rPr kumimoji="0" lang="sv-SE" altLang="sv-SE" sz="1000" b="0" i="0" u="none" strike="noStrike" cap="none" normalizeH="0" baseline="0">
+                <a:ln>
+                  <a:noFill/>
+                </a:ln>
+                <a:solidFill>
+                  <a:srgbClr val="A9B7C6"/>
+                </a:solidFill>
+                <a:effectLst/>
+                <a:latin typeface="Courier New" panose="02070309020205020404" pitchFamily="49" charset="0"/>
+                <a:cs typeface="Courier New" panose="02070309020205020404" pitchFamily="49" charset="0"/>
+              </a:rPr>
+              <a:t>() {</a:t>
+            </a:r>
+            <a:br>
+              <a:rPr kumimoji="0" lang="sv-SE" altLang="sv-SE" sz="1000" b="0" i="0" u="none" strike="noStrike" cap="none" normalizeH="0" baseline="0">
+                <a:ln>
+                  <a:noFill/>
+                </a:ln>
+                <a:solidFill>
+                  <a:srgbClr val="A9B7C6"/>
+                </a:solidFill>
+                <a:effectLst/>
+                <a:latin typeface="Courier New" panose="02070309020205020404" pitchFamily="49" charset="0"/>
+                <a:cs typeface="Courier New" panose="02070309020205020404" pitchFamily="49" charset="0"/>
+              </a:rPr>
+            </a:br>
+            <a:r>
+              <a:rPr kumimoji="0" lang="sv-SE" altLang="sv-SE" sz="1000" b="0" i="0" u="none" strike="noStrike" cap="none" normalizeH="0" baseline="0">
+                <a:ln>
+                  <a:noFill/>
+                </a:ln>
+                <a:solidFill>
+                  <a:srgbClr val="A9B7C6"/>
+                </a:solidFill>
+                <a:effectLst/>
+                <a:latin typeface="Courier New" panose="02070309020205020404" pitchFamily="49" charset="0"/>
+                <a:cs typeface="Courier New" panose="02070309020205020404" pitchFamily="49" charset="0"/>
+              </a:rPr>
+              <a:t>    GameCharacter mainCharacter = </a:t>
+            </a:r>
+            <a:r>
+              <a:rPr kumimoji="0" lang="sv-SE" altLang="sv-SE" sz="1000" b="0" i="0" u="none" strike="noStrike" cap="none" normalizeH="0" baseline="0">
+                <a:ln>
+                  <a:noFill/>
+                </a:ln>
+                <a:solidFill>
+                  <a:srgbClr val="CC7832"/>
+                </a:solidFill>
+                <a:effectLst/>
+                <a:latin typeface="Courier New" panose="02070309020205020404" pitchFamily="49" charset="0"/>
+                <a:cs typeface="Courier New" panose="02070309020205020404" pitchFamily="49" charset="0"/>
+              </a:rPr>
+              <a:t>new </a:t>
+            </a:r>
+            <a:r>
+              <a:rPr kumimoji="0" lang="sv-SE" altLang="sv-SE" sz="1000" b="0" i="0" u="none" strike="noStrike" cap="none" normalizeH="0" baseline="0">
+                <a:ln>
+                  <a:noFill/>
+                </a:ln>
+                <a:solidFill>
+                  <a:srgbClr val="A9B7C6"/>
+                </a:solidFill>
+                <a:effectLst/>
+                <a:latin typeface="Courier New" panose="02070309020205020404" pitchFamily="49" charset="0"/>
+                <a:cs typeface="Courier New" panose="02070309020205020404" pitchFamily="49" charset="0"/>
+              </a:rPr>
+              <a:t>GameCharacter(</a:t>
+            </a:r>
+            <a:r>
+              <a:rPr kumimoji="0" lang="sv-SE" altLang="sv-SE" sz="1000" b="0" i="0" u="none" strike="noStrike" cap="none" normalizeH="0" baseline="0">
+                <a:ln>
+                  <a:noFill/>
+                </a:ln>
+                <a:solidFill>
+                  <a:srgbClr val="6A8759"/>
+                </a:solidFill>
+                <a:effectLst/>
+                <a:latin typeface="Courier New" panose="02070309020205020404" pitchFamily="49" charset="0"/>
+                <a:cs typeface="Courier New" panose="02070309020205020404" pitchFamily="49" charset="0"/>
+              </a:rPr>
+              <a:t>"kalle"</a:t>
+            </a:r>
+            <a:r>
+              <a:rPr kumimoji="0" lang="sv-SE" altLang="sv-SE" sz="1000" b="0" i="0" u="none" strike="noStrike" cap="none" normalizeH="0" baseline="0">
+                <a:ln>
+                  <a:noFill/>
+                </a:ln>
+                <a:solidFill>
+                  <a:srgbClr val="A9B7C6"/>
+                </a:solidFill>
+                <a:effectLst/>
+                <a:latin typeface="Courier New" panose="02070309020205020404" pitchFamily="49" charset="0"/>
+                <a:cs typeface="Courier New" panose="02070309020205020404" pitchFamily="49" charset="0"/>
+              </a:rPr>
+              <a:t>)</a:t>
+            </a:r>
+            <a:r>
+              <a:rPr kumimoji="0" lang="sv-SE" altLang="sv-SE" sz="1000" b="0" i="0" u="none" strike="noStrike" cap="none" normalizeH="0" baseline="0">
+                <a:ln>
+                  <a:noFill/>
+                </a:ln>
+                <a:solidFill>
+                  <a:srgbClr val="CC7832"/>
+                </a:solidFill>
+                <a:effectLst/>
+                <a:latin typeface="Courier New" panose="02070309020205020404" pitchFamily="49" charset="0"/>
+                <a:cs typeface="Courier New" panose="02070309020205020404" pitchFamily="49" charset="0"/>
+              </a:rPr>
+              <a:t>;</a:t>
+            </a:r>
+            <a:br>
+              <a:rPr kumimoji="0" lang="sv-SE" altLang="sv-SE" sz="1000" b="0" i="0" u="none" strike="noStrike" cap="none" normalizeH="0" baseline="0">
+                <a:ln>
+                  <a:noFill/>
+                </a:ln>
+                <a:solidFill>
+                  <a:srgbClr val="CC7832"/>
+                </a:solidFill>
+                <a:effectLst/>
+                <a:latin typeface="Courier New" panose="02070309020205020404" pitchFamily="49" charset="0"/>
+                <a:cs typeface="Courier New" panose="02070309020205020404" pitchFamily="49" charset="0"/>
+              </a:rPr>
+            </a:br>
+            <a:r>
+              <a:rPr kumimoji="0" lang="sv-SE" altLang="sv-SE" sz="1000" b="0" i="0" u="none" strike="noStrike" cap="none" normalizeH="0" baseline="0">
+                <a:ln>
+                  <a:noFill/>
+                </a:ln>
+                <a:solidFill>
+                  <a:srgbClr val="CC7832"/>
+                </a:solidFill>
+                <a:effectLst/>
+                <a:latin typeface="Courier New" panose="02070309020205020404" pitchFamily="49" charset="0"/>
+                <a:cs typeface="Courier New" panose="02070309020205020404" pitchFamily="49" charset="0"/>
+              </a:rPr>
+              <a:t>    </a:t>
+            </a:r>
+            <a:r>
+              <a:rPr kumimoji="0" lang="sv-SE" altLang="sv-SE" sz="1000" b="0" i="0" u="none" strike="noStrike" cap="none" normalizeH="0" baseline="0">
+                <a:ln>
+                  <a:noFill/>
+                </a:ln>
+                <a:solidFill>
+                  <a:srgbClr val="A9B7C6"/>
+                </a:solidFill>
+                <a:effectLst/>
+                <a:latin typeface="Courier New" panose="02070309020205020404" pitchFamily="49" charset="0"/>
+                <a:cs typeface="Courier New" panose="02070309020205020404" pitchFamily="49" charset="0"/>
+              </a:rPr>
+              <a:t>mainCharacter.makeCharacterInCombat()</a:t>
+            </a:r>
+            <a:r>
+              <a:rPr kumimoji="0" lang="sv-SE" altLang="sv-SE" sz="1000" b="0" i="0" u="none" strike="noStrike" cap="none" normalizeH="0" baseline="0">
+                <a:ln>
+                  <a:noFill/>
+                </a:ln>
+                <a:solidFill>
+                  <a:srgbClr val="CC7832"/>
+                </a:solidFill>
+                <a:effectLst/>
+                <a:latin typeface="Courier New" panose="02070309020205020404" pitchFamily="49" charset="0"/>
+                <a:cs typeface="Courier New" panose="02070309020205020404" pitchFamily="49" charset="0"/>
+              </a:rPr>
+              <a:t>;</a:t>
+            </a:r>
+            <a:br>
+              <a:rPr kumimoji="0" lang="sv-SE" altLang="sv-SE" sz="1000" b="0" i="0" u="none" strike="noStrike" cap="none" normalizeH="0" baseline="0">
+                <a:ln>
+                  <a:noFill/>
+                </a:ln>
+                <a:solidFill>
+                  <a:srgbClr val="CC7832"/>
+                </a:solidFill>
+                <a:effectLst/>
+                <a:latin typeface="Courier New" panose="02070309020205020404" pitchFamily="49" charset="0"/>
+                <a:cs typeface="Courier New" panose="02070309020205020404" pitchFamily="49" charset="0"/>
+              </a:rPr>
+            </a:br>
+            <a:r>
+              <a:rPr kumimoji="0" lang="sv-SE" altLang="sv-SE" sz="1000" b="0" i="0" u="none" strike="noStrike" cap="none" normalizeH="0" baseline="0">
+                <a:ln>
+                  <a:noFill/>
+                </a:ln>
+                <a:solidFill>
+                  <a:srgbClr val="CC7832"/>
+                </a:solidFill>
+                <a:effectLst/>
+                <a:latin typeface="Courier New" panose="02070309020205020404" pitchFamily="49" charset="0"/>
+                <a:cs typeface="Courier New" panose="02070309020205020404" pitchFamily="49" charset="0"/>
+              </a:rPr>
+              <a:t>    int </a:t>
+            </a:r>
+            <a:r>
+              <a:rPr kumimoji="0" lang="sv-SE" altLang="sv-SE" sz="1000" b="0" i="0" u="none" strike="noStrike" cap="none" normalizeH="0" baseline="0">
+                <a:ln>
+                  <a:noFill/>
+                </a:ln>
+                <a:solidFill>
+                  <a:srgbClr val="A9B7C6"/>
+                </a:solidFill>
+                <a:effectLst/>
+                <a:latin typeface="Courier New" panose="02070309020205020404" pitchFamily="49" charset="0"/>
+                <a:cs typeface="Courier New" panose="02070309020205020404" pitchFamily="49" charset="0"/>
+              </a:rPr>
+              <a:t>currentHp = mainCharacter.getCurrentHp()</a:t>
+            </a:r>
+            <a:r>
+              <a:rPr kumimoji="0" lang="sv-SE" altLang="sv-SE" sz="1000" b="0" i="0" u="none" strike="noStrike" cap="none" normalizeH="0" baseline="0">
+                <a:ln>
+                  <a:noFill/>
+                </a:ln>
+                <a:solidFill>
+                  <a:srgbClr val="CC7832"/>
+                </a:solidFill>
+                <a:effectLst/>
+                <a:latin typeface="Courier New" panose="02070309020205020404" pitchFamily="49" charset="0"/>
+                <a:cs typeface="Courier New" panose="02070309020205020404" pitchFamily="49" charset="0"/>
+              </a:rPr>
+              <a:t>;</a:t>
+            </a:r>
+            <a:br>
+              <a:rPr kumimoji="0" lang="sv-SE" altLang="sv-SE" sz="1000" b="0" i="0" u="none" strike="noStrike" cap="none" normalizeH="0" baseline="0">
+                <a:ln>
+                  <a:noFill/>
+                </a:ln>
+                <a:solidFill>
+                  <a:srgbClr val="CC7832"/>
+                </a:solidFill>
+                <a:effectLst/>
+                <a:latin typeface="Courier New" panose="02070309020205020404" pitchFamily="49" charset="0"/>
+                <a:cs typeface="Courier New" panose="02070309020205020404" pitchFamily="49" charset="0"/>
+              </a:rPr>
+            </a:br>
+            <a:r>
+              <a:rPr kumimoji="0" lang="sv-SE" altLang="sv-SE" sz="1000" b="0" i="0" u="none" strike="noStrike" cap="none" normalizeH="0" baseline="0">
+                <a:ln>
+                  <a:noFill/>
+                </a:ln>
+                <a:solidFill>
+                  <a:srgbClr val="CC7832"/>
+                </a:solidFill>
+                <a:effectLst/>
+                <a:latin typeface="Courier New" panose="02070309020205020404" pitchFamily="49" charset="0"/>
+                <a:cs typeface="Courier New" panose="02070309020205020404" pitchFamily="49" charset="0"/>
+              </a:rPr>
+              <a:t>    </a:t>
+            </a:r>
+            <a:r>
+              <a:rPr kumimoji="0" lang="sv-SE" altLang="sv-SE" sz="1000" b="0" i="0" u="none" strike="noStrike" cap="none" normalizeH="0" baseline="0">
+                <a:ln>
+                  <a:noFill/>
+                </a:ln>
+                <a:solidFill>
+                  <a:srgbClr val="A9B7C6"/>
+                </a:solidFill>
+                <a:effectLst/>
+                <a:latin typeface="Courier New" panose="02070309020205020404" pitchFamily="49" charset="0"/>
+                <a:cs typeface="Courier New" panose="02070309020205020404" pitchFamily="49" charset="0"/>
+              </a:rPr>
+              <a:t>mainCharacter.hpCounter(currentHp)</a:t>
+            </a:r>
+            <a:r>
+              <a:rPr kumimoji="0" lang="sv-SE" altLang="sv-SE" sz="1000" b="0" i="0" u="none" strike="noStrike" cap="none" normalizeH="0" baseline="0">
+                <a:ln>
+                  <a:noFill/>
+                </a:ln>
+                <a:solidFill>
+                  <a:srgbClr val="CC7832"/>
+                </a:solidFill>
+                <a:effectLst/>
+                <a:latin typeface="Courier New" panose="02070309020205020404" pitchFamily="49" charset="0"/>
+                <a:cs typeface="Courier New" panose="02070309020205020404" pitchFamily="49" charset="0"/>
+              </a:rPr>
+              <a:t>;</a:t>
+            </a:r>
+            <a:br>
+              <a:rPr kumimoji="0" lang="sv-SE" altLang="sv-SE" sz="1000" b="0" i="0" u="none" strike="noStrike" cap="none" normalizeH="0" baseline="0">
+                <a:ln>
+                  <a:noFill/>
+                </a:ln>
+                <a:solidFill>
+                  <a:srgbClr val="CC7832"/>
+                </a:solidFill>
+                <a:effectLst/>
+                <a:latin typeface="Courier New" panose="02070309020205020404" pitchFamily="49" charset="0"/>
+                <a:cs typeface="Courier New" panose="02070309020205020404" pitchFamily="49" charset="0"/>
+              </a:rPr>
+            </a:br>
+            <a:r>
+              <a:rPr kumimoji="0" lang="sv-SE" altLang="sv-SE" sz="1000" b="0" i="0" u="none" strike="noStrike" cap="none" normalizeH="0" baseline="0">
+                <a:ln>
+                  <a:noFill/>
+                </a:ln>
+                <a:solidFill>
+                  <a:srgbClr val="CC7832"/>
+                </a:solidFill>
+                <a:effectLst/>
+                <a:latin typeface="Courier New" panose="02070309020205020404" pitchFamily="49" charset="0"/>
+                <a:cs typeface="Courier New" panose="02070309020205020404" pitchFamily="49" charset="0"/>
+              </a:rPr>
+              <a:t>    </a:t>
+            </a:r>
+            <a:r>
+              <a:rPr kumimoji="0" lang="sv-SE" altLang="sv-SE" sz="1000" b="0" i="0" u="none" strike="noStrike" cap="none" normalizeH="0" baseline="0">
+                <a:ln>
+                  <a:noFill/>
+                </a:ln>
+                <a:solidFill>
+                  <a:srgbClr val="A9B7C6"/>
+                </a:solidFill>
+                <a:effectLst/>
+                <a:latin typeface="Courier New" panose="02070309020205020404" pitchFamily="49" charset="0"/>
+                <a:cs typeface="Courier New" panose="02070309020205020404" pitchFamily="49" charset="0"/>
+              </a:rPr>
+              <a:t>mainCharacter.makeCharacterDead()</a:t>
+            </a:r>
+            <a:r>
+              <a:rPr kumimoji="0" lang="sv-SE" altLang="sv-SE" sz="1000" b="0" i="0" u="none" strike="noStrike" cap="none" normalizeH="0" baseline="0">
+                <a:ln>
+                  <a:noFill/>
+                </a:ln>
+                <a:solidFill>
+                  <a:srgbClr val="CC7832"/>
+                </a:solidFill>
+                <a:effectLst/>
+                <a:latin typeface="Courier New" panose="02070309020205020404" pitchFamily="49" charset="0"/>
+                <a:cs typeface="Courier New" panose="02070309020205020404" pitchFamily="49" charset="0"/>
+              </a:rPr>
+              <a:t>;</a:t>
+            </a:r>
+            <a:br>
+              <a:rPr kumimoji="0" lang="sv-SE" altLang="sv-SE" sz="1000" b="0" i="0" u="none" strike="noStrike" cap="none" normalizeH="0" baseline="0">
+                <a:ln>
+                  <a:noFill/>
+                </a:ln>
+                <a:solidFill>
+                  <a:srgbClr val="CC7832"/>
+                </a:solidFill>
+                <a:effectLst/>
+                <a:latin typeface="Courier New" panose="02070309020205020404" pitchFamily="49" charset="0"/>
+                <a:cs typeface="Courier New" panose="02070309020205020404" pitchFamily="49" charset="0"/>
+              </a:rPr>
+            </a:br>
+            <a:r>
+              <a:rPr kumimoji="0" lang="sv-SE" altLang="sv-SE" sz="1000" b="0" i="0" u="none" strike="noStrike" cap="none" normalizeH="0" baseline="0">
+                <a:ln>
+                  <a:noFill/>
+                </a:ln>
+                <a:solidFill>
+                  <a:srgbClr val="CC7832"/>
+                </a:solidFill>
+                <a:effectLst/>
+                <a:latin typeface="Courier New" panose="02070309020205020404" pitchFamily="49" charset="0"/>
+                <a:cs typeface="Courier New" panose="02070309020205020404" pitchFamily="49" charset="0"/>
+              </a:rPr>
+              <a:t>    </a:t>
+            </a:r>
+            <a:r>
+              <a:rPr kumimoji="0" lang="sv-SE" altLang="sv-SE" sz="1000" b="0" i="1" u="none" strike="noStrike" cap="none" normalizeH="0" baseline="0">
+                <a:ln>
+                  <a:noFill/>
+                </a:ln>
+                <a:solidFill>
+                  <a:srgbClr val="A9B7C6"/>
+                </a:solidFill>
+                <a:effectLst/>
+                <a:latin typeface="Courier New" panose="02070309020205020404" pitchFamily="49" charset="0"/>
+                <a:cs typeface="Courier New" panose="02070309020205020404" pitchFamily="49" charset="0"/>
+              </a:rPr>
+              <a:t>assertEquals</a:t>
+            </a:r>
+            <a:r>
+              <a:rPr kumimoji="0" lang="sv-SE" altLang="sv-SE" sz="1000" b="0" i="0" u="none" strike="noStrike" cap="none" normalizeH="0" baseline="0">
+                <a:ln>
+                  <a:noFill/>
+                </a:ln>
+                <a:solidFill>
+                  <a:srgbClr val="A9B7C6"/>
+                </a:solidFill>
+                <a:effectLst/>
+                <a:latin typeface="Courier New" panose="02070309020205020404" pitchFamily="49" charset="0"/>
+                <a:cs typeface="Courier New" panose="02070309020205020404" pitchFamily="49" charset="0"/>
+              </a:rPr>
+              <a:t>(</a:t>
+            </a:r>
+            <a:r>
+              <a:rPr kumimoji="0" lang="sv-SE" altLang="sv-SE" sz="1000" b="0" i="0" u="none" strike="noStrike" cap="none" normalizeH="0" baseline="0">
+                <a:ln>
+                  <a:noFill/>
+                </a:ln>
+                <a:solidFill>
+                  <a:srgbClr val="6897BB"/>
+                </a:solidFill>
+                <a:effectLst/>
+                <a:latin typeface="Courier New" panose="02070309020205020404" pitchFamily="49" charset="0"/>
+                <a:cs typeface="Courier New" panose="02070309020205020404" pitchFamily="49" charset="0"/>
+              </a:rPr>
+              <a:t>0</a:t>
+            </a:r>
+            <a:r>
+              <a:rPr kumimoji="0" lang="sv-SE" altLang="sv-SE" sz="1000" b="0" i="0" u="none" strike="noStrike" cap="none" normalizeH="0" baseline="0">
+                <a:ln>
+                  <a:noFill/>
+                </a:ln>
+                <a:solidFill>
+                  <a:srgbClr val="CC7832"/>
+                </a:solidFill>
+                <a:effectLst/>
+                <a:latin typeface="Courier New" panose="02070309020205020404" pitchFamily="49" charset="0"/>
+                <a:cs typeface="Courier New" panose="02070309020205020404" pitchFamily="49" charset="0"/>
+              </a:rPr>
+              <a:t>, </a:t>
+            </a:r>
+            <a:r>
+              <a:rPr kumimoji="0" lang="sv-SE" altLang="sv-SE" sz="1000" b="0" i="0" u="none" strike="noStrike" cap="none" normalizeH="0" baseline="0">
+                <a:ln>
+                  <a:noFill/>
+                </a:ln>
+                <a:solidFill>
+                  <a:srgbClr val="A9B7C6"/>
+                </a:solidFill>
+                <a:effectLst/>
+                <a:latin typeface="Courier New" panose="02070309020205020404" pitchFamily="49" charset="0"/>
+                <a:cs typeface="Courier New" panose="02070309020205020404" pitchFamily="49" charset="0"/>
+              </a:rPr>
+              <a:t>mainCharacter.getExperience())</a:t>
+            </a:r>
+            <a:r>
+              <a:rPr kumimoji="0" lang="sv-SE" altLang="sv-SE" sz="1000" b="0" i="0" u="none" strike="noStrike" cap="none" normalizeH="0" baseline="0">
+                <a:ln>
+                  <a:noFill/>
+                </a:ln>
+                <a:solidFill>
+                  <a:srgbClr val="CC7832"/>
+                </a:solidFill>
+                <a:effectLst/>
+                <a:latin typeface="Courier New" panose="02070309020205020404" pitchFamily="49" charset="0"/>
+                <a:cs typeface="Courier New" panose="02070309020205020404" pitchFamily="49" charset="0"/>
+              </a:rPr>
+              <a:t>;</a:t>
+            </a:r>
+            <a:br>
+              <a:rPr kumimoji="0" lang="sv-SE" altLang="sv-SE" sz="1000" b="0" i="0" u="none" strike="noStrike" cap="none" normalizeH="0" baseline="0">
+                <a:ln>
+                  <a:noFill/>
+                </a:ln>
+                <a:solidFill>
+                  <a:srgbClr val="CC7832"/>
+                </a:solidFill>
+                <a:effectLst/>
+                <a:latin typeface="Courier New" panose="02070309020205020404" pitchFamily="49" charset="0"/>
+                <a:cs typeface="Courier New" panose="02070309020205020404" pitchFamily="49" charset="0"/>
+              </a:rPr>
+            </a:br>
+            <a:r>
+              <a:rPr kumimoji="0" lang="sv-SE" altLang="sv-SE" sz="1000" b="0" i="0" u="none" strike="noStrike" cap="none" normalizeH="0" baseline="0">
+                <a:ln>
+                  <a:noFill/>
+                </a:ln>
+                <a:solidFill>
+                  <a:srgbClr val="A9B7C6"/>
+                </a:solidFill>
+                <a:effectLst/>
+                <a:latin typeface="Courier New" panose="02070309020205020404" pitchFamily="49" charset="0"/>
+                <a:cs typeface="Courier New" panose="02070309020205020404" pitchFamily="49" charset="0"/>
+              </a:rPr>
+              <a:t>}</a:t>
+            </a:r>
+            <a:endParaRPr kumimoji="0" lang="sv-SE" altLang="sv-SE" sz="1800" b="0" i="0" u="none" strike="noStrike" cap="none" normalizeH="0" baseline="0">
+              <a:ln>
+                <a:noFill/>
+              </a:ln>
+              <a:solidFill>
+                <a:schemeClr val="tx1"/>
+              </a:solidFill>
+              <a:effectLst/>
+              <a:latin typeface="Arial" panose="020B0604020202020204" pitchFamily="34" charset="0"/>
+            </a:endParaRPr>
+          </a:p>
+        </p:txBody>
+      </p:sp>
+      <p:sp>
+        <p:nvSpPr>
+          <p:cNvPr id="8" name="Rectangle 2">
+            <a:extLst>
+              <a:ext uri="{FF2B5EF4-FFF2-40B4-BE49-F238E27FC236}">
+                <a16:creationId xmlns:a16="http://schemas.microsoft.com/office/drawing/2014/main" id="{1FC9AD1E-4A52-4998-A5A3-BAEC1C827718}"/>
+              </a:ext>
+            </a:extLst>
+          </p:cNvPr>
+          <p:cNvSpPr>
+            <a:spLocks noGrp="1" noChangeArrowheads="1"/>
           </p:cNvSpPr>
           <p:nvPr>
             <p:ph sz="quarter" idx="4"/>
           </p:nvPr>
         </p:nvSpPr>
-        <p:spPr/>
-        <p:txBody>
-          <a:bodyPr/>
-          <a:lstStyle/>
-          <a:p>
-            <a:endParaRPr lang="sv-SE"/>
+        <p:spPr bwMode="auto">
+          <a:prstGeom prst="rect">
+            <a:avLst/>
+          </a:prstGeom>
+          <a:solidFill>
+            <a:srgbClr val="2B2B2B"/>
+          </a:solidFill>
+          <a:ln>
+            <a:noFill/>
+          </a:ln>
+          <a:effectLst/>
+          <a:extLst>
+            <a:ext uri="{91240B29-F687-4F45-9708-019B960494DF}">
+              <a14:hiddenLine xmlns:a14="http://schemas.microsoft.com/office/drawing/2010/main" w="9525">
+                <a:solidFill>
+                  <a:schemeClr val="tx1"/>
+                </a:solidFill>
+                <a:miter lim="800000"/>
+                <a:headEnd/>
+                <a:tailEnd/>
+              </a14:hiddenLine>
+            </a:ext>
+            <a:ext uri="{AF507438-7753-43E0-B8FC-AC1667EBCBE1}">
+              <a14:hiddenEffects xmlns:a14="http://schemas.microsoft.com/office/drawing/2010/main">
+                <a:effectLst>
+                  <a:outerShdw dist="35921" dir="2700000" algn="ctr" rotWithShape="0">
+                    <a:schemeClr val="bg2"/>
+                  </a:outerShdw>
+                </a:effectLst>
+              </a14:hiddenEffects>
+            </a:ext>
+          </a:extLst>
+        </p:spPr>
+        <p:txBody>
+          <a:bodyPr vert="horz" wrap="none" lIns="91440" tIns="45720" rIns="91440" bIns="45720" numCol="1" anchor="ctr" anchorCtr="0" compatLnSpc="1">
+            <a:prstTxWarp prst="textNoShape">
+              <a:avLst/>
+            </a:prstTxWarp>
+            <a:spAutoFit/>
+          </a:bodyPr>
+          <a:lstStyle/>
+          <a:p>
+            <a:pPr marL="0" marR="0" lvl="0" indent="0" algn="l" defTabSz="914400" rtl="0" eaLnBrk="0" fontAlgn="base" latinLnBrk="0" hangingPunct="0">
+              <a:lnSpc>
+                <a:spcPct val="100000"/>
+              </a:lnSpc>
+              <a:spcBef>
+                <a:spcPct val="0"/>
+              </a:spcBef>
+              <a:spcAft>
+                <a:spcPct val="0"/>
+              </a:spcAft>
+              <a:buClrTx/>
+              <a:buSzTx/>
+              <a:buFontTx/>
+              <a:buNone/>
+              <a:tabLst/>
+            </a:pPr>
+            <a:r>
+              <a:rPr kumimoji="0" lang="sv-SE" altLang="sv-SE" sz="1000" b="0" i="0" u="none" strike="noStrike" cap="none" normalizeH="0" baseline="0">
+                <a:ln>
+                  <a:noFill/>
+                </a:ln>
+                <a:solidFill>
+                  <a:srgbClr val="CC7832"/>
+                </a:solidFill>
+                <a:effectLst/>
+                <a:latin typeface="Courier New" panose="02070309020205020404" pitchFamily="49" charset="0"/>
+                <a:cs typeface="Courier New" panose="02070309020205020404" pitchFamily="49" charset="0"/>
+              </a:rPr>
+              <a:t>public void </a:t>
+            </a:r>
+            <a:r>
+              <a:rPr kumimoji="0" lang="sv-SE" altLang="sv-SE" sz="1000" b="0" i="0" u="none" strike="noStrike" cap="none" normalizeH="0" baseline="0">
+                <a:ln>
+                  <a:noFill/>
+                </a:ln>
+                <a:solidFill>
+                  <a:srgbClr val="FFC66D"/>
+                </a:solidFill>
+                <a:effectLst/>
+                <a:latin typeface="Courier New" panose="02070309020205020404" pitchFamily="49" charset="0"/>
+                <a:cs typeface="Courier New" panose="02070309020205020404" pitchFamily="49" charset="0"/>
+              </a:rPr>
+              <a:t>makeCharacterDead</a:t>
+            </a:r>
+            <a:r>
+              <a:rPr kumimoji="0" lang="sv-SE" altLang="sv-SE" sz="1000" b="0" i="0" u="none" strike="noStrike" cap="none" normalizeH="0" baseline="0">
+                <a:ln>
+                  <a:noFill/>
+                </a:ln>
+                <a:solidFill>
+                  <a:srgbClr val="A9B7C6"/>
+                </a:solidFill>
+                <a:effectLst/>
+                <a:latin typeface="Courier New" panose="02070309020205020404" pitchFamily="49" charset="0"/>
+                <a:cs typeface="Courier New" panose="02070309020205020404" pitchFamily="49" charset="0"/>
+              </a:rPr>
+              <a:t>() {</a:t>
+            </a:r>
+            <a:br>
+              <a:rPr kumimoji="0" lang="sv-SE" altLang="sv-SE" sz="1000" b="0" i="0" u="none" strike="noStrike" cap="none" normalizeH="0" baseline="0">
+                <a:ln>
+                  <a:noFill/>
+                </a:ln>
+                <a:solidFill>
+                  <a:srgbClr val="A9B7C6"/>
+                </a:solidFill>
+                <a:effectLst/>
+                <a:latin typeface="Courier New" panose="02070309020205020404" pitchFamily="49" charset="0"/>
+                <a:cs typeface="Courier New" panose="02070309020205020404" pitchFamily="49" charset="0"/>
+              </a:rPr>
+            </a:br>
+            <a:r>
+              <a:rPr kumimoji="0" lang="sv-SE" altLang="sv-SE" sz="1000" b="0" i="0" u="none" strike="noStrike" cap="none" normalizeH="0" baseline="0">
+                <a:ln>
+                  <a:noFill/>
+                </a:ln>
+                <a:solidFill>
+                  <a:srgbClr val="A9B7C6"/>
+                </a:solidFill>
+                <a:effectLst/>
+                <a:latin typeface="Courier New" panose="02070309020205020404" pitchFamily="49" charset="0"/>
+                <a:cs typeface="Courier New" panose="02070309020205020404" pitchFamily="49" charset="0"/>
+              </a:rPr>
+              <a:t>    </a:t>
+            </a:r>
+            <a:r>
+              <a:rPr kumimoji="0" lang="sv-SE" altLang="sv-SE" sz="1000" b="0" i="0" u="none" strike="noStrike" cap="none" normalizeH="0" baseline="0">
+                <a:ln>
+                  <a:noFill/>
+                </a:ln>
+                <a:solidFill>
+                  <a:srgbClr val="CC7832"/>
+                </a:solidFill>
+                <a:effectLst/>
+                <a:latin typeface="Courier New" panose="02070309020205020404" pitchFamily="49" charset="0"/>
+                <a:cs typeface="Courier New" panose="02070309020205020404" pitchFamily="49" charset="0"/>
+              </a:rPr>
+              <a:t>if </a:t>
+            </a:r>
+            <a:r>
+              <a:rPr kumimoji="0" lang="sv-SE" altLang="sv-SE" sz="1000" b="0" i="0" u="none" strike="noStrike" cap="none" normalizeH="0" baseline="0">
+                <a:ln>
+                  <a:noFill/>
+                </a:ln>
+                <a:solidFill>
+                  <a:srgbClr val="A9B7C6"/>
+                </a:solidFill>
+                <a:effectLst/>
+                <a:latin typeface="Courier New" panose="02070309020205020404" pitchFamily="49" charset="0"/>
+                <a:cs typeface="Courier New" panose="02070309020205020404" pitchFamily="49" charset="0"/>
+              </a:rPr>
+              <a:t>(</a:t>
+            </a:r>
+            <a:r>
+              <a:rPr kumimoji="0" lang="sv-SE" altLang="sv-SE" sz="1000" b="0" i="0" u="none" strike="noStrike" cap="none" normalizeH="0" baseline="0">
+                <a:ln>
+                  <a:noFill/>
+                </a:ln>
+                <a:solidFill>
+                  <a:srgbClr val="9876AA"/>
+                </a:solidFill>
+                <a:effectLst/>
+                <a:latin typeface="Courier New" panose="02070309020205020404" pitchFamily="49" charset="0"/>
+                <a:cs typeface="Courier New" panose="02070309020205020404" pitchFamily="49" charset="0"/>
+              </a:rPr>
+              <a:t>isInCombat </a:t>
+            </a:r>
+            <a:r>
+              <a:rPr kumimoji="0" lang="sv-SE" altLang="sv-SE" sz="1000" b="0" i="0" u="none" strike="noStrike" cap="none" normalizeH="0" baseline="0">
+                <a:ln>
+                  <a:noFill/>
+                </a:ln>
+                <a:solidFill>
+                  <a:srgbClr val="A9B7C6"/>
+                </a:solidFill>
+                <a:effectLst/>
+                <a:latin typeface="Courier New" panose="02070309020205020404" pitchFamily="49" charset="0"/>
+                <a:cs typeface="Courier New" panose="02070309020205020404" pitchFamily="49" charset="0"/>
+              </a:rPr>
+              <a:t>&amp;&amp; </a:t>
+            </a:r>
+            <a:r>
+              <a:rPr kumimoji="0" lang="sv-SE" altLang="sv-SE" sz="1000" b="0" i="0" u="none" strike="noStrike" cap="none" normalizeH="0" baseline="0">
+                <a:ln>
+                  <a:noFill/>
+                </a:ln>
+                <a:solidFill>
+                  <a:srgbClr val="9876AA"/>
+                </a:solidFill>
+                <a:effectLst/>
+                <a:latin typeface="Courier New" panose="02070309020205020404" pitchFamily="49" charset="0"/>
+                <a:cs typeface="Courier New" panose="02070309020205020404" pitchFamily="49" charset="0"/>
+              </a:rPr>
+              <a:t>currentHp </a:t>
+            </a:r>
+            <a:r>
+              <a:rPr kumimoji="0" lang="sv-SE" altLang="sv-SE" sz="1000" b="0" i="0" u="none" strike="noStrike" cap="none" normalizeH="0" baseline="0">
+                <a:ln>
+                  <a:noFill/>
+                </a:ln>
+                <a:solidFill>
+                  <a:srgbClr val="A9B7C6"/>
+                </a:solidFill>
+                <a:effectLst/>
+                <a:latin typeface="Courier New" panose="02070309020205020404" pitchFamily="49" charset="0"/>
+                <a:cs typeface="Courier New" panose="02070309020205020404" pitchFamily="49" charset="0"/>
+              </a:rPr>
+              <a:t>== </a:t>
+            </a:r>
+            <a:r>
+              <a:rPr kumimoji="0" lang="sv-SE" altLang="sv-SE" sz="1000" b="0" i="0" u="none" strike="noStrike" cap="none" normalizeH="0" baseline="0">
+                <a:ln>
+                  <a:noFill/>
+                </a:ln>
+                <a:solidFill>
+                  <a:srgbClr val="6897BB"/>
+                </a:solidFill>
+                <a:effectLst/>
+                <a:latin typeface="Courier New" panose="02070309020205020404" pitchFamily="49" charset="0"/>
+                <a:cs typeface="Courier New" panose="02070309020205020404" pitchFamily="49" charset="0"/>
+              </a:rPr>
+              <a:t>0</a:t>
+            </a:r>
+            <a:r>
+              <a:rPr kumimoji="0" lang="sv-SE" altLang="sv-SE" sz="1000" b="0" i="0" u="none" strike="noStrike" cap="none" normalizeH="0" baseline="0">
+                <a:ln>
+                  <a:noFill/>
+                </a:ln>
+                <a:solidFill>
+                  <a:srgbClr val="A9B7C6"/>
+                </a:solidFill>
+                <a:effectLst/>
+                <a:latin typeface="Courier New" panose="02070309020205020404" pitchFamily="49" charset="0"/>
+                <a:cs typeface="Courier New" panose="02070309020205020404" pitchFamily="49" charset="0"/>
+              </a:rPr>
+              <a:t>) {</a:t>
+            </a:r>
+            <a:br>
+              <a:rPr kumimoji="0" lang="sv-SE" altLang="sv-SE" sz="1000" b="0" i="0" u="none" strike="noStrike" cap="none" normalizeH="0" baseline="0">
+                <a:ln>
+                  <a:noFill/>
+                </a:ln>
+                <a:solidFill>
+                  <a:srgbClr val="A9B7C6"/>
+                </a:solidFill>
+                <a:effectLst/>
+                <a:latin typeface="Courier New" panose="02070309020205020404" pitchFamily="49" charset="0"/>
+                <a:cs typeface="Courier New" panose="02070309020205020404" pitchFamily="49" charset="0"/>
+              </a:rPr>
+            </a:br>
+            <a:r>
+              <a:rPr kumimoji="0" lang="sv-SE" altLang="sv-SE" sz="1000" b="0" i="0" u="none" strike="noStrike" cap="none" normalizeH="0" baseline="0">
+                <a:ln>
+                  <a:noFill/>
+                </a:ln>
+                <a:solidFill>
+                  <a:srgbClr val="A9B7C6"/>
+                </a:solidFill>
+                <a:effectLst/>
+                <a:latin typeface="Courier New" panose="02070309020205020404" pitchFamily="49" charset="0"/>
+                <a:cs typeface="Courier New" panose="02070309020205020404" pitchFamily="49" charset="0"/>
+              </a:rPr>
+              <a:t>        </a:t>
+            </a:r>
+            <a:r>
+              <a:rPr kumimoji="0" lang="sv-SE" altLang="sv-SE" sz="1000" b="0" i="0" u="none" strike="noStrike" cap="none" normalizeH="0" baseline="0">
+                <a:ln>
+                  <a:noFill/>
+                </a:ln>
+                <a:solidFill>
+                  <a:srgbClr val="9876AA"/>
+                </a:solidFill>
+                <a:effectLst/>
+                <a:latin typeface="Courier New" panose="02070309020205020404" pitchFamily="49" charset="0"/>
+                <a:cs typeface="Courier New" panose="02070309020205020404" pitchFamily="49" charset="0"/>
+              </a:rPr>
+              <a:t>isAlive </a:t>
+            </a:r>
+            <a:r>
+              <a:rPr kumimoji="0" lang="sv-SE" altLang="sv-SE" sz="1000" b="0" i="0" u="none" strike="noStrike" cap="none" normalizeH="0" baseline="0">
+                <a:ln>
+                  <a:noFill/>
+                </a:ln>
+                <a:solidFill>
+                  <a:srgbClr val="A9B7C6"/>
+                </a:solidFill>
+                <a:effectLst/>
+                <a:latin typeface="Courier New" panose="02070309020205020404" pitchFamily="49" charset="0"/>
+                <a:cs typeface="Courier New" panose="02070309020205020404" pitchFamily="49" charset="0"/>
+              </a:rPr>
+              <a:t>= </a:t>
+            </a:r>
+            <a:r>
+              <a:rPr kumimoji="0" lang="sv-SE" altLang="sv-SE" sz="1000" b="0" i="0" u="none" strike="noStrike" cap="none" normalizeH="0" baseline="0">
+                <a:ln>
+                  <a:noFill/>
+                </a:ln>
+                <a:solidFill>
+                  <a:srgbClr val="CC7832"/>
+                </a:solidFill>
+                <a:effectLst/>
+                <a:latin typeface="Courier New" panose="02070309020205020404" pitchFamily="49" charset="0"/>
+                <a:cs typeface="Courier New" panose="02070309020205020404" pitchFamily="49" charset="0"/>
+              </a:rPr>
+              <a:t>false;</a:t>
+            </a:r>
+            <a:br>
+              <a:rPr kumimoji="0" lang="sv-SE" altLang="sv-SE" sz="1000" b="0" i="0" u="none" strike="noStrike" cap="none" normalizeH="0" baseline="0">
+                <a:ln>
+                  <a:noFill/>
+                </a:ln>
+                <a:solidFill>
+                  <a:srgbClr val="CC7832"/>
+                </a:solidFill>
+                <a:effectLst/>
+                <a:latin typeface="Courier New" panose="02070309020205020404" pitchFamily="49" charset="0"/>
+                <a:cs typeface="Courier New" panose="02070309020205020404" pitchFamily="49" charset="0"/>
+              </a:rPr>
+            </a:br>
+            <a:r>
+              <a:rPr kumimoji="0" lang="sv-SE" altLang="sv-SE" sz="1000" b="0" i="0" u="none" strike="noStrike" cap="none" normalizeH="0" baseline="0">
+                <a:ln>
+                  <a:noFill/>
+                </a:ln>
+                <a:solidFill>
+                  <a:srgbClr val="CC7832"/>
+                </a:solidFill>
+                <a:effectLst/>
+                <a:latin typeface="Courier New" panose="02070309020205020404" pitchFamily="49" charset="0"/>
+                <a:cs typeface="Courier New" panose="02070309020205020404" pitchFamily="49" charset="0"/>
+              </a:rPr>
+              <a:t>        </a:t>
+            </a:r>
+            <a:r>
+              <a:rPr kumimoji="0" lang="sv-SE" altLang="sv-SE" sz="1000" b="0" i="0" u="none" strike="noStrike" cap="none" normalizeH="0" baseline="0">
+                <a:ln>
+                  <a:noFill/>
+                </a:ln>
+                <a:solidFill>
+                  <a:srgbClr val="A9B7C6"/>
+                </a:solidFill>
+                <a:effectLst/>
+                <a:latin typeface="Courier New" panose="02070309020205020404" pitchFamily="49" charset="0"/>
+                <a:cs typeface="Courier New" panose="02070309020205020404" pitchFamily="49" charset="0"/>
+              </a:rPr>
+              <a:t>resetExperience()</a:t>
+            </a:r>
+            <a:r>
+              <a:rPr kumimoji="0" lang="sv-SE" altLang="sv-SE" sz="1000" b="0" i="0" u="none" strike="noStrike" cap="none" normalizeH="0" baseline="0">
+                <a:ln>
+                  <a:noFill/>
+                </a:ln>
+                <a:solidFill>
+                  <a:srgbClr val="CC7832"/>
+                </a:solidFill>
+                <a:effectLst/>
+                <a:latin typeface="Courier New" panose="02070309020205020404" pitchFamily="49" charset="0"/>
+                <a:cs typeface="Courier New" panose="02070309020205020404" pitchFamily="49" charset="0"/>
+              </a:rPr>
+              <a:t>;</a:t>
+            </a:r>
+            <a:br>
+              <a:rPr kumimoji="0" lang="sv-SE" altLang="sv-SE" sz="1000" b="0" i="0" u="none" strike="noStrike" cap="none" normalizeH="0" baseline="0">
+                <a:ln>
+                  <a:noFill/>
+                </a:ln>
+                <a:solidFill>
+                  <a:srgbClr val="CC7832"/>
+                </a:solidFill>
+                <a:effectLst/>
+                <a:latin typeface="Courier New" panose="02070309020205020404" pitchFamily="49" charset="0"/>
+                <a:cs typeface="Courier New" panose="02070309020205020404" pitchFamily="49" charset="0"/>
+              </a:rPr>
+            </a:br>
+            <a:r>
+              <a:rPr kumimoji="0" lang="sv-SE" altLang="sv-SE" sz="1000" b="0" i="0" u="none" strike="noStrike" cap="none" normalizeH="0" baseline="0">
+                <a:ln>
+                  <a:noFill/>
+                </a:ln>
+                <a:solidFill>
+                  <a:srgbClr val="CC7832"/>
+                </a:solidFill>
+                <a:effectLst/>
+                <a:latin typeface="Courier New" panose="02070309020205020404" pitchFamily="49" charset="0"/>
+                <a:cs typeface="Courier New" panose="02070309020205020404" pitchFamily="49" charset="0"/>
+              </a:rPr>
+              <a:t>        </a:t>
+            </a:r>
+            <a:r>
+              <a:rPr kumimoji="0" lang="sv-SE" altLang="sv-SE" sz="1000" b="0" i="0" u="none" strike="noStrike" cap="none" normalizeH="0" baseline="0">
+                <a:ln>
+                  <a:noFill/>
+                </a:ln>
+                <a:solidFill>
+                  <a:srgbClr val="A9B7C6"/>
+                </a:solidFill>
+                <a:effectLst/>
+                <a:latin typeface="Courier New" panose="02070309020205020404" pitchFamily="49" charset="0"/>
+                <a:cs typeface="Courier New" panose="02070309020205020404" pitchFamily="49" charset="0"/>
+              </a:rPr>
+              <a:t>resetPosition()</a:t>
+            </a:r>
+            <a:r>
+              <a:rPr kumimoji="0" lang="sv-SE" altLang="sv-SE" sz="1000" b="0" i="0" u="none" strike="noStrike" cap="none" normalizeH="0" baseline="0">
+                <a:ln>
+                  <a:noFill/>
+                </a:ln>
+                <a:solidFill>
+                  <a:srgbClr val="CC7832"/>
+                </a:solidFill>
+                <a:effectLst/>
+                <a:latin typeface="Courier New" panose="02070309020205020404" pitchFamily="49" charset="0"/>
+                <a:cs typeface="Courier New" panose="02070309020205020404" pitchFamily="49" charset="0"/>
+              </a:rPr>
+              <a:t>;</a:t>
+            </a:r>
+            <a:br>
+              <a:rPr kumimoji="0" lang="sv-SE" altLang="sv-SE" sz="1000" b="0" i="0" u="none" strike="noStrike" cap="none" normalizeH="0" baseline="0">
+                <a:ln>
+                  <a:noFill/>
+                </a:ln>
+                <a:solidFill>
+                  <a:srgbClr val="CC7832"/>
+                </a:solidFill>
+                <a:effectLst/>
+                <a:latin typeface="Courier New" panose="02070309020205020404" pitchFamily="49" charset="0"/>
+                <a:cs typeface="Courier New" panose="02070309020205020404" pitchFamily="49" charset="0"/>
+              </a:rPr>
+            </a:br>
+            <a:r>
+              <a:rPr kumimoji="0" lang="sv-SE" altLang="sv-SE" sz="1000" b="0" i="0" u="none" strike="noStrike" cap="none" normalizeH="0" baseline="0">
+                <a:ln>
+                  <a:noFill/>
+                </a:ln>
+                <a:solidFill>
+                  <a:srgbClr val="CC7832"/>
+                </a:solidFill>
+                <a:effectLst/>
+                <a:latin typeface="Courier New" panose="02070309020205020404" pitchFamily="49" charset="0"/>
+                <a:cs typeface="Courier New" panose="02070309020205020404" pitchFamily="49" charset="0"/>
+              </a:rPr>
+              <a:t>    </a:t>
+            </a:r>
+            <a:r>
+              <a:rPr kumimoji="0" lang="sv-SE" altLang="sv-SE" sz="1000" b="0" i="0" u="none" strike="noStrike" cap="none" normalizeH="0" baseline="0">
+                <a:ln>
+                  <a:noFill/>
+                </a:ln>
+                <a:solidFill>
+                  <a:srgbClr val="A9B7C6"/>
+                </a:solidFill>
+                <a:effectLst/>
+                <a:latin typeface="Courier New" panose="02070309020205020404" pitchFamily="49" charset="0"/>
+                <a:cs typeface="Courier New" panose="02070309020205020404" pitchFamily="49" charset="0"/>
+              </a:rPr>
+              <a:t>}</a:t>
+            </a:r>
+            <a:br>
+              <a:rPr kumimoji="0" lang="sv-SE" altLang="sv-SE" sz="1000" b="0" i="0" u="none" strike="noStrike" cap="none" normalizeH="0" baseline="0">
+                <a:ln>
+                  <a:noFill/>
+                </a:ln>
+                <a:solidFill>
+                  <a:srgbClr val="A9B7C6"/>
+                </a:solidFill>
+                <a:effectLst/>
+                <a:latin typeface="Courier New" panose="02070309020205020404" pitchFamily="49" charset="0"/>
+                <a:cs typeface="Courier New" panose="02070309020205020404" pitchFamily="49" charset="0"/>
+              </a:rPr>
+            </a:br>
+            <a:r>
+              <a:rPr kumimoji="0" lang="sv-SE" altLang="sv-SE" sz="1000" b="0" i="0" u="none" strike="noStrike" cap="none" normalizeH="0" baseline="0">
+                <a:ln>
+                  <a:noFill/>
+                </a:ln>
+                <a:solidFill>
+                  <a:srgbClr val="A9B7C6"/>
+                </a:solidFill>
+                <a:effectLst/>
+                <a:latin typeface="Courier New" panose="02070309020205020404" pitchFamily="49" charset="0"/>
+                <a:cs typeface="Courier New" panose="02070309020205020404" pitchFamily="49" charset="0"/>
+              </a:rPr>
+              <a:t>}</a:t>
+            </a:r>
+            <a:endParaRPr kumimoji="0" lang="sv-SE" altLang="sv-SE" sz="1800" b="0" i="0" u="none" strike="noStrike" cap="none" normalizeH="0" baseline="0">
+              <a:ln>
+                <a:noFill/>
+              </a:ln>
+              <a:solidFill>
+                <a:schemeClr val="tx1"/>
+              </a:solidFill>
+              <a:effectLst/>
+              <a:latin typeface="Arial" panose="020B0604020202020204" pitchFamily="34" charset="0"/>
+            </a:endParaRPr>
           </a:p>
         </p:txBody>
       </p:sp>
@@ -8688,14 +10019,19 @@
             <p:ph type="title"/>
           </p:nvPr>
         </p:nvSpPr>
-        <p:spPr/>
+        <p:spPr>
+          <a:xfrm>
+            <a:off x="839788" y="312574"/>
+            <a:ext cx="10515600" cy="1325563"/>
+          </a:xfrm>
+        </p:spPr>
         <p:txBody>
           <a:bodyPr/>
           <a:lstStyle/>
           <a:p>
             <a:r>
               <a:rPr lang="sv-SE" dirty="0"/>
-              <a:t>TDD-exempel: Emil</a:t>
+              <a:t>TDD-exempel: Lukas</a:t>
             </a:r>
           </a:p>
         </p:txBody>
@@ -8725,25 +10061,6 @@
       </p:sp>
       <p:sp>
         <p:nvSpPr>
-          <p:cNvPr id="5" name="Platshållare för innehåll 4"/>
-          <p:cNvSpPr>
-            <a:spLocks noGrp="1"/>
-          </p:cNvSpPr>
-          <p:nvPr>
-            <p:ph sz="half" idx="2"/>
-          </p:nvPr>
-        </p:nvSpPr>
-        <p:spPr/>
-        <p:txBody>
-          <a:bodyPr/>
-          <a:lstStyle/>
-          <a:p>
-            <a:endParaRPr lang="sv-SE"/>
-          </a:p>
-        </p:txBody>
-      </p:sp>
-      <p:sp>
-        <p:nvSpPr>
           <p:cNvPr id="6" name="Platshållare för text 5"/>
           <p:cNvSpPr>
             <a:spLocks noGrp="1"/>
@@ -8766,20 +10083,1140 @@
       </p:sp>
       <p:sp>
         <p:nvSpPr>
-          <p:cNvPr id="7" name="Platshållare för innehåll 6"/>
-          <p:cNvSpPr>
-            <a:spLocks noGrp="1"/>
+          <p:cNvPr id="11" name="Rectangle 1">
+            <a:extLst>
+              <a:ext uri="{FF2B5EF4-FFF2-40B4-BE49-F238E27FC236}">
+                <a16:creationId xmlns:a16="http://schemas.microsoft.com/office/drawing/2014/main" id="{71DF96C0-C9A4-4E03-B1E4-67C132639050}"/>
+              </a:ext>
+            </a:extLst>
+          </p:cNvPr>
+          <p:cNvSpPr>
+            <a:spLocks noGrp="1" noChangeArrowheads="1"/>
+          </p:cNvSpPr>
+          <p:nvPr>
+            <p:ph sz="half" idx="2"/>
+          </p:nvPr>
+        </p:nvSpPr>
+        <p:spPr bwMode="auto">
+          <a:prstGeom prst="rect">
+            <a:avLst/>
+          </a:prstGeom>
+          <a:solidFill>
+            <a:srgbClr val="2B2B2B"/>
+          </a:solidFill>
+          <a:ln>
+            <a:noFill/>
+          </a:ln>
+          <a:effectLst/>
+          <a:extLst>
+            <a:ext uri="{91240B29-F687-4F45-9708-019B960494DF}">
+              <a14:hiddenLine xmlns:a14="http://schemas.microsoft.com/office/drawing/2010/main" w="9525">
+                <a:solidFill>
+                  <a:schemeClr val="tx1"/>
+                </a:solidFill>
+                <a:miter lim="800000"/>
+                <a:headEnd/>
+                <a:tailEnd/>
+              </a14:hiddenLine>
+            </a:ext>
+            <a:ext uri="{AF507438-7753-43E0-B8FC-AC1667EBCBE1}">
+              <a14:hiddenEffects xmlns:a14="http://schemas.microsoft.com/office/drawing/2010/main">
+                <a:effectLst>
+                  <a:outerShdw dist="35921" dir="2700000" algn="ctr" rotWithShape="0">
+                    <a:schemeClr val="bg2"/>
+                  </a:outerShdw>
+                </a:effectLst>
+              </a14:hiddenEffects>
+            </a:ext>
+          </a:extLst>
+        </p:spPr>
+        <p:txBody>
+          <a:bodyPr vert="horz" wrap="none" lIns="91440" tIns="45720" rIns="91440" bIns="45720" numCol="1" anchor="ctr" anchorCtr="0" compatLnSpc="1">
+            <a:prstTxWarp prst="textNoShape">
+              <a:avLst/>
+            </a:prstTxWarp>
+            <a:spAutoFit/>
+          </a:bodyPr>
+          <a:lstStyle/>
+          <a:p>
+            <a:pPr marL="0" marR="0" lvl="0" indent="0" algn="l" defTabSz="914400" rtl="0" eaLnBrk="0" fontAlgn="base" latinLnBrk="0" hangingPunct="0">
+              <a:lnSpc>
+                <a:spcPct val="100000"/>
+              </a:lnSpc>
+              <a:spcBef>
+                <a:spcPct val="0"/>
+              </a:spcBef>
+              <a:spcAft>
+                <a:spcPct val="0"/>
+              </a:spcAft>
+              <a:buClrTx/>
+              <a:buSzTx/>
+              <a:buFontTx/>
+              <a:buNone/>
+              <a:tabLst/>
+            </a:pPr>
+            <a:r>
+              <a:rPr kumimoji="0" lang="sv-SE" altLang="sv-SE" sz="1000" b="0" i="0" u="none" strike="noStrike" cap="none" normalizeH="0" baseline="0">
+                <a:ln>
+                  <a:noFill/>
+                </a:ln>
+                <a:solidFill>
+                  <a:srgbClr val="BBB529"/>
+                </a:solidFill>
+                <a:effectLst/>
+                <a:latin typeface="Courier New" panose="02070309020205020404" pitchFamily="49" charset="0"/>
+                <a:cs typeface="Courier New" panose="02070309020205020404" pitchFamily="49" charset="0"/>
+              </a:rPr>
+              <a:t>@Test</a:t>
+            </a:r>
+            <a:br>
+              <a:rPr kumimoji="0" lang="sv-SE" altLang="sv-SE" sz="1000" b="0" i="0" u="none" strike="noStrike" cap="none" normalizeH="0" baseline="0">
+                <a:ln>
+                  <a:noFill/>
+                </a:ln>
+                <a:solidFill>
+                  <a:srgbClr val="BBB529"/>
+                </a:solidFill>
+                <a:effectLst/>
+                <a:latin typeface="Courier New" panose="02070309020205020404" pitchFamily="49" charset="0"/>
+                <a:cs typeface="Courier New" panose="02070309020205020404" pitchFamily="49" charset="0"/>
+              </a:rPr>
+            </a:br>
+            <a:r>
+              <a:rPr kumimoji="0" lang="sv-SE" altLang="sv-SE" sz="1000" b="0" i="0" u="none" strike="noStrike" cap="none" normalizeH="0" baseline="0">
+                <a:ln>
+                  <a:noFill/>
+                </a:ln>
+                <a:solidFill>
+                  <a:srgbClr val="CC7832"/>
+                </a:solidFill>
+                <a:effectLst/>
+                <a:latin typeface="Courier New" panose="02070309020205020404" pitchFamily="49" charset="0"/>
+                <a:cs typeface="Courier New" panose="02070309020205020404" pitchFamily="49" charset="0"/>
+              </a:rPr>
+              <a:t>public void </a:t>
+            </a:r>
+            <a:r>
+              <a:rPr kumimoji="0" lang="sv-SE" altLang="sv-SE" sz="1000" b="0" i="0" u="none" strike="noStrike" cap="none" normalizeH="0" baseline="0">
+                <a:ln>
+                  <a:noFill/>
+                </a:ln>
+                <a:solidFill>
+                  <a:srgbClr val="FFC66D"/>
+                </a:solidFill>
+                <a:effectLst/>
+                <a:latin typeface="Courier New" panose="02070309020205020404" pitchFamily="49" charset="0"/>
+                <a:cs typeface="Courier New" panose="02070309020205020404" pitchFamily="49" charset="0"/>
+              </a:rPr>
+              <a:t>testLevelAfterFight</a:t>
+            </a:r>
+            <a:r>
+              <a:rPr kumimoji="0" lang="sv-SE" altLang="sv-SE" sz="1000" b="0" i="0" u="none" strike="noStrike" cap="none" normalizeH="0" baseline="0">
+                <a:ln>
+                  <a:noFill/>
+                </a:ln>
+                <a:solidFill>
+                  <a:srgbClr val="A9B7C6"/>
+                </a:solidFill>
+                <a:effectLst/>
+                <a:latin typeface="Courier New" panose="02070309020205020404" pitchFamily="49" charset="0"/>
+                <a:cs typeface="Courier New" panose="02070309020205020404" pitchFamily="49" charset="0"/>
+              </a:rPr>
+              <a:t>() </a:t>
+            </a:r>
+            <a:r>
+              <a:rPr kumimoji="0" lang="sv-SE" altLang="sv-SE" sz="1000" b="0" i="0" u="none" strike="noStrike" cap="none" normalizeH="0" baseline="0">
+                <a:ln>
+                  <a:noFill/>
+                </a:ln>
+                <a:solidFill>
+                  <a:srgbClr val="CC7832"/>
+                </a:solidFill>
+                <a:effectLst/>
+                <a:latin typeface="Courier New" panose="02070309020205020404" pitchFamily="49" charset="0"/>
+                <a:cs typeface="Courier New" panose="02070309020205020404" pitchFamily="49" charset="0"/>
+              </a:rPr>
+              <a:t>throws </a:t>
+            </a:r>
+            <a:r>
+              <a:rPr kumimoji="0" lang="sv-SE" altLang="sv-SE" sz="1000" b="0" i="0" u="none" strike="noStrike" cap="none" normalizeH="0" baseline="0">
+                <a:ln>
+                  <a:noFill/>
+                </a:ln>
+                <a:solidFill>
+                  <a:srgbClr val="A9B7C6"/>
+                </a:solidFill>
+                <a:effectLst/>
+                <a:latin typeface="Courier New" panose="02070309020205020404" pitchFamily="49" charset="0"/>
+                <a:cs typeface="Courier New" panose="02070309020205020404" pitchFamily="49" charset="0"/>
+              </a:rPr>
+              <a:t>Exception {</a:t>
+            </a:r>
+            <a:br>
+              <a:rPr kumimoji="0" lang="sv-SE" altLang="sv-SE" sz="1000" b="0" i="0" u="none" strike="noStrike" cap="none" normalizeH="0" baseline="0">
+                <a:ln>
+                  <a:noFill/>
+                </a:ln>
+                <a:solidFill>
+                  <a:srgbClr val="A9B7C6"/>
+                </a:solidFill>
+                <a:effectLst/>
+                <a:latin typeface="Courier New" panose="02070309020205020404" pitchFamily="49" charset="0"/>
+                <a:cs typeface="Courier New" panose="02070309020205020404" pitchFamily="49" charset="0"/>
+              </a:rPr>
+            </a:br>
+            <a:r>
+              <a:rPr kumimoji="0" lang="sv-SE" altLang="sv-SE" sz="1000" b="0" i="0" u="none" strike="noStrike" cap="none" normalizeH="0" baseline="0">
+                <a:ln>
+                  <a:noFill/>
+                </a:ln>
+                <a:solidFill>
+                  <a:srgbClr val="A9B7C6"/>
+                </a:solidFill>
+                <a:effectLst/>
+                <a:latin typeface="Courier New" panose="02070309020205020404" pitchFamily="49" charset="0"/>
+                <a:cs typeface="Courier New" panose="02070309020205020404" pitchFamily="49" charset="0"/>
+              </a:rPr>
+              <a:t>    GameCharacter character = </a:t>
+            </a:r>
+            <a:r>
+              <a:rPr kumimoji="0" lang="sv-SE" altLang="sv-SE" sz="1000" b="0" i="0" u="none" strike="noStrike" cap="none" normalizeH="0" baseline="0">
+                <a:ln>
+                  <a:noFill/>
+                </a:ln>
+                <a:solidFill>
+                  <a:srgbClr val="CC7832"/>
+                </a:solidFill>
+                <a:effectLst/>
+                <a:latin typeface="Courier New" panose="02070309020205020404" pitchFamily="49" charset="0"/>
+                <a:cs typeface="Courier New" panose="02070309020205020404" pitchFamily="49" charset="0"/>
+              </a:rPr>
+              <a:t>new </a:t>
+            </a:r>
+            <a:r>
+              <a:rPr kumimoji="0" lang="sv-SE" altLang="sv-SE" sz="1000" b="0" i="0" u="none" strike="noStrike" cap="none" normalizeH="0" baseline="0">
+                <a:ln>
+                  <a:noFill/>
+                </a:ln>
+                <a:solidFill>
+                  <a:srgbClr val="A9B7C6"/>
+                </a:solidFill>
+                <a:effectLst/>
+                <a:latin typeface="Courier New" panose="02070309020205020404" pitchFamily="49" charset="0"/>
+                <a:cs typeface="Courier New" panose="02070309020205020404" pitchFamily="49" charset="0"/>
+              </a:rPr>
+              <a:t>GameCharacter(</a:t>
+            </a:r>
+            <a:r>
+              <a:rPr kumimoji="0" lang="sv-SE" altLang="sv-SE" sz="1000" b="0" i="0" u="none" strike="noStrike" cap="none" normalizeH="0" baseline="0">
+                <a:ln>
+                  <a:noFill/>
+                </a:ln>
+                <a:solidFill>
+                  <a:srgbClr val="6A8759"/>
+                </a:solidFill>
+                <a:effectLst/>
+                <a:latin typeface="Courier New" panose="02070309020205020404" pitchFamily="49" charset="0"/>
+                <a:cs typeface="Courier New" panose="02070309020205020404" pitchFamily="49" charset="0"/>
+              </a:rPr>
+              <a:t>"Gubbe"</a:t>
+            </a:r>
+            <a:r>
+              <a:rPr kumimoji="0" lang="sv-SE" altLang="sv-SE" sz="1000" b="0" i="0" u="none" strike="noStrike" cap="none" normalizeH="0" baseline="0">
+                <a:ln>
+                  <a:noFill/>
+                </a:ln>
+                <a:solidFill>
+                  <a:srgbClr val="A9B7C6"/>
+                </a:solidFill>
+                <a:effectLst/>
+                <a:latin typeface="Courier New" panose="02070309020205020404" pitchFamily="49" charset="0"/>
+                <a:cs typeface="Courier New" panose="02070309020205020404" pitchFamily="49" charset="0"/>
+              </a:rPr>
+              <a:t>)</a:t>
+            </a:r>
+            <a:r>
+              <a:rPr kumimoji="0" lang="sv-SE" altLang="sv-SE" sz="1000" b="0" i="0" u="none" strike="noStrike" cap="none" normalizeH="0" baseline="0">
+                <a:ln>
+                  <a:noFill/>
+                </a:ln>
+                <a:solidFill>
+                  <a:srgbClr val="CC7832"/>
+                </a:solidFill>
+                <a:effectLst/>
+                <a:latin typeface="Courier New" panose="02070309020205020404" pitchFamily="49" charset="0"/>
+                <a:cs typeface="Courier New" panose="02070309020205020404" pitchFamily="49" charset="0"/>
+              </a:rPr>
+              <a:t>;</a:t>
+            </a:r>
+            <a:br>
+              <a:rPr kumimoji="0" lang="sv-SE" altLang="sv-SE" sz="1000" b="0" i="0" u="none" strike="noStrike" cap="none" normalizeH="0" baseline="0">
+                <a:ln>
+                  <a:noFill/>
+                </a:ln>
+                <a:solidFill>
+                  <a:srgbClr val="CC7832"/>
+                </a:solidFill>
+                <a:effectLst/>
+                <a:latin typeface="Courier New" panose="02070309020205020404" pitchFamily="49" charset="0"/>
+                <a:cs typeface="Courier New" panose="02070309020205020404" pitchFamily="49" charset="0"/>
+              </a:rPr>
+            </a:br>
+            <a:r>
+              <a:rPr kumimoji="0" lang="sv-SE" altLang="sv-SE" sz="1000" b="0" i="0" u="none" strike="noStrike" cap="none" normalizeH="0" baseline="0">
+                <a:ln>
+                  <a:noFill/>
+                </a:ln>
+                <a:solidFill>
+                  <a:srgbClr val="CC7832"/>
+                </a:solidFill>
+                <a:effectLst/>
+                <a:latin typeface="Courier New" panose="02070309020205020404" pitchFamily="49" charset="0"/>
+                <a:cs typeface="Courier New" panose="02070309020205020404" pitchFamily="49" charset="0"/>
+              </a:rPr>
+              <a:t>    </a:t>
+            </a:r>
+            <a:r>
+              <a:rPr kumimoji="0" lang="sv-SE" altLang="sv-SE" sz="1000" b="0" i="0" u="none" strike="noStrike" cap="none" normalizeH="0" baseline="0">
+                <a:ln>
+                  <a:noFill/>
+                </a:ln>
+                <a:solidFill>
+                  <a:srgbClr val="A9B7C6"/>
+                </a:solidFill>
+                <a:effectLst/>
+                <a:latin typeface="Courier New" panose="02070309020205020404" pitchFamily="49" charset="0"/>
+                <a:cs typeface="Courier New" panose="02070309020205020404" pitchFamily="49" charset="0"/>
+              </a:rPr>
+              <a:t>character.afterCombat(</a:t>
+            </a:r>
+            <a:r>
+              <a:rPr kumimoji="0" lang="sv-SE" altLang="sv-SE" sz="1000" b="0" i="0" u="none" strike="noStrike" cap="none" normalizeH="0" baseline="0">
+                <a:ln>
+                  <a:noFill/>
+                </a:ln>
+                <a:solidFill>
+                  <a:srgbClr val="CC7832"/>
+                </a:solidFill>
+                <a:effectLst/>
+                <a:latin typeface="Courier New" panose="02070309020205020404" pitchFamily="49" charset="0"/>
+                <a:cs typeface="Courier New" panose="02070309020205020404" pitchFamily="49" charset="0"/>
+              </a:rPr>
+              <a:t>true</a:t>
+            </a:r>
+            <a:r>
+              <a:rPr kumimoji="0" lang="sv-SE" altLang="sv-SE" sz="1000" b="0" i="0" u="none" strike="noStrike" cap="none" normalizeH="0" baseline="0">
+                <a:ln>
+                  <a:noFill/>
+                </a:ln>
+                <a:solidFill>
+                  <a:srgbClr val="A9B7C6"/>
+                </a:solidFill>
+                <a:effectLst/>
+                <a:latin typeface="Courier New" panose="02070309020205020404" pitchFamily="49" charset="0"/>
+                <a:cs typeface="Courier New" panose="02070309020205020404" pitchFamily="49" charset="0"/>
+              </a:rPr>
+              <a:t>)</a:t>
+            </a:r>
+            <a:r>
+              <a:rPr kumimoji="0" lang="sv-SE" altLang="sv-SE" sz="1000" b="0" i="0" u="none" strike="noStrike" cap="none" normalizeH="0" baseline="0">
+                <a:ln>
+                  <a:noFill/>
+                </a:ln>
+                <a:solidFill>
+                  <a:srgbClr val="CC7832"/>
+                </a:solidFill>
+                <a:effectLst/>
+                <a:latin typeface="Courier New" panose="02070309020205020404" pitchFamily="49" charset="0"/>
+                <a:cs typeface="Courier New" panose="02070309020205020404" pitchFamily="49" charset="0"/>
+              </a:rPr>
+              <a:t>;</a:t>
+            </a:r>
+            <a:br>
+              <a:rPr kumimoji="0" lang="sv-SE" altLang="sv-SE" sz="1000" b="0" i="0" u="none" strike="noStrike" cap="none" normalizeH="0" baseline="0">
+                <a:ln>
+                  <a:noFill/>
+                </a:ln>
+                <a:solidFill>
+                  <a:srgbClr val="CC7832"/>
+                </a:solidFill>
+                <a:effectLst/>
+                <a:latin typeface="Courier New" panose="02070309020205020404" pitchFamily="49" charset="0"/>
+                <a:cs typeface="Courier New" panose="02070309020205020404" pitchFamily="49" charset="0"/>
+              </a:rPr>
+            </a:br>
+            <a:r>
+              <a:rPr kumimoji="0" lang="sv-SE" altLang="sv-SE" sz="1000" b="0" i="0" u="none" strike="noStrike" cap="none" normalizeH="0" baseline="0">
+                <a:ln>
+                  <a:noFill/>
+                </a:ln>
+                <a:solidFill>
+                  <a:srgbClr val="CC7832"/>
+                </a:solidFill>
+                <a:effectLst/>
+                <a:latin typeface="Courier New" panose="02070309020205020404" pitchFamily="49" charset="0"/>
+                <a:cs typeface="Courier New" panose="02070309020205020404" pitchFamily="49" charset="0"/>
+              </a:rPr>
+              <a:t>    </a:t>
+            </a:r>
+            <a:r>
+              <a:rPr kumimoji="0" lang="sv-SE" altLang="sv-SE" sz="1000" b="0" i="1" u="none" strike="noStrike" cap="none" normalizeH="0" baseline="0">
+                <a:ln>
+                  <a:noFill/>
+                </a:ln>
+                <a:solidFill>
+                  <a:srgbClr val="A9B7C6"/>
+                </a:solidFill>
+                <a:effectLst/>
+                <a:latin typeface="Courier New" panose="02070309020205020404" pitchFamily="49" charset="0"/>
+                <a:cs typeface="Courier New" panose="02070309020205020404" pitchFamily="49" charset="0"/>
+              </a:rPr>
+              <a:t>assertEquals</a:t>
+            </a:r>
+            <a:r>
+              <a:rPr kumimoji="0" lang="sv-SE" altLang="sv-SE" sz="1000" b="0" i="0" u="none" strike="noStrike" cap="none" normalizeH="0" baseline="0">
+                <a:ln>
+                  <a:noFill/>
+                </a:ln>
+                <a:solidFill>
+                  <a:srgbClr val="A9B7C6"/>
+                </a:solidFill>
+                <a:effectLst/>
+                <a:latin typeface="Courier New" panose="02070309020205020404" pitchFamily="49" charset="0"/>
+                <a:cs typeface="Courier New" panose="02070309020205020404" pitchFamily="49" charset="0"/>
+              </a:rPr>
+              <a:t>(</a:t>
+            </a:r>
+            <a:r>
+              <a:rPr kumimoji="0" lang="sv-SE" altLang="sv-SE" sz="1000" b="0" i="0" u="none" strike="noStrike" cap="none" normalizeH="0" baseline="0">
+                <a:ln>
+                  <a:noFill/>
+                </a:ln>
+                <a:solidFill>
+                  <a:srgbClr val="6897BB"/>
+                </a:solidFill>
+                <a:effectLst/>
+                <a:latin typeface="Courier New" panose="02070309020205020404" pitchFamily="49" charset="0"/>
+                <a:cs typeface="Courier New" panose="02070309020205020404" pitchFamily="49" charset="0"/>
+              </a:rPr>
+              <a:t>1</a:t>
+            </a:r>
+            <a:r>
+              <a:rPr kumimoji="0" lang="sv-SE" altLang="sv-SE" sz="1000" b="0" i="0" u="none" strike="noStrike" cap="none" normalizeH="0" baseline="0">
+                <a:ln>
+                  <a:noFill/>
+                </a:ln>
+                <a:solidFill>
+                  <a:srgbClr val="CC7832"/>
+                </a:solidFill>
+                <a:effectLst/>
+                <a:latin typeface="Courier New" panose="02070309020205020404" pitchFamily="49" charset="0"/>
+                <a:cs typeface="Courier New" panose="02070309020205020404" pitchFamily="49" charset="0"/>
+              </a:rPr>
+              <a:t>, </a:t>
+            </a:r>
+            <a:r>
+              <a:rPr kumimoji="0" lang="sv-SE" altLang="sv-SE" sz="1000" b="0" i="0" u="none" strike="noStrike" cap="none" normalizeH="0" baseline="0">
+                <a:ln>
+                  <a:noFill/>
+                </a:ln>
+                <a:solidFill>
+                  <a:srgbClr val="A9B7C6"/>
+                </a:solidFill>
+                <a:effectLst/>
+                <a:latin typeface="Courier New" panose="02070309020205020404" pitchFamily="49" charset="0"/>
+                <a:cs typeface="Courier New" panose="02070309020205020404" pitchFamily="49" charset="0"/>
+              </a:rPr>
+              <a:t>character.getLevel())</a:t>
+            </a:r>
+            <a:r>
+              <a:rPr kumimoji="0" lang="sv-SE" altLang="sv-SE" sz="1000" b="0" i="0" u="none" strike="noStrike" cap="none" normalizeH="0" baseline="0">
+                <a:ln>
+                  <a:noFill/>
+                </a:ln>
+                <a:solidFill>
+                  <a:srgbClr val="CC7832"/>
+                </a:solidFill>
+                <a:effectLst/>
+                <a:latin typeface="Courier New" panose="02070309020205020404" pitchFamily="49" charset="0"/>
+                <a:cs typeface="Courier New" panose="02070309020205020404" pitchFamily="49" charset="0"/>
+              </a:rPr>
+              <a:t>;</a:t>
+            </a:r>
+            <a:br>
+              <a:rPr kumimoji="0" lang="sv-SE" altLang="sv-SE" sz="1000" b="0" i="0" u="none" strike="noStrike" cap="none" normalizeH="0" baseline="0">
+                <a:ln>
+                  <a:noFill/>
+                </a:ln>
+                <a:solidFill>
+                  <a:srgbClr val="CC7832"/>
+                </a:solidFill>
+                <a:effectLst/>
+                <a:latin typeface="Courier New" panose="02070309020205020404" pitchFamily="49" charset="0"/>
+                <a:cs typeface="Courier New" panose="02070309020205020404" pitchFamily="49" charset="0"/>
+              </a:rPr>
+            </a:br>
+            <a:r>
+              <a:rPr kumimoji="0" lang="sv-SE" altLang="sv-SE" sz="1000" b="0" i="0" u="none" strike="noStrike" cap="none" normalizeH="0" baseline="0">
+                <a:ln>
+                  <a:noFill/>
+                </a:ln>
+                <a:solidFill>
+                  <a:srgbClr val="A9B7C6"/>
+                </a:solidFill>
+                <a:effectLst/>
+                <a:latin typeface="Courier New" panose="02070309020205020404" pitchFamily="49" charset="0"/>
+                <a:cs typeface="Courier New" panose="02070309020205020404" pitchFamily="49" charset="0"/>
+              </a:rPr>
+              <a:t>}</a:t>
+            </a:r>
+            <a:endParaRPr kumimoji="0" lang="sv-SE" altLang="sv-SE" sz="1800" b="0" i="0" u="none" strike="noStrike" cap="none" normalizeH="0" baseline="0">
+              <a:ln>
+                <a:noFill/>
+              </a:ln>
+              <a:solidFill>
+                <a:schemeClr val="tx1"/>
+              </a:solidFill>
+              <a:effectLst/>
+              <a:latin typeface="Arial" panose="020B0604020202020204" pitchFamily="34" charset="0"/>
+            </a:endParaRPr>
+          </a:p>
+        </p:txBody>
+      </p:sp>
+      <p:sp>
+        <p:nvSpPr>
+          <p:cNvPr id="13" name="Rectangle 3">
+            <a:extLst>
+              <a:ext uri="{FF2B5EF4-FFF2-40B4-BE49-F238E27FC236}">
+                <a16:creationId xmlns:a16="http://schemas.microsoft.com/office/drawing/2014/main" id="{C08EF8EF-E887-46B2-8D83-1FD183E46154}"/>
+              </a:ext>
+            </a:extLst>
+          </p:cNvPr>
+          <p:cNvSpPr>
+            <a:spLocks noGrp="1" noChangeArrowheads="1"/>
           </p:cNvSpPr>
           <p:nvPr>
             <p:ph sz="quarter" idx="4"/>
           </p:nvPr>
         </p:nvSpPr>
-        <p:spPr/>
-        <p:txBody>
-          <a:bodyPr/>
-          <a:lstStyle/>
-          <a:p>
-            <a:endParaRPr lang="sv-SE"/>
+        <p:spPr bwMode="auto">
+          <a:prstGeom prst="rect">
+            <a:avLst/>
+          </a:prstGeom>
+          <a:solidFill>
+            <a:srgbClr val="2B2B2B"/>
+          </a:solidFill>
+          <a:ln>
+            <a:noFill/>
+          </a:ln>
+          <a:effectLst/>
+          <a:extLst>
+            <a:ext uri="{91240B29-F687-4F45-9708-019B960494DF}">
+              <a14:hiddenLine xmlns:a14="http://schemas.microsoft.com/office/drawing/2010/main" w="9525">
+                <a:solidFill>
+                  <a:schemeClr val="tx1"/>
+                </a:solidFill>
+                <a:miter lim="800000"/>
+                <a:headEnd/>
+                <a:tailEnd/>
+              </a14:hiddenLine>
+            </a:ext>
+            <a:ext uri="{AF507438-7753-43E0-B8FC-AC1667EBCBE1}">
+              <a14:hiddenEffects xmlns:a14="http://schemas.microsoft.com/office/drawing/2010/main">
+                <a:effectLst>
+                  <a:outerShdw dist="35921" dir="2700000" algn="ctr" rotWithShape="0">
+                    <a:schemeClr val="bg2"/>
+                  </a:outerShdw>
+                </a:effectLst>
+              </a14:hiddenEffects>
+            </a:ext>
+          </a:extLst>
+        </p:spPr>
+        <p:txBody>
+          <a:bodyPr vert="horz" wrap="none" lIns="91440" tIns="45720" rIns="91440" bIns="45720" numCol="1" anchor="ctr" anchorCtr="0" compatLnSpc="1">
+            <a:prstTxWarp prst="textNoShape">
+              <a:avLst/>
+            </a:prstTxWarp>
+            <a:spAutoFit/>
+          </a:bodyPr>
+          <a:lstStyle/>
+          <a:p>
+            <a:pPr marL="0" marR="0" lvl="0" indent="0" algn="l" defTabSz="914400" rtl="0" eaLnBrk="0" fontAlgn="base" latinLnBrk="0" hangingPunct="0">
+              <a:lnSpc>
+                <a:spcPct val="100000"/>
+              </a:lnSpc>
+              <a:spcBef>
+                <a:spcPct val="0"/>
+              </a:spcBef>
+              <a:spcAft>
+                <a:spcPct val="0"/>
+              </a:spcAft>
+              <a:buClrTx/>
+              <a:buSzTx/>
+              <a:buFontTx/>
+              <a:buNone/>
+              <a:tabLst/>
+            </a:pPr>
+            <a:r>
+              <a:rPr kumimoji="0" lang="sv-SE" altLang="sv-SE" sz="1000" b="0" i="0" u="none" strike="noStrike" cap="none" normalizeH="0" baseline="0">
+                <a:ln>
+                  <a:noFill/>
+                </a:ln>
+                <a:solidFill>
+                  <a:srgbClr val="CC7832"/>
+                </a:solidFill>
+                <a:effectLst/>
+                <a:latin typeface="Courier New" panose="02070309020205020404" pitchFamily="49" charset="0"/>
+                <a:cs typeface="Courier New" panose="02070309020205020404" pitchFamily="49" charset="0"/>
+              </a:rPr>
+              <a:t>public void </a:t>
+            </a:r>
+            <a:r>
+              <a:rPr kumimoji="0" lang="sv-SE" altLang="sv-SE" sz="1000" b="0" i="0" u="none" strike="noStrike" cap="none" normalizeH="0" baseline="0">
+                <a:ln>
+                  <a:noFill/>
+                </a:ln>
+                <a:solidFill>
+                  <a:srgbClr val="FFC66D"/>
+                </a:solidFill>
+                <a:effectLst/>
+                <a:latin typeface="Courier New" panose="02070309020205020404" pitchFamily="49" charset="0"/>
+                <a:cs typeface="Courier New" panose="02070309020205020404" pitchFamily="49" charset="0"/>
+              </a:rPr>
+              <a:t>afterCombat</a:t>
+            </a:r>
+            <a:r>
+              <a:rPr kumimoji="0" lang="sv-SE" altLang="sv-SE" sz="1000" b="0" i="0" u="none" strike="noStrike" cap="none" normalizeH="0" baseline="0">
+                <a:ln>
+                  <a:noFill/>
+                </a:ln>
+                <a:solidFill>
+                  <a:srgbClr val="A9B7C6"/>
+                </a:solidFill>
+                <a:effectLst/>
+                <a:latin typeface="Courier New" panose="02070309020205020404" pitchFamily="49" charset="0"/>
+                <a:cs typeface="Courier New" panose="02070309020205020404" pitchFamily="49" charset="0"/>
+              </a:rPr>
+              <a:t>(</a:t>
+            </a:r>
+            <a:r>
+              <a:rPr kumimoji="0" lang="sv-SE" altLang="sv-SE" sz="1000" b="0" i="0" u="none" strike="noStrike" cap="none" normalizeH="0" baseline="0">
+                <a:ln>
+                  <a:noFill/>
+                </a:ln>
+                <a:solidFill>
+                  <a:srgbClr val="CC7832"/>
+                </a:solidFill>
+                <a:effectLst/>
+                <a:latin typeface="Courier New" panose="02070309020205020404" pitchFamily="49" charset="0"/>
+                <a:cs typeface="Courier New" panose="02070309020205020404" pitchFamily="49" charset="0"/>
+              </a:rPr>
+              <a:t>boolean </a:t>
+            </a:r>
+            <a:r>
+              <a:rPr kumimoji="0" lang="sv-SE" altLang="sv-SE" sz="1000" b="0" i="0" u="none" strike="noStrike" cap="none" normalizeH="0" baseline="0">
+                <a:ln>
+                  <a:noFill/>
+                </a:ln>
+                <a:solidFill>
+                  <a:srgbClr val="A9B7C6"/>
+                </a:solidFill>
+                <a:effectLst/>
+                <a:latin typeface="Courier New" panose="02070309020205020404" pitchFamily="49" charset="0"/>
+                <a:cs typeface="Courier New" panose="02070309020205020404" pitchFamily="49" charset="0"/>
+              </a:rPr>
+              <a:t>isInCombat) {</a:t>
+            </a:r>
+            <a:br>
+              <a:rPr kumimoji="0" lang="sv-SE" altLang="sv-SE" sz="1000" b="0" i="0" u="none" strike="noStrike" cap="none" normalizeH="0" baseline="0">
+                <a:ln>
+                  <a:noFill/>
+                </a:ln>
+                <a:solidFill>
+                  <a:srgbClr val="A9B7C6"/>
+                </a:solidFill>
+                <a:effectLst/>
+                <a:latin typeface="Courier New" panose="02070309020205020404" pitchFamily="49" charset="0"/>
+                <a:cs typeface="Courier New" panose="02070309020205020404" pitchFamily="49" charset="0"/>
+              </a:rPr>
+            </a:br>
+            <a:r>
+              <a:rPr kumimoji="0" lang="sv-SE" altLang="sv-SE" sz="1000" b="0" i="0" u="none" strike="noStrike" cap="none" normalizeH="0" baseline="0">
+                <a:ln>
+                  <a:noFill/>
+                </a:ln>
+                <a:solidFill>
+                  <a:srgbClr val="A9B7C6"/>
+                </a:solidFill>
+                <a:effectLst/>
+                <a:latin typeface="Courier New" panose="02070309020205020404" pitchFamily="49" charset="0"/>
+                <a:cs typeface="Courier New" panose="02070309020205020404" pitchFamily="49" charset="0"/>
+              </a:rPr>
+              <a:t>    </a:t>
+            </a:r>
+            <a:r>
+              <a:rPr kumimoji="0" lang="sv-SE" altLang="sv-SE" sz="1000" b="0" i="0" u="none" strike="noStrike" cap="none" normalizeH="0" baseline="0">
+                <a:ln>
+                  <a:noFill/>
+                </a:ln>
+                <a:solidFill>
+                  <a:srgbClr val="CC7832"/>
+                </a:solidFill>
+                <a:effectLst/>
+                <a:latin typeface="Courier New" panose="02070309020205020404" pitchFamily="49" charset="0"/>
+                <a:cs typeface="Courier New" panose="02070309020205020404" pitchFamily="49" charset="0"/>
+              </a:rPr>
+              <a:t>if </a:t>
+            </a:r>
+            <a:r>
+              <a:rPr kumimoji="0" lang="sv-SE" altLang="sv-SE" sz="1000" b="0" i="0" u="none" strike="noStrike" cap="none" normalizeH="0" baseline="0">
+                <a:ln>
+                  <a:noFill/>
+                </a:ln>
+                <a:solidFill>
+                  <a:srgbClr val="A9B7C6"/>
+                </a:solidFill>
+                <a:effectLst/>
+                <a:latin typeface="Courier New" panose="02070309020205020404" pitchFamily="49" charset="0"/>
+                <a:cs typeface="Courier New" panose="02070309020205020404" pitchFamily="49" charset="0"/>
+              </a:rPr>
+              <a:t>(isInCombat) {</a:t>
+            </a:r>
+            <a:br>
+              <a:rPr kumimoji="0" lang="sv-SE" altLang="sv-SE" sz="1000" b="0" i="0" u="none" strike="noStrike" cap="none" normalizeH="0" baseline="0">
+                <a:ln>
+                  <a:noFill/>
+                </a:ln>
+                <a:solidFill>
+                  <a:srgbClr val="A9B7C6"/>
+                </a:solidFill>
+                <a:effectLst/>
+                <a:latin typeface="Courier New" panose="02070309020205020404" pitchFamily="49" charset="0"/>
+                <a:cs typeface="Courier New" panose="02070309020205020404" pitchFamily="49" charset="0"/>
+              </a:rPr>
+            </a:br>
+            <a:r>
+              <a:rPr kumimoji="0" lang="sv-SE" altLang="sv-SE" sz="1000" b="0" i="0" u="none" strike="noStrike" cap="none" normalizeH="0" baseline="0">
+                <a:ln>
+                  <a:noFill/>
+                </a:ln>
+                <a:solidFill>
+                  <a:srgbClr val="A9B7C6"/>
+                </a:solidFill>
+                <a:effectLst/>
+                <a:latin typeface="Courier New" panose="02070309020205020404" pitchFamily="49" charset="0"/>
+                <a:cs typeface="Courier New" panose="02070309020205020404" pitchFamily="49" charset="0"/>
+              </a:rPr>
+              <a:t>        makeCharacterInPeacefulStance()</a:t>
+            </a:r>
+            <a:r>
+              <a:rPr kumimoji="0" lang="sv-SE" altLang="sv-SE" sz="1000" b="0" i="0" u="none" strike="noStrike" cap="none" normalizeH="0" baseline="0">
+                <a:ln>
+                  <a:noFill/>
+                </a:ln>
+                <a:solidFill>
+                  <a:srgbClr val="CC7832"/>
+                </a:solidFill>
+                <a:effectLst/>
+                <a:latin typeface="Courier New" panose="02070309020205020404" pitchFamily="49" charset="0"/>
+                <a:cs typeface="Courier New" panose="02070309020205020404" pitchFamily="49" charset="0"/>
+              </a:rPr>
+              <a:t>;</a:t>
+            </a:r>
+            <a:br>
+              <a:rPr kumimoji="0" lang="sv-SE" altLang="sv-SE" sz="1000" b="0" i="0" u="none" strike="noStrike" cap="none" normalizeH="0" baseline="0">
+                <a:ln>
+                  <a:noFill/>
+                </a:ln>
+                <a:solidFill>
+                  <a:srgbClr val="CC7832"/>
+                </a:solidFill>
+                <a:effectLst/>
+                <a:latin typeface="Courier New" panose="02070309020205020404" pitchFamily="49" charset="0"/>
+                <a:cs typeface="Courier New" panose="02070309020205020404" pitchFamily="49" charset="0"/>
+              </a:rPr>
+            </a:br>
+            <a:r>
+              <a:rPr kumimoji="0" lang="sv-SE" altLang="sv-SE" sz="1000" b="0" i="0" u="none" strike="noStrike" cap="none" normalizeH="0" baseline="0">
+                <a:ln>
+                  <a:noFill/>
+                </a:ln>
+                <a:solidFill>
+                  <a:srgbClr val="CC7832"/>
+                </a:solidFill>
+                <a:effectLst/>
+                <a:latin typeface="Courier New" panose="02070309020205020404" pitchFamily="49" charset="0"/>
+                <a:cs typeface="Courier New" panose="02070309020205020404" pitchFamily="49" charset="0"/>
+              </a:rPr>
+              <a:t>        </a:t>
+            </a:r>
+            <a:r>
+              <a:rPr kumimoji="0" lang="sv-SE" altLang="sv-SE" sz="1000" b="0" i="0" u="none" strike="noStrike" cap="none" normalizeH="0" baseline="0">
+                <a:ln>
+                  <a:noFill/>
+                </a:ln>
+                <a:solidFill>
+                  <a:srgbClr val="9876AA"/>
+                </a:solidFill>
+                <a:effectLst/>
+                <a:latin typeface="Courier New" panose="02070309020205020404" pitchFamily="49" charset="0"/>
+                <a:cs typeface="Courier New" panose="02070309020205020404" pitchFamily="49" charset="0"/>
+              </a:rPr>
+              <a:t>experience </a:t>
+            </a:r>
+            <a:r>
+              <a:rPr kumimoji="0" lang="sv-SE" altLang="sv-SE" sz="1000" b="0" i="0" u="none" strike="noStrike" cap="none" normalizeH="0" baseline="0">
+                <a:ln>
+                  <a:noFill/>
+                </a:ln>
+                <a:solidFill>
+                  <a:srgbClr val="A9B7C6"/>
+                </a:solidFill>
+                <a:effectLst/>
+                <a:latin typeface="Courier New" panose="02070309020205020404" pitchFamily="49" charset="0"/>
+                <a:cs typeface="Courier New" panose="02070309020205020404" pitchFamily="49" charset="0"/>
+              </a:rPr>
+              <a:t>+= </a:t>
+            </a:r>
+            <a:r>
+              <a:rPr kumimoji="0" lang="sv-SE" altLang="sv-SE" sz="1000" b="0" i="0" u="none" strike="noStrike" cap="none" normalizeH="0" baseline="0">
+                <a:ln>
+                  <a:noFill/>
+                </a:ln>
+                <a:solidFill>
+                  <a:srgbClr val="6897BB"/>
+                </a:solidFill>
+                <a:effectLst/>
+                <a:latin typeface="Courier New" panose="02070309020205020404" pitchFamily="49" charset="0"/>
+                <a:cs typeface="Courier New" panose="02070309020205020404" pitchFamily="49" charset="0"/>
+              </a:rPr>
+              <a:t>10</a:t>
+            </a:r>
+            <a:r>
+              <a:rPr kumimoji="0" lang="sv-SE" altLang="sv-SE" sz="1000" b="0" i="0" u="none" strike="noStrike" cap="none" normalizeH="0" baseline="0">
+                <a:ln>
+                  <a:noFill/>
+                </a:ln>
+                <a:solidFill>
+                  <a:srgbClr val="CC7832"/>
+                </a:solidFill>
+                <a:effectLst/>
+                <a:latin typeface="Courier New" panose="02070309020205020404" pitchFamily="49" charset="0"/>
+                <a:cs typeface="Courier New" panose="02070309020205020404" pitchFamily="49" charset="0"/>
+              </a:rPr>
+              <a:t>;</a:t>
+            </a:r>
+            <a:br>
+              <a:rPr kumimoji="0" lang="sv-SE" altLang="sv-SE" sz="1000" b="0" i="0" u="none" strike="noStrike" cap="none" normalizeH="0" baseline="0">
+                <a:ln>
+                  <a:noFill/>
+                </a:ln>
+                <a:solidFill>
+                  <a:srgbClr val="CC7832"/>
+                </a:solidFill>
+                <a:effectLst/>
+                <a:latin typeface="Courier New" panose="02070309020205020404" pitchFamily="49" charset="0"/>
+                <a:cs typeface="Courier New" panose="02070309020205020404" pitchFamily="49" charset="0"/>
+              </a:rPr>
+            </a:br>
+            <a:r>
+              <a:rPr kumimoji="0" lang="sv-SE" altLang="sv-SE" sz="1000" b="0" i="0" u="none" strike="noStrike" cap="none" normalizeH="0" baseline="0">
+                <a:ln>
+                  <a:noFill/>
+                </a:ln>
+                <a:solidFill>
+                  <a:srgbClr val="CC7832"/>
+                </a:solidFill>
+                <a:effectLst/>
+                <a:latin typeface="Courier New" panose="02070309020205020404" pitchFamily="49" charset="0"/>
+                <a:cs typeface="Courier New" panose="02070309020205020404" pitchFamily="49" charset="0"/>
+              </a:rPr>
+              <a:t>        if </a:t>
+            </a:r>
+            <a:r>
+              <a:rPr kumimoji="0" lang="sv-SE" altLang="sv-SE" sz="1000" b="0" i="0" u="none" strike="noStrike" cap="none" normalizeH="0" baseline="0">
+                <a:ln>
+                  <a:noFill/>
+                </a:ln>
+                <a:solidFill>
+                  <a:srgbClr val="A9B7C6"/>
+                </a:solidFill>
+                <a:effectLst/>
+                <a:latin typeface="Courier New" panose="02070309020205020404" pitchFamily="49" charset="0"/>
+                <a:cs typeface="Courier New" panose="02070309020205020404" pitchFamily="49" charset="0"/>
+              </a:rPr>
+              <a:t>(</a:t>
+            </a:r>
+            <a:r>
+              <a:rPr kumimoji="0" lang="sv-SE" altLang="sv-SE" sz="1000" b="0" i="0" u="none" strike="noStrike" cap="none" normalizeH="0" baseline="0">
+                <a:ln>
+                  <a:noFill/>
+                </a:ln>
+                <a:solidFill>
+                  <a:srgbClr val="9876AA"/>
+                </a:solidFill>
+                <a:effectLst/>
+                <a:latin typeface="Courier New" panose="02070309020205020404" pitchFamily="49" charset="0"/>
+                <a:cs typeface="Courier New" panose="02070309020205020404" pitchFamily="49" charset="0"/>
+              </a:rPr>
+              <a:t>experience </a:t>
+            </a:r>
+            <a:r>
+              <a:rPr kumimoji="0" lang="sv-SE" altLang="sv-SE" sz="1000" b="0" i="0" u="none" strike="noStrike" cap="none" normalizeH="0" baseline="0">
+                <a:ln>
+                  <a:noFill/>
+                </a:ln>
+                <a:solidFill>
+                  <a:srgbClr val="A9B7C6"/>
+                </a:solidFill>
+                <a:effectLst/>
+                <a:latin typeface="Courier New" panose="02070309020205020404" pitchFamily="49" charset="0"/>
+                <a:cs typeface="Courier New" panose="02070309020205020404" pitchFamily="49" charset="0"/>
+              </a:rPr>
+              <a:t>&gt; </a:t>
+            </a:r>
+            <a:r>
+              <a:rPr kumimoji="0" lang="sv-SE" altLang="sv-SE" sz="1000" b="0" i="0" u="none" strike="noStrike" cap="none" normalizeH="0" baseline="0">
+                <a:ln>
+                  <a:noFill/>
+                </a:ln>
+                <a:solidFill>
+                  <a:srgbClr val="6897BB"/>
+                </a:solidFill>
+                <a:effectLst/>
+                <a:latin typeface="Courier New" panose="02070309020205020404" pitchFamily="49" charset="0"/>
+                <a:cs typeface="Courier New" panose="02070309020205020404" pitchFamily="49" charset="0"/>
+              </a:rPr>
+              <a:t>30</a:t>
+            </a:r>
+            <a:r>
+              <a:rPr kumimoji="0" lang="sv-SE" altLang="sv-SE" sz="1000" b="0" i="0" u="none" strike="noStrike" cap="none" normalizeH="0" baseline="0">
+                <a:ln>
+                  <a:noFill/>
+                </a:ln>
+                <a:solidFill>
+                  <a:srgbClr val="A9B7C6"/>
+                </a:solidFill>
+                <a:effectLst/>
+                <a:latin typeface="Courier New" panose="02070309020205020404" pitchFamily="49" charset="0"/>
+                <a:cs typeface="Courier New" panose="02070309020205020404" pitchFamily="49" charset="0"/>
+              </a:rPr>
+              <a:t>) {</a:t>
+            </a:r>
+            <a:br>
+              <a:rPr kumimoji="0" lang="sv-SE" altLang="sv-SE" sz="1000" b="0" i="0" u="none" strike="noStrike" cap="none" normalizeH="0" baseline="0">
+                <a:ln>
+                  <a:noFill/>
+                </a:ln>
+                <a:solidFill>
+                  <a:srgbClr val="A9B7C6"/>
+                </a:solidFill>
+                <a:effectLst/>
+                <a:latin typeface="Courier New" panose="02070309020205020404" pitchFamily="49" charset="0"/>
+                <a:cs typeface="Courier New" panose="02070309020205020404" pitchFamily="49" charset="0"/>
+              </a:rPr>
+            </a:br>
+            <a:r>
+              <a:rPr kumimoji="0" lang="sv-SE" altLang="sv-SE" sz="1000" b="0" i="0" u="none" strike="noStrike" cap="none" normalizeH="0" baseline="0">
+                <a:ln>
+                  <a:noFill/>
+                </a:ln>
+                <a:solidFill>
+                  <a:srgbClr val="A9B7C6"/>
+                </a:solidFill>
+                <a:effectLst/>
+                <a:latin typeface="Courier New" panose="02070309020205020404" pitchFamily="49" charset="0"/>
+                <a:cs typeface="Courier New" panose="02070309020205020404" pitchFamily="49" charset="0"/>
+              </a:rPr>
+              <a:t>            levelUp()</a:t>
+            </a:r>
+            <a:r>
+              <a:rPr kumimoji="0" lang="sv-SE" altLang="sv-SE" sz="1000" b="0" i="0" u="none" strike="noStrike" cap="none" normalizeH="0" baseline="0">
+                <a:ln>
+                  <a:noFill/>
+                </a:ln>
+                <a:solidFill>
+                  <a:srgbClr val="CC7832"/>
+                </a:solidFill>
+                <a:effectLst/>
+                <a:latin typeface="Courier New" panose="02070309020205020404" pitchFamily="49" charset="0"/>
+                <a:cs typeface="Courier New" panose="02070309020205020404" pitchFamily="49" charset="0"/>
+              </a:rPr>
+              <a:t>;</a:t>
+            </a:r>
+            <a:br>
+              <a:rPr kumimoji="0" lang="sv-SE" altLang="sv-SE" sz="1000" b="0" i="0" u="none" strike="noStrike" cap="none" normalizeH="0" baseline="0">
+                <a:ln>
+                  <a:noFill/>
+                </a:ln>
+                <a:solidFill>
+                  <a:srgbClr val="CC7832"/>
+                </a:solidFill>
+                <a:effectLst/>
+                <a:latin typeface="Courier New" panose="02070309020205020404" pitchFamily="49" charset="0"/>
+                <a:cs typeface="Courier New" panose="02070309020205020404" pitchFamily="49" charset="0"/>
+              </a:rPr>
+            </a:br>
+            <a:r>
+              <a:rPr kumimoji="0" lang="sv-SE" altLang="sv-SE" sz="1000" b="0" i="0" u="none" strike="noStrike" cap="none" normalizeH="0" baseline="0">
+                <a:ln>
+                  <a:noFill/>
+                </a:ln>
+                <a:solidFill>
+                  <a:srgbClr val="CC7832"/>
+                </a:solidFill>
+                <a:effectLst/>
+                <a:latin typeface="Courier New" panose="02070309020205020404" pitchFamily="49" charset="0"/>
+                <a:cs typeface="Courier New" panose="02070309020205020404" pitchFamily="49" charset="0"/>
+              </a:rPr>
+              <a:t>            </a:t>
+            </a:r>
+            <a:r>
+              <a:rPr kumimoji="0" lang="sv-SE" altLang="sv-SE" sz="1000" b="0" i="0" u="none" strike="noStrike" cap="none" normalizeH="0" baseline="0">
+                <a:ln>
+                  <a:noFill/>
+                </a:ln>
+                <a:solidFill>
+                  <a:srgbClr val="A9B7C6"/>
+                </a:solidFill>
+                <a:effectLst/>
+                <a:latin typeface="Courier New" panose="02070309020205020404" pitchFamily="49" charset="0"/>
+                <a:cs typeface="Courier New" panose="02070309020205020404" pitchFamily="49" charset="0"/>
+              </a:rPr>
+              <a:t>resetExperience()</a:t>
+            </a:r>
+            <a:r>
+              <a:rPr kumimoji="0" lang="sv-SE" altLang="sv-SE" sz="1000" b="0" i="0" u="none" strike="noStrike" cap="none" normalizeH="0" baseline="0">
+                <a:ln>
+                  <a:noFill/>
+                </a:ln>
+                <a:solidFill>
+                  <a:srgbClr val="CC7832"/>
+                </a:solidFill>
+                <a:effectLst/>
+                <a:latin typeface="Courier New" panose="02070309020205020404" pitchFamily="49" charset="0"/>
+                <a:cs typeface="Courier New" panose="02070309020205020404" pitchFamily="49" charset="0"/>
+              </a:rPr>
+              <a:t>;</a:t>
+            </a:r>
+            <a:br>
+              <a:rPr kumimoji="0" lang="sv-SE" altLang="sv-SE" sz="1000" b="0" i="0" u="none" strike="noStrike" cap="none" normalizeH="0" baseline="0">
+                <a:ln>
+                  <a:noFill/>
+                </a:ln>
+                <a:solidFill>
+                  <a:srgbClr val="CC7832"/>
+                </a:solidFill>
+                <a:effectLst/>
+                <a:latin typeface="Courier New" panose="02070309020205020404" pitchFamily="49" charset="0"/>
+                <a:cs typeface="Courier New" panose="02070309020205020404" pitchFamily="49" charset="0"/>
+              </a:rPr>
+            </a:br>
+            <a:r>
+              <a:rPr kumimoji="0" lang="sv-SE" altLang="sv-SE" sz="1000" b="0" i="0" u="none" strike="noStrike" cap="none" normalizeH="0" baseline="0">
+                <a:ln>
+                  <a:noFill/>
+                </a:ln>
+                <a:solidFill>
+                  <a:srgbClr val="CC7832"/>
+                </a:solidFill>
+                <a:effectLst/>
+                <a:latin typeface="Courier New" panose="02070309020205020404" pitchFamily="49" charset="0"/>
+                <a:cs typeface="Courier New" panose="02070309020205020404" pitchFamily="49" charset="0"/>
+              </a:rPr>
+              <a:t>        </a:t>
+            </a:r>
+            <a:r>
+              <a:rPr kumimoji="0" lang="sv-SE" altLang="sv-SE" sz="1000" b="0" i="0" u="none" strike="noStrike" cap="none" normalizeH="0" baseline="0">
+                <a:ln>
+                  <a:noFill/>
+                </a:ln>
+                <a:solidFill>
+                  <a:srgbClr val="A9B7C6"/>
+                </a:solidFill>
+                <a:effectLst/>
+                <a:latin typeface="Courier New" panose="02070309020205020404" pitchFamily="49" charset="0"/>
+                <a:cs typeface="Courier New" panose="02070309020205020404" pitchFamily="49" charset="0"/>
+              </a:rPr>
+              <a:t>}</a:t>
+            </a:r>
+            <a:br>
+              <a:rPr kumimoji="0" lang="sv-SE" altLang="sv-SE" sz="1000" b="0" i="0" u="none" strike="noStrike" cap="none" normalizeH="0" baseline="0">
+                <a:ln>
+                  <a:noFill/>
+                </a:ln>
+                <a:solidFill>
+                  <a:srgbClr val="A9B7C6"/>
+                </a:solidFill>
+                <a:effectLst/>
+                <a:latin typeface="Courier New" panose="02070309020205020404" pitchFamily="49" charset="0"/>
+                <a:cs typeface="Courier New" panose="02070309020205020404" pitchFamily="49" charset="0"/>
+              </a:rPr>
+            </a:br>
+            <a:r>
+              <a:rPr kumimoji="0" lang="sv-SE" altLang="sv-SE" sz="1000" b="0" i="0" u="none" strike="noStrike" cap="none" normalizeH="0" baseline="0">
+                <a:ln>
+                  <a:noFill/>
+                </a:ln>
+                <a:solidFill>
+                  <a:srgbClr val="A9B7C6"/>
+                </a:solidFill>
+                <a:effectLst/>
+                <a:latin typeface="Courier New" panose="02070309020205020404" pitchFamily="49" charset="0"/>
+                <a:cs typeface="Courier New" panose="02070309020205020404" pitchFamily="49" charset="0"/>
+              </a:rPr>
+              <a:t>    }</a:t>
+            </a:r>
+            <a:br>
+              <a:rPr kumimoji="0" lang="sv-SE" altLang="sv-SE" sz="1000" b="0" i="0" u="none" strike="noStrike" cap="none" normalizeH="0" baseline="0">
+                <a:ln>
+                  <a:noFill/>
+                </a:ln>
+                <a:solidFill>
+                  <a:srgbClr val="A9B7C6"/>
+                </a:solidFill>
+                <a:effectLst/>
+                <a:latin typeface="Courier New" panose="02070309020205020404" pitchFamily="49" charset="0"/>
+                <a:cs typeface="Courier New" panose="02070309020205020404" pitchFamily="49" charset="0"/>
+              </a:rPr>
+            </a:br>
+            <a:r>
+              <a:rPr kumimoji="0" lang="sv-SE" altLang="sv-SE" sz="1000" b="0" i="0" u="none" strike="noStrike" cap="none" normalizeH="0" baseline="0">
+                <a:ln>
+                  <a:noFill/>
+                </a:ln>
+                <a:solidFill>
+                  <a:srgbClr val="A9B7C6"/>
+                </a:solidFill>
+                <a:effectLst/>
+                <a:latin typeface="Courier New" panose="02070309020205020404" pitchFamily="49" charset="0"/>
+                <a:cs typeface="Courier New" panose="02070309020205020404" pitchFamily="49" charset="0"/>
+              </a:rPr>
+              <a:t>}</a:t>
+            </a:r>
+            <a:br>
+              <a:rPr kumimoji="0" lang="sv-SE" altLang="sv-SE" sz="1000" b="0" i="0" u="none" strike="noStrike" cap="none" normalizeH="0" baseline="0">
+                <a:ln>
+                  <a:noFill/>
+                </a:ln>
+                <a:solidFill>
+                  <a:srgbClr val="A9B7C6"/>
+                </a:solidFill>
+                <a:effectLst/>
+                <a:latin typeface="Courier New" panose="02070309020205020404" pitchFamily="49" charset="0"/>
+                <a:cs typeface="Courier New" panose="02070309020205020404" pitchFamily="49" charset="0"/>
+              </a:rPr>
+            </a:br>
+            <a:endParaRPr kumimoji="0" lang="sv-SE" altLang="sv-SE" sz="1800" b="0" i="0" u="none" strike="noStrike" cap="none" normalizeH="0" baseline="0">
+              <a:ln>
+                <a:noFill/>
+              </a:ln>
+              <a:solidFill>
+                <a:schemeClr val="tx1"/>
+              </a:solidFill>
+              <a:effectLst/>
+              <a:latin typeface="Arial" panose="020B0604020202020204" pitchFamily="34" charset="0"/>
+            </a:endParaRPr>
           </a:p>
         </p:txBody>
       </p:sp>
@@ -8789,7 +11226,7 @@
     </p:custDataLst>
     <p:extLst>
       <p:ext uri="{BB962C8B-B14F-4D97-AF65-F5344CB8AC3E}">
-        <p14:creationId xmlns:p14="http://schemas.microsoft.com/office/powerpoint/2010/main" val="3564308879"/>
+        <p14:creationId xmlns:p14="http://schemas.microsoft.com/office/powerpoint/2010/main" val="2800721589"/>
       </p:ext>
     </p:extLst>
   </p:cSld>
@@ -8833,7 +11270,7 @@
           <a:p>
             <a:r>
               <a:rPr lang="sv-SE" dirty="0"/>
-              <a:t>TDD-exempel: Robert</a:t>
+              <a:t>TDD-exempel: Emil</a:t>
             </a:r>
           </a:p>
         </p:txBody>
@@ -8927,7 +11364,7 @@
     </p:custDataLst>
     <p:extLst>
       <p:ext uri="{BB962C8B-B14F-4D97-AF65-F5344CB8AC3E}">
-        <p14:creationId xmlns:p14="http://schemas.microsoft.com/office/powerpoint/2010/main" val="1463672114"/>
+        <p14:creationId xmlns:p14="http://schemas.microsoft.com/office/powerpoint/2010/main" val="3564308879"/>
       </p:ext>
     </p:extLst>
   </p:cSld>
@@ -8971,7 +11408,7 @@
           <a:p>
             <a:r>
               <a:rPr lang="sv-SE" dirty="0"/>
-              <a:t>TDD-exempel: Oscar</a:t>
+              <a:t>TDD-exempel: Robert</a:t>
             </a:r>
           </a:p>
         </p:txBody>
@@ -9065,7 +11502,7 @@
     </p:custDataLst>
     <p:extLst>
       <p:ext uri="{BB962C8B-B14F-4D97-AF65-F5344CB8AC3E}">
-        <p14:creationId xmlns:p14="http://schemas.microsoft.com/office/powerpoint/2010/main" val="25956106"/>
+        <p14:creationId xmlns:p14="http://schemas.microsoft.com/office/powerpoint/2010/main" val="1463672114"/>
       </p:ext>
     </p:extLst>
   </p:cSld>
@@ -9109,7 +11546,7 @@
           <a:p>
             <a:r>
               <a:rPr lang="sv-SE" dirty="0"/>
-              <a:t>TDD-exempel: Peter</a:t>
+              <a:t>TDD-exempel: Oscar</a:t>
             </a:r>
           </a:p>
         </p:txBody>
@@ -9203,7 +11640,7 @@
     </p:custDataLst>
     <p:extLst>
       <p:ext uri="{BB962C8B-B14F-4D97-AF65-F5344CB8AC3E}">
-        <p14:creationId xmlns:p14="http://schemas.microsoft.com/office/powerpoint/2010/main" val="1161572908"/>
+        <p14:creationId xmlns:p14="http://schemas.microsoft.com/office/powerpoint/2010/main" val="25956106"/>
       </p:ext>
     </p:extLst>
   </p:cSld>
@@ -9232,7 +11669,7 @@
       </p:grpSpPr>
       <p:sp>
         <p:nvSpPr>
-          <p:cNvPr id="9" name="Rubrik 8"/>
+          <p:cNvPr id="2" name="Rubrik 1"/>
           <p:cNvSpPr>
             <a:spLocks noGrp="1"/>
           </p:cNvSpPr>
@@ -9247,27 +11684,91 @@
           <a:p>
             <a:r>
               <a:rPr lang="sv-SE" dirty="0"/>
-              <a:t>TDD erfarenheter</a:t>
-            </a:r>
-          </a:p>
-        </p:txBody>
-      </p:sp>
-      <p:sp>
-        <p:nvSpPr>
-          <p:cNvPr id="10" name="Platshållare för innehåll 9"/>
-          <p:cNvSpPr>
-            <a:spLocks noGrp="1"/>
-          </p:cNvSpPr>
-          <p:nvPr>
-            <p:ph idx="1"/>
-          </p:nvPr>
-        </p:nvSpPr>
-        <p:spPr/>
-        <p:txBody>
-          <a:bodyPr/>
-          <a:lstStyle/>
-          <a:p>
+              <a:t>TDD-exempel: Peter</a:t>
+            </a:r>
+          </a:p>
+        </p:txBody>
+      </p:sp>
+      <p:sp>
+        <p:nvSpPr>
+          <p:cNvPr id="4" name="Platshållare för text 3"/>
+          <p:cNvSpPr>
+            <a:spLocks noGrp="1"/>
+          </p:cNvSpPr>
+          <p:nvPr>
+            <p:ph type="body" idx="1"/>
+          </p:nvPr>
+        </p:nvSpPr>
+        <p:spPr/>
+        <p:txBody>
+          <a:bodyPr/>
+          <a:lstStyle/>
+          <a:p>
+            <a:r>
+              <a:rPr lang="sv-SE" dirty="0" err="1"/>
+              <a:t>Testkod</a:t>
+            </a:r>
             <a:endParaRPr lang="sv-SE" dirty="0"/>
+          </a:p>
+        </p:txBody>
+      </p:sp>
+      <p:sp>
+        <p:nvSpPr>
+          <p:cNvPr id="5" name="Platshållare för innehåll 4"/>
+          <p:cNvSpPr>
+            <a:spLocks noGrp="1"/>
+          </p:cNvSpPr>
+          <p:nvPr>
+            <p:ph sz="half" idx="2"/>
+          </p:nvPr>
+        </p:nvSpPr>
+        <p:spPr/>
+        <p:txBody>
+          <a:bodyPr/>
+          <a:lstStyle/>
+          <a:p>
+            <a:endParaRPr lang="sv-SE"/>
+          </a:p>
+        </p:txBody>
+      </p:sp>
+      <p:sp>
+        <p:nvSpPr>
+          <p:cNvPr id="6" name="Platshållare för text 5"/>
+          <p:cNvSpPr>
+            <a:spLocks noGrp="1"/>
+          </p:cNvSpPr>
+          <p:nvPr>
+            <p:ph type="body" sz="quarter" idx="3"/>
+          </p:nvPr>
+        </p:nvSpPr>
+        <p:spPr/>
+        <p:txBody>
+          <a:bodyPr/>
+          <a:lstStyle/>
+          <a:p>
+            <a:r>
+              <a:rPr lang="sv-SE" dirty="0"/>
+              <a:t>Koden som testas</a:t>
+            </a:r>
+          </a:p>
+        </p:txBody>
+      </p:sp>
+      <p:sp>
+        <p:nvSpPr>
+          <p:cNvPr id="7" name="Platshållare för innehåll 6"/>
+          <p:cNvSpPr>
+            <a:spLocks noGrp="1"/>
+          </p:cNvSpPr>
+          <p:nvPr>
+            <p:ph sz="quarter" idx="4"/>
+          </p:nvPr>
+        </p:nvSpPr>
+        <p:spPr/>
+        <p:txBody>
+          <a:bodyPr/>
+          <a:lstStyle/>
+          <a:p>
+            <a:endParaRPr lang="sv-SE"/>
           </a:p>
         </p:txBody>
       </p:sp>
@@ -9277,7 +11778,7 @@
     </p:custDataLst>
     <p:extLst>
       <p:ext uri="{BB962C8B-B14F-4D97-AF65-F5344CB8AC3E}">
-        <p14:creationId xmlns:p14="http://schemas.microsoft.com/office/powerpoint/2010/main" val="1458286633"/>
+        <p14:creationId xmlns:p14="http://schemas.microsoft.com/office/powerpoint/2010/main" val="1161572908"/>
       </p:ext>
     </p:extLst>
   </p:cSld>
@@ -9403,6 +11904,12 @@
 </file>
 
 <file path=ppt/tags/tag27.xml><?xml version="1.0" encoding="utf-8"?>
+<p:tagLst xmlns:a="http://schemas.openxmlformats.org/drawingml/2006/main" xmlns:r="http://schemas.openxmlformats.org/officeDocument/2006/relationships" xmlns:p="http://schemas.openxmlformats.org/presentationml/2006/main">
+  <p:tag name="ARTICULATE_SLIDE_THUMBNAIL_REFRESH" val="1"/>
+</p:tagLst>
+</file>
+
+<file path=ppt/tags/tag28.xml><?xml version="1.0" encoding="utf-8"?>
 <p:tagLst xmlns:a="http://schemas.openxmlformats.org/drawingml/2006/main" xmlns:r="http://schemas.openxmlformats.org/officeDocument/2006/relationships" xmlns:p="http://schemas.openxmlformats.org/presentationml/2006/main">
   <p:tag name="ARTICULATE_SLIDE_THUMBNAIL_REFRESH" val="1"/>
 </p:tagLst>

</xml_diff>

<commit_message>
lagt til tdd exempel i powerpointen
</commit_message>
<xml_diff>
--- a/01 Dokumentation/slutredovisning.pptx
+++ b/01 Dokumentation/slutredovisning.pptx
@@ -5,7 +5,7 @@
     <p:sldMasterId id="2147483648" r:id="rId1"/>
   </p:sldMasterIdLst>
   <p:notesMasterIdLst>
-    <p:notesMasterId r:id="rId31"/>
+    <p:notesMasterId r:id="rId32"/>
   </p:notesMasterIdLst>
   <p:sldIdLst>
     <p:sldId id="256" r:id="rId2"/>
@@ -16,32 +16,33 @@
     <p:sldId id="287" r:id="rId7"/>
     <p:sldId id="288" r:id="rId8"/>
     <p:sldId id="283" r:id="rId9"/>
-    <p:sldId id="284" r:id="rId10"/>
-    <p:sldId id="290" r:id="rId11"/>
-    <p:sldId id="260" r:id="rId12"/>
-    <p:sldId id="285" r:id="rId13"/>
-    <p:sldId id="286" r:id="rId14"/>
-    <p:sldId id="261" r:id="rId15"/>
-    <p:sldId id="262" r:id="rId16"/>
-    <p:sldId id="265" r:id="rId17"/>
-    <p:sldId id="266" r:id="rId18"/>
-    <p:sldId id="267" r:id="rId19"/>
-    <p:sldId id="268" r:id="rId20"/>
-    <p:sldId id="273" r:id="rId21"/>
-    <p:sldId id="274" r:id="rId22"/>
-    <p:sldId id="275" r:id="rId23"/>
-    <p:sldId id="276" r:id="rId24"/>
-    <p:sldId id="277" r:id="rId25"/>
-    <p:sldId id="278" r:id="rId26"/>
-    <p:sldId id="279" r:id="rId27"/>
-    <p:sldId id="282" r:id="rId28"/>
-    <p:sldId id="280" r:id="rId29"/>
-    <p:sldId id="281" r:id="rId30"/>
+    <p:sldId id="291" r:id="rId10"/>
+    <p:sldId id="284" r:id="rId11"/>
+    <p:sldId id="290" r:id="rId12"/>
+    <p:sldId id="260" r:id="rId13"/>
+    <p:sldId id="285" r:id="rId14"/>
+    <p:sldId id="286" r:id="rId15"/>
+    <p:sldId id="261" r:id="rId16"/>
+    <p:sldId id="262" r:id="rId17"/>
+    <p:sldId id="265" r:id="rId18"/>
+    <p:sldId id="266" r:id="rId19"/>
+    <p:sldId id="267" r:id="rId20"/>
+    <p:sldId id="268" r:id="rId21"/>
+    <p:sldId id="273" r:id="rId22"/>
+    <p:sldId id="274" r:id="rId23"/>
+    <p:sldId id="275" r:id="rId24"/>
+    <p:sldId id="276" r:id="rId25"/>
+    <p:sldId id="277" r:id="rId26"/>
+    <p:sldId id="278" r:id="rId27"/>
+    <p:sldId id="279" r:id="rId28"/>
+    <p:sldId id="282" r:id="rId29"/>
+    <p:sldId id="280" r:id="rId30"/>
+    <p:sldId id="281" r:id="rId31"/>
   </p:sldIdLst>
   <p:sldSz cx="12192000" cy="6858000"/>
   <p:notesSz cx="6858000" cy="9144000"/>
   <p:custDataLst>
-    <p:tags r:id="rId32"/>
+    <p:tags r:id="rId33"/>
   </p:custDataLst>
   <p:defaultTextStyle>
     <a:defPPr>
@@ -390,7 +391,7 @@
           <a:p>
             <a:fld id="{8667F948-D2CB-486C-A2EA-FEABC2DAAE8D}" type="slidenum">
               <a:rPr lang="sv-SE" smtClean="0"/>
-              <a:t>‹#›</a:t>
+              <a:t>‹Nr.›</a:t>
             </a:fld>
             <a:endParaRPr lang="sv-SE"/>
           </a:p>
@@ -712,7 +713,7 @@
     </p:spTree>
     <p:extLst>
       <p:ext uri="{BB962C8B-B14F-4D97-AF65-F5344CB8AC3E}">
-        <p14:creationId xmlns:p14="http://schemas.microsoft.com/office/powerpoint/2010/main" val="61407698"/>
+        <p14:creationId xmlns:p14="http://schemas.microsoft.com/office/powerpoint/2010/main" val="3805628052"/>
       </p:ext>
     </p:extLst>
   </p:cSld>
@@ -784,8 +785,40 @@
               <a:defRPr/>
             </a:pPr>
             <a:r>
-              <a:rPr lang="sv-SE" dirty="0"/>
-              <a:t>En diskussion om vilka era erfarenheter ni dragit av att tillämpa TDD. Det finns inget rätt eller fel här. Enda sättet att bli underkända är att bara fuska över punkten och säga något pliktskyldigt.</a:t>
+              <a:rPr lang="sv-SE" sz="1200" kern="1200" dirty="0">
+                <a:solidFill>
+                  <a:schemeClr val="tx1"/>
+                </a:solidFill>
+                <a:effectLst/>
+                <a:latin typeface="+mn-lt"/>
+                <a:ea typeface="+mn-ea"/>
+                <a:cs typeface="+mn-cs"/>
+              </a:rPr>
+              <a:t>Två eller tre exempel per</a:t>
+            </a:r>
+            <a:r>
+              <a:rPr lang="sv-SE" sz="1200" kern="1200" baseline="0" dirty="0">
+                <a:solidFill>
+                  <a:schemeClr val="tx1"/>
+                </a:solidFill>
+                <a:effectLst/>
+                <a:latin typeface="+mn-lt"/>
+                <a:ea typeface="+mn-ea"/>
+                <a:cs typeface="+mn-cs"/>
+              </a:rPr>
+              <a:t> person i projektet på hur ni tillämpat TDD med koden för såväl testfallen som koden som ska testas. (Det kan alltså bli upp till 15 sidor för en fempersonersgrupp.) Exemplen ska vara från olika faser </a:t>
+            </a:r>
+            <a:r>
+              <a:rPr lang="sv-SE" sz="1200" kern="1200" dirty="0">
+                <a:solidFill>
+                  <a:schemeClr val="tx1"/>
+                </a:solidFill>
+                <a:effectLst/>
+                <a:latin typeface="+mn-lt"/>
+                <a:ea typeface="+mn-ea"/>
+                <a:cs typeface="+mn-cs"/>
+              </a:rPr>
+              <a:t>i projektet. Om ni har använt versionshanteringssystemet ordentligt bör all information som efterfrågas här finnas i det. Tänk på att kodexemplen ska vara läsbara. </a:t>
             </a:r>
           </a:p>
           <a:p>
@@ -819,7 +852,7 @@
     </p:spTree>
     <p:extLst>
       <p:ext uri="{BB962C8B-B14F-4D97-AF65-F5344CB8AC3E}">
-        <p14:creationId xmlns:p14="http://schemas.microsoft.com/office/powerpoint/2010/main" val="4160569562"/>
+        <p14:creationId xmlns:p14="http://schemas.microsoft.com/office/powerpoint/2010/main" val="61407698"/>
       </p:ext>
     </p:extLst>
   </p:cSld>
@@ -926,7 +959,7 @@
     </p:spTree>
     <p:extLst>
       <p:ext uri="{BB962C8B-B14F-4D97-AF65-F5344CB8AC3E}">
-        <p14:creationId xmlns:p14="http://schemas.microsoft.com/office/powerpoint/2010/main" val="3138013813"/>
+        <p14:creationId xmlns:p14="http://schemas.microsoft.com/office/powerpoint/2010/main" val="4160569562"/>
       </p:ext>
     </p:extLst>
   </p:cSld>
@@ -1033,7 +1066,7 @@
     </p:spTree>
     <p:extLst>
       <p:ext uri="{BB962C8B-B14F-4D97-AF65-F5344CB8AC3E}">
-        <p14:creationId xmlns:p14="http://schemas.microsoft.com/office/powerpoint/2010/main" val="1466515987"/>
+        <p14:creationId xmlns:p14="http://schemas.microsoft.com/office/powerpoint/2010/main" val="3138013813"/>
       </p:ext>
     </p:extLst>
   </p:cSld>
@@ -1105,16 +1138,8 @@
               <a:defRPr/>
             </a:pPr>
             <a:r>
-              <a:rPr lang="sv-SE" sz="1200" kern="1200" dirty="0">
-                <a:solidFill>
-                  <a:schemeClr val="tx1"/>
-                </a:solidFill>
-                <a:effectLst/>
-                <a:latin typeface="+mn-lt"/>
-                <a:ea typeface="+mn-ea"/>
-                <a:cs typeface="+mn-cs"/>
-              </a:rPr>
-              <a:t>En kort textuell presentation av vad ni valt ut för att tillämpa ekvivalensklassuppdelning på. Ni ska kort motivera valet, och ge tillräckligt med information för att det ska gå att bedöma er. Detta avsnitt och de följande (till och med testmatrisen) ska finnas för samtliga delar ni tillämpat ekvivalensklassuppdelning på. Om ni inte tillämpat ekvivalensklassuppdelning tar ni bort dessa bilder.</a:t>
+              <a:rPr lang="sv-SE" dirty="0"/>
+              <a:t>En diskussion om vilka era erfarenheter ni dragit av att tillämpa TDD. Det finns inget rätt eller fel här. Enda sättet att bli underkända är att bara fuska över punkten och säga något pliktskyldigt.</a:t>
             </a:r>
           </a:p>
           <a:p>
@@ -1148,7 +1173,7 @@
     </p:spTree>
     <p:extLst>
       <p:ext uri="{BB962C8B-B14F-4D97-AF65-F5344CB8AC3E}">
-        <p14:creationId xmlns:p14="http://schemas.microsoft.com/office/powerpoint/2010/main" val="2473427308"/>
+        <p14:creationId xmlns:p14="http://schemas.microsoft.com/office/powerpoint/2010/main" val="1466515987"/>
       </p:ext>
     </p:extLst>
   </p:cSld>
@@ -1229,29 +1254,8 @@
                 <a:ea typeface="+mn-ea"/>
                 <a:cs typeface="+mn-cs"/>
               </a:rPr>
-              <a:t>Samtliga ekvivalensklasser för denna del presenterade på ett tydligt sätt. Använd</a:t>
-            </a:r>
-            <a:r>
-              <a:rPr lang="sv-SE" sz="1200" kern="1200" baseline="0" dirty="0">
-                <a:solidFill>
-                  <a:schemeClr val="tx1"/>
-                </a:solidFill>
-                <a:effectLst/>
-                <a:latin typeface="+mn-lt"/>
-                <a:ea typeface="+mn-ea"/>
-                <a:cs typeface="+mn-cs"/>
-              </a:rPr>
-              <a:t> gärna flera sidor om det behövs.</a:t>
-            </a:r>
-            <a:endParaRPr lang="sv-SE" sz="1200" kern="1200" dirty="0">
-              <a:solidFill>
-                <a:schemeClr val="tx1"/>
-              </a:solidFill>
-              <a:effectLst/>
-              <a:latin typeface="+mn-lt"/>
-              <a:ea typeface="+mn-ea"/>
-              <a:cs typeface="+mn-cs"/>
-            </a:endParaRPr>
+              <a:t>En kort textuell presentation av vad ni valt ut för att tillämpa ekvivalensklassuppdelning på. Ni ska kort motivera valet, och ge tillräckligt med information för att det ska gå att bedöma er. Detta avsnitt och de följande (till och med testmatrisen) ska finnas för samtliga delar ni tillämpat ekvivalensklassuppdelning på. Om ni inte tillämpat ekvivalensklassuppdelning tar ni bort dessa bilder.</a:t>
+            </a:r>
           </a:p>
           <a:p>
             <a:endParaRPr lang="sv-SE" dirty="0"/>
@@ -1284,7 +1288,7 @@
     </p:spTree>
     <p:extLst>
       <p:ext uri="{BB962C8B-B14F-4D97-AF65-F5344CB8AC3E}">
-        <p14:creationId xmlns:p14="http://schemas.microsoft.com/office/powerpoint/2010/main" val="2613784504"/>
+        <p14:creationId xmlns:p14="http://schemas.microsoft.com/office/powerpoint/2010/main" val="2473427308"/>
       </p:ext>
     </p:extLst>
   </p:cSld>
@@ -1365,8 +1369,29 @@
                 <a:ea typeface="+mn-ea"/>
                 <a:cs typeface="+mn-cs"/>
               </a:rPr>
-              <a:t>En kort textuell presentation av vad ni valt ut för att tillämpa tillståndsmaskiner på och vilket eller vilka kriterier ni använder för att ta fram testfall från maskinen. Ni ska kort motivera valet, och ge tillräckligt med information för att det ska gå att bedöma er. Detta avsnitt och de följande ska finnas för samtliga delar ni tillämpat tillståndsmaskiner på. Om ni inte tillämpat tillståndsmaskiner tar ni bort dessa bilder.</a:t>
-            </a:r>
+              <a:t>Samtliga ekvivalensklasser för denna del presenterade på ett tydligt sätt. Använd</a:t>
+            </a:r>
+            <a:r>
+              <a:rPr lang="sv-SE" sz="1200" kern="1200" baseline="0" dirty="0">
+                <a:solidFill>
+                  <a:schemeClr val="tx1"/>
+                </a:solidFill>
+                <a:effectLst/>
+                <a:latin typeface="+mn-lt"/>
+                <a:ea typeface="+mn-ea"/>
+                <a:cs typeface="+mn-cs"/>
+              </a:rPr>
+              <a:t> gärna flera sidor om det behövs.</a:t>
+            </a:r>
+            <a:endParaRPr lang="sv-SE" sz="1200" kern="1200" dirty="0">
+              <a:solidFill>
+                <a:schemeClr val="tx1"/>
+              </a:solidFill>
+              <a:effectLst/>
+              <a:latin typeface="+mn-lt"/>
+              <a:ea typeface="+mn-ea"/>
+              <a:cs typeface="+mn-cs"/>
+            </a:endParaRPr>
           </a:p>
           <a:p>
             <a:endParaRPr lang="sv-SE" dirty="0"/>
@@ -1399,7 +1424,7 @@
     </p:spTree>
     <p:extLst>
       <p:ext uri="{BB962C8B-B14F-4D97-AF65-F5344CB8AC3E}">
-        <p14:creationId xmlns:p14="http://schemas.microsoft.com/office/powerpoint/2010/main" val="2041626993"/>
+        <p14:creationId xmlns:p14="http://schemas.microsoft.com/office/powerpoint/2010/main" val="2613784504"/>
       </p:ext>
     </p:extLst>
   </p:cSld>
@@ -1453,10 +1478,38 @@
           <a:bodyPr/>
           <a:lstStyle/>
           <a:p>
-            <a:r>
-              <a:rPr lang="sv-SE" dirty="0"/>
-              <a:t>Själva tillståndsmaskinen</a:t>
-            </a:r>
+            <a:pPr marL="0" marR="0" lvl="0" indent="0" algn="l" defTabSz="914400" rtl="0" eaLnBrk="1" fontAlgn="auto" latinLnBrk="0" hangingPunct="1">
+              <a:lnSpc>
+                <a:spcPct val="100000"/>
+              </a:lnSpc>
+              <a:spcBef>
+                <a:spcPts val="0"/>
+              </a:spcBef>
+              <a:spcAft>
+                <a:spcPts val="0"/>
+              </a:spcAft>
+              <a:buClrTx/>
+              <a:buSzTx/>
+              <a:buFontTx/>
+              <a:buNone/>
+              <a:tabLst/>
+              <a:defRPr/>
+            </a:pPr>
+            <a:r>
+              <a:rPr lang="sv-SE" sz="1200" kern="1200" dirty="0">
+                <a:solidFill>
+                  <a:schemeClr val="tx1"/>
+                </a:solidFill>
+                <a:effectLst/>
+                <a:latin typeface="+mn-lt"/>
+                <a:ea typeface="+mn-ea"/>
+                <a:cs typeface="+mn-cs"/>
+              </a:rPr>
+              <a:t>En kort textuell presentation av vad ni valt ut för att tillämpa tillståndsmaskiner på och vilket eller vilka kriterier ni använder för att ta fram testfall från maskinen. Ni ska kort motivera valet, och ge tillräckligt med information för att det ska gå att bedöma er. Detta avsnitt och de följande ska finnas för samtliga delar ni tillämpat tillståndsmaskiner på. Om ni inte tillämpat tillståndsmaskiner tar ni bort dessa bilder.</a:t>
+            </a:r>
+          </a:p>
+          <a:p>
+            <a:endParaRPr lang="sv-SE" dirty="0"/>
           </a:p>
         </p:txBody>
       </p:sp>
@@ -1486,7 +1539,7 @@
     </p:spTree>
     <p:extLst>
       <p:ext uri="{BB962C8B-B14F-4D97-AF65-F5344CB8AC3E}">
-        <p14:creationId xmlns:p14="http://schemas.microsoft.com/office/powerpoint/2010/main" val="1235134485"/>
+        <p14:creationId xmlns:p14="http://schemas.microsoft.com/office/powerpoint/2010/main" val="2041626993"/>
       </p:ext>
     </p:extLst>
   </p:cSld>
@@ -1540,39 +1593,10 @@
           <a:bodyPr/>
           <a:lstStyle/>
           <a:p>
-            <a:pPr marL="0" marR="0" lvl="0" indent="0" algn="l" defTabSz="914400" rtl="0" eaLnBrk="1" fontAlgn="auto" latinLnBrk="0" hangingPunct="1">
-              <a:lnSpc>
-                <a:spcPct val="100000"/>
-              </a:lnSpc>
-              <a:spcBef>
-                <a:spcPts val="0"/>
-              </a:spcBef>
-              <a:spcAft>
-                <a:spcPts val="0"/>
-              </a:spcAft>
-              <a:buClrTx/>
-              <a:buSzTx/>
-              <a:buFontTx/>
-              <a:buNone/>
-              <a:tabLst/>
-              <a:defRPr/>
-            </a:pPr>
-            <a:r>
-              <a:rPr lang="sv-SE" sz="1200" kern="1200" dirty="0">
-                <a:solidFill>
-                  <a:schemeClr val="tx1"/>
-                </a:solidFill>
-                <a:effectLst/>
-                <a:latin typeface="+mn-lt"/>
-                <a:ea typeface="+mn-ea"/>
-                <a:cs typeface="+mn-cs"/>
-              </a:rPr>
-              <a:t>Testfallen som ni fått fram från tillståndsmaskinen. Observera att vi inte vill ha någon kod här, utan bara en tydlig presentation av testfallen i någon lämplig tabellform. </a:t>
-            </a:r>
-            <a:endParaRPr lang="sv-SE" dirty="0"/>
-          </a:p>
-          <a:p>
-            <a:endParaRPr lang="sv-SE" dirty="0"/>
+            <a:r>
+              <a:rPr lang="sv-SE" dirty="0"/>
+              <a:t>Själva tillståndsmaskinen</a:t>
+            </a:r>
           </a:p>
         </p:txBody>
       </p:sp>
@@ -1602,7 +1626,7 @@
     </p:spTree>
     <p:extLst>
       <p:ext uri="{BB962C8B-B14F-4D97-AF65-F5344CB8AC3E}">
-        <p14:creationId xmlns:p14="http://schemas.microsoft.com/office/powerpoint/2010/main" val="556359333"/>
+        <p14:creationId xmlns:p14="http://schemas.microsoft.com/office/powerpoint/2010/main" val="1235134485"/>
       </p:ext>
     </p:extLst>
   </p:cSld>
@@ -1683,77 +1707,9 @@
                 <a:ea typeface="+mn-ea"/>
                 <a:cs typeface="+mn-cs"/>
               </a:rPr>
-              <a:t>En testmatris (eller annan</a:t>
-            </a:r>
-            <a:r>
-              <a:rPr lang="sv-SE" sz="1200" kern="1200" baseline="0" dirty="0">
-                <a:solidFill>
-                  <a:schemeClr val="tx1"/>
-                </a:solidFill>
-                <a:effectLst/>
-                <a:latin typeface="+mn-lt"/>
-                <a:ea typeface="+mn-ea"/>
-                <a:cs typeface="+mn-cs"/>
-              </a:rPr>
-              <a:t> lämplig form)</a:t>
-            </a:r>
-            <a:r>
-              <a:rPr lang="sv-SE" sz="1200" kern="1200" dirty="0">
-                <a:solidFill>
-                  <a:schemeClr val="tx1"/>
-                </a:solidFill>
-                <a:effectLst/>
-                <a:latin typeface="+mn-lt"/>
-                <a:ea typeface="+mn-ea"/>
-                <a:cs typeface="+mn-cs"/>
-              </a:rPr>
-              <a:t> som visar sambandet mellan tillståndsmaskinen och testfallen för denna del så att det går att se att ni tillämpat de kriterier</a:t>
-            </a:r>
-            <a:r>
-              <a:rPr lang="sv-SE" sz="1200" kern="1200" baseline="0" dirty="0">
-                <a:solidFill>
-                  <a:schemeClr val="tx1"/>
-                </a:solidFill>
-                <a:effectLst/>
-                <a:latin typeface="+mn-lt"/>
-                <a:ea typeface="+mn-ea"/>
-                <a:cs typeface="+mn-cs"/>
-              </a:rPr>
-              <a:t> ni satt upp för att ta fram testfall</a:t>
-            </a:r>
-            <a:r>
-              <a:rPr lang="sv-SE" sz="1200" kern="1200" dirty="0">
-                <a:solidFill>
-                  <a:schemeClr val="tx1"/>
-                </a:solidFill>
-                <a:effectLst/>
-                <a:latin typeface="+mn-lt"/>
-                <a:ea typeface="+mn-ea"/>
-                <a:cs typeface="+mn-cs"/>
-              </a:rPr>
-              <a:t>. Om detta tydligt framgår från testfallen</a:t>
-            </a:r>
-            <a:r>
-              <a:rPr lang="sv-SE" sz="1200" kern="1200" baseline="0" dirty="0">
-                <a:solidFill>
-                  <a:schemeClr val="tx1"/>
-                </a:solidFill>
-                <a:effectLst/>
-                <a:latin typeface="+mn-lt"/>
-                <a:ea typeface="+mn-ea"/>
-                <a:cs typeface="+mn-cs"/>
-              </a:rPr>
-              <a:t> så kan denna bild plockas bort.</a:t>
-            </a:r>
-            <a:endParaRPr lang="sv-SE" sz="1200" kern="1200" dirty="0">
-              <a:solidFill>
-                <a:schemeClr val="tx1"/>
-              </a:solidFill>
-              <a:effectLst/>
-              <a:latin typeface="+mn-lt"/>
-              <a:ea typeface="+mn-ea"/>
-              <a:cs typeface="+mn-cs"/>
-            </a:endParaRPr>
+              <a:t>Testfallen som ni fått fram från tillståndsmaskinen. Observera att vi inte vill ha någon kod här, utan bara en tydlig presentation av testfallen i någon lämplig tabellform. </a:t>
+            </a:r>
+            <a:endParaRPr lang="sv-SE" dirty="0"/>
           </a:p>
           <a:p>
             <a:endParaRPr lang="sv-SE" dirty="0"/>
@@ -1786,7 +1742,7 @@
     </p:spTree>
     <p:extLst>
       <p:ext uri="{BB962C8B-B14F-4D97-AF65-F5344CB8AC3E}">
-        <p14:creationId xmlns:p14="http://schemas.microsoft.com/office/powerpoint/2010/main" val="61413010"/>
+        <p14:creationId xmlns:p14="http://schemas.microsoft.com/office/powerpoint/2010/main" val="556359333"/>
       </p:ext>
     </p:extLst>
   </p:cSld>
@@ -1951,10 +1907,10 @@
                 <a:ea typeface="+mn-ea"/>
                 <a:cs typeface="+mn-cs"/>
               </a:rPr>
-              <a:t>En kort presentation av den del av koden ni valt ut för att göra en formell granskning av och processen ni använt er av inklusive eventuella checklistor, scenarier, </a:t>
-            </a:r>
-            <a:r>
-              <a:rPr lang="sv-SE" sz="1200" kern="1200" dirty="0" err="1">
+              <a:t>En testmatris (eller annan</a:t>
+            </a:r>
+            <a:r>
+              <a:rPr lang="sv-SE" sz="1200" kern="1200" baseline="0" dirty="0">
                 <a:solidFill>
                   <a:schemeClr val="tx1"/>
                 </a:solidFill>
@@ -1963,7 +1919,7 @@
                 <a:ea typeface="+mn-ea"/>
                 <a:cs typeface="+mn-cs"/>
               </a:rPr>
-              <a:t>edyl</a:t>
+              <a:t> lämplig form)</a:t>
             </a:r>
             <a:r>
               <a:rPr lang="sv-SE" sz="1200" kern="1200" dirty="0">
@@ -1975,8 +1931,53 @@
                 <a:ea typeface="+mn-ea"/>
                 <a:cs typeface="+mn-cs"/>
               </a:rPr>
-              <a:t>. Ni ska kort motivera valen, och ge tillräckligt med information för att det ska gå att bedöma er. </a:t>
-            </a:r>
+              <a:t> som visar sambandet mellan tillståndsmaskinen och testfallen för denna del så att det går att se att ni tillämpat de kriterier</a:t>
+            </a:r>
+            <a:r>
+              <a:rPr lang="sv-SE" sz="1200" kern="1200" baseline="0" dirty="0">
+                <a:solidFill>
+                  <a:schemeClr val="tx1"/>
+                </a:solidFill>
+                <a:effectLst/>
+                <a:latin typeface="+mn-lt"/>
+                <a:ea typeface="+mn-ea"/>
+                <a:cs typeface="+mn-cs"/>
+              </a:rPr>
+              <a:t> ni satt upp för att ta fram testfall</a:t>
+            </a:r>
+            <a:r>
+              <a:rPr lang="sv-SE" sz="1200" kern="1200" dirty="0">
+                <a:solidFill>
+                  <a:schemeClr val="tx1"/>
+                </a:solidFill>
+                <a:effectLst/>
+                <a:latin typeface="+mn-lt"/>
+                <a:ea typeface="+mn-ea"/>
+                <a:cs typeface="+mn-cs"/>
+              </a:rPr>
+              <a:t>. Om detta tydligt framgår från testfallen</a:t>
+            </a:r>
+            <a:r>
+              <a:rPr lang="sv-SE" sz="1200" kern="1200" baseline="0" dirty="0">
+                <a:solidFill>
+                  <a:schemeClr val="tx1"/>
+                </a:solidFill>
+                <a:effectLst/>
+                <a:latin typeface="+mn-lt"/>
+                <a:ea typeface="+mn-ea"/>
+                <a:cs typeface="+mn-cs"/>
+              </a:rPr>
+              <a:t> så kan denna bild plockas bort.</a:t>
+            </a:r>
+            <a:endParaRPr lang="sv-SE" sz="1200" kern="1200" dirty="0">
+              <a:solidFill>
+                <a:schemeClr val="tx1"/>
+              </a:solidFill>
+              <a:effectLst/>
+              <a:latin typeface="+mn-lt"/>
+              <a:ea typeface="+mn-ea"/>
+              <a:cs typeface="+mn-cs"/>
+            </a:endParaRPr>
           </a:p>
           <a:p>
             <a:endParaRPr lang="sv-SE" dirty="0"/>
@@ -2009,7 +2010,7 @@
     </p:spTree>
     <p:extLst>
       <p:ext uri="{BB962C8B-B14F-4D97-AF65-F5344CB8AC3E}">
-        <p14:creationId xmlns:p14="http://schemas.microsoft.com/office/powerpoint/2010/main" val="1836920504"/>
+        <p14:creationId xmlns:p14="http://schemas.microsoft.com/office/powerpoint/2010/main" val="61413010"/>
       </p:ext>
     </p:extLst>
   </p:cSld>
@@ -2090,7 +2091,31 @@
                 <a:ea typeface="+mn-ea"/>
                 <a:cs typeface="+mn-cs"/>
               </a:rPr>
-              <a:t>En lista över de påträffade felen och hur pass allvarliga ni bedömer dem.</a:t>
+              <a:t>En kort presentation av den del av koden ni valt ut för att göra en formell granskning av och processen ni använt er av inklusive eventuella checklistor, scenarier, </a:t>
+            </a:r>
+            <a:r>
+              <a:rPr lang="sv-SE" sz="1200" kern="1200" dirty="0" err="1">
+                <a:solidFill>
+                  <a:schemeClr val="tx1"/>
+                </a:solidFill>
+                <a:effectLst/>
+                <a:latin typeface="+mn-lt"/>
+                <a:ea typeface="+mn-ea"/>
+                <a:cs typeface="+mn-cs"/>
+              </a:rPr>
+              <a:t>edyl</a:t>
+            </a:r>
+            <a:r>
+              <a:rPr lang="sv-SE" sz="1200" kern="1200" dirty="0">
+                <a:solidFill>
+                  <a:schemeClr val="tx1"/>
+                </a:solidFill>
+                <a:effectLst/>
+                <a:latin typeface="+mn-lt"/>
+                <a:ea typeface="+mn-ea"/>
+                <a:cs typeface="+mn-cs"/>
+              </a:rPr>
+              <a:t>. Ni ska kort motivera valen, och ge tillräckligt med information för att det ska gå att bedöma er. </a:t>
             </a:r>
           </a:p>
           <a:p>
@@ -2124,7 +2149,7 @@
     </p:spTree>
     <p:extLst>
       <p:ext uri="{BB962C8B-B14F-4D97-AF65-F5344CB8AC3E}">
-        <p14:creationId xmlns:p14="http://schemas.microsoft.com/office/powerpoint/2010/main" val="1645734220"/>
+        <p14:creationId xmlns:p14="http://schemas.microsoft.com/office/powerpoint/2010/main" val="1836920504"/>
       </p:ext>
     </p:extLst>
   </p:cSld>
@@ -2205,31 +2230,7 @@
                 <a:ea typeface="+mn-ea"/>
                 <a:cs typeface="+mn-cs"/>
               </a:rPr>
-              <a:t>En diskussion om vilka era erfarenheter ni dragit av att tillämpa granskning. Det finns inget rätt eller fel här. Enda sättet att bli underkända är att bara fuska över punkten och bara säga något pliktskyldigt. Ni förväntas förhålla er till såväl kursböckerna som utdelat material och IEEE </a:t>
-            </a:r>
-            <a:r>
-              <a:rPr lang="sv-SE" sz="1200" kern="1200" dirty="0" err="1">
-                <a:solidFill>
-                  <a:schemeClr val="tx1"/>
-                </a:solidFill>
-                <a:effectLst/>
-                <a:latin typeface="+mn-lt"/>
-                <a:ea typeface="+mn-ea"/>
-                <a:cs typeface="+mn-cs"/>
-              </a:rPr>
-              <a:t>Std</a:t>
-            </a:r>
-            <a:r>
-              <a:rPr lang="sv-SE" sz="1200" kern="1200" dirty="0">
-                <a:solidFill>
-                  <a:schemeClr val="tx1"/>
-                </a:solidFill>
-                <a:effectLst/>
-                <a:latin typeface="+mn-lt"/>
-                <a:ea typeface="+mn-ea"/>
-                <a:cs typeface="+mn-cs"/>
-              </a:rPr>
-              <a:t> 1028.</a:t>
+              <a:t>En lista över de påträffade felen och hur pass allvarliga ni bedömer dem.</a:t>
             </a:r>
           </a:p>
           <a:p>
@@ -2263,7 +2264,7 @@
     </p:spTree>
     <p:extLst>
       <p:ext uri="{BB962C8B-B14F-4D97-AF65-F5344CB8AC3E}">
-        <p14:creationId xmlns:p14="http://schemas.microsoft.com/office/powerpoint/2010/main" val="393491449"/>
+        <p14:creationId xmlns:p14="http://schemas.microsoft.com/office/powerpoint/2010/main" val="1645734220"/>
       </p:ext>
     </p:extLst>
   </p:cSld>
@@ -2344,7 +2345,31 @@
                 <a:ea typeface="+mn-ea"/>
                 <a:cs typeface="+mn-cs"/>
               </a:rPr>
-              <a:t>En presentation av de problem som hittats med hjälp av verktyg för statisk analys och en diskussion av dem enligt anvisningarna. Det räcker alltså inte med att bara lista problemen, ni måste förhålla er till dem också. Tänk också på att ni ska göra detta både på koden som den såg ut före granskningen och på koden efter att ni rättat det som kommit fram under granskningen.</a:t>
+              <a:t>En diskussion om vilka era erfarenheter ni dragit av att tillämpa granskning. Det finns inget rätt eller fel här. Enda sättet att bli underkända är att bara fuska över punkten och bara säga något pliktskyldigt. Ni förväntas förhålla er till såväl kursböckerna som utdelat material och IEEE </a:t>
+            </a:r>
+            <a:r>
+              <a:rPr lang="sv-SE" sz="1200" kern="1200" dirty="0" err="1">
+                <a:solidFill>
+                  <a:schemeClr val="tx1"/>
+                </a:solidFill>
+                <a:effectLst/>
+                <a:latin typeface="+mn-lt"/>
+                <a:ea typeface="+mn-ea"/>
+                <a:cs typeface="+mn-cs"/>
+              </a:rPr>
+              <a:t>Std</a:t>
+            </a:r>
+            <a:r>
+              <a:rPr lang="sv-SE" sz="1200" kern="1200" dirty="0">
+                <a:solidFill>
+                  <a:schemeClr val="tx1"/>
+                </a:solidFill>
+                <a:effectLst/>
+                <a:latin typeface="+mn-lt"/>
+                <a:ea typeface="+mn-ea"/>
+                <a:cs typeface="+mn-cs"/>
+              </a:rPr>
+              <a:t> 1028.</a:t>
             </a:r>
           </a:p>
           <a:p>
@@ -2378,7 +2403,7 @@
     </p:spTree>
     <p:extLst>
       <p:ext uri="{BB962C8B-B14F-4D97-AF65-F5344CB8AC3E}">
-        <p14:creationId xmlns:p14="http://schemas.microsoft.com/office/powerpoint/2010/main" val="1343433812"/>
+        <p14:creationId xmlns:p14="http://schemas.microsoft.com/office/powerpoint/2010/main" val="393491449"/>
       </p:ext>
     </p:extLst>
   </p:cSld>
@@ -2459,7 +2484,7 @@
                 <a:ea typeface="+mn-ea"/>
                 <a:cs typeface="+mn-cs"/>
               </a:rPr>
-              <a:t>En presentation och diskussion kring ett antal lämpliga statiska mått på koden. Att vi inte specificerar exakt vilka mått som ska tas upp beror på att olika verktyg har olika uppsättningar, men vi förväntar oss fler och mer intressanta mått än bara rena storleksmått som LOC, #klasser, #metoder, etc. Även här är det viktigt att förhållas sig till måtten, inte bara lista dem.</a:t>
+              <a:t>En presentation av de problem som hittats med hjälp av verktyg för statisk analys och en diskussion av dem enligt anvisningarna. Det räcker alltså inte med att bara lista problemen, ni måste förhålla er till dem också. Tänk också på att ni ska göra detta både på koden som den såg ut före granskningen och på koden efter att ni rättat det som kommit fram under granskningen.</a:t>
             </a:r>
           </a:p>
           <a:p>
@@ -2493,7 +2518,7 @@
     </p:spTree>
     <p:extLst>
       <p:ext uri="{BB962C8B-B14F-4D97-AF65-F5344CB8AC3E}">
-        <p14:creationId xmlns:p14="http://schemas.microsoft.com/office/powerpoint/2010/main" val="247082709"/>
+        <p14:creationId xmlns:p14="http://schemas.microsoft.com/office/powerpoint/2010/main" val="1343433812"/>
       </p:ext>
     </p:extLst>
   </p:cSld>
@@ -2574,7 +2599,7 @@
                 <a:ea typeface="+mn-ea"/>
                 <a:cs typeface="+mn-cs"/>
               </a:rPr>
-              <a:t>En översikt över vilken täckningsgrad era testfall uppnått. Denna kan antagligen tas rakt av från verktyget ni använt för att mäta den. Om ni inte uppnått fullständig täckning så ska detta förklaras och motiveras.</a:t>
+              <a:t>En presentation och diskussion kring ett antal lämpliga statiska mått på koden. Att vi inte specificerar exakt vilka mått som ska tas upp beror på att olika verktyg har olika uppsättningar, men vi förväntar oss fler och mer intressanta mått än bara rena storleksmått som LOC, #klasser, #metoder, etc. Även här är det viktigt att förhållas sig till måtten, inte bara lista dem.</a:t>
             </a:r>
           </a:p>
           <a:p>
@@ -2608,7 +2633,7 @@
     </p:spTree>
     <p:extLst>
       <p:ext uri="{BB962C8B-B14F-4D97-AF65-F5344CB8AC3E}">
-        <p14:creationId xmlns:p14="http://schemas.microsoft.com/office/powerpoint/2010/main" val="169751880"/>
+        <p14:creationId xmlns:p14="http://schemas.microsoft.com/office/powerpoint/2010/main" val="247082709"/>
       </p:ext>
     </p:extLst>
   </p:cSld>
@@ -2689,6 +2714,121 @@
                 <a:ea typeface="+mn-ea"/>
                 <a:cs typeface="+mn-cs"/>
               </a:rPr>
+              <a:t>En översikt över vilken täckningsgrad era testfall uppnått. Denna kan antagligen tas rakt av från verktyget ni använt för att mäta den. Om ni inte uppnått fullständig täckning så ska detta förklaras och motiveras.</a:t>
+            </a:r>
+          </a:p>
+          <a:p>
+            <a:endParaRPr lang="sv-SE" dirty="0"/>
+          </a:p>
+        </p:txBody>
+      </p:sp>
+      <p:sp>
+        <p:nvSpPr>
+          <p:cNvPr id="4" name="Platshållare för bildnummer 3"/>
+          <p:cNvSpPr>
+            <a:spLocks noGrp="1"/>
+          </p:cNvSpPr>
+          <p:nvPr>
+            <p:ph type="sldNum" sz="quarter" idx="10"/>
+          </p:nvPr>
+        </p:nvSpPr>
+        <p:spPr/>
+        <p:txBody>
+          <a:bodyPr/>
+          <a:lstStyle/>
+          <a:p>
+            <a:fld id="{8667F948-D2CB-486C-A2EA-FEABC2DAAE8D}" type="slidenum">
+              <a:rPr lang="sv-SE" smtClean="0"/>
+              <a:t>26</a:t>
+            </a:fld>
+            <a:endParaRPr lang="sv-SE"/>
+          </a:p>
+        </p:txBody>
+      </p:sp>
+    </p:spTree>
+    <p:extLst>
+      <p:ext uri="{BB962C8B-B14F-4D97-AF65-F5344CB8AC3E}">
+        <p14:creationId xmlns:p14="http://schemas.microsoft.com/office/powerpoint/2010/main" val="169751880"/>
+      </p:ext>
+    </p:extLst>
+  </p:cSld>
+  <p:clrMapOvr>
+    <a:masterClrMapping/>
+  </p:clrMapOvr>
+</p:notes>
+</file>
+
+<file path=ppt/notesSlides/notesSlide27.xml><?xml version="1.0" encoding="utf-8"?>
+<p:notes xmlns:a="http://schemas.openxmlformats.org/drawingml/2006/main" xmlns:r="http://schemas.openxmlformats.org/officeDocument/2006/relationships" xmlns:p="http://schemas.openxmlformats.org/presentationml/2006/main">
+  <p:cSld>
+    <p:spTree>
+      <p:nvGrpSpPr>
+        <p:cNvPr id="1" name=""/>
+        <p:cNvGrpSpPr/>
+        <p:nvPr/>
+      </p:nvGrpSpPr>
+      <p:grpSpPr>
+        <a:xfrm>
+          <a:off x="0" y="0"/>
+          <a:ext cx="0" cy="0"/>
+          <a:chOff x="0" y="0"/>
+          <a:chExt cx="0" cy="0"/>
+        </a:xfrm>
+      </p:grpSpPr>
+      <p:sp>
+        <p:nvSpPr>
+          <p:cNvPr id="2" name="Platshållare för bildobjekt 1"/>
+          <p:cNvSpPr>
+            <a:spLocks noGrp="1" noRot="1" noChangeAspect="1"/>
+          </p:cNvSpPr>
+          <p:nvPr>
+            <p:ph type="sldImg"/>
+          </p:nvPr>
+        </p:nvSpPr>
+        <p:spPr/>
+      </p:sp>
+      <p:sp>
+        <p:nvSpPr>
+          <p:cNvPr id="3" name="Platshållare för anteckningar 2"/>
+          <p:cNvSpPr>
+            <a:spLocks noGrp="1"/>
+          </p:cNvSpPr>
+          <p:nvPr>
+            <p:ph type="body" idx="1"/>
+          </p:nvPr>
+        </p:nvSpPr>
+        <p:spPr/>
+        <p:txBody>
+          <a:bodyPr/>
+          <a:lstStyle/>
+          <a:p>
+            <a:pPr marL="0" marR="0" lvl="0" indent="0" algn="l" defTabSz="914400" rtl="0" eaLnBrk="1" fontAlgn="auto" latinLnBrk="0" hangingPunct="1">
+              <a:lnSpc>
+                <a:spcPct val="100000"/>
+              </a:lnSpc>
+              <a:spcBef>
+                <a:spcPts val="0"/>
+              </a:spcBef>
+              <a:spcAft>
+                <a:spcPts val="0"/>
+              </a:spcAft>
+              <a:buClrTx/>
+              <a:buSzTx/>
+              <a:buFontTx/>
+              <a:buNone/>
+              <a:tabLst/>
+              <a:defRPr/>
+            </a:pPr>
+            <a:r>
+              <a:rPr lang="sv-SE" sz="1200" kern="1200" dirty="0">
+                <a:solidFill>
+                  <a:schemeClr val="tx1"/>
+                </a:solidFill>
+                <a:effectLst/>
+                <a:latin typeface="+mn-lt"/>
+                <a:ea typeface="+mn-ea"/>
+                <a:cs typeface="+mn-cs"/>
+              </a:rPr>
               <a:t>En kort presentation av hur ni gått tillväga för att testa koden med en profiler och vilka resultat ni fick fram. Även här är det viktigt att förhållas sig till måtten, inte bara presentera dem.</a:t>
             </a:r>
           </a:p>
@@ -2742,7 +2882,7 @@
           <a:p>
             <a:fld id="{8667F948-D2CB-486C-A2EA-FEABC2DAAE8D}" type="slidenum">
               <a:rPr lang="sv-SE" smtClean="0"/>
-              <a:t>26</a:t>
+              <a:t>27</a:t>
             </a:fld>
             <a:endParaRPr lang="sv-SE"/>
           </a:p>
@@ -2752,121 +2892,6 @@
     <p:extLst>
       <p:ext uri="{BB962C8B-B14F-4D97-AF65-F5344CB8AC3E}">
         <p14:creationId xmlns:p14="http://schemas.microsoft.com/office/powerpoint/2010/main" val="1278246246"/>
-      </p:ext>
-    </p:extLst>
-  </p:cSld>
-  <p:clrMapOvr>
-    <a:masterClrMapping/>
-  </p:clrMapOvr>
-</p:notes>
-</file>
-
-<file path=ppt/notesSlides/notesSlide27.xml><?xml version="1.0" encoding="utf-8"?>
-<p:notes xmlns:a="http://schemas.openxmlformats.org/drawingml/2006/main" xmlns:r="http://schemas.openxmlformats.org/officeDocument/2006/relationships" xmlns:p="http://schemas.openxmlformats.org/presentationml/2006/main">
-  <p:cSld>
-    <p:spTree>
-      <p:nvGrpSpPr>
-        <p:cNvPr id="1" name=""/>
-        <p:cNvGrpSpPr/>
-        <p:nvPr/>
-      </p:nvGrpSpPr>
-      <p:grpSpPr>
-        <a:xfrm>
-          <a:off x="0" y="0"/>
-          <a:ext cx="0" cy="0"/>
-          <a:chOff x="0" y="0"/>
-          <a:chExt cx="0" cy="0"/>
-        </a:xfrm>
-      </p:grpSpPr>
-      <p:sp>
-        <p:nvSpPr>
-          <p:cNvPr id="2" name="Platshållare för bildobjekt 1"/>
-          <p:cNvSpPr>
-            <a:spLocks noGrp="1" noRot="1" noChangeAspect="1"/>
-          </p:cNvSpPr>
-          <p:nvPr>
-            <p:ph type="sldImg"/>
-          </p:nvPr>
-        </p:nvSpPr>
-        <p:spPr/>
-      </p:sp>
-      <p:sp>
-        <p:nvSpPr>
-          <p:cNvPr id="3" name="Platshållare för anteckningar 2"/>
-          <p:cNvSpPr>
-            <a:spLocks noGrp="1"/>
-          </p:cNvSpPr>
-          <p:nvPr>
-            <p:ph type="body" idx="1"/>
-          </p:nvPr>
-        </p:nvSpPr>
-        <p:spPr/>
-        <p:txBody>
-          <a:bodyPr/>
-          <a:lstStyle/>
-          <a:p>
-            <a:pPr marL="0" marR="0" lvl="0" indent="0" algn="l" defTabSz="914400" rtl="0" eaLnBrk="1" fontAlgn="auto" latinLnBrk="0" hangingPunct="1">
-              <a:lnSpc>
-                <a:spcPct val="100000"/>
-              </a:lnSpc>
-              <a:spcBef>
-                <a:spcPts val="0"/>
-              </a:spcBef>
-              <a:spcAft>
-                <a:spcPts val="0"/>
-              </a:spcAft>
-              <a:buClrTx/>
-              <a:buSzTx/>
-              <a:buFontTx/>
-              <a:buNone/>
-              <a:tabLst/>
-              <a:defRPr/>
-            </a:pPr>
-            <a:r>
-              <a:rPr lang="sv-SE" sz="1200" kern="1200" dirty="0">
-                <a:solidFill>
-                  <a:schemeClr val="tx1"/>
-                </a:solidFill>
-                <a:effectLst/>
-                <a:latin typeface="+mn-lt"/>
-                <a:ea typeface="+mn-ea"/>
-                <a:cs typeface="+mn-cs"/>
-              </a:rPr>
-              <a:t>Byggscriptets första (seriösa) version, och den slutliga.</a:t>
-            </a:r>
-          </a:p>
-          <a:p>
-            <a:endParaRPr lang="sv-SE" dirty="0"/>
-          </a:p>
-        </p:txBody>
-      </p:sp>
-      <p:sp>
-        <p:nvSpPr>
-          <p:cNvPr id="4" name="Platshållare för bildnummer 3"/>
-          <p:cNvSpPr>
-            <a:spLocks noGrp="1"/>
-          </p:cNvSpPr>
-          <p:nvPr>
-            <p:ph type="sldNum" sz="quarter" idx="10"/>
-          </p:nvPr>
-        </p:nvSpPr>
-        <p:spPr/>
-        <p:txBody>
-          <a:bodyPr/>
-          <a:lstStyle/>
-          <a:p>
-            <a:fld id="{8667F948-D2CB-486C-A2EA-FEABC2DAAE8D}" type="slidenum">
-              <a:rPr lang="sv-SE" smtClean="0"/>
-              <a:t>28</a:t>
-            </a:fld>
-            <a:endParaRPr lang="sv-SE"/>
-          </a:p>
-        </p:txBody>
-      </p:sp>
-    </p:spTree>
-    <p:extLst>
-      <p:ext uri="{BB962C8B-B14F-4D97-AF65-F5344CB8AC3E}">
-        <p14:creationId xmlns:p14="http://schemas.microsoft.com/office/powerpoint/2010/main" val="109849433"/>
       </p:ext>
     </p:extLst>
   </p:cSld>
@@ -2947,7 +2972,7 @@
                 <a:ea typeface="+mn-ea"/>
                 <a:cs typeface="+mn-cs"/>
               </a:rPr>
-              <a:t>Här kan ni ta upp övrigt av relevans för bedömningen av ert arbete. Om avsnittet inte behövs kan det plockas bort.</a:t>
+              <a:t>Byggscriptets första (seriösa) version, och den slutliga.</a:t>
             </a:r>
           </a:p>
           <a:p>
@@ -2973,6 +2998,121 @@
             <a:fld id="{8667F948-D2CB-486C-A2EA-FEABC2DAAE8D}" type="slidenum">
               <a:rPr lang="sv-SE" smtClean="0"/>
               <a:t>29</a:t>
+            </a:fld>
+            <a:endParaRPr lang="sv-SE"/>
+          </a:p>
+        </p:txBody>
+      </p:sp>
+    </p:spTree>
+    <p:extLst>
+      <p:ext uri="{BB962C8B-B14F-4D97-AF65-F5344CB8AC3E}">
+        <p14:creationId xmlns:p14="http://schemas.microsoft.com/office/powerpoint/2010/main" val="109849433"/>
+      </p:ext>
+    </p:extLst>
+  </p:cSld>
+  <p:clrMapOvr>
+    <a:masterClrMapping/>
+  </p:clrMapOvr>
+</p:notes>
+</file>
+
+<file path=ppt/notesSlides/notesSlide29.xml><?xml version="1.0" encoding="utf-8"?>
+<p:notes xmlns:a="http://schemas.openxmlformats.org/drawingml/2006/main" xmlns:r="http://schemas.openxmlformats.org/officeDocument/2006/relationships" xmlns:p="http://schemas.openxmlformats.org/presentationml/2006/main">
+  <p:cSld>
+    <p:spTree>
+      <p:nvGrpSpPr>
+        <p:cNvPr id="1" name=""/>
+        <p:cNvGrpSpPr/>
+        <p:nvPr/>
+      </p:nvGrpSpPr>
+      <p:grpSpPr>
+        <a:xfrm>
+          <a:off x="0" y="0"/>
+          <a:ext cx="0" cy="0"/>
+          <a:chOff x="0" y="0"/>
+          <a:chExt cx="0" cy="0"/>
+        </a:xfrm>
+      </p:grpSpPr>
+      <p:sp>
+        <p:nvSpPr>
+          <p:cNvPr id="2" name="Platshållare för bildobjekt 1"/>
+          <p:cNvSpPr>
+            <a:spLocks noGrp="1" noRot="1" noChangeAspect="1"/>
+          </p:cNvSpPr>
+          <p:nvPr>
+            <p:ph type="sldImg"/>
+          </p:nvPr>
+        </p:nvSpPr>
+        <p:spPr/>
+      </p:sp>
+      <p:sp>
+        <p:nvSpPr>
+          <p:cNvPr id="3" name="Platshållare för anteckningar 2"/>
+          <p:cNvSpPr>
+            <a:spLocks noGrp="1"/>
+          </p:cNvSpPr>
+          <p:nvPr>
+            <p:ph type="body" idx="1"/>
+          </p:nvPr>
+        </p:nvSpPr>
+        <p:spPr/>
+        <p:txBody>
+          <a:bodyPr/>
+          <a:lstStyle/>
+          <a:p>
+            <a:pPr marL="0" marR="0" lvl="0" indent="0" algn="l" defTabSz="914400" rtl="0" eaLnBrk="1" fontAlgn="auto" latinLnBrk="0" hangingPunct="1">
+              <a:lnSpc>
+                <a:spcPct val="100000"/>
+              </a:lnSpc>
+              <a:spcBef>
+                <a:spcPts val="0"/>
+              </a:spcBef>
+              <a:spcAft>
+                <a:spcPts val="0"/>
+              </a:spcAft>
+              <a:buClrTx/>
+              <a:buSzTx/>
+              <a:buFontTx/>
+              <a:buNone/>
+              <a:tabLst/>
+              <a:defRPr/>
+            </a:pPr>
+            <a:r>
+              <a:rPr lang="sv-SE" sz="1200" kern="1200" dirty="0">
+                <a:solidFill>
+                  <a:schemeClr val="tx1"/>
+                </a:solidFill>
+                <a:effectLst/>
+                <a:latin typeface="+mn-lt"/>
+                <a:ea typeface="+mn-ea"/>
+                <a:cs typeface="+mn-cs"/>
+              </a:rPr>
+              <a:t>Här kan ni ta upp övrigt av relevans för bedömningen av ert arbete. Om avsnittet inte behövs kan det plockas bort.</a:t>
+            </a:r>
+          </a:p>
+          <a:p>
+            <a:endParaRPr lang="sv-SE" dirty="0"/>
+          </a:p>
+        </p:txBody>
+      </p:sp>
+      <p:sp>
+        <p:nvSpPr>
+          <p:cNvPr id="4" name="Platshållare för bildnummer 3"/>
+          <p:cNvSpPr>
+            <a:spLocks noGrp="1"/>
+          </p:cNvSpPr>
+          <p:nvPr>
+            <p:ph type="sldNum" sz="quarter" idx="10"/>
+          </p:nvPr>
+        </p:nvSpPr>
+        <p:spPr/>
+        <p:txBody>
+          <a:bodyPr/>
+          <a:lstStyle/>
+          <a:p>
+            <a:fld id="{8667F948-D2CB-486C-A2EA-FEABC2DAAE8D}" type="slidenum">
+              <a:rPr lang="sv-SE" smtClean="0"/>
+              <a:t>30</a:t>
             </a:fld>
             <a:endParaRPr lang="sv-SE"/>
           </a:p>
@@ -3922,7 +4062,7 @@
     </p:spTree>
     <p:extLst>
       <p:ext uri="{BB962C8B-B14F-4D97-AF65-F5344CB8AC3E}">
-        <p14:creationId xmlns:p14="http://schemas.microsoft.com/office/powerpoint/2010/main" val="3805628052"/>
+        <p14:creationId xmlns:p14="http://schemas.microsoft.com/office/powerpoint/2010/main" val="1515248308"/>
       </p:ext>
     </p:extLst>
   </p:cSld>
@@ -4103,7 +4243,7 @@
           <a:p>
             <a:fld id="{36FE6EAF-707E-454E-841A-E111EB854EEC}" type="slidenum">
               <a:rPr lang="sv-SE" smtClean="0"/>
-              <a:t>‹#›</a:t>
+              <a:t>‹Nr.›</a:t>
             </a:fld>
             <a:endParaRPr lang="sv-SE"/>
           </a:p>
@@ -4271,7 +4411,7 @@
           <a:p>
             <a:fld id="{36FE6EAF-707E-454E-841A-E111EB854EEC}" type="slidenum">
               <a:rPr lang="sv-SE" smtClean="0"/>
-              <a:t>‹#›</a:t>
+              <a:t>‹Nr.›</a:t>
             </a:fld>
             <a:endParaRPr lang="sv-SE"/>
           </a:p>
@@ -4449,7 +4589,7 @@
           <a:p>
             <a:fld id="{36FE6EAF-707E-454E-841A-E111EB854EEC}" type="slidenum">
               <a:rPr lang="sv-SE" smtClean="0"/>
-              <a:t>‹#›</a:t>
+              <a:t>‹Nr.›</a:t>
             </a:fld>
             <a:endParaRPr lang="sv-SE"/>
           </a:p>
@@ -4617,7 +4757,7 @@
           <a:p>
             <a:fld id="{36FE6EAF-707E-454E-841A-E111EB854EEC}" type="slidenum">
               <a:rPr lang="sv-SE" smtClean="0"/>
-              <a:t>‹#›</a:t>
+              <a:t>‹Nr.›</a:t>
             </a:fld>
             <a:endParaRPr lang="sv-SE"/>
           </a:p>
@@ -4862,7 +5002,7 @@
           <a:p>
             <a:fld id="{36FE6EAF-707E-454E-841A-E111EB854EEC}" type="slidenum">
               <a:rPr lang="sv-SE" smtClean="0"/>
-              <a:t>‹#›</a:t>
+              <a:t>‹Nr.›</a:t>
             </a:fld>
             <a:endParaRPr lang="sv-SE"/>
           </a:p>
@@ -5091,7 +5231,7 @@
           <a:p>
             <a:fld id="{36FE6EAF-707E-454E-841A-E111EB854EEC}" type="slidenum">
               <a:rPr lang="sv-SE" smtClean="0"/>
-              <a:t>‹#›</a:t>
+              <a:t>‹Nr.›</a:t>
             </a:fld>
             <a:endParaRPr lang="sv-SE"/>
           </a:p>
@@ -5455,7 +5595,7 @@
           <a:p>
             <a:fld id="{36FE6EAF-707E-454E-841A-E111EB854EEC}" type="slidenum">
               <a:rPr lang="sv-SE" smtClean="0"/>
-              <a:t>‹#›</a:t>
+              <a:t>‹Nr.›</a:t>
             </a:fld>
             <a:endParaRPr lang="sv-SE"/>
           </a:p>
@@ -5572,7 +5712,7 @@
           <a:p>
             <a:fld id="{36FE6EAF-707E-454E-841A-E111EB854EEC}" type="slidenum">
               <a:rPr lang="sv-SE" smtClean="0"/>
-              <a:t>‹#›</a:t>
+              <a:t>‹Nr.›</a:t>
             </a:fld>
             <a:endParaRPr lang="sv-SE"/>
           </a:p>
@@ -5667,7 +5807,7 @@
           <a:p>
             <a:fld id="{36FE6EAF-707E-454E-841A-E111EB854EEC}" type="slidenum">
               <a:rPr lang="sv-SE" smtClean="0"/>
-              <a:t>‹#›</a:t>
+              <a:t>‹Nr.›</a:t>
             </a:fld>
             <a:endParaRPr lang="sv-SE"/>
           </a:p>
@@ -5942,7 +6082,7 @@
           <a:p>
             <a:fld id="{36FE6EAF-707E-454E-841A-E111EB854EEC}" type="slidenum">
               <a:rPr lang="sv-SE" smtClean="0"/>
-              <a:t>‹#›</a:t>
+              <a:t>‹Nr.›</a:t>
             </a:fld>
             <a:endParaRPr lang="sv-SE"/>
           </a:p>
@@ -6194,7 +6334,7 @@
           <a:p>
             <a:fld id="{36FE6EAF-707E-454E-841A-E111EB854EEC}" type="slidenum">
               <a:rPr lang="sv-SE" smtClean="0"/>
-              <a:t>‹#›</a:t>
+              <a:t>‹Nr.›</a:t>
             </a:fld>
             <a:endParaRPr lang="sv-SE"/>
           </a:p>
@@ -6441,7 +6581,7 @@
           <a:p>
             <a:fld id="{36FE6EAF-707E-454E-841A-E111EB854EEC}" type="slidenum">
               <a:rPr lang="sv-SE" smtClean="0"/>
-              <a:t>‹#›</a:t>
+              <a:t>‹Nr.›</a:t>
             </a:fld>
             <a:endParaRPr lang="sv-SE"/>
           </a:p>
@@ -6957,6 +7097,176 @@
           </a:p>
         </p:txBody>
       </p:sp>
+      <p:pic>
+        <p:nvPicPr>
+          <p:cNvPr id="8" name="Platshållare för innehåll 7">
+            <a:extLst>
+              <a:ext uri="{FF2B5EF4-FFF2-40B4-BE49-F238E27FC236}">
+                <a16:creationId xmlns:a16="http://schemas.microsoft.com/office/drawing/2014/main" xmlns="" id="{F4151D08-FA9D-4AC1-8C53-E69308777791}"/>
+              </a:ext>
+            </a:extLst>
+          </p:cNvPr>
+          <p:cNvPicPr>
+            <a:picLocks noGrp="1" noChangeAspect="1"/>
+          </p:cNvPicPr>
+          <p:nvPr>
+            <p:ph sz="half" idx="2"/>
+          </p:nvPr>
+        </p:nvPicPr>
+        <p:blipFill>
+          <a:blip r:embed="rId4">
+            <a:extLst>
+              <a:ext uri="{28A0092B-C50C-407E-A947-70E740481C1C}">
+                <a14:useLocalDpi xmlns:a14="http://schemas.microsoft.com/office/drawing/2010/main" val="0"/>
+              </a:ext>
+            </a:extLst>
+          </a:blip>
+          <a:stretch>
+            <a:fillRect/>
+          </a:stretch>
+        </p:blipFill>
+        <p:spPr>
+          <a:xfrm>
+            <a:off x="0" y="2505075"/>
+            <a:ext cx="5771535" cy="1663802"/>
+          </a:xfrm>
+        </p:spPr>
+      </p:pic>
+      <p:sp>
+        <p:nvSpPr>
+          <p:cNvPr id="6" name="Platshållare för text 5"/>
+          <p:cNvSpPr>
+            <a:spLocks noGrp="1"/>
+          </p:cNvSpPr>
+          <p:nvPr>
+            <p:ph type="body" sz="quarter" idx="3"/>
+          </p:nvPr>
+        </p:nvSpPr>
+        <p:spPr/>
+        <p:txBody>
+          <a:bodyPr/>
+          <a:lstStyle/>
+          <a:p>
+            <a:r>
+              <a:rPr lang="sv-SE" dirty="0"/>
+              <a:t>Koden som testas</a:t>
+            </a:r>
+          </a:p>
+        </p:txBody>
+      </p:sp>
+      <p:pic>
+        <p:nvPicPr>
+          <p:cNvPr id="10" name="Platshållare för innehåll 9" descr="En bild som visar skärmbild&#10;&#10;Beskrivning genererad med mycket hög exakthet">
+            <a:extLst>
+              <a:ext uri="{FF2B5EF4-FFF2-40B4-BE49-F238E27FC236}">
+                <a16:creationId xmlns:a16="http://schemas.microsoft.com/office/drawing/2014/main" xmlns="" id="{C928B2DA-6F41-475E-9F6A-C1A7518CAFD0}"/>
+              </a:ext>
+            </a:extLst>
+          </p:cNvPr>
+          <p:cNvPicPr>
+            <a:picLocks noGrp="1" noChangeAspect="1"/>
+          </p:cNvPicPr>
+          <p:nvPr>
+            <p:ph sz="quarter" idx="4"/>
+          </p:nvPr>
+        </p:nvPicPr>
+        <p:blipFill>
+          <a:blip r:embed="rId5">
+            <a:extLst>
+              <a:ext uri="{28A0092B-C50C-407E-A947-70E740481C1C}">
+                <a14:useLocalDpi xmlns:a14="http://schemas.microsoft.com/office/drawing/2010/main" val="0"/>
+              </a:ext>
+            </a:extLst>
+          </a:blip>
+          <a:stretch>
+            <a:fillRect/>
+          </a:stretch>
+        </p:blipFill>
+        <p:spPr>
+          <a:xfrm>
+            <a:off x="5997574" y="2505074"/>
+            <a:ext cx="5269497" cy="3738409"/>
+          </a:xfrm>
+        </p:spPr>
+      </p:pic>
+    </p:spTree>
+    <p:custDataLst>
+      <p:tags r:id="rId1"/>
+    </p:custDataLst>
+    <p:extLst>
+      <p:ext uri="{BB962C8B-B14F-4D97-AF65-F5344CB8AC3E}">
+        <p14:creationId xmlns:p14="http://schemas.microsoft.com/office/powerpoint/2010/main" val="1161572908"/>
+      </p:ext>
+    </p:extLst>
+  </p:cSld>
+  <p:clrMapOvr>
+    <a:masterClrMapping/>
+  </p:clrMapOvr>
+</p:sld>
+</file>
+
+<file path=ppt/slides/slide11.xml><?xml version="1.0" encoding="utf-8"?>
+<p:sld xmlns:a="http://schemas.openxmlformats.org/drawingml/2006/main" xmlns:r="http://schemas.openxmlformats.org/officeDocument/2006/relationships" xmlns:p="http://schemas.openxmlformats.org/presentationml/2006/main">
+  <p:cSld>
+    <p:spTree>
+      <p:nvGrpSpPr>
+        <p:cNvPr id="1" name=""/>
+        <p:cNvGrpSpPr/>
+        <p:nvPr/>
+      </p:nvGrpSpPr>
+      <p:grpSpPr>
+        <a:xfrm>
+          <a:off x="0" y="0"/>
+          <a:ext cx="0" cy="0"/>
+          <a:chOff x="0" y="0"/>
+          <a:chExt cx="0" cy="0"/>
+        </a:xfrm>
+      </p:grpSpPr>
+      <p:sp>
+        <p:nvSpPr>
+          <p:cNvPr id="2" name="Rubrik 1"/>
+          <p:cNvSpPr>
+            <a:spLocks noGrp="1"/>
+          </p:cNvSpPr>
+          <p:nvPr>
+            <p:ph type="title"/>
+          </p:nvPr>
+        </p:nvSpPr>
+        <p:spPr/>
+        <p:txBody>
+          <a:bodyPr/>
+          <a:lstStyle/>
+          <a:p>
+            <a:r>
+              <a:rPr lang="sv-SE" dirty="0"/>
+              <a:t>TDD-exempel: Peter</a:t>
+            </a:r>
+          </a:p>
+        </p:txBody>
+      </p:sp>
+      <p:sp>
+        <p:nvSpPr>
+          <p:cNvPr id="4" name="Platshållare för text 3"/>
+          <p:cNvSpPr>
+            <a:spLocks noGrp="1"/>
+          </p:cNvSpPr>
+          <p:nvPr>
+            <p:ph type="body" idx="1"/>
+          </p:nvPr>
+        </p:nvSpPr>
+        <p:spPr/>
+        <p:txBody>
+          <a:bodyPr/>
+          <a:lstStyle/>
+          <a:p>
+            <a:r>
+              <a:rPr lang="sv-SE" dirty="0" err="1"/>
+              <a:t>Testkod</a:t>
+            </a:r>
+            <a:endParaRPr lang="sv-SE" dirty="0"/>
+          </a:p>
+        </p:txBody>
+      </p:sp>
       <p:sp>
         <p:nvSpPr>
           <p:cNvPr id="6" name="Platshållare för text 5"/>
@@ -6984,7 +7294,7 @@
           <p:cNvPr id="18" name="Platshållare för innehåll 17" descr="En bild som visar skärmbild&#10;&#10;Beskrivning genererad med hög exakthet">
             <a:extLst>
               <a:ext uri="{FF2B5EF4-FFF2-40B4-BE49-F238E27FC236}">
-                <a16:creationId xmlns:a16="http://schemas.microsoft.com/office/drawing/2014/main" id="{CE98ADE7-97A3-46F9-BEDC-A38E54C3E1E8}"/>
+                <a16:creationId xmlns:a16="http://schemas.microsoft.com/office/drawing/2014/main" xmlns="" id="{CE98ADE7-97A3-46F9-BEDC-A38E54C3E1E8}"/>
               </a:ext>
             </a:extLst>
           </p:cNvPr>
@@ -7019,7 +7329,7 @@
           <p:cNvPr id="22" name="Platshållare för innehåll 21">
             <a:extLst>
               <a:ext uri="{FF2B5EF4-FFF2-40B4-BE49-F238E27FC236}">
-                <a16:creationId xmlns:a16="http://schemas.microsoft.com/office/drawing/2014/main" id="{5C3327C6-EFFD-46F1-97F7-D99EDFD25B6E}"/>
+                <a16:creationId xmlns:a16="http://schemas.microsoft.com/office/drawing/2014/main" xmlns="" id="{5C3327C6-EFFD-46F1-97F7-D99EDFD25B6E}"/>
               </a:ext>
             </a:extLst>
           </p:cNvPr>
@@ -7065,80 +7375,6 @@
 </p:sld>
 </file>
 
-<file path=ppt/slides/slide11.xml><?xml version="1.0" encoding="utf-8"?>
-<p:sld xmlns:a="http://schemas.openxmlformats.org/drawingml/2006/main" xmlns:r="http://schemas.openxmlformats.org/officeDocument/2006/relationships" xmlns:p="http://schemas.openxmlformats.org/presentationml/2006/main">
-  <p:cSld>
-    <p:spTree>
-      <p:nvGrpSpPr>
-        <p:cNvPr id="1" name=""/>
-        <p:cNvGrpSpPr/>
-        <p:nvPr/>
-      </p:nvGrpSpPr>
-      <p:grpSpPr>
-        <a:xfrm>
-          <a:off x="0" y="0"/>
-          <a:ext cx="0" cy="0"/>
-          <a:chOff x="0" y="0"/>
-          <a:chExt cx="0" cy="0"/>
-        </a:xfrm>
-      </p:grpSpPr>
-      <p:sp>
-        <p:nvSpPr>
-          <p:cNvPr id="9" name="Rubrik 8"/>
-          <p:cNvSpPr>
-            <a:spLocks noGrp="1"/>
-          </p:cNvSpPr>
-          <p:nvPr>
-            <p:ph type="title"/>
-          </p:nvPr>
-        </p:nvSpPr>
-        <p:spPr/>
-        <p:txBody>
-          <a:bodyPr/>
-          <a:lstStyle/>
-          <a:p>
-            <a:r>
-              <a:rPr lang="sv-SE" dirty="0"/>
-              <a:t>TDD erfarenheter</a:t>
-            </a:r>
-          </a:p>
-        </p:txBody>
-      </p:sp>
-      <p:sp>
-        <p:nvSpPr>
-          <p:cNvPr id="10" name="Platshållare för innehåll 9"/>
-          <p:cNvSpPr>
-            <a:spLocks noGrp="1"/>
-          </p:cNvSpPr>
-          <p:nvPr>
-            <p:ph idx="1"/>
-          </p:nvPr>
-        </p:nvSpPr>
-        <p:spPr/>
-        <p:txBody>
-          <a:bodyPr/>
-          <a:lstStyle/>
-          <a:p>
-            <a:endParaRPr lang="sv-SE" dirty="0"/>
-          </a:p>
-        </p:txBody>
-      </p:sp>
-    </p:spTree>
-    <p:custDataLst>
-      <p:tags r:id="rId1"/>
-    </p:custDataLst>
-    <p:extLst>
-      <p:ext uri="{BB962C8B-B14F-4D97-AF65-F5344CB8AC3E}">
-        <p14:creationId xmlns:p14="http://schemas.microsoft.com/office/powerpoint/2010/main" val="1458286633"/>
-      </p:ext>
-    </p:extLst>
-  </p:cSld>
-  <p:clrMapOvr>
-    <a:masterClrMapping/>
-  </p:clrMapOvr>
-</p:sld>
-</file>
-
 <file path=ppt/slides/slide12.xml><?xml version="1.0" encoding="utf-8"?>
 <p:sld xmlns:a="http://schemas.openxmlformats.org/drawingml/2006/main" xmlns:r="http://schemas.openxmlformats.org/officeDocument/2006/relationships" xmlns:p="http://schemas.openxmlformats.org/presentationml/2006/main">
   <p:cSld>
@@ -7203,7 +7439,7 @@
     </p:custDataLst>
     <p:extLst>
       <p:ext uri="{BB962C8B-B14F-4D97-AF65-F5344CB8AC3E}">
-        <p14:creationId xmlns:p14="http://schemas.microsoft.com/office/powerpoint/2010/main" val="3632093194"/>
+        <p14:creationId xmlns:p14="http://schemas.microsoft.com/office/powerpoint/2010/main" val="1458286633"/>
       </p:ext>
     </p:extLst>
   </p:cSld>
@@ -7277,7 +7513,7 @@
     </p:custDataLst>
     <p:extLst>
       <p:ext uri="{BB962C8B-B14F-4D97-AF65-F5344CB8AC3E}">
-        <p14:creationId xmlns:p14="http://schemas.microsoft.com/office/powerpoint/2010/main" val="3311918635"/>
+        <p14:creationId xmlns:p14="http://schemas.microsoft.com/office/powerpoint/2010/main" val="3632093194"/>
       </p:ext>
     </p:extLst>
   </p:cSld>
@@ -7306,6 +7542,80 @@
       </p:grpSpPr>
       <p:sp>
         <p:nvSpPr>
+          <p:cNvPr id="9" name="Rubrik 8"/>
+          <p:cNvSpPr>
+            <a:spLocks noGrp="1"/>
+          </p:cNvSpPr>
+          <p:nvPr>
+            <p:ph type="title"/>
+          </p:nvPr>
+        </p:nvSpPr>
+        <p:spPr/>
+        <p:txBody>
+          <a:bodyPr/>
+          <a:lstStyle/>
+          <a:p>
+            <a:r>
+              <a:rPr lang="sv-SE" dirty="0"/>
+              <a:t>TDD erfarenheter</a:t>
+            </a:r>
+          </a:p>
+        </p:txBody>
+      </p:sp>
+      <p:sp>
+        <p:nvSpPr>
+          <p:cNvPr id="10" name="Platshållare för innehåll 9"/>
+          <p:cNvSpPr>
+            <a:spLocks noGrp="1"/>
+          </p:cNvSpPr>
+          <p:nvPr>
+            <p:ph idx="1"/>
+          </p:nvPr>
+        </p:nvSpPr>
+        <p:spPr/>
+        <p:txBody>
+          <a:bodyPr/>
+          <a:lstStyle/>
+          <a:p>
+            <a:endParaRPr lang="sv-SE" dirty="0"/>
+          </a:p>
+        </p:txBody>
+      </p:sp>
+    </p:spTree>
+    <p:custDataLst>
+      <p:tags r:id="rId1"/>
+    </p:custDataLst>
+    <p:extLst>
+      <p:ext uri="{BB962C8B-B14F-4D97-AF65-F5344CB8AC3E}">
+        <p14:creationId xmlns:p14="http://schemas.microsoft.com/office/powerpoint/2010/main" val="3311918635"/>
+      </p:ext>
+    </p:extLst>
+  </p:cSld>
+  <p:clrMapOvr>
+    <a:masterClrMapping/>
+  </p:clrMapOvr>
+</p:sld>
+</file>
+
+<file path=ppt/slides/slide15.xml><?xml version="1.0" encoding="utf-8"?>
+<p:sld xmlns:a="http://schemas.openxmlformats.org/drawingml/2006/main" xmlns:r="http://schemas.openxmlformats.org/officeDocument/2006/relationships" xmlns:p="http://schemas.openxmlformats.org/presentationml/2006/main">
+  <p:cSld>
+    <p:spTree>
+      <p:nvGrpSpPr>
+        <p:cNvPr id="1" name=""/>
+        <p:cNvGrpSpPr/>
+        <p:nvPr/>
+      </p:nvGrpSpPr>
+      <p:grpSpPr>
+        <a:xfrm>
+          <a:off x="0" y="0"/>
+          <a:ext cx="0" cy="0"/>
+          <a:chOff x="0" y="0"/>
+          <a:chExt cx="0" cy="0"/>
+        </a:xfrm>
+      </p:grpSpPr>
+      <p:sp>
+        <p:nvSpPr>
           <p:cNvPr id="2" name="Rubrik 1"/>
           <p:cNvSpPr>
             <a:spLocks noGrp="1"/>
@@ -7404,7 +7714,7 @@
 </p:sld>
 </file>
 
-<file path=ppt/slides/slide15.xml><?xml version="1.0" encoding="utf-8"?>
+<file path=ppt/slides/slide16.xml><?xml version="1.0" encoding="utf-8"?>
 <p:sld xmlns:a="http://schemas.openxmlformats.org/drawingml/2006/main" xmlns:r="http://schemas.openxmlformats.org/officeDocument/2006/relationships" xmlns:p="http://schemas.openxmlformats.org/presentationml/2006/main">
   <p:cSld>
     <p:spTree>
@@ -7492,80 +7802,6 @@
 </p:sld>
 </file>
 
-<file path=ppt/slides/slide16.xml><?xml version="1.0" encoding="utf-8"?>
-<p:sld xmlns:a="http://schemas.openxmlformats.org/drawingml/2006/main" xmlns:r="http://schemas.openxmlformats.org/officeDocument/2006/relationships" xmlns:p="http://schemas.openxmlformats.org/presentationml/2006/main">
-  <p:cSld>
-    <p:spTree>
-      <p:nvGrpSpPr>
-        <p:cNvPr id="1" name=""/>
-        <p:cNvGrpSpPr/>
-        <p:nvPr/>
-      </p:nvGrpSpPr>
-      <p:grpSpPr>
-        <a:xfrm>
-          <a:off x="0" y="0"/>
-          <a:ext cx="0" cy="0"/>
-          <a:chOff x="0" y="0"/>
-          <a:chExt cx="0" cy="0"/>
-        </a:xfrm>
-      </p:grpSpPr>
-      <p:sp>
-        <p:nvSpPr>
-          <p:cNvPr id="2" name="Rubrik 1"/>
-          <p:cNvSpPr>
-            <a:spLocks noGrp="1"/>
-          </p:cNvSpPr>
-          <p:nvPr>
-            <p:ph type="title"/>
-          </p:nvPr>
-        </p:nvSpPr>
-        <p:spPr/>
-        <p:txBody>
-          <a:bodyPr/>
-          <a:lstStyle/>
-          <a:p>
-            <a:r>
-              <a:rPr lang="sv-SE" dirty="0"/>
-              <a:t>Tillståndsmaskiner</a:t>
-            </a:r>
-          </a:p>
-        </p:txBody>
-      </p:sp>
-      <p:sp>
-        <p:nvSpPr>
-          <p:cNvPr id="3" name="Platshållare för innehåll 2"/>
-          <p:cNvSpPr>
-            <a:spLocks noGrp="1"/>
-          </p:cNvSpPr>
-          <p:nvPr>
-            <p:ph idx="1"/>
-          </p:nvPr>
-        </p:nvSpPr>
-        <p:spPr/>
-        <p:txBody>
-          <a:bodyPr/>
-          <a:lstStyle/>
-          <a:p>
-            <a:endParaRPr lang="sv-SE"/>
-          </a:p>
-        </p:txBody>
-      </p:sp>
-    </p:spTree>
-    <p:custDataLst>
-      <p:tags r:id="rId1"/>
-    </p:custDataLst>
-    <p:extLst>
-      <p:ext uri="{BB962C8B-B14F-4D97-AF65-F5344CB8AC3E}">
-        <p14:creationId xmlns:p14="http://schemas.microsoft.com/office/powerpoint/2010/main" val="1230194705"/>
-      </p:ext>
-    </p:extLst>
-  </p:cSld>
-  <p:clrMapOvr>
-    <a:masterClrMapping/>
-  </p:clrMapOvr>
-</p:sld>
-</file>
-
 <file path=ppt/slides/slide17.xml><?xml version="1.0" encoding="utf-8"?>
 <p:sld xmlns:a="http://schemas.openxmlformats.org/drawingml/2006/main" xmlns:r="http://schemas.openxmlformats.org/officeDocument/2006/relationships" xmlns:p="http://schemas.openxmlformats.org/presentationml/2006/main">
   <p:cSld>
@@ -7600,7 +7836,7 @@
           <a:p>
             <a:r>
               <a:rPr lang="sv-SE" dirty="0"/>
-              <a:t>Tillståndsmaskinen</a:t>
+              <a:t>Tillståndsmaskiner</a:t>
             </a:r>
           </a:p>
         </p:txBody>
@@ -7630,7 +7866,7 @@
     </p:custDataLst>
     <p:extLst>
       <p:ext uri="{BB962C8B-B14F-4D97-AF65-F5344CB8AC3E}">
-        <p14:creationId xmlns:p14="http://schemas.microsoft.com/office/powerpoint/2010/main" val="2924590265"/>
+        <p14:creationId xmlns:p14="http://schemas.microsoft.com/office/powerpoint/2010/main" val="1230194705"/>
       </p:ext>
     </p:extLst>
   </p:cSld>
@@ -7674,7 +7910,7 @@
           <a:p>
             <a:r>
               <a:rPr lang="sv-SE" dirty="0"/>
-              <a:t>Testfall</a:t>
+              <a:t>Tillståndsmaskinen</a:t>
             </a:r>
           </a:p>
         </p:txBody>
@@ -7694,35 +7930,7 @@
           <a:bodyPr/>
           <a:lstStyle/>
           <a:p>
-            <a:r>
-              <a:rPr lang="sv-SE" dirty="0"/>
-              <a:t>Karaktären kan droppa item under </a:t>
-            </a:r>
-            <a:r>
-              <a:rPr lang="sv-SE" dirty="0" err="1"/>
-              <a:t>combat</a:t>
-            </a:r>
-            <a:r>
-              <a:rPr lang="sv-SE" dirty="0"/>
-              <a:t>.</a:t>
-            </a:r>
-          </a:p>
-          <a:p>
-            <a:r>
-              <a:rPr lang="sv-SE" dirty="0"/>
-              <a:t>Karaktären kan inte plocka upp item under </a:t>
-            </a:r>
-            <a:r>
-              <a:rPr lang="sv-SE" dirty="0" err="1"/>
-              <a:t>combat</a:t>
-            </a:r>
-            <a:r>
-              <a:rPr lang="sv-SE" dirty="0"/>
-              <a:t>.</a:t>
-            </a:r>
-          </a:p>
-          <a:p>
-            <a:endParaRPr lang="sv-SE" dirty="0"/>
+            <a:endParaRPr lang="sv-SE"/>
           </a:p>
         </p:txBody>
       </p:sp>
@@ -7732,7 +7940,7 @@
     </p:custDataLst>
     <p:extLst>
       <p:ext uri="{BB962C8B-B14F-4D97-AF65-F5344CB8AC3E}">
-        <p14:creationId xmlns:p14="http://schemas.microsoft.com/office/powerpoint/2010/main" val="1268711775"/>
+        <p14:creationId xmlns:p14="http://schemas.microsoft.com/office/powerpoint/2010/main" val="2924590265"/>
       </p:ext>
     </p:extLst>
   </p:cSld>
@@ -7776,7 +7984,7 @@
           <a:p>
             <a:r>
               <a:rPr lang="sv-SE" dirty="0"/>
-              <a:t>Testmatris</a:t>
+              <a:t>Testfall</a:t>
             </a:r>
           </a:p>
         </p:txBody>
@@ -7796,7 +8004,35 @@
           <a:bodyPr/>
           <a:lstStyle/>
           <a:p>
-            <a:endParaRPr lang="sv-SE"/>
+            <a:r>
+              <a:rPr lang="sv-SE" dirty="0"/>
+              <a:t>Karaktären kan droppa item under </a:t>
+            </a:r>
+            <a:r>
+              <a:rPr lang="sv-SE" dirty="0" err="1"/>
+              <a:t>combat</a:t>
+            </a:r>
+            <a:r>
+              <a:rPr lang="sv-SE" dirty="0"/>
+              <a:t>.</a:t>
+            </a:r>
+          </a:p>
+          <a:p>
+            <a:r>
+              <a:rPr lang="sv-SE" dirty="0"/>
+              <a:t>Karaktären kan inte plocka upp item under </a:t>
+            </a:r>
+            <a:r>
+              <a:rPr lang="sv-SE" dirty="0" err="1"/>
+              <a:t>combat</a:t>
+            </a:r>
+            <a:r>
+              <a:rPr lang="sv-SE" dirty="0"/>
+              <a:t>.</a:t>
+            </a:r>
+          </a:p>
+          <a:p>
+            <a:endParaRPr lang="sv-SE" dirty="0"/>
           </a:p>
         </p:txBody>
       </p:sp>
@@ -7806,7 +8042,7 @@
     </p:custDataLst>
     <p:extLst>
       <p:ext uri="{BB962C8B-B14F-4D97-AF65-F5344CB8AC3E}">
-        <p14:creationId xmlns:p14="http://schemas.microsoft.com/office/powerpoint/2010/main" val="2129764329"/>
+        <p14:creationId xmlns:p14="http://schemas.microsoft.com/office/powerpoint/2010/main" val="1268711775"/>
       </p:ext>
     </p:extLst>
   </p:cSld>
@@ -8110,7 +8346,7 @@
           <a:p>
             <a:r>
               <a:rPr lang="sv-SE" dirty="0"/>
-              <a:t>Granskning</a:t>
+              <a:t>Testmatris</a:t>
             </a:r>
           </a:p>
         </p:txBody>
@@ -8140,7 +8376,7 @@
     </p:custDataLst>
     <p:extLst>
       <p:ext uri="{BB962C8B-B14F-4D97-AF65-F5344CB8AC3E}">
-        <p14:creationId xmlns:p14="http://schemas.microsoft.com/office/powerpoint/2010/main" val="3427005653"/>
+        <p14:creationId xmlns:p14="http://schemas.microsoft.com/office/powerpoint/2010/main" val="2129764329"/>
       </p:ext>
     </p:extLst>
   </p:cSld>
@@ -8184,7 +8420,7 @@
           <a:p>
             <a:r>
               <a:rPr lang="sv-SE" dirty="0"/>
-              <a:t>Granskningsrapport</a:t>
+              <a:t>Granskning</a:t>
             </a:r>
           </a:p>
         </p:txBody>
@@ -8214,7 +8450,7 @@
     </p:custDataLst>
     <p:extLst>
       <p:ext uri="{BB962C8B-B14F-4D97-AF65-F5344CB8AC3E}">
-        <p14:creationId xmlns:p14="http://schemas.microsoft.com/office/powerpoint/2010/main" val="3874197174"/>
+        <p14:creationId xmlns:p14="http://schemas.microsoft.com/office/powerpoint/2010/main" val="3427005653"/>
       </p:ext>
     </p:extLst>
   </p:cSld>
@@ -8258,7 +8494,7 @@
           <a:p>
             <a:r>
               <a:rPr lang="sv-SE" dirty="0"/>
-              <a:t>Erfarenheter av granskning</a:t>
+              <a:t>Granskningsrapport</a:t>
             </a:r>
           </a:p>
         </p:txBody>
@@ -8288,7 +8524,7 @@
     </p:custDataLst>
     <p:extLst>
       <p:ext uri="{BB962C8B-B14F-4D97-AF65-F5344CB8AC3E}">
-        <p14:creationId xmlns:p14="http://schemas.microsoft.com/office/powerpoint/2010/main" val="724679724"/>
+        <p14:creationId xmlns:p14="http://schemas.microsoft.com/office/powerpoint/2010/main" val="3874197174"/>
       </p:ext>
     </p:extLst>
   </p:cSld>
@@ -8332,7 +8568,7 @@
           <a:p>
             <a:r>
               <a:rPr lang="sv-SE" dirty="0"/>
-              <a:t>Kodkritiksystem</a:t>
+              <a:t>Erfarenheter av granskning</a:t>
             </a:r>
           </a:p>
         </p:txBody>
@@ -8362,7 +8598,7 @@
     </p:custDataLst>
     <p:extLst>
       <p:ext uri="{BB962C8B-B14F-4D97-AF65-F5344CB8AC3E}">
-        <p14:creationId xmlns:p14="http://schemas.microsoft.com/office/powerpoint/2010/main" val="847618868"/>
+        <p14:creationId xmlns:p14="http://schemas.microsoft.com/office/powerpoint/2010/main" val="724679724"/>
       </p:ext>
     </p:extLst>
   </p:cSld>
@@ -8406,6 +8642,80 @@
           <a:p>
             <a:r>
               <a:rPr lang="sv-SE" dirty="0"/>
+              <a:t>Kodkritiksystem</a:t>
+            </a:r>
+          </a:p>
+        </p:txBody>
+      </p:sp>
+      <p:sp>
+        <p:nvSpPr>
+          <p:cNvPr id="3" name="Platshållare för innehåll 2"/>
+          <p:cNvSpPr>
+            <a:spLocks noGrp="1"/>
+          </p:cNvSpPr>
+          <p:nvPr>
+            <p:ph idx="1"/>
+          </p:nvPr>
+        </p:nvSpPr>
+        <p:spPr/>
+        <p:txBody>
+          <a:bodyPr/>
+          <a:lstStyle/>
+          <a:p>
+            <a:endParaRPr lang="sv-SE"/>
+          </a:p>
+        </p:txBody>
+      </p:sp>
+    </p:spTree>
+    <p:custDataLst>
+      <p:tags r:id="rId1"/>
+    </p:custDataLst>
+    <p:extLst>
+      <p:ext uri="{BB962C8B-B14F-4D97-AF65-F5344CB8AC3E}">
+        <p14:creationId xmlns:p14="http://schemas.microsoft.com/office/powerpoint/2010/main" val="847618868"/>
+      </p:ext>
+    </p:extLst>
+  </p:cSld>
+  <p:clrMapOvr>
+    <a:masterClrMapping/>
+  </p:clrMapOvr>
+</p:sld>
+</file>
+
+<file path=ppt/slides/slide25.xml><?xml version="1.0" encoding="utf-8"?>
+<p:sld xmlns:a="http://schemas.openxmlformats.org/drawingml/2006/main" xmlns:r="http://schemas.openxmlformats.org/officeDocument/2006/relationships" xmlns:p="http://schemas.openxmlformats.org/presentationml/2006/main">
+  <p:cSld>
+    <p:spTree>
+      <p:nvGrpSpPr>
+        <p:cNvPr id="1" name=""/>
+        <p:cNvGrpSpPr/>
+        <p:nvPr/>
+      </p:nvGrpSpPr>
+      <p:grpSpPr>
+        <a:xfrm>
+          <a:off x="0" y="0"/>
+          <a:ext cx="0" cy="0"/>
+          <a:chOff x="0" y="0"/>
+          <a:chExt cx="0" cy="0"/>
+        </a:xfrm>
+      </p:grpSpPr>
+      <p:sp>
+        <p:nvSpPr>
+          <p:cNvPr id="2" name="Rubrik 1"/>
+          <p:cNvSpPr>
+            <a:spLocks noGrp="1"/>
+          </p:cNvSpPr>
+          <p:nvPr>
+            <p:ph type="title"/>
+          </p:nvPr>
+        </p:nvSpPr>
+        <p:spPr/>
+        <p:txBody>
+          <a:bodyPr/>
+          <a:lstStyle/>
+          <a:p>
+            <a:r>
+              <a:rPr lang="sv-SE" dirty="0"/>
               <a:t>Statiska mått</a:t>
             </a:r>
           </a:p>
@@ -8446,7 +8756,7 @@
 </p:sld>
 </file>
 
-<file path=ppt/slides/slide25.xml><?xml version="1.0" encoding="utf-8"?>
+<file path=ppt/slides/slide26.xml><?xml version="1.0" encoding="utf-8"?>
 <p:sld xmlns:a="http://schemas.openxmlformats.org/drawingml/2006/main" xmlns:r="http://schemas.openxmlformats.org/officeDocument/2006/relationships" xmlns:p="http://schemas.openxmlformats.org/presentationml/2006/main">
   <p:cSld>
     <p:spTree>
@@ -8530,80 +8840,6 @@
 </p:sld>
 </file>
 
-<file path=ppt/slides/slide26.xml><?xml version="1.0" encoding="utf-8"?>
-<p:sld xmlns:a="http://schemas.openxmlformats.org/drawingml/2006/main" xmlns:r="http://schemas.openxmlformats.org/officeDocument/2006/relationships" xmlns:p="http://schemas.openxmlformats.org/presentationml/2006/main">
-  <p:cSld>
-    <p:spTree>
-      <p:nvGrpSpPr>
-        <p:cNvPr id="1" name=""/>
-        <p:cNvGrpSpPr/>
-        <p:nvPr/>
-      </p:nvGrpSpPr>
-      <p:grpSpPr>
-        <a:xfrm>
-          <a:off x="0" y="0"/>
-          <a:ext cx="0" cy="0"/>
-          <a:chOff x="0" y="0"/>
-          <a:chExt cx="0" cy="0"/>
-        </a:xfrm>
-      </p:grpSpPr>
-      <p:sp>
-        <p:nvSpPr>
-          <p:cNvPr id="2" name="Rubrik 1"/>
-          <p:cNvSpPr>
-            <a:spLocks noGrp="1"/>
-          </p:cNvSpPr>
-          <p:nvPr>
-            <p:ph type="title"/>
-          </p:nvPr>
-        </p:nvSpPr>
-        <p:spPr/>
-        <p:txBody>
-          <a:bodyPr/>
-          <a:lstStyle/>
-          <a:p>
-            <a:r>
-              <a:rPr lang="sv-SE" dirty="0"/>
-              <a:t>Profiler</a:t>
-            </a:r>
-          </a:p>
-        </p:txBody>
-      </p:sp>
-      <p:sp>
-        <p:nvSpPr>
-          <p:cNvPr id="3" name="Platshållare för innehåll 2"/>
-          <p:cNvSpPr>
-            <a:spLocks noGrp="1"/>
-          </p:cNvSpPr>
-          <p:nvPr>
-            <p:ph idx="1"/>
-          </p:nvPr>
-        </p:nvSpPr>
-        <p:spPr/>
-        <p:txBody>
-          <a:bodyPr/>
-          <a:lstStyle/>
-          <a:p>
-            <a:endParaRPr lang="sv-SE"/>
-          </a:p>
-        </p:txBody>
-      </p:sp>
-    </p:spTree>
-    <p:custDataLst>
-      <p:tags r:id="rId1"/>
-    </p:custDataLst>
-    <p:extLst>
-      <p:ext uri="{BB962C8B-B14F-4D97-AF65-F5344CB8AC3E}">
-        <p14:creationId xmlns:p14="http://schemas.microsoft.com/office/powerpoint/2010/main" val="4124232571"/>
-      </p:ext>
-    </p:extLst>
-  </p:cSld>
-  <p:clrMapOvr>
-    <a:masterClrMapping/>
-  </p:clrMapOvr>
-</p:sld>
-</file>
-
 <file path=ppt/slides/slide27.xml><?xml version="1.0" encoding="utf-8"?>
 <p:sld xmlns:a="http://schemas.openxmlformats.org/drawingml/2006/main" xmlns:r="http://schemas.openxmlformats.org/officeDocument/2006/relationships" xmlns:p="http://schemas.openxmlformats.org/presentationml/2006/main">
   <p:cSld>
@@ -8621,66 +8857,54 @@
           <a:chExt cx="0" cy="0"/>
         </a:xfrm>
       </p:grpSpPr>
-      <p:pic>
-        <p:nvPicPr>
-          <p:cNvPr id="4" name="Platshållare för innehåll 3"/>
-          <p:cNvPicPr>
-            <a:picLocks noGrp="1" noChangeAspect="1"/>
-          </p:cNvPicPr>
+      <p:sp>
+        <p:nvSpPr>
+          <p:cNvPr id="2" name="Rubrik 1"/>
+          <p:cNvSpPr>
+            <a:spLocks noGrp="1"/>
+          </p:cNvSpPr>
+          <p:nvPr>
+            <p:ph type="title"/>
+          </p:nvPr>
+        </p:nvSpPr>
+        <p:spPr/>
+        <p:txBody>
+          <a:bodyPr/>
+          <a:lstStyle/>
+          <a:p>
+            <a:r>
+              <a:rPr lang="sv-SE" dirty="0"/>
+              <a:t>Profiler</a:t>
+            </a:r>
+          </a:p>
+        </p:txBody>
+      </p:sp>
+      <p:sp>
+        <p:nvSpPr>
+          <p:cNvPr id="3" name="Platshållare för innehåll 2"/>
+          <p:cNvSpPr>
+            <a:spLocks noGrp="1"/>
+          </p:cNvSpPr>
           <p:nvPr>
             <p:ph idx="1"/>
           </p:nvPr>
-        </p:nvPicPr>
-        <p:blipFill>
-          <a:blip r:embed="rId2">
-            <a:extLst>
-              <a:ext uri="{28A0092B-C50C-407E-A947-70E740481C1C}">
-                <a14:useLocalDpi xmlns:a14="http://schemas.microsoft.com/office/drawing/2010/main" val="0"/>
-              </a:ext>
-            </a:extLst>
-          </a:blip>
-          <a:stretch>
-            <a:fillRect/>
-          </a:stretch>
-        </p:blipFill>
-        <p:spPr>
-          <a:xfrm>
-            <a:off x="3460831" y="0"/>
-            <a:ext cx="8731170" cy="6830210"/>
-          </a:xfrm>
-        </p:spPr>
-      </p:pic>
-      <p:sp>
-        <p:nvSpPr>
-          <p:cNvPr id="5" name="Rubrik 1"/>
-          <p:cNvSpPr>
-            <a:spLocks noGrp="1"/>
-          </p:cNvSpPr>
-          <p:nvPr>
-            <p:ph type="title"/>
-          </p:nvPr>
-        </p:nvSpPr>
-        <p:spPr>
-          <a:xfrm>
-            <a:off x="-134074" y="2610613"/>
-            <a:ext cx="10515600" cy="1325563"/>
-          </a:xfrm>
-        </p:spPr>
-        <p:txBody>
-          <a:bodyPr/>
-          <a:lstStyle/>
-          <a:p>
-            <a:r>
-              <a:rPr lang="sv-SE" dirty="0"/>
-              <a:t>Byggscript före</a:t>
-            </a:r>
+        </p:nvSpPr>
+        <p:spPr/>
+        <p:txBody>
+          <a:bodyPr/>
+          <a:lstStyle/>
+          <a:p>
+            <a:endParaRPr lang="sv-SE"/>
           </a:p>
         </p:txBody>
       </p:sp>
     </p:spTree>
+    <p:custDataLst>
+      <p:tags r:id="rId1"/>
+    </p:custDataLst>
     <p:extLst>
       <p:ext uri="{BB962C8B-B14F-4D97-AF65-F5344CB8AC3E}">
-        <p14:creationId xmlns:p14="http://schemas.microsoft.com/office/powerpoint/2010/main" val="170185678"/>
+        <p14:creationId xmlns:p14="http://schemas.microsoft.com/office/powerpoint/2010/main" val="4124232571"/>
       </p:ext>
     </p:extLst>
   </p:cSld>
@@ -8707,6 +8931,92 @@
           <a:chExt cx="0" cy="0"/>
         </a:xfrm>
       </p:grpSpPr>
+      <p:pic>
+        <p:nvPicPr>
+          <p:cNvPr id="4" name="Platshållare för innehåll 3"/>
+          <p:cNvPicPr>
+            <a:picLocks noGrp="1" noChangeAspect="1"/>
+          </p:cNvPicPr>
+          <p:nvPr>
+            <p:ph idx="1"/>
+          </p:nvPr>
+        </p:nvPicPr>
+        <p:blipFill>
+          <a:blip r:embed="rId2">
+            <a:extLst>
+              <a:ext uri="{28A0092B-C50C-407E-A947-70E740481C1C}">
+                <a14:useLocalDpi xmlns:a14="http://schemas.microsoft.com/office/drawing/2010/main" val="0"/>
+              </a:ext>
+            </a:extLst>
+          </a:blip>
+          <a:stretch>
+            <a:fillRect/>
+          </a:stretch>
+        </p:blipFill>
+        <p:spPr>
+          <a:xfrm>
+            <a:off x="3460831" y="0"/>
+            <a:ext cx="8731170" cy="6830210"/>
+          </a:xfrm>
+        </p:spPr>
+      </p:pic>
+      <p:sp>
+        <p:nvSpPr>
+          <p:cNvPr id="5" name="Rubrik 1"/>
+          <p:cNvSpPr>
+            <a:spLocks noGrp="1"/>
+          </p:cNvSpPr>
+          <p:nvPr>
+            <p:ph type="title"/>
+          </p:nvPr>
+        </p:nvSpPr>
+        <p:spPr>
+          <a:xfrm>
+            <a:off x="-134074" y="2610613"/>
+            <a:ext cx="10515600" cy="1325563"/>
+          </a:xfrm>
+        </p:spPr>
+        <p:txBody>
+          <a:bodyPr/>
+          <a:lstStyle/>
+          <a:p>
+            <a:r>
+              <a:rPr lang="sv-SE" dirty="0"/>
+              <a:t>Byggscript före</a:t>
+            </a:r>
+          </a:p>
+        </p:txBody>
+      </p:sp>
+    </p:spTree>
+    <p:extLst>
+      <p:ext uri="{BB962C8B-B14F-4D97-AF65-F5344CB8AC3E}">
+        <p14:creationId xmlns:p14="http://schemas.microsoft.com/office/powerpoint/2010/main" val="170185678"/>
+      </p:ext>
+    </p:extLst>
+  </p:cSld>
+  <p:clrMapOvr>
+    <a:masterClrMapping/>
+  </p:clrMapOvr>
+</p:sld>
+</file>
+
+<file path=ppt/slides/slide29.xml><?xml version="1.0" encoding="utf-8"?>
+<p:sld xmlns:a="http://schemas.openxmlformats.org/drawingml/2006/main" xmlns:r="http://schemas.openxmlformats.org/officeDocument/2006/relationships" xmlns:p="http://schemas.openxmlformats.org/presentationml/2006/main">
+  <p:cSld>
+    <p:spTree>
+      <p:nvGrpSpPr>
+        <p:cNvPr id="1" name=""/>
+        <p:cNvGrpSpPr/>
+        <p:nvPr/>
+      </p:nvGrpSpPr>
+      <p:grpSpPr>
+        <a:xfrm>
+          <a:off x="0" y="0"/>
+          <a:ext cx="0" cy="0"/>
+          <a:chOff x="0" y="0"/>
+          <a:chExt cx="0" cy="0"/>
+        </a:xfrm>
+      </p:grpSpPr>
       <p:sp>
         <p:nvSpPr>
           <p:cNvPr id="9" name="Rubrik 1"/>
@@ -8768,7 +9078,7 @@
           <p:cNvPr id="2" name="Pil: höger 1">
             <a:extLst>
               <a:ext uri="{FF2B5EF4-FFF2-40B4-BE49-F238E27FC236}">
-                <a16:creationId xmlns:a16="http://schemas.microsoft.com/office/drawing/2014/main" id="{5BED2071-56FA-4E12-93ED-D5F1E015E9AB}"/>
+                <a16:creationId xmlns:a16="http://schemas.microsoft.com/office/drawing/2014/main" xmlns="" id="{5BED2071-56FA-4E12-93ED-D5F1E015E9AB}"/>
               </a:ext>
             </a:extLst>
           </p:cNvPr>
@@ -8838,7 +9148,7 @@
           <p:cNvPr id="5" name="Pil: höger 4">
             <a:extLst>
               <a:ext uri="{FF2B5EF4-FFF2-40B4-BE49-F238E27FC236}">
-                <a16:creationId xmlns:a16="http://schemas.microsoft.com/office/drawing/2014/main" id="{DC33DE33-4EEE-4AAE-971A-9ECC8EEE5EF1}"/>
+                <a16:creationId xmlns:a16="http://schemas.microsoft.com/office/drawing/2014/main" xmlns="" id="{DC33DE33-4EEE-4AAE-971A-9ECC8EEE5EF1}"/>
               </a:ext>
             </a:extLst>
           </p:cNvPr>
@@ -8908,7 +9218,7 @@
           <p:cNvPr id="6" name="Pil: höger 5">
             <a:extLst>
               <a:ext uri="{FF2B5EF4-FFF2-40B4-BE49-F238E27FC236}">
-                <a16:creationId xmlns:a16="http://schemas.microsoft.com/office/drawing/2014/main" id="{079D7526-A6BE-430A-8F83-1E17E1718B8F}"/>
+                <a16:creationId xmlns:a16="http://schemas.microsoft.com/office/drawing/2014/main" xmlns="" id="{079D7526-A6BE-430A-8F83-1E17E1718B8F}"/>
               </a:ext>
             </a:extLst>
           </p:cNvPr>
@@ -8978,7 +9288,7 @@
           <p:cNvPr id="7" name="Pil: höger 6">
             <a:extLst>
               <a:ext uri="{FF2B5EF4-FFF2-40B4-BE49-F238E27FC236}">
-                <a16:creationId xmlns:a16="http://schemas.microsoft.com/office/drawing/2014/main" id="{C612D35E-3946-4792-9C94-3ADB79886997}"/>
+                <a16:creationId xmlns:a16="http://schemas.microsoft.com/office/drawing/2014/main" xmlns="" id="{C612D35E-3946-4792-9C94-3ADB79886997}"/>
               </a:ext>
             </a:extLst>
           </p:cNvPr>
@@ -9048,7 +9358,7 @@
           <p:cNvPr id="8" name="Pil: höger 7">
             <a:extLst>
               <a:ext uri="{FF2B5EF4-FFF2-40B4-BE49-F238E27FC236}">
-                <a16:creationId xmlns:a16="http://schemas.microsoft.com/office/drawing/2014/main" id="{5BD09438-3B93-47E0-BC3B-379F80A1ECA7}"/>
+                <a16:creationId xmlns:a16="http://schemas.microsoft.com/office/drawing/2014/main" xmlns="" id="{5BD09438-3B93-47E0-BC3B-379F80A1ECA7}"/>
               </a:ext>
             </a:extLst>
           </p:cNvPr>
@@ -9118,7 +9428,7 @@
           <p:cNvPr id="10" name="Pil: höger 9">
             <a:extLst>
               <a:ext uri="{FF2B5EF4-FFF2-40B4-BE49-F238E27FC236}">
-                <a16:creationId xmlns:a16="http://schemas.microsoft.com/office/drawing/2014/main" id="{5E1CDCBD-85A1-479E-827B-CE49B4497796}"/>
+                <a16:creationId xmlns:a16="http://schemas.microsoft.com/office/drawing/2014/main" xmlns="" id="{5E1CDCBD-85A1-479E-827B-CE49B4497796}"/>
               </a:ext>
             </a:extLst>
           </p:cNvPr>
@@ -9188,7 +9498,7 @@
           <p:cNvPr id="12" name="Pil: höger 11">
             <a:extLst>
               <a:ext uri="{FF2B5EF4-FFF2-40B4-BE49-F238E27FC236}">
-                <a16:creationId xmlns:a16="http://schemas.microsoft.com/office/drawing/2014/main" id="{8731D112-5CF6-4435-8FC0-5ABB9AFA1AC7}"/>
+                <a16:creationId xmlns:a16="http://schemas.microsoft.com/office/drawing/2014/main" xmlns="" id="{8731D112-5CF6-4435-8FC0-5ABB9AFA1AC7}"/>
               </a:ext>
             </a:extLst>
           </p:cNvPr>
@@ -9258,7 +9568,7 @@
           <p:cNvPr id="13" name="Pil: höger 12">
             <a:extLst>
               <a:ext uri="{FF2B5EF4-FFF2-40B4-BE49-F238E27FC236}">
-                <a16:creationId xmlns:a16="http://schemas.microsoft.com/office/drawing/2014/main" id="{6353E274-CA98-4BA5-9F0C-F86B0EAE5578}"/>
+                <a16:creationId xmlns:a16="http://schemas.microsoft.com/office/drawing/2014/main" xmlns="" id="{6353E274-CA98-4BA5-9F0C-F86B0EAE5578}"/>
               </a:ext>
             </a:extLst>
           </p:cNvPr>
@@ -9339,80 +9649,6 @@
 </p:sld>
 </file>
 
-<file path=ppt/slides/slide29.xml><?xml version="1.0" encoding="utf-8"?>
-<p:sld xmlns:a="http://schemas.openxmlformats.org/drawingml/2006/main" xmlns:r="http://schemas.openxmlformats.org/officeDocument/2006/relationships" xmlns:p="http://schemas.openxmlformats.org/presentationml/2006/main">
-  <p:cSld>
-    <p:spTree>
-      <p:nvGrpSpPr>
-        <p:cNvPr id="1" name=""/>
-        <p:cNvGrpSpPr/>
-        <p:nvPr/>
-      </p:nvGrpSpPr>
-      <p:grpSpPr>
-        <a:xfrm>
-          <a:off x="0" y="0"/>
-          <a:ext cx="0" cy="0"/>
-          <a:chOff x="0" y="0"/>
-          <a:chExt cx="0" cy="0"/>
-        </a:xfrm>
-      </p:grpSpPr>
-      <p:sp>
-        <p:nvSpPr>
-          <p:cNvPr id="2" name="Rubrik 1"/>
-          <p:cNvSpPr>
-            <a:spLocks noGrp="1"/>
-          </p:cNvSpPr>
-          <p:nvPr>
-            <p:ph type="title"/>
-          </p:nvPr>
-        </p:nvSpPr>
-        <p:spPr/>
-        <p:txBody>
-          <a:bodyPr/>
-          <a:lstStyle/>
-          <a:p>
-            <a:r>
-              <a:rPr lang="sv-SE" dirty="0"/>
-              <a:t>Övrigt</a:t>
-            </a:r>
-          </a:p>
-        </p:txBody>
-      </p:sp>
-      <p:sp>
-        <p:nvSpPr>
-          <p:cNvPr id="3" name="Platshållare för innehåll 2"/>
-          <p:cNvSpPr>
-            <a:spLocks noGrp="1"/>
-          </p:cNvSpPr>
-          <p:nvPr>
-            <p:ph idx="1"/>
-          </p:nvPr>
-        </p:nvSpPr>
-        <p:spPr/>
-        <p:txBody>
-          <a:bodyPr/>
-          <a:lstStyle/>
-          <a:p>
-            <a:endParaRPr lang="sv-SE"/>
-          </a:p>
-        </p:txBody>
-      </p:sp>
-    </p:spTree>
-    <p:custDataLst>
-      <p:tags r:id="rId1"/>
-    </p:custDataLst>
-    <p:extLst>
-      <p:ext uri="{BB962C8B-B14F-4D97-AF65-F5344CB8AC3E}">
-        <p14:creationId xmlns:p14="http://schemas.microsoft.com/office/powerpoint/2010/main" val="3016223473"/>
-      </p:ext>
-    </p:extLst>
-  </p:cSld>
-  <p:clrMapOvr>
-    <a:masterClrMapping/>
-  </p:clrMapOvr>
-</p:sld>
-</file>
-
 <file path=ppt/slides/slide3.xml><?xml version="1.0" encoding="utf-8"?>
 <p:sld xmlns:a="http://schemas.openxmlformats.org/drawingml/2006/main" xmlns:r="http://schemas.openxmlformats.org/officeDocument/2006/relationships" xmlns:p="http://schemas.openxmlformats.org/presentationml/2006/main">
   <p:cSld>
@@ -9478,6 +9714,80 @@
     <p:extLst>
       <p:ext uri="{BB962C8B-B14F-4D97-AF65-F5344CB8AC3E}">
         <p14:creationId xmlns:p14="http://schemas.microsoft.com/office/powerpoint/2010/main" val="3617610750"/>
+      </p:ext>
+    </p:extLst>
+  </p:cSld>
+  <p:clrMapOvr>
+    <a:masterClrMapping/>
+  </p:clrMapOvr>
+</p:sld>
+</file>
+
+<file path=ppt/slides/slide30.xml><?xml version="1.0" encoding="utf-8"?>
+<p:sld xmlns:a="http://schemas.openxmlformats.org/drawingml/2006/main" xmlns:r="http://schemas.openxmlformats.org/officeDocument/2006/relationships" xmlns:p="http://schemas.openxmlformats.org/presentationml/2006/main">
+  <p:cSld>
+    <p:spTree>
+      <p:nvGrpSpPr>
+        <p:cNvPr id="1" name=""/>
+        <p:cNvGrpSpPr/>
+        <p:nvPr/>
+      </p:nvGrpSpPr>
+      <p:grpSpPr>
+        <a:xfrm>
+          <a:off x="0" y="0"/>
+          <a:ext cx="0" cy="0"/>
+          <a:chOff x="0" y="0"/>
+          <a:chExt cx="0" cy="0"/>
+        </a:xfrm>
+      </p:grpSpPr>
+      <p:sp>
+        <p:nvSpPr>
+          <p:cNvPr id="2" name="Rubrik 1"/>
+          <p:cNvSpPr>
+            <a:spLocks noGrp="1"/>
+          </p:cNvSpPr>
+          <p:nvPr>
+            <p:ph type="title"/>
+          </p:nvPr>
+        </p:nvSpPr>
+        <p:spPr/>
+        <p:txBody>
+          <a:bodyPr/>
+          <a:lstStyle/>
+          <a:p>
+            <a:r>
+              <a:rPr lang="sv-SE" dirty="0"/>
+              <a:t>Övrigt</a:t>
+            </a:r>
+          </a:p>
+        </p:txBody>
+      </p:sp>
+      <p:sp>
+        <p:nvSpPr>
+          <p:cNvPr id="3" name="Platshållare för innehåll 2"/>
+          <p:cNvSpPr>
+            <a:spLocks noGrp="1"/>
+          </p:cNvSpPr>
+          <p:nvPr>
+            <p:ph idx="1"/>
+          </p:nvPr>
+        </p:nvSpPr>
+        <p:spPr/>
+        <p:txBody>
+          <a:bodyPr/>
+          <a:lstStyle/>
+          <a:p>
+            <a:endParaRPr lang="sv-SE"/>
+          </a:p>
+        </p:txBody>
+      </p:sp>
+    </p:spTree>
+    <p:custDataLst>
+      <p:tags r:id="rId1"/>
+    </p:custDataLst>
+    <p:extLst>
+      <p:ext uri="{BB962C8B-B14F-4D97-AF65-F5344CB8AC3E}">
+        <p14:creationId xmlns:p14="http://schemas.microsoft.com/office/powerpoint/2010/main" val="3016223473"/>
       </p:ext>
     </p:extLst>
   </p:cSld>
@@ -9586,7 +9896,7 @@
           <p:cNvPr id="8" name="Rectangle 2">
             <a:extLst>
               <a:ext uri="{FF2B5EF4-FFF2-40B4-BE49-F238E27FC236}">
-                <a16:creationId xmlns:a16="http://schemas.microsoft.com/office/drawing/2014/main" id="{1FC9AD1E-4A52-4998-A5A3-BAEC1C827718}"/>
+                <a16:creationId xmlns:a16="http://schemas.microsoft.com/office/drawing/2014/main" xmlns="" id="{1FC9AD1E-4A52-4998-A5A3-BAEC1C827718}"/>
               </a:ext>
             </a:extLst>
           </p:cNvPr>
@@ -10101,7 +10411,7 @@
           <p:cNvPr id="12" name="Rectangle 2">
             <a:extLst>
               <a:ext uri="{FF2B5EF4-FFF2-40B4-BE49-F238E27FC236}">
-                <a16:creationId xmlns:a16="http://schemas.microsoft.com/office/drawing/2014/main" id="{390B7AF8-02CC-4EF9-A9A5-59849FC5BA99}"/>
+                <a16:creationId xmlns:a16="http://schemas.microsoft.com/office/drawing/2014/main" xmlns="" id="{390B7AF8-02CC-4EF9-A9A5-59849FC5BA99}"/>
               </a:ext>
             </a:extLst>
           </p:cNvPr>
@@ -10174,6 +10484,20 @@
               <a:buNone/>
               <a:tabLst/>
             </a:pPr>
+            <a:r>
+              <a:rPr kumimoji="0" lang="sv-SE" altLang="sv-SE" sz="1000" b="0" i="0" u="none" strike="noStrike" cap="none" normalizeH="0" baseline="0" dirty="0">
+                <a:ln>
+                  <a:noFill/>
+                </a:ln>
+                <a:solidFill>
+                  <a:srgbClr val="A9B7C6"/>
+                </a:solidFill>
+                <a:effectLst/>
+                <a:latin typeface="Courier New" panose="02070309020205020404" pitchFamily="49" charset="0"/>
+                <a:cs typeface="Courier New" panose="02070309020205020404" pitchFamily="49" charset="0"/>
+              </a:rPr>
+              <a:t/>
+            </a:r>
             <a:br>
               <a:rPr kumimoji="0" lang="sv-SE" altLang="sv-SE" sz="1000" b="0" i="0" u="none" strike="noStrike" cap="none" normalizeH="0" baseline="0" dirty="0">
                 <a:ln>
@@ -11724,6 +12048,20 @@
                 <a:cs typeface="Courier New" panose="02070309020205020404" pitchFamily="49" charset="0"/>
               </a:rPr>
             </a:br>
+            <a:r>
+              <a:rPr kumimoji="0" lang="sv-SE" altLang="sv-SE" sz="1000" b="0" i="0" u="none" strike="noStrike" cap="none" normalizeH="0" baseline="0" dirty="0">
+                <a:ln>
+                  <a:noFill/>
+                </a:ln>
+                <a:solidFill>
+                  <a:srgbClr val="CC7832"/>
+                </a:solidFill>
+                <a:effectLst/>
+                <a:latin typeface="Courier New" panose="02070309020205020404" pitchFamily="49" charset="0"/>
+                <a:cs typeface="Courier New" panose="02070309020205020404" pitchFamily="49" charset="0"/>
+              </a:rPr>
+              <a:t/>
+            </a:r>
             <a:br>
               <a:rPr kumimoji="0" lang="sv-SE" altLang="sv-SE" sz="1000" b="0" i="0" u="none" strike="noStrike" cap="none" normalizeH="0" baseline="0" dirty="0">
                 <a:ln>
@@ -11764,6 +12102,20 @@
                 <a:cs typeface="Courier New" panose="02070309020205020404" pitchFamily="49" charset="0"/>
               </a:rPr>
             </a:br>
+            <a:r>
+              <a:rPr kumimoji="0" lang="sv-SE" altLang="sv-SE" sz="1000" b="0" i="0" u="none" strike="noStrike" cap="none" normalizeH="0" baseline="0" dirty="0">
+                <a:ln>
+                  <a:noFill/>
+                </a:ln>
+                <a:solidFill>
+                  <a:srgbClr val="A9B7C6"/>
+                </a:solidFill>
+                <a:effectLst/>
+                <a:latin typeface="Courier New" panose="02070309020205020404" pitchFamily="49" charset="0"/>
+                <a:cs typeface="Courier New" panose="02070309020205020404" pitchFamily="49" charset="0"/>
+              </a:rPr>
+              <a:t/>
+            </a:r>
             <a:br>
               <a:rPr kumimoji="0" lang="sv-SE" altLang="sv-SE" sz="1000" b="0" i="0" u="none" strike="noStrike" cap="none" normalizeH="0" baseline="0" dirty="0">
                 <a:ln>
@@ -12704,7 +13056,7 @@
           <p:cNvPr id="13" name="Rectangle 3">
             <a:extLst>
               <a:ext uri="{FF2B5EF4-FFF2-40B4-BE49-F238E27FC236}">
-                <a16:creationId xmlns:a16="http://schemas.microsoft.com/office/drawing/2014/main" id="{C08EF8EF-E887-46B2-8D83-1FD183E46154}"/>
+                <a16:creationId xmlns:a16="http://schemas.microsoft.com/office/drawing/2014/main" xmlns="" id="{C08EF8EF-E887-46B2-8D83-1FD183E46154}"/>
               </a:ext>
             </a:extLst>
           </p:cNvPr>
@@ -13341,7 +13693,7 @@
           <p:cNvPr id="7" name="Rectangle 1">
             <a:extLst>
               <a:ext uri="{FF2B5EF4-FFF2-40B4-BE49-F238E27FC236}">
-                <a16:creationId xmlns:a16="http://schemas.microsoft.com/office/drawing/2014/main" id="{3199D4B4-952F-47D5-A8B5-DFCEF934D87B}"/>
+                <a16:creationId xmlns:a16="http://schemas.microsoft.com/office/drawing/2014/main" xmlns="" id="{3199D4B4-952F-47D5-A8B5-DFCEF934D87B}"/>
               </a:ext>
             </a:extLst>
           </p:cNvPr>
@@ -13824,6 +14176,20 @@
                 <a:cs typeface="Courier New" panose="02070309020205020404" pitchFamily="49" charset="0"/>
               </a:rPr>
             </a:br>
+            <a:r>
+              <a:rPr kumimoji="0" lang="sv-SE" altLang="sv-SE" sz="1000" b="0" i="0" u="none" strike="noStrike" cap="none" normalizeH="0" baseline="0">
+                <a:ln>
+                  <a:noFill/>
+                </a:ln>
+                <a:solidFill>
+                  <a:srgbClr val="A9B7C6"/>
+                </a:solidFill>
+                <a:effectLst/>
+                <a:latin typeface="Courier New" panose="02070309020205020404" pitchFamily="49" charset="0"/>
+                <a:cs typeface="Courier New" panose="02070309020205020404" pitchFamily="49" charset="0"/>
+              </a:rPr>
+              <a:t/>
+            </a:r>
             <a:br>
               <a:rPr kumimoji="0" lang="sv-SE" altLang="sv-SE" sz="1000" b="0" i="0" u="none" strike="noStrike" cap="none" normalizeH="0" baseline="0">
                 <a:ln>
@@ -14265,6 +14631,20 @@
                 <a:cs typeface="Courier New" panose="02070309020205020404" pitchFamily="49" charset="0"/>
               </a:rPr>
             </a:br>
+            <a:r>
+              <a:rPr kumimoji="0" lang="sv-SE" altLang="sv-SE" sz="1000" b="0" i="0" u="none" strike="noStrike" cap="none" normalizeH="0" baseline="0">
+                <a:ln>
+                  <a:noFill/>
+                </a:ln>
+                <a:solidFill>
+                  <a:srgbClr val="A9B7C6"/>
+                </a:solidFill>
+                <a:effectLst/>
+                <a:latin typeface="Courier New" panose="02070309020205020404" pitchFamily="49" charset="0"/>
+                <a:cs typeface="Courier New" panose="02070309020205020404" pitchFamily="49" charset="0"/>
+              </a:rPr>
+              <a:t/>
+            </a:r>
             <a:br>
               <a:rPr kumimoji="0" lang="sv-SE" altLang="sv-SE" sz="1000" b="0" i="0" u="none" strike="noStrike" cap="none" normalizeH="0" baseline="0">
                 <a:ln>
@@ -15060,25 +15440,35 @@
           </a:p>
         </p:txBody>
       </p:sp>
-      <p:sp>
-        <p:nvSpPr>
-          <p:cNvPr id="5" name="Platshållare för innehåll 4"/>
-          <p:cNvSpPr>
-            <a:spLocks noGrp="1"/>
-          </p:cNvSpPr>
+      <p:pic>
+        <p:nvPicPr>
+          <p:cNvPr id="3" name="Platshållare för innehåll 2"/>
+          <p:cNvPicPr>
+            <a:picLocks noGrp="1" noChangeAspect="1"/>
+          </p:cNvPicPr>
           <p:nvPr>
             <p:ph sz="half" idx="2"/>
           </p:nvPr>
-        </p:nvSpPr>
-        <p:spPr/>
-        <p:txBody>
-          <a:bodyPr/>
-          <a:lstStyle/>
-          <a:p>
-            <a:endParaRPr lang="sv-SE"/>
-          </a:p>
-        </p:txBody>
-      </p:sp>
+        </p:nvPicPr>
+        <p:blipFill>
+          <a:blip r:embed="rId4">
+            <a:extLst>
+              <a:ext uri="{28A0092B-C50C-407E-A947-70E740481C1C}">
+                <a14:useLocalDpi xmlns:a14="http://schemas.microsoft.com/office/drawing/2010/main" val="0"/>
+              </a:ext>
+            </a:extLst>
+          </a:blip>
+          <a:stretch>
+            <a:fillRect/>
+          </a:stretch>
+        </p:blipFill>
+        <p:spPr>
+          <a:xfrm>
+            <a:off x="109729" y="1280160"/>
+            <a:ext cx="6136476" cy="5577840"/>
+          </a:xfrm>
+        </p:spPr>
+      </p:pic>
       <p:sp>
         <p:nvSpPr>
           <p:cNvPr id="6" name="Platshållare för text 5"/>
@@ -15101,25 +15491,35 @@
           </a:p>
         </p:txBody>
       </p:sp>
-      <p:sp>
-        <p:nvSpPr>
-          <p:cNvPr id="7" name="Platshållare för innehåll 6"/>
-          <p:cNvSpPr>
-            <a:spLocks noGrp="1"/>
-          </p:cNvSpPr>
+      <p:pic>
+        <p:nvPicPr>
+          <p:cNvPr id="8" name="Platshållare för innehåll 7"/>
+          <p:cNvPicPr>
+            <a:picLocks noGrp="1" noChangeAspect="1"/>
+          </p:cNvPicPr>
           <p:nvPr>
             <p:ph sz="quarter" idx="4"/>
           </p:nvPr>
-        </p:nvSpPr>
-        <p:spPr/>
-        <p:txBody>
-          <a:bodyPr/>
-          <a:lstStyle/>
-          <a:p>
-            <a:endParaRPr lang="sv-SE"/>
-          </a:p>
-        </p:txBody>
-      </p:sp>
+        </p:nvPicPr>
+        <p:blipFill>
+          <a:blip r:embed="rId5">
+            <a:extLst>
+              <a:ext uri="{28A0092B-C50C-407E-A947-70E740481C1C}">
+                <a14:useLocalDpi xmlns:a14="http://schemas.microsoft.com/office/drawing/2010/main" val="0"/>
+              </a:ext>
+            </a:extLst>
+          </a:blip>
+          <a:stretch>
+            <a:fillRect/>
+          </a:stretch>
+        </p:blipFill>
+        <p:spPr>
+          <a:xfrm>
+            <a:off x="6246204" y="2497148"/>
+            <a:ext cx="5183188" cy="1845924"/>
+          </a:xfrm>
+        </p:spPr>
+      </p:pic>
     </p:spTree>
     <p:custDataLst>
       <p:tags r:id="rId1"/>
@@ -15170,7 +15570,7 @@
           <a:p>
             <a:r>
               <a:rPr lang="sv-SE" dirty="0"/>
-              <a:t>TDD-exempel: Peter</a:t>
+              <a:t>TDD-exempel: Oscar</a:t>
             </a:r>
           </a:p>
         </p:txBody>
@@ -15200,13 +15600,7 @@
       </p:sp>
       <p:pic>
         <p:nvPicPr>
-          <p:cNvPr id="8" name="Platshållare för innehåll 7">
-            <a:extLst>
-              <a:ext uri="{FF2B5EF4-FFF2-40B4-BE49-F238E27FC236}">
-                <a16:creationId xmlns:a16="http://schemas.microsoft.com/office/drawing/2014/main" id="{F4151D08-FA9D-4AC1-8C53-E69308777791}"/>
-              </a:ext>
-            </a:extLst>
-          </p:cNvPr>
+          <p:cNvPr id="3" name="Platshållare för innehåll 2"/>
           <p:cNvPicPr>
             <a:picLocks noGrp="1" noChangeAspect="1"/>
           </p:cNvPicPr>
@@ -15228,8 +15622,8 @@
         </p:blipFill>
         <p:spPr>
           <a:xfrm>
-            <a:off x="0" y="2505075"/>
-            <a:ext cx="5771535" cy="1663802"/>
+            <a:off x="191545" y="2449132"/>
+            <a:ext cx="5980655" cy="3390836"/>
           </a:xfrm>
         </p:spPr>
       </p:pic>
@@ -15257,13 +15651,7 @@
       </p:sp>
       <p:pic>
         <p:nvPicPr>
-          <p:cNvPr id="10" name="Platshållare för innehåll 9" descr="En bild som visar skärmbild&#10;&#10;Beskrivning genererad med mycket hög exakthet">
-            <a:extLst>
-              <a:ext uri="{FF2B5EF4-FFF2-40B4-BE49-F238E27FC236}">
-                <a16:creationId xmlns:a16="http://schemas.microsoft.com/office/drawing/2014/main" id="{C928B2DA-6F41-475E-9F6A-C1A7518CAFD0}"/>
-              </a:ext>
-            </a:extLst>
-          </p:cNvPr>
+          <p:cNvPr id="8" name="Platshållare för innehåll 7"/>
           <p:cNvPicPr>
             <a:picLocks noGrp="1" noChangeAspect="1"/>
           </p:cNvPicPr>
@@ -15285,8 +15673,8 @@
         </p:blipFill>
         <p:spPr>
           <a:xfrm>
-            <a:off x="5997574" y="2505074"/>
-            <a:ext cx="5269497" cy="3738409"/>
+            <a:off x="6172200" y="3998594"/>
+            <a:ext cx="5183188" cy="697550"/>
           </a:xfrm>
         </p:spPr>
       </p:pic>
@@ -15296,7 +15684,7 @@
     </p:custDataLst>
     <p:extLst>
       <p:ext uri="{BB962C8B-B14F-4D97-AF65-F5344CB8AC3E}">
-        <p14:creationId xmlns:p14="http://schemas.microsoft.com/office/powerpoint/2010/main" val="1161572908"/>
+        <p14:creationId xmlns:p14="http://schemas.microsoft.com/office/powerpoint/2010/main" val="1472292606"/>
       </p:ext>
     </p:extLst>
   </p:cSld>
@@ -15440,6 +15828,12 @@
 </file>
 
 <file path=ppt/tags/tag3.xml><?xml version="1.0" encoding="utf-8"?>
+<p:tagLst xmlns:a="http://schemas.openxmlformats.org/drawingml/2006/main" xmlns:r="http://schemas.openxmlformats.org/officeDocument/2006/relationships" xmlns:p="http://schemas.openxmlformats.org/presentationml/2006/main">
+  <p:tag name="ARTICULATE_SLIDE_THUMBNAIL_REFRESH" val="1"/>
+</p:tagLst>
+</file>
+
+<file path=ppt/tags/tag30.xml><?xml version="1.0" encoding="utf-8"?>
 <p:tagLst xmlns:a="http://schemas.openxmlformats.org/drawingml/2006/main" xmlns:r="http://schemas.openxmlformats.org/officeDocument/2006/relationships" xmlns:p="http://schemas.openxmlformats.org/presentationml/2006/main">
   <p:tag name="ARTICULATE_SLIDE_THUMBNAIL_REFRESH" val="1"/>
 </p:tagLst>

</xml_diff>

<commit_message>
ändrat kodkritiksystem till FindBugs då jag äntligen fått det att fungera som jag vill
</commit_message>
<xml_diff>
--- a/01 Dokumentation/slutredovisning.pptx
+++ b/01 Dokumentation/slutredovisning.pptx
@@ -395,7 +395,7 @@
           <a:p>
             <a:fld id="{8667F948-D2CB-486C-A2EA-FEABC2DAAE8D}" type="slidenum">
               <a:rPr lang="sv-SE" smtClean="0"/>
-              <a:t>‹#›</a:t>
+              <a:t>‹Nr.›</a:t>
             </a:fld>
             <a:endParaRPr lang="sv-SE"/>
           </a:p>
@@ -4247,7 +4247,7 @@
           <a:p>
             <a:fld id="{36FE6EAF-707E-454E-841A-E111EB854EEC}" type="slidenum">
               <a:rPr lang="sv-SE" smtClean="0"/>
-              <a:t>‹#›</a:t>
+              <a:t>‹Nr.›</a:t>
             </a:fld>
             <a:endParaRPr lang="sv-SE"/>
           </a:p>
@@ -4415,7 +4415,7 @@
           <a:p>
             <a:fld id="{36FE6EAF-707E-454E-841A-E111EB854EEC}" type="slidenum">
               <a:rPr lang="sv-SE" smtClean="0"/>
-              <a:t>‹#›</a:t>
+              <a:t>‹Nr.›</a:t>
             </a:fld>
             <a:endParaRPr lang="sv-SE"/>
           </a:p>
@@ -4593,7 +4593,7 @@
           <a:p>
             <a:fld id="{36FE6EAF-707E-454E-841A-E111EB854EEC}" type="slidenum">
               <a:rPr lang="sv-SE" smtClean="0"/>
-              <a:t>‹#›</a:t>
+              <a:t>‹Nr.›</a:t>
             </a:fld>
             <a:endParaRPr lang="sv-SE"/>
           </a:p>
@@ -4761,7 +4761,7 @@
           <a:p>
             <a:fld id="{36FE6EAF-707E-454E-841A-E111EB854EEC}" type="slidenum">
               <a:rPr lang="sv-SE" smtClean="0"/>
-              <a:t>‹#›</a:t>
+              <a:t>‹Nr.›</a:t>
             </a:fld>
             <a:endParaRPr lang="sv-SE"/>
           </a:p>
@@ -5006,7 +5006,7 @@
           <a:p>
             <a:fld id="{36FE6EAF-707E-454E-841A-E111EB854EEC}" type="slidenum">
               <a:rPr lang="sv-SE" smtClean="0"/>
-              <a:t>‹#›</a:t>
+              <a:t>‹Nr.›</a:t>
             </a:fld>
             <a:endParaRPr lang="sv-SE"/>
           </a:p>
@@ -5235,7 +5235,7 @@
           <a:p>
             <a:fld id="{36FE6EAF-707E-454E-841A-E111EB854EEC}" type="slidenum">
               <a:rPr lang="sv-SE" smtClean="0"/>
-              <a:t>‹#›</a:t>
+              <a:t>‹Nr.›</a:t>
             </a:fld>
             <a:endParaRPr lang="sv-SE"/>
           </a:p>
@@ -5599,7 +5599,7 @@
           <a:p>
             <a:fld id="{36FE6EAF-707E-454E-841A-E111EB854EEC}" type="slidenum">
               <a:rPr lang="sv-SE" smtClean="0"/>
-              <a:t>‹#›</a:t>
+              <a:t>‹Nr.›</a:t>
             </a:fld>
             <a:endParaRPr lang="sv-SE"/>
           </a:p>
@@ -5716,7 +5716,7 @@
           <a:p>
             <a:fld id="{36FE6EAF-707E-454E-841A-E111EB854EEC}" type="slidenum">
               <a:rPr lang="sv-SE" smtClean="0"/>
-              <a:t>‹#›</a:t>
+              <a:t>‹Nr.›</a:t>
             </a:fld>
             <a:endParaRPr lang="sv-SE"/>
           </a:p>
@@ -5811,7 +5811,7 @@
           <a:p>
             <a:fld id="{36FE6EAF-707E-454E-841A-E111EB854EEC}" type="slidenum">
               <a:rPr lang="sv-SE" smtClean="0"/>
-              <a:t>‹#›</a:t>
+              <a:t>‹Nr.›</a:t>
             </a:fld>
             <a:endParaRPr lang="sv-SE"/>
           </a:p>
@@ -6086,7 +6086,7 @@
           <a:p>
             <a:fld id="{36FE6EAF-707E-454E-841A-E111EB854EEC}" type="slidenum">
               <a:rPr lang="sv-SE" smtClean="0"/>
-              <a:t>‹#›</a:t>
+              <a:t>‹Nr.›</a:t>
             </a:fld>
             <a:endParaRPr lang="sv-SE"/>
           </a:p>
@@ -6338,7 +6338,7 @@
           <a:p>
             <a:fld id="{36FE6EAF-707E-454E-841A-E111EB854EEC}" type="slidenum">
               <a:rPr lang="sv-SE" smtClean="0"/>
-              <a:t>‹#›</a:t>
+              <a:t>‹Nr.›</a:t>
             </a:fld>
             <a:endParaRPr lang="sv-SE"/>
           </a:p>
@@ -6585,7 +6585,7 @@
           <a:p>
             <a:fld id="{36FE6EAF-707E-454E-841A-E111EB854EEC}" type="slidenum">
               <a:rPr lang="sv-SE" smtClean="0"/>
-              <a:t>‹#›</a:t>
+              <a:t>‹Nr.›</a:t>
             </a:fld>
             <a:endParaRPr lang="sv-SE"/>
           </a:p>
@@ -7201,6 +7201,13 @@
   <p:clrMapOvr>
     <a:masterClrMapping/>
   </p:clrMapOvr>
+  <p:timing>
+    <p:tnLst>
+      <p:par>
+        <p:cTn id="1" dur="indefinite" restart="never" nodeType="tmRoot"/>
+      </p:par>
+    </p:tnLst>
+  </p:timing>
 </p:sld>
 </file>
 
@@ -7271,7 +7278,7 @@
           <p:cNvPr id="8" name="Platshållare för innehåll 7">
             <a:extLst>
               <a:ext uri="{FF2B5EF4-FFF2-40B4-BE49-F238E27FC236}">
-                <a16:creationId xmlns:a16="http://schemas.microsoft.com/office/drawing/2014/main" id="{F4151D08-FA9D-4AC1-8C53-E69308777791}"/>
+                <a16:creationId xmlns:a16="http://schemas.microsoft.com/office/drawing/2014/main" xmlns="" id="{F4151D08-FA9D-4AC1-8C53-E69308777791}"/>
               </a:ext>
             </a:extLst>
           </p:cNvPr>
@@ -7328,7 +7335,7 @@
           <p:cNvPr id="10" name="Platshållare för innehåll 9" descr="En bild som visar skärmbild&#10;&#10;Beskrivning genererad med mycket hög exakthet">
             <a:extLst>
               <a:ext uri="{FF2B5EF4-FFF2-40B4-BE49-F238E27FC236}">
-                <a16:creationId xmlns:a16="http://schemas.microsoft.com/office/drawing/2014/main" id="{C928B2DA-6F41-475E-9F6A-C1A7518CAFD0}"/>
+                <a16:creationId xmlns:a16="http://schemas.microsoft.com/office/drawing/2014/main" xmlns="" id="{C928B2DA-6F41-475E-9F6A-C1A7518CAFD0}"/>
               </a:ext>
             </a:extLst>
           </p:cNvPr>
@@ -7371,6 +7378,13 @@
   <p:clrMapOvr>
     <a:masterClrMapping/>
   </p:clrMapOvr>
+  <p:timing>
+    <p:tnLst>
+      <p:par>
+        <p:cTn id="1" dur="indefinite" restart="never" nodeType="tmRoot"/>
+      </p:par>
+    </p:tnLst>
+  </p:timing>
 </p:sld>
 </file>
 
@@ -7463,7 +7477,7 @@
           <p:cNvPr id="18" name="Platshållare för innehåll 17" descr="En bild som visar skärmbild&#10;&#10;Beskrivning genererad med hög exakthet">
             <a:extLst>
               <a:ext uri="{FF2B5EF4-FFF2-40B4-BE49-F238E27FC236}">
-                <a16:creationId xmlns:a16="http://schemas.microsoft.com/office/drawing/2014/main" id="{CE98ADE7-97A3-46F9-BEDC-A38E54C3E1E8}"/>
+                <a16:creationId xmlns:a16="http://schemas.microsoft.com/office/drawing/2014/main" xmlns="" id="{CE98ADE7-97A3-46F9-BEDC-A38E54C3E1E8}"/>
               </a:ext>
             </a:extLst>
           </p:cNvPr>
@@ -7498,7 +7512,7 @@
           <p:cNvPr id="22" name="Platshållare för innehåll 21">
             <a:extLst>
               <a:ext uri="{FF2B5EF4-FFF2-40B4-BE49-F238E27FC236}">
-                <a16:creationId xmlns:a16="http://schemas.microsoft.com/office/drawing/2014/main" id="{5C3327C6-EFFD-46F1-97F7-D99EDFD25B6E}"/>
+                <a16:creationId xmlns:a16="http://schemas.microsoft.com/office/drawing/2014/main" xmlns="" id="{5C3327C6-EFFD-46F1-97F7-D99EDFD25B6E}"/>
               </a:ext>
             </a:extLst>
           </p:cNvPr>
@@ -7541,6 +7555,13 @@
   <p:clrMapOvr>
     <a:masterClrMapping/>
   </p:clrMapOvr>
+  <p:timing>
+    <p:tnLst>
+      <p:par>
+        <p:cTn id="1" dur="indefinite" restart="never" nodeType="tmRoot"/>
+      </p:par>
+    </p:tnLst>
+  </p:timing>
 </p:sld>
 </file>
 
@@ -7621,6 +7642,13 @@
   <p:clrMapOvr>
     <a:masterClrMapping/>
   </p:clrMapOvr>
+  <p:timing>
+    <p:tnLst>
+      <p:par>
+        <p:cTn id="1" dur="indefinite" restart="never" nodeType="tmRoot"/>
+      </p:par>
+    </p:tnLst>
+  </p:timing>
 </p:sld>
 </file>
 
@@ -7738,6 +7766,13 @@
   <p:clrMapOvr>
     <a:masterClrMapping/>
   </p:clrMapOvr>
+  <p:timing>
+    <p:tnLst>
+      <p:par>
+        <p:cTn id="1" dur="indefinite" restart="never" nodeType="tmRoot"/>
+      </p:par>
+    </p:tnLst>
+  </p:timing>
 </p:sld>
 </file>
 
@@ -7826,6 +7861,13 @@
   <p:clrMapOvr>
     <a:masterClrMapping/>
   </p:clrMapOvr>
+  <p:timing>
+    <p:tnLst>
+      <p:par>
+        <p:cTn id="1" dur="indefinite" restart="never" nodeType="tmRoot"/>
+      </p:par>
+    </p:tnLst>
+  </p:timing>
 </p:sld>
 </file>
 
@@ -7904,6 +7946,13 @@
   <p:clrMapOvr>
     <a:masterClrMapping/>
   </p:clrMapOvr>
+  <p:timing>
+    <p:tnLst>
+      <p:par>
+        <p:cTn id="1" dur="indefinite" restart="never" nodeType="tmRoot"/>
+      </p:par>
+    </p:tnLst>
+  </p:timing>
 </p:sld>
 </file>
 
@@ -7993,6 +8042,13 @@
   <p:clrMapOvr>
     <a:masterClrMapping/>
   </p:clrMapOvr>
+  <p:timing>
+    <p:tnLst>
+      <p:par>
+        <p:cTn id="1" dur="indefinite" restart="never" nodeType="tmRoot"/>
+      </p:par>
+    </p:tnLst>
+  </p:timing>
 </p:sld>
 </file>
 
@@ -8063,28 +8119,28 @@
                 <a:gridCol w="2276061">
                   <a:extLst>
                     <a:ext uri="{9D8B030D-6E8A-4147-A177-3AD203B41FA5}">
-                      <a16:colId xmlns:a16="http://schemas.microsoft.com/office/drawing/2014/main" val="20000"/>
+                      <a16:colId xmlns:a16="http://schemas.microsoft.com/office/drawing/2014/main" xmlns="" val="20000"/>
                     </a:ext>
                   </a:extLst>
                 </a:gridCol>
                 <a:gridCol w="2276061">
                   <a:extLst>
                     <a:ext uri="{9D8B030D-6E8A-4147-A177-3AD203B41FA5}">
-                      <a16:colId xmlns:a16="http://schemas.microsoft.com/office/drawing/2014/main" val="20001"/>
+                      <a16:colId xmlns:a16="http://schemas.microsoft.com/office/drawing/2014/main" xmlns="" val="20001"/>
                     </a:ext>
                   </a:extLst>
                 </a:gridCol>
                 <a:gridCol w="2276061">
                   <a:extLst>
                     <a:ext uri="{9D8B030D-6E8A-4147-A177-3AD203B41FA5}">
-                      <a16:colId xmlns:a16="http://schemas.microsoft.com/office/drawing/2014/main" val="20002"/>
+                      <a16:colId xmlns:a16="http://schemas.microsoft.com/office/drawing/2014/main" xmlns="" val="20002"/>
                     </a:ext>
                   </a:extLst>
                 </a:gridCol>
                 <a:gridCol w="2276061">
                   <a:extLst>
                     <a:ext uri="{9D8B030D-6E8A-4147-A177-3AD203B41FA5}">
-                      <a16:colId xmlns:a16="http://schemas.microsoft.com/office/drawing/2014/main" val="20003"/>
+                      <a16:colId xmlns:a16="http://schemas.microsoft.com/office/drawing/2014/main" xmlns="" val="20003"/>
                     </a:ext>
                   </a:extLst>
                 </a:gridCol>
@@ -8152,7 +8208,7 @@
                 </a:tc>
                 <a:extLst>
                   <a:ext uri="{0D108BD9-81ED-4DB2-BD59-A6C34878D82A}">
-                    <a16:rowId xmlns:a16="http://schemas.microsoft.com/office/drawing/2014/main" val="10000"/>
+                    <a16:rowId xmlns:a16="http://schemas.microsoft.com/office/drawing/2014/main" xmlns="" val="10000"/>
                   </a:ext>
                 </a:extLst>
               </a:tr>
@@ -8322,7 +8378,7 @@
                 </a:tc>
                 <a:extLst>
                   <a:ext uri="{0D108BD9-81ED-4DB2-BD59-A6C34878D82A}">
-                    <a16:rowId xmlns:a16="http://schemas.microsoft.com/office/drawing/2014/main" val="10001"/>
+                    <a16:rowId xmlns:a16="http://schemas.microsoft.com/office/drawing/2014/main" xmlns="" val="10001"/>
                   </a:ext>
                 </a:extLst>
               </a:tr>
@@ -8444,7 +8500,7 @@
                 </a:tc>
                 <a:extLst>
                   <a:ext uri="{0D108BD9-81ED-4DB2-BD59-A6C34878D82A}">
-                    <a16:rowId xmlns:a16="http://schemas.microsoft.com/office/drawing/2014/main" val="10002"/>
+                    <a16:rowId xmlns:a16="http://schemas.microsoft.com/office/drawing/2014/main" xmlns="" val="10002"/>
                   </a:ext>
                 </a:extLst>
               </a:tr>
@@ -8603,7 +8659,7 @@
                 </a:tc>
                 <a:extLst>
                   <a:ext uri="{0D108BD9-81ED-4DB2-BD59-A6C34878D82A}">
-                    <a16:rowId xmlns:a16="http://schemas.microsoft.com/office/drawing/2014/main" val="10003"/>
+                    <a16:rowId xmlns:a16="http://schemas.microsoft.com/office/drawing/2014/main" xmlns="" val="10003"/>
                   </a:ext>
                 </a:extLst>
               </a:tr>
@@ -8624,6 +8680,13 @@
   <p:clrMapOvr>
     <a:masterClrMapping/>
   </p:clrMapOvr>
+  <p:timing>
+    <p:tnLst>
+      <p:par>
+        <p:cTn id="1" dur="indefinite" restart="never" nodeType="tmRoot"/>
+      </p:par>
+    </p:tnLst>
+  </p:timing>
 </p:sld>
 </file>
 
@@ -8695,28 +8758,28 @@
                 <a:gridCol w="2276061">
                   <a:extLst>
                     <a:ext uri="{9D8B030D-6E8A-4147-A177-3AD203B41FA5}">
-                      <a16:colId xmlns:a16="http://schemas.microsoft.com/office/drawing/2014/main" val="20000"/>
+                      <a16:colId xmlns:a16="http://schemas.microsoft.com/office/drawing/2014/main" xmlns="" val="20000"/>
                     </a:ext>
                   </a:extLst>
                 </a:gridCol>
                 <a:gridCol w="2276061">
                   <a:extLst>
                     <a:ext uri="{9D8B030D-6E8A-4147-A177-3AD203B41FA5}">
-                      <a16:colId xmlns:a16="http://schemas.microsoft.com/office/drawing/2014/main" val="20001"/>
+                      <a16:colId xmlns:a16="http://schemas.microsoft.com/office/drawing/2014/main" xmlns="" val="20001"/>
                     </a:ext>
                   </a:extLst>
                 </a:gridCol>
                 <a:gridCol w="2276061">
                   <a:extLst>
                     <a:ext uri="{9D8B030D-6E8A-4147-A177-3AD203B41FA5}">
-                      <a16:colId xmlns:a16="http://schemas.microsoft.com/office/drawing/2014/main" val="20002"/>
+                      <a16:colId xmlns:a16="http://schemas.microsoft.com/office/drawing/2014/main" xmlns="" val="20002"/>
                     </a:ext>
                   </a:extLst>
                 </a:gridCol>
                 <a:gridCol w="2276061">
                   <a:extLst>
                     <a:ext uri="{9D8B030D-6E8A-4147-A177-3AD203B41FA5}">
-                      <a16:colId xmlns:a16="http://schemas.microsoft.com/office/drawing/2014/main" val="20003"/>
+                      <a16:colId xmlns:a16="http://schemas.microsoft.com/office/drawing/2014/main" xmlns="" val="20003"/>
                     </a:ext>
                   </a:extLst>
                 </a:gridCol>
@@ -8784,7 +8847,7 @@
                 </a:tc>
                 <a:extLst>
                   <a:ext uri="{0D108BD9-81ED-4DB2-BD59-A6C34878D82A}">
-                    <a16:rowId xmlns:a16="http://schemas.microsoft.com/office/drawing/2014/main" val="10000"/>
+                    <a16:rowId xmlns:a16="http://schemas.microsoft.com/office/drawing/2014/main" xmlns="" val="10000"/>
                   </a:ext>
                 </a:extLst>
               </a:tr>
@@ -8892,7 +8955,7 @@
                 </a:tc>
                 <a:extLst>
                   <a:ext uri="{0D108BD9-81ED-4DB2-BD59-A6C34878D82A}">
-                    <a16:rowId xmlns:a16="http://schemas.microsoft.com/office/drawing/2014/main" val="10001"/>
+                    <a16:rowId xmlns:a16="http://schemas.microsoft.com/office/drawing/2014/main" xmlns="" val="10001"/>
                   </a:ext>
                 </a:extLst>
               </a:tr>
@@ -8939,7 +9002,7 @@
                 </a:tc>
                 <a:extLst>
                   <a:ext uri="{0D108BD9-81ED-4DB2-BD59-A6C34878D82A}">
-                    <a16:rowId xmlns:a16="http://schemas.microsoft.com/office/drawing/2014/main" val="10002"/>
+                    <a16:rowId xmlns:a16="http://schemas.microsoft.com/office/drawing/2014/main" xmlns="" val="10002"/>
                   </a:ext>
                 </a:extLst>
               </a:tr>
@@ -8986,7 +9049,7 @@
                 </a:tc>
                 <a:extLst>
                   <a:ext uri="{0D108BD9-81ED-4DB2-BD59-A6C34878D82A}">
-                    <a16:rowId xmlns:a16="http://schemas.microsoft.com/office/drawing/2014/main" val="10003"/>
+                    <a16:rowId xmlns:a16="http://schemas.microsoft.com/office/drawing/2014/main" xmlns="" val="10003"/>
                   </a:ext>
                 </a:extLst>
               </a:tr>
@@ -9007,6 +9070,13 @@
   <p:clrMapOvr>
     <a:masterClrMapping/>
   </p:clrMapOvr>
+  <p:timing>
+    <p:tnLst>
+      <p:par>
+        <p:cTn id="1" dur="indefinite" restart="never" nodeType="tmRoot"/>
+      </p:par>
+    </p:tnLst>
+  </p:timing>
 </p:sld>
 </file>
 
@@ -9185,8 +9255,8 @@
               <a:t>Kodkritiksystem: </a:t>
             </a:r>
             <a:r>
-              <a:rPr lang="sv-SE" dirty="0"/>
-              <a:t>Debugger intelij</a:t>
+              <a:rPr lang="sv-SE" dirty="0" err="1" smtClean="0"/>
+              <a:t>FindBugs</a:t>
             </a:r>
             <a:endParaRPr lang="sv-SE" b="1" dirty="0"/>
           </a:p>
@@ -9364,6 +9434,13 @@
   <p:clrMapOvr>
     <a:masterClrMapping/>
   </p:clrMapOvr>
+  <p:timing>
+    <p:tnLst>
+      <p:par>
+        <p:cTn id="1" dur="indefinite" restart="never" nodeType="tmRoot"/>
+      </p:par>
+    </p:tnLst>
+  </p:timing>
 </p:sld>
 </file>
 
@@ -9462,6 +9539,13 @@
   <p:clrMapOvr>
     <a:masterClrMapping/>
   </p:clrMapOvr>
+  <p:timing>
+    <p:tnLst>
+      <p:par>
+        <p:cTn id="1" dur="indefinite" restart="never" nodeType="tmRoot"/>
+      </p:par>
+    </p:tnLst>
+  </p:timing>
 </p:sld>
 </file>
 
@@ -9696,6 +9780,13 @@
   <p:clrMapOvr>
     <a:masterClrMapping/>
   </p:clrMapOvr>
+  <p:timing>
+    <p:tnLst>
+      <p:par>
+        <p:cTn id="1" dur="indefinite" restart="never" nodeType="tmRoot"/>
+      </p:par>
+    </p:tnLst>
+  </p:timing>
 </p:sld>
 </file>
 
@@ -9797,6 +9888,13 @@
   <p:clrMapOvr>
     <a:masterClrMapping/>
   </p:clrMapOvr>
+  <p:timing>
+    <p:tnLst>
+      <p:par>
+        <p:cTn id="1" dur="indefinite" restart="never" nodeType="tmRoot"/>
+      </p:par>
+    </p:tnLst>
+  </p:timing>
 </p:sld>
 </file>
 
@@ -9871,6 +9969,13 @@
   <p:clrMapOvr>
     <a:masterClrMapping/>
   </p:clrMapOvr>
+  <p:timing>
+    <p:tnLst>
+      <p:par>
+        <p:cTn id="1" dur="indefinite" restart="never" nodeType="tmRoot"/>
+      </p:par>
+    </p:tnLst>
+  </p:timing>
 </p:sld>
 </file>
 
@@ -10883,6 +10988,13 @@
   <p:clrMapOvr>
     <a:masterClrMapping/>
   </p:clrMapOvr>
+  <p:timing>
+    <p:tnLst>
+      <p:par>
+        <p:cTn id="1" dur="indefinite" restart="never" nodeType="tmRoot"/>
+      </p:par>
+    </p:tnLst>
+  </p:timing>
 </p:sld>
 </file>
 
@@ -10964,7 +11076,7 @@
           <p:cNvPr id="2" name="Pil: höger 1">
             <a:extLst>
               <a:ext uri="{FF2B5EF4-FFF2-40B4-BE49-F238E27FC236}">
-                <a16:creationId xmlns:a16="http://schemas.microsoft.com/office/drawing/2014/main" id="{5BED2071-56FA-4E12-93ED-D5F1E015E9AB}"/>
+                <a16:creationId xmlns:a16="http://schemas.microsoft.com/office/drawing/2014/main" xmlns="" id="{5BED2071-56FA-4E12-93ED-D5F1E015E9AB}"/>
               </a:ext>
             </a:extLst>
           </p:cNvPr>
@@ -11034,7 +11146,7 @@
           <p:cNvPr id="5" name="Pil: höger 4">
             <a:extLst>
               <a:ext uri="{FF2B5EF4-FFF2-40B4-BE49-F238E27FC236}">
-                <a16:creationId xmlns:a16="http://schemas.microsoft.com/office/drawing/2014/main" id="{DC33DE33-4EEE-4AAE-971A-9ECC8EEE5EF1}"/>
+                <a16:creationId xmlns:a16="http://schemas.microsoft.com/office/drawing/2014/main" xmlns="" id="{DC33DE33-4EEE-4AAE-971A-9ECC8EEE5EF1}"/>
               </a:ext>
             </a:extLst>
           </p:cNvPr>
@@ -11104,7 +11216,7 @@
           <p:cNvPr id="6" name="Pil: höger 5">
             <a:extLst>
               <a:ext uri="{FF2B5EF4-FFF2-40B4-BE49-F238E27FC236}">
-                <a16:creationId xmlns:a16="http://schemas.microsoft.com/office/drawing/2014/main" id="{079D7526-A6BE-430A-8F83-1E17E1718B8F}"/>
+                <a16:creationId xmlns:a16="http://schemas.microsoft.com/office/drawing/2014/main" xmlns="" id="{079D7526-A6BE-430A-8F83-1E17E1718B8F}"/>
               </a:ext>
             </a:extLst>
           </p:cNvPr>
@@ -11174,7 +11286,7 @@
           <p:cNvPr id="7" name="Pil: höger 6">
             <a:extLst>
               <a:ext uri="{FF2B5EF4-FFF2-40B4-BE49-F238E27FC236}">
-                <a16:creationId xmlns:a16="http://schemas.microsoft.com/office/drawing/2014/main" id="{C612D35E-3946-4792-9C94-3ADB79886997}"/>
+                <a16:creationId xmlns:a16="http://schemas.microsoft.com/office/drawing/2014/main" xmlns="" id="{C612D35E-3946-4792-9C94-3ADB79886997}"/>
               </a:ext>
             </a:extLst>
           </p:cNvPr>
@@ -11244,7 +11356,7 @@
           <p:cNvPr id="8" name="Pil: höger 7">
             <a:extLst>
               <a:ext uri="{FF2B5EF4-FFF2-40B4-BE49-F238E27FC236}">
-                <a16:creationId xmlns:a16="http://schemas.microsoft.com/office/drawing/2014/main" id="{5BD09438-3B93-47E0-BC3B-379F80A1ECA7}"/>
+                <a16:creationId xmlns:a16="http://schemas.microsoft.com/office/drawing/2014/main" xmlns="" id="{5BD09438-3B93-47E0-BC3B-379F80A1ECA7}"/>
               </a:ext>
             </a:extLst>
           </p:cNvPr>
@@ -11314,7 +11426,7 @@
           <p:cNvPr id="10" name="Pil: höger 9">
             <a:extLst>
               <a:ext uri="{FF2B5EF4-FFF2-40B4-BE49-F238E27FC236}">
-                <a16:creationId xmlns:a16="http://schemas.microsoft.com/office/drawing/2014/main" id="{5E1CDCBD-85A1-479E-827B-CE49B4497796}"/>
+                <a16:creationId xmlns:a16="http://schemas.microsoft.com/office/drawing/2014/main" xmlns="" id="{5E1CDCBD-85A1-479E-827B-CE49B4497796}"/>
               </a:ext>
             </a:extLst>
           </p:cNvPr>
@@ -11384,7 +11496,7 @@
           <p:cNvPr id="12" name="Pil: höger 11">
             <a:extLst>
               <a:ext uri="{FF2B5EF4-FFF2-40B4-BE49-F238E27FC236}">
-                <a16:creationId xmlns:a16="http://schemas.microsoft.com/office/drawing/2014/main" id="{8731D112-5CF6-4435-8FC0-5ABB9AFA1AC7}"/>
+                <a16:creationId xmlns:a16="http://schemas.microsoft.com/office/drawing/2014/main" xmlns="" id="{8731D112-5CF6-4435-8FC0-5ABB9AFA1AC7}"/>
               </a:ext>
             </a:extLst>
           </p:cNvPr>
@@ -11454,7 +11566,7 @@
           <p:cNvPr id="13" name="Pil: höger 12">
             <a:extLst>
               <a:ext uri="{FF2B5EF4-FFF2-40B4-BE49-F238E27FC236}">
-                <a16:creationId xmlns:a16="http://schemas.microsoft.com/office/drawing/2014/main" id="{6353E274-CA98-4BA5-9F0C-F86B0EAE5578}"/>
+                <a16:creationId xmlns:a16="http://schemas.microsoft.com/office/drawing/2014/main" xmlns="" id="{6353E274-CA98-4BA5-9F0C-F86B0EAE5578}"/>
               </a:ext>
             </a:extLst>
           </p:cNvPr>
@@ -11532,6 +11644,13 @@
   <p:clrMapOvr>
     <a:masterClrMapping/>
   </p:clrMapOvr>
+  <p:timing>
+    <p:tnLst>
+      <p:par>
+        <p:cTn id="1" dur="indefinite" restart="never" nodeType="tmRoot"/>
+      </p:par>
+    </p:tnLst>
+  </p:timing>
 </p:sld>
 </file>
 
@@ -11634,7 +11753,7 @@
           <p:cNvPr id="8" name="Rectangle 2">
             <a:extLst>
               <a:ext uri="{FF2B5EF4-FFF2-40B4-BE49-F238E27FC236}">
-                <a16:creationId xmlns:a16="http://schemas.microsoft.com/office/drawing/2014/main" id="{1FC9AD1E-4A52-4998-A5A3-BAEC1C827718}"/>
+                <a16:creationId xmlns:a16="http://schemas.microsoft.com/office/drawing/2014/main" xmlns="" id="{1FC9AD1E-4A52-4998-A5A3-BAEC1C827718}"/>
               </a:ext>
             </a:extLst>
           </p:cNvPr>
@@ -12149,7 +12268,7 @@
           <p:cNvPr id="12" name="Rectangle 2">
             <a:extLst>
               <a:ext uri="{FF2B5EF4-FFF2-40B4-BE49-F238E27FC236}">
-                <a16:creationId xmlns:a16="http://schemas.microsoft.com/office/drawing/2014/main" id="{390B7AF8-02CC-4EF9-A9A5-59849FC5BA99}"/>
+                <a16:creationId xmlns:a16="http://schemas.microsoft.com/office/drawing/2014/main" xmlns="" id="{390B7AF8-02CC-4EF9-A9A5-59849FC5BA99}"/>
               </a:ext>
             </a:extLst>
           </p:cNvPr>
@@ -14801,7 +14920,7 @@
           <p:cNvPr id="13" name="Rectangle 3">
             <a:extLst>
               <a:ext uri="{FF2B5EF4-FFF2-40B4-BE49-F238E27FC236}">
-                <a16:creationId xmlns:a16="http://schemas.microsoft.com/office/drawing/2014/main" id="{C08EF8EF-E887-46B2-8D83-1FD183E46154}"/>
+                <a16:creationId xmlns:a16="http://schemas.microsoft.com/office/drawing/2014/main" xmlns="" id="{C08EF8EF-E887-46B2-8D83-1FD183E46154}"/>
               </a:ext>
             </a:extLst>
           </p:cNvPr>
@@ -15438,7 +15557,7 @@
           <p:cNvPr id="7" name="Rectangle 1">
             <a:extLst>
               <a:ext uri="{FF2B5EF4-FFF2-40B4-BE49-F238E27FC236}">
-                <a16:creationId xmlns:a16="http://schemas.microsoft.com/office/drawing/2014/main" id="{3199D4B4-952F-47D5-A8B5-DFCEF934D87B}"/>
+                <a16:creationId xmlns:a16="http://schemas.microsoft.com/office/drawing/2014/main" xmlns="" id="{3199D4B4-952F-47D5-A8B5-DFCEF934D87B}"/>
               </a:ext>
             </a:extLst>
           </p:cNvPr>

</xml_diff>

<commit_message>
added information for FindBugs
</commit_message>
<xml_diff>
--- a/01 Dokumentation/slutredovisning.pptx
+++ b/01 Dokumentation/slutredovisning.pptx
@@ -396,7 +396,7 @@
           <a:p>
             <a:fld id="{8667F948-D2CB-486C-A2EA-FEABC2DAAE8D}" type="slidenum">
               <a:rPr lang="sv-SE" smtClean="0"/>
-              <a:t>‹#›</a:t>
+              <a:t>‹Nr.›</a:t>
             </a:fld>
             <a:endParaRPr lang="sv-SE"/>
           </a:p>
@@ -4387,7 +4387,7 @@
           <a:p>
             <a:fld id="{36FE6EAF-707E-454E-841A-E111EB854EEC}" type="slidenum">
               <a:rPr lang="sv-SE" smtClean="0"/>
-              <a:t>‹#›</a:t>
+              <a:t>‹Nr.›</a:t>
             </a:fld>
             <a:endParaRPr lang="sv-SE"/>
           </a:p>
@@ -4555,7 +4555,7 @@
           <a:p>
             <a:fld id="{36FE6EAF-707E-454E-841A-E111EB854EEC}" type="slidenum">
               <a:rPr lang="sv-SE" smtClean="0"/>
-              <a:t>‹#›</a:t>
+              <a:t>‹Nr.›</a:t>
             </a:fld>
             <a:endParaRPr lang="sv-SE"/>
           </a:p>
@@ -4733,7 +4733,7 @@
           <a:p>
             <a:fld id="{36FE6EAF-707E-454E-841A-E111EB854EEC}" type="slidenum">
               <a:rPr lang="sv-SE" smtClean="0"/>
-              <a:t>‹#›</a:t>
+              <a:t>‹Nr.›</a:t>
             </a:fld>
             <a:endParaRPr lang="sv-SE"/>
           </a:p>
@@ -4901,7 +4901,7 @@
           <a:p>
             <a:fld id="{36FE6EAF-707E-454E-841A-E111EB854EEC}" type="slidenum">
               <a:rPr lang="sv-SE" smtClean="0"/>
-              <a:t>‹#›</a:t>
+              <a:t>‹Nr.›</a:t>
             </a:fld>
             <a:endParaRPr lang="sv-SE"/>
           </a:p>
@@ -5146,7 +5146,7 @@
           <a:p>
             <a:fld id="{36FE6EAF-707E-454E-841A-E111EB854EEC}" type="slidenum">
               <a:rPr lang="sv-SE" smtClean="0"/>
-              <a:t>‹#›</a:t>
+              <a:t>‹Nr.›</a:t>
             </a:fld>
             <a:endParaRPr lang="sv-SE"/>
           </a:p>
@@ -5375,7 +5375,7 @@
           <a:p>
             <a:fld id="{36FE6EAF-707E-454E-841A-E111EB854EEC}" type="slidenum">
               <a:rPr lang="sv-SE" smtClean="0"/>
-              <a:t>‹#›</a:t>
+              <a:t>‹Nr.›</a:t>
             </a:fld>
             <a:endParaRPr lang="sv-SE"/>
           </a:p>
@@ -5739,7 +5739,7 @@
           <a:p>
             <a:fld id="{36FE6EAF-707E-454E-841A-E111EB854EEC}" type="slidenum">
               <a:rPr lang="sv-SE" smtClean="0"/>
-              <a:t>‹#›</a:t>
+              <a:t>‹Nr.›</a:t>
             </a:fld>
             <a:endParaRPr lang="sv-SE"/>
           </a:p>
@@ -5856,7 +5856,7 @@
           <a:p>
             <a:fld id="{36FE6EAF-707E-454E-841A-E111EB854EEC}" type="slidenum">
               <a:rPr lang="sv-SE" smtClean="0"/>
-              <a:t>‹#›</a:t>
+              <a:t>‹Nr.›</a:t>
             </a:fld>
             <a:endParaRPr lang="sv-SE"/>
           </a:p>
@@ -5951,7 +5951,7 @@
           <a:p>
             <a:fld id="{36FE6EAF-707E-454E-841A-E111EB854EEC}" type="slidenum">
               <a:rPr lang="sv-SE" smtClean="0"/>
-              <a:t>‹#›</a:t>
+              <a:t>‹Nr.›</a:t>
             </a:fld>
             <a:endParaRPr lang="sv-SE"/>
           </a:p>
@@ -6226,7 +6226,7 @@
           <a:p>
             <a:fld id="{36FE6EAF-707E-454E-841A-E111EB854EEC}" type="slidenum">
               <a:rPr lang="sv-SE" smtClean="0"/>
-              <a:t>‹#›</a:t>
+              <a:t>‹Nr.›</a:t>
             </a:fld>
             <a:endParaRPr lang="sv-SE"/>
           </a:p>
@@ -6478,7 +6478,7 @@
           <a:p>
             <a:fld id="{36FE6EAF-707E-454E-841A-E111EB854EEC}" type="slidenum">
               <a:rPr lang="sv-SE" smtClean="0"/>
-              <a:t>‹#›</a:t>
+              <a:t>‹Nr.›</a:t>
             </a:fld>
             <a:endParaRPr lang="sv-SE"/>
           </a:p>
@@ -6725,7 +6725,7 @@
           <a:p>
             <a:fld id="{36FE6EAF-707E-454E-841A-E111EB854EEC}" type="slidenum">
               <a:rPr lang="sv-SE" smtClean="0"/>
-              <a:t>‹#›</a:t>
+              <a:t>‹Nr.›</a:t>
             </a:fld>
             <a:endParaRPr lang="sv-SE"/>
           </a:p>
@@ -7583,7 +7583,7 @@
           <p:cNvPr id="8" name="Platshållare för innehåll 7">
             <a:extLst>
               <a:ext uri="{FF2B5EF4-FFF2-40B4-BE49-F238E27FC236}">
-                <a16:creationId xmlns:a16="http://schemas.microsoft.com/office/drawing/2014/main" id="{F4151D08-FA9D-4AC1-8C53-E69308777791}"/>
+                <a16:creationId xmlns:a16="http://schemas.microsoft.com/office/drawing/2014/main" xmlns="" id="{F4151D08-FA9D-4AC1-8C53-E69308777791}"/>
               </a:ext>
             </a:extLst>
           </p:cNvPr>
@@ -7640,7 +7640,7 @@
           <p:cNvPr id="10" name="Platshållare för innehåll 9" descr="En bild som visar skärmbild&#10;&#10;Beskrivning genererad med mycket hög exakthet">
             <a:extLst>
               <a:ext uri="{FF2B5EF4-FFF2-40B4-BE49-F238E27FC236}">
-                <a16:creationId xmlns:a16="http://schemas.microsoft.com/office/drawing/2014/main" id="{C928B2DA-6F41-475E-9F6A-C1A7518CAFD0}"/>
+                <a16:creationId xmlns:a16="http://schemas.microsoft.com/office/drawing/2014/main" xmlns="" id="{C928B2DA-6F41-475E-9F6A-C1A7518CAFD0}"/>
               </a:ext>
             </a:extLst>
           </p:cNvPr>
@@ -7782,7 +7782,7 @@
           <p:cNvPr id="18" name="Platshållare för innehåll 17" descr="En bild som visar skärmbild&#10;&#10;Beskrivning genererad med hög exakthet">
             <a:extLst>
               <a:ext uri="{FF2B5EF4-FFF2-40B4-BE49-F238E27FC236}">
-                <a16:creationId xmlns:a16="http://schemas.microsoft.com/office/drawing/2014/main" id="{CE98ADE7-97A3-46F9-BEDC-A38E54C3E1E8}"/>
+                <a16:creationId xmlns:a16="http://schemas.microsoft.com/office/drawing/2014/main" xmlns="" id="{CE98ADE7-97A3-46F9-BEDC-A38E54C3E1E8}"/>
               </a:ext>
             </a:extLst>
           </p:cNvPr>
@@ -7817,7 +7817,7 @@
           <p:cNvPr id="22" name="Platshållare för innehåll 21">
             <a:extLst>
               <a:ext uri="{FF2B5EF4-FFF2-40B4-BE49-F238E27FC236}">
-                <a16:creationId xmlns:a16="http://schemas.microsoft.com/office/drawing/2014/main" id="{5C3327C6-EFFD-46F1-97F7-D99EDFD25B6E}"/>
+                <a16:creationId xmlns:a16="http://schemas.microsoft.com/office/drawing/2014/main" xmlns="" id="{5C3327C6-EFFD-46F1-97F7-D99EDFD25B6E}"/>
               </a:ext>
             </a:extLst>
           </p:cNvPr>
@@ -8477,28 +8477,28 @@
                 <a:gridCol w="2276061">
                   <a:extLst>
                     <a:ext uri="{9D8B030D-6E8A-4147-A177-3AD203B41FA5}">
-                      <a16:colId xmlns:a16="http://schemas.microsoft.com/office/drawing/2014/main" val="20000"/>
+                      <a16:colId xmlns:a16="http://schemas.microsoft.com/office/drawing/2014/main" xmlns="" val="20000"/>
                     </a:ext>
                   </a:extLst>
                 </a:gridCol>
                 <a:gridCol w="2276061">
                   <a:extLst>
                     <a:ext uri="{9D8B030D-6E8A-4147-A177-3AD203B41FA5}">
-                      <a16:colId xmlns:a16="http://schemas.microsoft.com/office/drawing/2014/main" val="20001"/>
+                      <a16:colId xmlns:a16="http://schemas.microsoft.com/office/drawing/2014/main" xmlns="" val="20001"/>
                     </a:ext>
                   </a:extLst>
                 </a:gridCol>
                 <a:gridCol w="2276061">
                   <a:extLst>
                     <a:ext uri="{9D8B030D-6E8A-4147-A177-3AD203B41FA5}">
-                      <a16:colId xmlns:a16="http://schemas.microsoft.com/office/drawing/2014/main" val="20002"/>
+                      <a16:colId xmlns:a16="http://schemas.microsoft.com/office/drawing/2014/main" xmlns="" val="20002"/>
                     </a:ext>
                   </a:extLst>
                 </a:gridCol>
                 <a:gridCol w="2276061">
                   <a:extLst>
                     <a:ext uri="{9D8B030D-6E8A-4147-A177-3AD203B41FA5}">
-                      <a16:colId xmlns:a16="http://schemas.microsoft.com/office/drawing/2014/main" val="20003"/>
+                      <a16:colId xmlns:a16="http://schemas.microsoft.com/office/drawing/2014/main" xmlns="" val="20003"/>
                     </a:ext>
                   </a:extLst>
                 </a:gridCol>
@@ -8566,7 +8566,7 @@
                 </a:tc>
                 <a:extLst>
                   <a:ext uri="{0D108BD9-81ED-4DB2-BD59-A6C34878D82A}">
-                    <a16:rowId xmlns:a16="http://schemas.microsoft.com/office/drawing/2014/main" val="10000"/>
+                    <a16:rowId xmlns:a16="http://schemas.microsoft.com/office/drawing/2014/main" xmlns="" val="10000"/>
                   </a:ext>
                 </a:extLst>
               </a:tr>
@@ -8736,7 +8736,7 @@
                 </a:tc>
                 <a:extLst>
                   <a:ext uri="{0D108BD9-81ED-4DB2-BD59-A6C34878D82A}">
-                    <a16:rowId xmlns:a16="http://schemas.microsoft.com/office/drawing/2014/main" val="10001"/>
+                    <a16:rowId xmlns:a16="http://schemas.microsoft.com/office/drawing/2014/main" xmlns="" val="10001"/>
                   </a:ext>
                 </a:extLst>
               </a:tr>
@@ -8858,7 +8858,7 @@
                 </a:tc>
                 <a:extLst>
                   <a:ext uri="{0D108BD9-81ED-4DB2-BD59-A6C34878D82A}">
-                    <a16:rowId xmlns:a16="http://schemas.microsoft.com/office/drawing/2014/main" val="10002"/>
+                    <a16:rowId xmlns:a16="http://schemas.microsoft.com/office/drawing/2014/main" xmlns="" val="10002"/>
                   </a:ext>
                 </a:extLst>
               </a:tr>
@@ -9017,7 +9017,7 @@
                 </a:tc>
                 <a:extLst>
                   <a:ext uri="{0D108BD9-81ED-4DB2-BD59-A6C34878D82A}">
-                    <a16:rowId xmlns:a16="http://schemas.microsoft.com/office/drawing/2014/main" val="10003"/>
+                    <a16:rowId xmlns:a16="http://schemas.microsoft.com/office/drawing/2014/main" xmlns="" val="10003"/>
                   </a:ext>
                 </a:extLst>
               </a:tr>
@@ -9388,28 +9388,28 @@
                 <a:gridCol w="2276061">
                   <a:extLst>
                     <a:ext uri="{9D8B030D-6E8A-4147-A177-3AD203B41FA5}">
-                      <a16:colId xmlns:a16="http://schemas.microsoft.com/office/drawing/2014/main" val="20000"/>
+                      <a16:colId xmlns:a16="http://schemas.microsoft.com/office/drawing/2014/main" xmlns="" val="20000"/>
                     </a:ext>
                   </a:extLst>
                 </a:gridCol>
                 <a:gridCol w="2276061">
                   <a:extLst>
                     <a:ext uri="{9D8B030D-6E8A-4147-A177-3AD203B41FA5}">
-                      <a16:colId xmlns:a16="http://schemas.microsoft.com/office/drawing/2014/main" val="20001"/>
+                      <a16:colId xmlns:a16="http://schemas.microsoft.com/office/drawing/2014/main" xmlns="" val="20001"/>
                     </a:ext>
                   </a:extLst>
                 </a:gridCol>
                 <a:gridCol w="2276061">
                   <a:extLst>
                     <a:ext uri="{9D8B030D-6E8A-4147-A177-3AD203B41FA5}">
-                      <a16:colId xmlns:a16="http://schemas.microsoft.com/office/drawing/2014/main" val="20002"/>
+                      <a16:colId xmlns:a16="http://schemas.microsoft.com/office/drawing/2014/main" xmlns="" val="20002"/>
                     </a:ext>
                   </a:extLst>
                 </a:gridCol>
                 <a:gridCol w="2276061">
                   <a:extLst>
                     <a:ext uri="{9D8B030D-6E8A-4147-A177-3AD203B41FA5}">
-                      <a16:colId xmlns:a16="http://schemas.microsoft.com/office/drawing/2014/main" val="20003"/>
+                      <a16:colId xmlns:a16="http://schemas.microsoft.com/office/drawing/2014/main" xmlns="" val="20003"/>
                     </a:ext>
                   </a:extLst>
                 </a:gridCol>
@@ -9477,7 +9477,7 @@
                 </a:tc>
                 <a:extLst>
                   <a:ext uri="{0D108BD9-81ED-4DB2-BD59-A6C34878D82A}">
-                    <a16:rowId xmlns:a16="http://schemas.microsoft.com/office/drawing/2014/main" val="10000"/>
+                    <a16:rowId xmlns:a16="http://schemas.microsoft.com/office/drawing/2014/main" xmlns="" val="10000"/>
                   </a:ext>
                 </a:extLst>
               </a:tr>
@@ -9585,7 +9585,7 @@
                 </a:tc>
                 <a:extLst>
                   <a:ext uri="{0D108BD9-81ED-4DB2-BD59-A6C34878D82A}">
-                    <a16:rowId xmlns:a16="http://schemas.microsoft.com/office/drawing/2014/main" val="10001"/>
+                    <a16:rowId xmlns:a16="http://schemas.microsoft.com/office/drawing/2014/main" xmlns="" val="10001"/>
                   </a:ext>
                 </a:extLst>
               </a:tr>
@@ -9632,7 +9632,7 @@
                 </a:tc>
                 <a:extLst>
                   <a:ext uri="{0D108BD9-81ED-4DB2-BD59-A6C34878D82A}">
-                    <a16:rowId xmlns:a16="http://schemas.microsoft.com/office/drawing/2014/main" val="10002"/>
+                    <a16:rowId xmlns:a16="http://schemas.microsoft.com/office/drawing/2014/main" xmlns="" val="10002"/>
                   </a:ext>
                 </a:extLst>
               </a:tr>
@@ -9679,7 +9679,7 @@
                 </a:tc>
                 <a:extLst>
                   <a:ext uri="{0D108BD9-81ED-4DB2-BD59-A6C34878D82A}">
-                    <a16:rowId xmlns:a16="http://schemas.microsoft.com/office/drawing/2014/main" val="10003"/>
+                    <a16:rowId xmlns:a16="http://schemas.microsoft.com/office/drawing/2014/main" xmlns="" val="10003"/>
                   </a:ext>
                 </a:extLst>
               </a:tr>
@@ -9998,11 +9998,7 @@
             </a:pPr>
             <a:r>
               <a:rPr lang="sv-SE" dirty="0" smtClean="0"/>
-              <a:t>Mindre </a:t>
-            </a:r>
-            <a:r>
-              <a:rPr lang="sv-SE" dirty="0" smtClean="0"/>
-              <a:t>allvarliga </a:t>
+              <a:t>Mindre allvarliga </a:t>
             </a:r>
             <a:endParaRPr lang="sv-SE" dirty="0"/>
           </a:p>
@@ -10316,13 +10312,171 @@
         </p:nvSpPr>
         <p:spPr/>
         <p:txBody>
-          <a:bodyPr/>
-          <a:lstStyle/>
-          <a:p>
-            <a:endParaRPr lang="sv-SE"/>
-          </a:p>
-        </p:txBody>
-      </p:sp>
+          <a:bodyPr>
+            <a:normAutofit/>
+          </a:bodyPr>
+          <a:lstStyle/>
+          <a:p>
+            <a:r>
+              <a:rPr lang="sv-SE" sz="1800" dirty="0" smtClean="0"/>
+              <a:t>Några av felen vi hittade i </a:t>
+            </a:r>
+            <a:r>
+              <a:rPr lang="sv-SE" sz="1800" dirty="0" err="1" smtClean="0"/>
+              <a:t>FindBugs</a:t>
+            </a:r>
+            <a:r>
+              <a:rPr lang="sv-SE" sz="1800" dirty="0" smtClean="0"/>
+              <a:t> visar att under granskningen så fokuserade vi på annat än vad som kan va relevant för funktionen i programmet. Huvudfokus i granskningen var att göra koden lätt att förstå och </a:t>
+            </a:r>
+            <a:r>
+              <a:rPr lang="sv-SE" sz="1800" dirty="0" err="1" smtClean="0"/>
+              <a:t>refaktorera</a:t>
+            </a:r>
+            <a:r>
+              <a:rPr lang="sv-SE" sz="1800" dirty="0" smtClean="0"/>
+              <a:t> metoder med svåra namn. </a:t>
+            </a:r>
+            <a:r>
+              <a:rPr lang="sv-SE" sz="1800" dirty="0" err="1" smtClean="0"/>
+              <a:t>FindBugs</a:t>
+            </a:r>
+            <a:r>
+              <a:rPr lang="sv-SE" sz="1800" dirty="0" smtClean="0"/>
+              <a:t> hittade mer fel såsom ”\n” kunde ersättas med ”%n” i en </a:t>
+            </a:r>
+            <a:r>
+              <a:rPr lang="sv-SE" sz="1800" dirty="0" err="1" smtClean="0"/>
+              <a:t>printf</a:t>
+            </a:r>
+            <a:r>
+              <a:rPr lang="sv-SE" sz="1800" dirty="0" smtClean="0"/>
+              <a:t>() för att säkra funktionaliteten över flera operativsystem och miljöer.</a:t>
+            </a:r>
+          </a:p>
+          <a:p>
+            <a:r>
+              <a:rPr lang="sv-SE" sz="1800" dirty="0" smtClean="0"/>
+              <a:t>Kodkritiksystemet har varit inställt på högsta  känslighet både före och efter granskningen, dock så hittade det inte något kritiskt som behövdes åtgärdas när vi korrigerat allt från </a:t>
+            </a:r>
+            <a:r>
+              <a:rPr lang="sv-SE" sz="1800" dirty="0" err="1" smtClean="0"/>
+              <a:t>granskningrapporten</a:t>
+            </a:r>
+            <a:r>
+              <a:rPr lang="sv-SE" sz="1800" dirty="0" smtClean="0"/>
+              <a:t> samt första körningen av </a:t>
+            </a:r>
+            <a:r>
+              <a:rPr lang="sv-SE" sz="1800" dirty="0" err="1" smtClean="0"/>
+              <a:t>FindBugs</a:t>
+            </a:r>
+            <a:r>
+              <a:rPr lang="sv-SE" sz="1800" dirty="0" smtClean="0"/>
+              <a:t>.</a:t>
+            </a:r>
+          </a:p>
+          <a:p>
+            <a:r>
+              <a:rPr lang="sv-SE" sz="1800" dirty="0" smtClean="0"/>
+              <a:t>Det felet som </a:t>
+            </a:r>
+            <a:r>
+              <a:rPr lang="sv-SE" sz="1800" dirty="0" err="1" smtClean="0"/>
+              <a:t>FindBugs</a:t>
+            </a:r>
+            <a:r>
+              <a:rPr lang="sv-SE" sz="1800" dirty="0" smtClean="0"/>
+              <a:t> hittat är att returvärdet i </a:t>
+            </a:r>
+            <a:r>
+              <a:rPr lang="sv-SE" sz="1800" dirty="0" err="1" smtClean="0"/>
+              <a:t>getMaxHp</a:t>
+            </a:r>
+            <a:r>
+              <a:rPr lang="sv-SE" sz="1800" dirty="0" smtClean="0"/>
+              <a:t>() ignoreras, om vi tolkat uppgifterna rätt. I nuläget används inte metoden för mer än testning av variabeln </a:t>
+            </a:r>
+            <a:r>
+              <a:rPr lang="sv-SE" sz="1800" dirty="0" err="1" smtClean="0"/>
+              <a:t>maxHp</a:t>
+            </a:r>
+            <a:r>
+              <a:rPr lang="sv-SE" sz="1800" dirty="0" smtClean="0"/>
+              <a:t>, dock så kommer den vara till stor nytta när man i framtiden ska kunna lägga möjlighet att </a:t>
+            </a:r>
+            <a:r>
+              <a:rPr lang="sv-SE" sz="1800" dirty="0" err="1" smtClean="0"/>
+              <a:t>heala</a:t>
+            </a:r>
+            <a:r>
+              <a:rPr lang="sv-SE" sz="1800" dirty="0" smtClean="0"/>
+              <a:t> karaktären så livet inte överstiger max. Därav är det viktigt att ha det maximala värdet uppdaterat varje gång metoden kallas på.</a:t>
+            </a:r>
+            <a:endParaRPr lang="sv-SE" sz="1800" dirty="0" smtClean="0"/>
+          </a:p>
+        </p:txBody>
+      </p:sp>
+      <p:pic>
+        <p:nvPicPr>
+          <p:cNvPr id="4" name="Bildobjekt 3"/>
+          <p:cNvPicPr>
+            <a:picLocks noChangeAspect="1"/>
+          </p:cNvPicPr>
+          <p:nvPr/>
+        </p:nvPicPr>
+        <p:blipFill>
+          <a:blip r:embed="rId4">
+            <a:extLst>
+              <a:ext uri="{28A0092B-C50C-407E-A947-70E740481C1C}">
+                <a14:useLocalDpi xmlns:a14="http://schemas.microsoft.com/office/drawing/2010/main" val="0"/>
+              </a:ext>
+            </a:extLst>
+          </a:blip>
+          <a:stretch>
+            <a:fillRect/>
+          </a:stretch>
+        </p:blipFill>
+        <p:spPr>
+          <a:xfrm>
+            <a:off x="0" y="5127171"/>
+            <a:ext cx="7547366" cy="1518558"/>
+          </a:xfrm>
+          <a:prstGeom prst="rect">
+            <a:avLst/>
+          </a:prstGeom>
+        </p:spPr>
+      </p:pic>
+      <p:pic>
+        <p:nvPicPr>
+          <p:cNvPr id="5" name="Bildobjekt 4"/>
+          <p:cNvPicPr>
+            <a:picLocks noChangeAspect="1"/>
+          </p:cNvPicPr>
+          <p:nvPr/>
+        </p:nvPicPr>
+        <p:blipFill>
+          <a:blip r:embed="rId5">
+            <a:extLst>
+              <a:ext uri="{28A0092B-C50C-407E-A947-70E740481C1C}">
+                <a14:useLocalDpi xmlns:a14="http://schemas.microsoft.com/office/drawing/2010/main" val="0"/>
+              </a:ext>
+            </a:extLst>
+          </a:blip>
+          <a:stretch>
+            <a:fillRect/>
+          </a:stretch>
+        </p:blipFill>
+        <p:spPr>
+          <a:xfrm>
+            <a:off x="7556500" y="5433446"/>
+            <a:ext cx="4635500" cy="977900"/>
+          </a:xfrm>
+          <a:prstGeom prst="rect">
+            <a:avLst/>
+          </a:prstGeom>
+        </p:spPr>
+      </p:pic>
     </p:spTree>
     <p:custDataLst>
       <p:tags r:id="rId1"/>
@@ -11443,7 +11597,7 @@
           <p:cNvPr id="2" name="Pil: höger 1">
             <a:extLst>
               <a:ext uri="{FF2B5EF4-FFF2-40B4-BE49-F238E27FC236}">
-                <a16:creationId xmlns:a16="http://schemas.microsoft.com/office/drawing/2014/main" id="{5BED2071-56FA-4E12-93ED-D5F1E015E9AB}"/>
+                <a16:creationId xmlns:a16="http://schemas.microsoft.com/office/drawing/2014/main" xmlns="" id="{5BED2071-56FA-4E12-93ED-D5F1E015E9AB}"/>
               </a:ext>
             </a:extLst>
           </p:cNvPr>
@@ -11513,7 +11667,7 @@
           <p:cNvPr id="5" name="Pil: höger 4">
             <a:extLst>
               <a:ext uri="{FF2B5EF4-FFF2-40B4-BE49-F238E27FC236}">
-                <a16:creationId xmlns:a16="http://schemas.microsoft.com/office/drawing/2014/main" id="{DC33DE33-4EEE-4AAE-971A-9ECC8EEE5EF1}"/>
+                <a16:creationId xmlns:a16="http://schemas.microsoft.com/office/drawing/2014/main" xmlns="" id="{DC33DE33-4EEE-4AAE-971A-9ECC8EEE5EF1}"/>
               </a:ext>
             </a:extLst>
           </p:cNvPr>
@@ -11583,7 +11737,7 @@
           <p:cNvPr id="6" name="Pil: höger 5">
             <a:extLst>
               <a:ext uri="{FF2B5EF4-FFF2-40B4-BE49-F238E27FC236}">
-                <a16:creationId xmlns:a16="http://schemas.microsoft.com/office/drawing/2014/main" id="{079D7526-A6BE-430A-8F83-1E17E1718B8F}"/>
+                <a16:creationId xmlns:a16="http://schemas.microsoft.com/office/drawing/2014/main" xmlns="" id="{079D7526-A6BE-430A-8F83-1E17E1718B8F}"/>
               </a:ext>
             </a:extLst>
           </p:cNvPr>
@@ -11653,7 +11807,7 @@
           <p:cNvPr id="7" name="Pil: höger 6">
             <a:extLst>
               <a:ext uri="{FF2B5EF4-FFF2-40B4-BE49-F238E27FC236}">
-                <a16:creationId xmlns:a16="http://schemas.microsoft.com/office/drawing/2014/main" id="{C612D35E-3946-4792-9C94-3ADB79886997}"/>
+                <a16:creationId xmlns:a16="http://schemas.microsoft.com/office/drawing/2014/main" xmlns="" id="{C612D35E-3946-4792-9C94-3ADB79886997}"/>
               </a:ext>
             </a:extLst>
           </p:cNvPr>
@@ -11723,7 +11877,7 @@
           <p:cNvPr id="8" name="Pil: höger 7">
             <a:extLst>
               <a:ext uri="{FF2B5EF4-FFF2-40B4-BE49-F238E27FC236}">
-                <a16:creationId xmlns:a16="http://schemas.microsoft.com/office/drawing/2014/main" id="{5BD09438-3B93-47E0-BC3B-379F80A1ECA7}"/>
+                <a16:creationId xmlns:a16="http://schemas.microsoft.com/office/drawing/2014/main" xmlns="" id="{5BD09438-3B93-47E0-BC3B-379F80A1ECA7}"/>
               </a:ext>
             </a:extLst>
           </p:cNvPr>
@@ -11793,7 +11947,7 @@
           <p:cNvPr id="10" name="Pil: höger 9">
             <a:extLst>
               <a:ext uri="{FF2B5EF4-FFF2-40B4-BE49-F238E27FC236}">
-                <a16:creationId xmlns:a16="http://schemas.microsoft.com/office/drawing/2014/main" id="{5E1CDCBD-85A1-479E-827B-CE49B4497796}"/>
+                <a16:creationId xmlns:a16="http://schemas.microsoft.com/office/drawing/2014/main" xmlns="" id="{5E1CDCBD-85A1-479E-827B-CE49B4497796}"/>
               </a:ext>
             </a:extLst>
           </p:cNvPr>
@@ -11863,7 +12017,7 @@
           <p:cNvPr id="12" name="Pil: höger 11">
             <a:extLst>
               <a:ext uri="{FF2B5EF4-FFF2-40B4-BE49-F238E27FC236}">
-                <a16:creationId xmlns:a16="http://schemas.microsoft.com/office/drawing/2014/main" id="{8731D112-5CF6-4435-8FC0-5ABB9AFA1AC7}"/>
+                <a16:creationId xmlns:a16="http://schemas.microsoft.com/office/drawing/2014/main" xmlns="" id="{8731D112-5CF6-4435-8FC0-5ABB9AFA1AC7}"/>
               </a:ext>
             </a:extLst>
           </p:cNvPr>
@@ -11933,7 +12087,7 @@
           <p:cNvPr id="13" name="Pil: höger 12">
             <a:extLst>
               <a:ext uri="{FF2B5EF4-FFF2-40B4-BE49-F238E27FC236}">
-                <a16:creationId xmlns:a16="http://schemas.microsoft.com/office/drawing/2014/main" id="{6353E274-CA98-4BA5-9F0C-F86B0EAE5578}"/>
+                <a16:creationId xmlns:a16="http://schemas.microsoft.com/office/drawing/2014/main" xmlns="" id="{6353E274-CA98-4BA5-9F0C-F86B0EAE5578}"/>
               </a:ext>
             </a:extLst>
           </p:cNvPr>
@@ -12120,7 +12274,7 @@
           <p:cNvPr id="8" name="Rectangle 2">
             <a:extLst>
               <a:ext uri="{FF2B5EF4-FFF2-40B4-BE49-F238E27FC236}">
-                <a16:creationId xmlns:a16="http://schemas.microsoft.com/office/drawing/2014/main" id="{1FC9AD1E-4A52-4998-A5A3-BAEC1C827718}"/>
+                <a16:creationId xmlns:a16="http://schemas.microsoft.com/office/drawing/2014/main" xmlns="" id="{1FC9AD1E-4A52-4998-A5A3-BAEC1C827718}"/>
               </a:ext>
             </a:extLst>
           </p:cNvPr>
@@ -12635,7 +12789,7 @@
           <p:cNvPr id="12" name="Rectangle 2">
             <a:extLst>
               <a:ext uri="{FF2B5EF4-FFF2-40B4-BE49-F238E27FC236}">
-                <a16:creationId xmlns:a16="http://schemas.microsoft.com/office/drawing/2014/main" id="{390B7AF8-02CC-4EF9-A9A5-59849FC5BA99}"/>
+                <a16:creationId xmlns:a16="http://schemas.microsoft.com/office/drawing/2014/main" xmlns="" id="{390B7AF8-02CC-4EF9-A9A5-59849FC5BA99}"/>
               </a:ext>
             </a:extLst>
           </p:cNvPr>
@@ -15287,7 +15441,7 @@
           <p:cNvPr id="13" name="Rectangle 3">
             <a:extLst>
               <a:ext uri="{FF2B5EF4-FFF2-40B4-BE49-F238E27FC236}">
-                <a16:creationId xmlns:a16="http://schemas.microsoft.com/office/drawing/2014/main" id="{C08EF8EF-E887-46B2-8D83-1FD183E46154}"/>
+                <a16:creationId xmlns:a16="http://schemas.microsoft.com/office/drawing/2014/main" xmlns="" id="{C08EF8EF-E887-46B2-8D83-1FD183E46154}"/>
               </a:ext>
             </a:extLst>
           </p:cNvPr>
@@ -15924,7 +16078,7 @@
           <p:cNvPr id="7" name="Rectangle 1">
             <a:extLst>
               <a:ext uri="{FF2B5EF4-FFF2-40B4-BE49-F238E27FC236}">
-                <a16:creationId xmlns:a16="http://schemas.microsoft.com/office/drawing/2014/main" id="{3199D4B4-952F-47D5-A8B5-DFCEF934D87B}"/>
+                <a16:creationId xmlns:a16="http://schemas.microsoft.com/office/drawing/2014/main" xmlns="" id="{3199D4B4-952F-47D5-A8B5-DFCEF934D87B}"/>
               </a:ext>
             </a:extLst>
           </p:cNvPr>

</xml_diff>

<commit_message>
Metrics tillagd i PP
Har lagt till metrics i powerpoint presentationen, har även återställt en äldre version av Game.java så att profilern kan testas.
</commit_message>
<xml_diff>
--- a/01 Dokumentation/slutredovisning.pptx
+++ b/01 Dokumentation/slutredovisning.pptx
@@ -5,7 +5,7 @@
     <p:sldMasterId id="2147483648" r:id="rId1"/>
   </p:sldMasterIdLst>
   <p:notesMasterIdLst>
-    <p:notesMasterId r:id="rId37"/>
+    <p:notesMasterId r:id="rId40"/>
   </p:notesMasterIdLst>
   <p:sldIdLst>
     <p:sldId id="256" r:id="rId2"/>
@@ -34,20 +34,23 @@
     <p:sldId id="275" r:id="rId25"/>
     <p:sldId id="276" r:id="rId26"/>
     <p:sldId id="277" r:id="rId27"/>
-    <p:sldId id="278" r:id="rId28"/>
-    <p:sldId id="279" r:id="rId29"/>
-    <p:sldId id="296" r:id="rId30"/>
-    <p:sldId id="297" r:id="rId31"/>
-    <p:sldId id="298" r:id="rId32"/>
-    <p:sldId id="299" r:id="rId33"/>
-    <p:sldId id="300" r:id="rId34"/>
-    <p:sldId id="282" r:id="rId35"/>
-    <p:sldId id="280" r:id="rId36"/>
+    <p:sldId id="302" r:id="rId28"/>
+    <p:sldId id="303" r:id="rId29"/>
+    <p:sldId id="304" r:id="rId30"/>
+    <p:sldId id="278" r:id="rId31"/>
+    <p:sldId id="279" r:id="rId32"/>
+    <p:sldId id="296" r:id="rId33"/>
+    <p:sldId id="297" r:id="rId34"/>
+    <p:sldId id="298" r:id="rId35"/>
+    <p:sldId id="299" r:id="rId36"/>
+    <p:sldId id="300" r:id="rId37"/>
+    <p:sldId id="282" r:id="rId38"/>
+    <p:sldId id="280" r:id="rId39"/>
   </p:sldIdLst>
   <p:sldSz cx="12192000" cy="6858000"/>
   <p:notesSz cx="6858000" cy="9144000"/>
   <p:custDataLst>
-    <p:tags r:id="rId38"/>
+    <p:tags r:id="rId41"/>
   </p:custDataLst>
   <p:defaultTextStyle>
     <a:defPPr>
@@ -396,7 +399,7 @@
           <a:p>
             <a:fld id="{8667F948-D2CB-486C-A2EA-FEABC2DAAE8D}" type="slidenum">
               <a:rPr lang="sv-SE" smtClean="0"/>
-              <a:t>‹Nr.›</a:t>
+              <a:t>‹#›</a:t>
             </a:fld>
             <a:endParaRPr lang="sv-SE"/>
           </a:p>
@@ -2830,7 +2833,7 @@
                 <a:ea typeface="+mn-ea"/>
                 <a:cs typeface="+mn-cs"/>
               </a:rPr>
-              <a:t>En översikt över vilken täckningsgrad era testfall uppnått. Denna kan antagligen tas rakt av från verktyget ni använt för att mäta den. Om ni inte uppnått fullständig täckning så ska detta förklaras och motiveras.</a:t>
+              <a:t>En presentation och diskussion kring ett antal lämpliga statiska mått på koden. Att vi inte specificerar exakt vilka mått som ska tas upp beror på att olika verktyg har olika uppsättningar, men vi förväntar oss fler och mer intressanta mått än bara rena storleksmått som LOC, #klasser, #metoder, etc. Även här är det viktigt att förhållas sig till måtten, inte bara lista dem.</a:t>
             </a:r>
           </a:p>
           <a:p>
@@ -2864,7 +2867,7 @@
     </p:spTree>
     <p:extLst>
       <p:ext uri="{BB962C8B-B14F-4D97-AF65-F5344CB8AC3E}">
-        <p14:creationId xmlns:p14="http://schemas.microsoft.com/office/powerpoint/2010/main" val="169751880"/>
+        <p14:creationId xmlns:p14="http://schemas.microsoft.com/office/powerpoint/2010/main" val="3216018999"/>
       </p:ext>
     </p:extLst>
   </p:cSld>
@@ -2945,36 +2948,8 @@
                 <a:ea typeface="+mn-ea"/>
                 <a:cs typeface="+mn-cs"/>
               </a:rPr>
-              <a:t>En kort presentation av hur ni gått tillväga för att testa koden med en profiler och vilka resultat ni fick fram. Även här är det viktigt att förhållas sig till måtten, inte bara presentera dem.</a:t>
-            </a:r>
-          </a:p>
-          <a:p>
-            <a:pPr marL="0" marR="0" lvl="0" indent="0" algn="l" defTabSz="914400" rtl="0" eaLnBrk="1" fontAlgn="auto" latinLnBrk="0" hangingPunct="1">
-              <a:lnSpc>
-                <a:spcPct val="100000"/>
-              </a:lnSpc>
-              <a:spcBef>
-                <a:spcPts val="0"/>
-              </a:spcBef>
-              <a:spcAft>
-                <a:spcPts val="0"/>
-              </a:spcAft>
-              <a:buClrTx/>
-              <a:buSzTx/>
-              <a:buFontTx/>
-              <a:buNone/>
-              <a:tabLst/>
-              <a:defRPr/>
-            </a:pPr>
-            <a:endParaRPr lang="sv-SE" sz="1200" kern="1200" dirty="0">
-              <a:solidFill>
-                <a:schemeClr val="tx1"/>
-              </a:solidFill>
-              <a:effectLst/>
-              <a:latin typeface="+mn-lt"/>
-              <a:ea typeface="+mn-ea"/>
-              <a:cs typeface="+mn-cs"/>
-            </a:endParaRPr>
+              <a:t>En presentation och diskussion kring ett antal lämpliga statiska mått på koden. Att vi inte specificerar exakt vilka mått som ska tas upp beror på att olika verktyg har olika uppsättningar, men vi förväntar oss fler och mer intressanta mått än bara rena storleksmått som LOC, #klasser, #metoder, etc. Även här är det viktigt att förhållas sig till måtten, inte bara lista dem.</a:t>
+            </a:r>
           </a:p>
           <a:p>
             <a:endParaRPr lang="sv-SE" dirty="0"/>
@@ -3007,7 +2982,7 @@
     </p:spTree>
     <p:extLst>
       <p:ext uri="{BB962C8B-B14F-4D97-AF65-F5344CB8AC3E}">
-        <p14:creationId xmlns:p14="http://schemas.microsoft.com/office/powerpoint/2010/main" val="1278246246"/>
+        <p14:creationId xmlns:p14="http://schemas.microsoft.com/office/powerpoint/2010/main" val="3157414616"/>
       </p:ext>
     </p:extLst>
   </p:cSld>
@@ -3088,36 +3063,8 @@
                 <a:ea typeface="+mn-ea"/>
                 <a:cs typeface="+mn-cs"/>
               </a:rPr>
-              <a:t>En kort presentation av hur ni gått tillväga för att testa koden med en profiler och vilka resultat ni fick fram. Även här är det viktigt att förhållas sig till måtten, inte bara presentera dem.</a:t>
-            </a:r>
-          </a:p>
-          <a:p>
-            <a:pPr marL="0" marR="0" lvl="0" indent="0" algn="l" defTabSz="914400" rtl="0" eaLnBrk="1" fontAlgn="auto" latinLnBrk="0" hangingPunct="1">
-              <a:lnSpc>
-                <a:spcPct val="100000"/>
-              </a:lnSpc>
-              <a:spcBef>
-                <a:spcPts val="0"/>
-              </a:spcBef>
-              <a:spcAft>
-                <a:spcPts val="0"/>
-              </a:spcAft>
-              <a:buClrTx/>
-              <a:buSzTx/>
-              <a:buFontTx/>
-              <a:buNone/>
-              <a:tabLst/>
-              <a:defRPr/>
-            </a:pPr>
-            <a:endParaRPr lang="sv-SE" sz="1200" kern="1200" dirty="0">
-              <a:solidFill>
-                <a:schemeClr val="tx1"/>
-              </a:solidFill>
-              <a:effectLst/>
-              <a:latin typeface="+mn-lt"/>
-              <a:ea typeface="+mn-ea"/>
-              <a:cs typeface="+mn-cs"/>
-            </a:endParaRPr>
+              <a:t>En presentation och diskussion kring ett antal lämpliga statiska mått på koden. Att vi inte specificerar exakt vilka mått som ska tas upp beror på att olika verktyg har olika uppsättningar, men vi förväntar oss fler och mer intressanta mått än bara rena storleksmått som LOC, #klasser, #metoder, etc. Även här är det viktigt att förhållas sig till måtten, inte bara lista dem.</a:t>
+            </a:r>
           </a:p>
           <a:p>
             <a:endParaRPr lang="sv-SE" dirty="0"/>
@@ -3150,7 +3097,7 @@
     </p:spTree>
     <p:extLst>
       <p:ext uri="{BB962C8B-B14F-4D97-AF65-F5344CB8AC3E}">
-        <p14:creationId xmlns:p14="http://schemas.microsoft.com/office/powerpoint/2010/main" val="3235654969"/>
+        <p14:creationId xmlns:p14="http://schemas.microsoft.com/office/powerpoint/2010/main" val="3821843939"/>
       </p:ext>
     </p:extLst>
   </p:cSld>
@@ -3338,7 +3285,7 @@
                 <a:ea typeface="+mn-ea"/>
                 <a:cs typeface="+mn-cs"/>
               </a:rPr>
-              <a:t>Byggscriptets första (seriösa) version, och den slutliga.</a:t>
+              <a:t>En översikt över vilken täckningsgrad era testfall uppnått. Denna kan antagligen tas rakt av från verktyget ni använt för att mäta den. Om ni inte uppnått fullständig täckning så ska detta förklaras och motiveras.</a:t>
             </a:r>
           </a:p>
           <a:p>
@@ -3363,7 +3310,408 @@
           <a:p>
             <a:fld id="{8667F948-D2CB-486C-A2EA-FEABC2DAAE8D}" type="slidenum">
               <a:rPr lang="sv-SE" smtClean="0"/>
-              <a:t>35</a:t>
+              <a:t>30</a:t>
+            </a:fld>
+            <a:endParaRPr lang="sv-SE"/>
+          </a:p>
+        </p:txBody>
+      </p:sp>
+    </p:spTree>
+    <p:extLst>
+      <p:ext uri="{BB962C8B-B14F-4D97-AF65-F5344CB8AC3E}">
+        <p14:creationId xmlns:p14="http://schemas.microsoft.com/office/powerpoint/2010/main" val="169751880"/>
+      </p:ext>
+    </p:extLst>
+  </p:cSld>
+  <p:clrMapOvr>
+    <a:masterClrMapping/>
+  </p:clrMapOvr>
+</p:notes>
+</file>
+
+<file path=ppt/notesSlides/notesSlide31.xml><?xml version="1.0" encoding="utf-8"?>
+<p:notes xmlns:a="http://schemas.openxmlformats.org/drawingml/2006/main" xmlns:r="http://schemas.openxmlformats.org/officeDocument/2006/relationships" xmlns:p="http://schemas.openxmlformats.org/presentationml/2006/main">
+  <p:cSld>
+    <p:spTree>
+      <p:nvGrpSpPr>
+        <p:cNvPr id="1" name=""/>
+        <p:cNvGrpSpPr/>
+        <p:nvPr/>
+      </p:nvGrpSpPr>
+      <p:grpSpPr>
+        <a:xfrm>
+          <a:off x="0" y="0"/>
+          <a:ext cx="0" cy="0"/>
+          <a:chOff x="0" y="0"/>
+          <a:chExt cx="0" cy="0"/>
+        </a:xfrm>
+      </p:grpSpPr>
+      <p:sp>
+        <p:nvSpPr>
+          <p:cNvPr id="2" name="Platshållare för bildobjekt 1"/>
+          <p:cNvSpPr>
+            <a:spLocks noGrp="1" noRot="1" noChangeAspect="1"/>
+          </p:cNvSpPr>
+          <p:nvPr>
+            <p:ph type="sldImg"/>
+          </p:nvPr>
+        </p:nvSpPr>
+        <p:spPr/>
+      </p:sp>
+      <p:sp>
+        <p:nvSpPr>
+          <p:cNvPr id="3" name="Platshållare för anteckningar 2"/>
+          <p:cNvSpPr>
+            <a:spLocks noGrp="1"/>
+          </p:cNvSpPr>
+          <p:nvPr>
+            <p:ph type="body" idx="1"/>
+          </p:nvPr>
+        </p:nvSpPr>
+        <p:spPr/>
+        <p:txBody>
+          <a:bodyPr/>
+          <a:lstStyle/>
+          <a:p>
+            <a:pPr marL="0" marR="0" lvl="0" indent="0" algn="l" defTabSz="914400" rtl="0" eaLnBrk="1" fontAlgn="auto" latinLnBrk="0" hangingPunct="1">
+              <a:lnSpc>
+                <a:spcPct val="100000"/>
+              </a:lnSpc>
+              <a:spcBef>
+                <a:spcPts val="0"/>
+              </a:spcBef>
+              <a:spcAft>
+                <a:spcPts val="0"/>
+              </a:spcAft>
+              <a:buClrTx/>
+              <a:buSzTx/>
+              <a:buFontTx/>
+              <a:buNone/>
+              <a:tabLst/>
+              <a:defRPr/>
+            </a:pPr>
+            <a:r>
+              <a:rPr lang="sv-SE" sz="1200" kern="1200" dirty="0">
+                <a:solidFill>
+                  <a:schemeClr val="tx1"/>
+                </a:solidFill>
+                <a:effectLst/>
+                <a:latin typeface="+mn-lt"/>
+                <a:ea typeface="+mn-ea"/>
+                <a:cs typeface="+mn-cs"/>
+              </a:rPr>
+              <a:t>En kort presentation av hur ni gått tillväga för att testa koden med en profiler och vilka resultat ni fick fram. Även här är det viktigt att förhållas sig till måtten, inte bara presentera dem.</a:t>
+            </a:r>
+          </a:p>
+          <a:p>
+            <a:pPr marL="0" marR="0" lvl="0" indent="0" algn="l" defTabSz="914400" rtl="0" eaLnBrk="1" fontAlgn="auto" latinLnBrk="0" hangingPunct="1">
+              <a:lnSpc>
+                <a:spcPct val="100000"/>
+              </a:lnSpc>
+              <a:spcBef>
+                <a:spcPts val="0"/>
+              </a:spcBef>
+              <a:spcAft>
+                <a:spcPts val="0"/>
+              </a:spcAft>
+              <a:buClrTx/>
+              <a:buSzTx/>
+              <a:buFontTx/>
+              <a:buNone/>
+              <a:tabLst/>
+              <a:defRPr/>
+            </a:pPr>
+            <a:endParaRPr lang="sv-SE" sz="1200" kern="1200" dirty="0">
+              <a:solidFill>
+                <a:schemeClr val="tx1"/>
+              </a:solidFill>
+              <a:effectLst/>
+              <a:latin typeface="+mn-lt"/>
+              <a:ea typeface="+mn-ea"/>
+              <a:cs typeface="+mn-cs"/>
+            </a:endParaRPr>
+          </a:p>
+          <a:p>
+            <a:endParaRPr lang="sv-SE" dirty="0"/>
+          </a:p>
+        </p:txBody>
+      </p:sp>
+      <p:sp>
+        <p:nvSpPr>
+          <p:cNvPr id="4" name="Platshållare för bildnummer 3"/>
+          <p:cNvSpPr>
+            <a:spLocks noGrp="1"/>
+          </p:cNvSpPr>
+          <p:nvPr>
+            <p:ph type="sldNum" sz="quarter" idx="10"/>
+          </p:nvPr>
+        </p:nvSpPr>
+        <p:spPr/>
+        <p:txBody>
+          <a:bodyPr/>
+          <a:lstStyle/>
+          <a:p>
+            <a:fld id="{8667F948-D2CB-486C-A2EA-FEABC2DAAE8D}" type="slidenum">
+              <a:rPr lang="sv-SE" smtClean="0"/>
+              <a:t>31</a:t>
+            </a:fld>
+            <a:endParaRPr lang="sv-SE"/>
+          </a:p>
+        </p:txBody>
+      </p:sp>
+    </p:spTree>
+    <p:extLst>
+      <p:ext uri="{BB962C8B-B14F-4D97-AF65-F5344CB8AC3E}">
+        <p14:creationId xmlns:p14="http://schemas.microsoft.com/office/powerpoint/2010/main" val="1278246246"/>
+      </p:ext>
+    </p:extLst>
+  </p:cSld>
+  <p:clrMapOvr>
+    <a:masterClrMapping/>
+  </p:clrMapOvr>
+</p:notes>
+</file>
+
+<file path=ppt/notesSlides/notesSlide32.xml><?xml version="1.0" encoding="utf-8"?>
+<p:notes xmlns:a="http://schemas.openxmlformats.org/drawingml/2006/main" xmlns:r="http://schemas.openxmlformats.org/officeDocument/2006/relationships" xmlns:p="http://schemas.openxmlformats.org/presentationml/2006/main">
+  <p:cSld>
+    <p:spTree>
+      <p:nvGrpSpPr>
+        <p:cNvPr id="1" name=""/>
+        <p:cNvGrpSpPr/>
+        <p:nvPr/>
+      </p:nvGrpSpPr>
+      <p:grpSpPr>
+        <a:xfrm>
+          <a:off x="0" y="0"/>
+          <a:ext cx="0" cy="0"/>
+          <a:chOff x="0" y="0"/>
+          <a:chExt cx="0" cy="0"/>
+        </a:xfrm>
+      </p:grpSpPr>
+      <p:sp>
+        <p:nvSpPr>
+          <p:cNvPr id="2" name="Platshållare för bildobjekt 1"/>
+          <p:cNvSpPr>
+            <a:spLocks noGrp="1" noRot="1" noChangeAspect="1"/>
+          </p:cNvSpPr>
+          <p:nvPr>
+            <p:ph type="sldImg"/>
+          </p:nvPr>
+        </p:nvSpPr>
+        <p:spPr/>
+      </p:sp>
+      <p:sp>
+        <p:nvSpPr>
+          <p:cNvPr id="3" name="Platshållare för anteckningar 2"/>
+          <p:cNvSpPr>
+            <a:spLocks noGrp="1"/>
+          </p:cNvSpPr>
+          <p:nvPr>
+            <p:ph type="body" idx="1"/>
+          </p:nvPr>
+        </p:nvSpPr>
+        <p:spPr/>
+        <p:txBody>
+          <a:bodyPr/>
+          <a:lstStyle/>
+          <a:p>
+            <a:pPr marL="0" marR="0" lvl="0" indent="0" algn="l" defTabSz="914400" rtl="0" eaLnBrk="1" fontAlgn="auto" latinLnBrk="0" hangingPunct="1">
+              <a:lnSpc>
+                <a:spcPct val="100000"/>
+              </a:lnSpc>
+              <a:spcBef>
+                <a:spcPts val="0"/>
+              </a:spcBef>
+              <a:spcAft>
+                <a:spcPts val="0"/>
+              </a:spcAft>
+              <a:buClrTx/>
+              <a:buSzTx/>
+              <a:buFontTx/>
+              <a:buNone/>
+              <a:tabLst/>
+              <a:defRPr/>
+            </a:pPr>
+            <a:r>
+              <a:rPr lang="sv-SE" sz="1200" kern="1200" dirty="0">
+                <a:solidFill>
+                  <a:schemeClr val="tx1"/>
+                </a:solidFill>
+                <a:effectLst/>
+                <a:latin typeface="+mn-lt"/>
+                <a:ea typeface="+mn-ea"/>
+                <a:cs typeface="+mn-cs"/>
+              </a:rPr>
+              <a:t>En kort presentation av hur ni gått tillväga för att testa koden med en profiler och vilka resultat ni fick fram. Även här är det viktigt att förhållas sig till måtten, inte bara presentera dem.</a:t>
+            </a:r>
+          </a:p>
+          <a:p>
+            <a:pPr marL="0" marR="0" lvl="0" indent="0" algn="l" defTabSz="914400" rtl="0" eaLnBrk="1" fontAlgn="auto" latinLnBrk="0" hangingPunct="1">
+              <a:lnSpc>
+                <a:spcPct val="100000"/>
+              </a:lnSpc>
+              <a:spcBef>
+                <a:spcPts val="0"/>
+              </a:spcBef>
+              <a:spcAft>
+                <a:spcPts val="0"/>
+              </a:spcAft>
+              <a:buClrTx/>
+              <a:buSzTx/>
+              <a:buFontTx/>
+              <a:buNone/>
+              <a:tabLst/>
+              <a:defRPr/>
+            </a:pPr>
+            <a:endParaRPr lang="sv-SE" sz="1200" kern="1200" dirty="0">
+              <a:solidFill>
+                <a:schemeClr val="tx1"/>
+              </a:solidFill>
+              <a:effectLst/>
+              <a:latin typeface="+mn-lt"/>
+              <a:ea typeface="+mn-ea"/>
+              <a:cs typeface="+mn-cs"/>
+            </a:endParaRPr>
+          </a:p>
+          <a:p>
+            <a:endParaRPr lang="sv-SE" dirty="0"/>
+          </a:p>
+        </p:txBody>
+      </p:sp>
+      <p:sp>
+        <p:nvSpPr>
+          <p:cNvPr id="4" name="Platshållare för bildnummer 3"/>
+          <p:cNvSpPr>
+            <a:spLocks noGrp="1"/>
+          </p:cNvSpPr>
+          <p:nvPr>
+            <p:ph type="sldNum" sz="quarter" idx="10"/>
+          </p:nvPr>
+        </p:nvSpPr>
+        <p:spPr/>
+        <p:txBody>
+          <a:bodyPr/>
+          <a:lstStyle/>
+          <a:p>
+            <a:fld id="{8667F948-D2CB-486C-A2EA-FEABC2DAAE8D}" type="slidenum">
+              <a:rPr lang="sv-SE" smtClean="0"/>
+              <a:t>32</a:t>
+            </a:fld>
+            <a:endParaRPr lang="sv-SE"/>
+          </a:p>
+        </p:txBody>
+      </p:sp>
+    </p:spTree>
+    <p:extLst>
+      <p:ext uri="{BB962C8B-B14F-4D97-AF65-F5344CB8AC3E}">
+        <p14:creationId xmlns:p14="http://schemas.microsoft.com/office/powerpoint/2010/main" val="3235654969"/>
+      </p:ext>
+    </p:extLst>
+  </p:cSld>
+  <p:clrMapOvr>
+    <a:masterClrMapping/>
+  </p:clrMapOvr>
+</p:notes>
+</file>
+
+<file path=ppt/notesSlides/notesSlide33.xml><?xml version="1.0" encoding="utf-8"?>
+<p:notes xmlns:a="http://schemas.openxmlformats.org/drawingml/2006/main" xmlns:r="http://schemas.openxmlformats.org/officeDocument/2006/relationships" xmlns:p="http://schemas.openxmlformats.org/presentationml/2006/main">
+  <p:cSld>
+    <p:spTree>
+      <p:nvGrpSpPr>
+        <p:cNvPr id="1" name=""/>
+        <p:cNvGrpSpPr/>
+        <p:nvPr/>
+      </p:nvGrpSpPr>
+      <p:grpSpPr>
+        <a:xfrm>
+          <a:off x="0" y="0"/>
+          <a:ext cx="0" cy="0"/>
+          <a:chOff x="0" y="0"/>
+          <a:chExt cx="0" cy="0"/>
+        </a:xfrm>
+      </p:grpSpPr>
+      <p:sp>
+        <p:nvSpPr>
+          <p:cNvPr id="2" name="Platshållare för bildobjekt 1"/>
+          <p:cNvSpPr>
+            <a:spLocks noGrp="1" noRot="1" noChangeAspect="1"/>
+          </p:cNvSpPr>
+          <p:nvPr>
+            <p:ph type="sldImg"/>
+          </p:nvPr>
+        </p:nvSpPr>
+        <p:spPr/>
+      </p:sp>
+      <p:sp>
+        <p:nvSpPr>
+          <p:cNvPr id="3" name="Platshållare för anteckningar 2"/>
+          <p:cNvSpPr>
+            <a:spLocks noGrp="1"/>
+          </p:cNvSpPr>
+          <p:nvPr>
+            <p:ph type="body" idx="1"/>
+          </p:nvPr>
+        </p:nvSpPr>
+        <p:spPr/>
+        <p:txBody>
+          <a:bodyPr/>
+          <a:lstStyle/>
+          <a:p>
+            <a:pPr marL="0" marR="0" lvl="0" indent="0" algn="l" defTabSz="914400" rtl="0" eaLnBrk="1" fontAlgn="auto" latinLnBrk="0" hangingPunct="1">
+              <a:lnSpc>
+                <a:spcPct val="100000"/>
+              </a:lnSpc>
+              <a:spcBef>
+                <a:spcPts val="0"/>
+              </a:spcBef>
+              <a:spcAft>
+                <a:spcPts val="0"/>
+              </a:spcAft>
+              <a:buClrTx/>
+              <a:buSzTx/>
+              <a:buFontTx/>
+              <a:buNone/>
+              <a:tabLst/>
+              <a:defRPr/>
+            </a:pPr>
+            <a:r>
+              <a:rPr lang="sv-SE" sz="1200" kern="1200" dirty="0">
+                <a:solidFill>
+                  <a:schemeClr val="tx1"/>
+                </a:solidFill>
+                <a:effectLst/>
+                <a:latin typeface="+mn-lt"/>
+                <a:ea typeface="+mn-ea"/>
+                <a:cs typeface="+mn-cs"/>
+              </a:rPr>
+              <a:t>Byggscriptets första (seriösa) version, och den slutliga.</a:t>
+            </a:r>
+          </a:p>
+          <a:p>
+            <a:endParaRPr lang="sv-SE" dirty="0"/>
+          </a:p>
+        </p:txBody>
+      </p:sp>
+      <p:sp>
+        <p:nvSpPr>
+          <p:cNvPr id="4" name="Platshållare för bildnummer 3"/>
+          <p:cNvSpPr>
+            <a:spLocks noGrp="1"/>
+          </p:cNvSpPr>
+          <p:nvPr>
+            <p:ph type="sldNum" sz="quarter" idx="10"/>
+          </p:nvPr>
+        </p:nvSpPr>
+        <p:spPr/>
+        <p:txBody>
+          <a:bodyPr/>
+          <a:lstStyle/>
+          <a:p>
+            <a:fld id="{8667F948-D2CB-486C-A2EA-FEABC2DAAE8D}" type="slidenum">
+              <a:rPr lang="sv-SE" smtClean="0"/>
+              <a:t>38</a:t>
             </a:fld>
             <a:endParaRPr lang="sv-SE"/>
           </a:p>
@@ -4387,7 +4735,7 @@
           <a:p>
             <a:fld id="{36FE6EAF-707E-454E-841A-E111EB854EEC}" type="slidenum">
               <a:rPr lang="sv-SE" smtClean="0"/>
-              <a:t>‹Nr.›</a:t>
+              <a:t>‹#›</a:t>
             </a:fld>
             <a:endParaRPr lang="sv-SE"/>
           </a:p>
@@ -4555,7 +4903,7 @@
           <a:p>
             <a:fld id="{36FE6EAF-707E-454E-841A-E111EB854EEC}" type="slidenum">
               <a:rPr lang="sv-SE" smtClean="0"/>
-              <a:t>‹Nr.›</a:t>
+              <a:t>‹#›</a:t>
             </a:fld>
             <a:endParaRPr lang="sv-SE"/>
           </a:p>
@@ -4733,7 +5081,7 @@
           <a:p>
             <a:fld id="{36FE6EAF-707E-454E-841A-E111EB854EEC}" type="slidenum">
               <a:rPr lang="sv-SE" smtClean="0"/>
-              <a:t>‹Nr.›</a:t>
+              <a:t>‹#›</a:t>
             </a:fld>
             <a:endParaRPr lang="sv-SE"/>
           </a:p>
@@ -4901,7 +5249,7 @@
           <a:p>
             <a:fld id="{36FE6EAF-707E-454E-841A-E111EB854EEC}" type="slidenum">
               <a:rPr lang="sv-SE" smtClean="0"/>
-              <a:t>‹Nr.›</a:t>
+              <a:t>‹#›</a:t>
             </a:fld>
             <a:endParaRPr lang="sv-SE"/>
           </a:p>
@@ -5146,7 +5494,7 @@
           <a:p>
             <a:fld id="{36FE6EAF-707E-454E-841A-E111EB854EEC}" type="slidenum">
               <a:rPr lang="sv-SE" smtClean="0"/>
-              <a:t>‹Nr.›</a:t>
+              <a:t>‹#›</a:t>
             </a:fld>
             <a:endParaRPr lang="sv-SE"/>
           </a:p>
@@ -5375,7 +5723,7 @@
           <a:p>
             <a:fld id="{36FE6EAF-707E-454E-841A-E111EB854EEC}" type="slidenum">
               <a:rPr lang="sv-SE" smtClean="0"/>
-              <a:t>‹Nr.›</a:t>
+              <a:t>‹#›</a:t>
             </a:fld>
             <a:endParaRPr lang="sv-SE"/>
           </a:p>
@@ -5739,7 +6087,7 @@
           <a:p>
             <a:fld id="{36FE6EAF-707E-454E-841A-E111EB854EEC}" type="slidenum">
               <a:rPr lang="sv-SE" smtClean="0"/>
-              <a:t>‹Nr.›</a:t>
+              <a:t>‹#›</a:t>
             </a:fld>
             <a:endParaRPr lang="sv-SE"/>
           </a:p>
@@ -5856,7 +6204,7 @@
           <a:p>
             <a:fld id="{36FE6EAF-707E-454E-841A-E111EB854EEC}" type="slidenum">
               <a:rPr lang="sv-SE" smtClean="0"/>
-              <a:t>‹Nr.›</a:t>
+              <a:t>‹#›</a:t>
             </a:fld>
             <a:endParaRPr lang="sv-SE"/>
           </a:p>
@@ -5951,7 +6299,7 @@
           <a:p>
             <a:fld id="{36FE6EAF-707E-454E-841A-E111EB854EEC}" type="slidenum">
               <a:rPr lang="sv-SE" smtClean="0"/>
-              <a:t>‹Nr.›</a:t>
+              <a:t>‹#›</a:t>
             </a:fld>
             <a:endParaRPr lang="sv-SE"/>
           </a:p>
@@ -6226,7 +6574,7 @@
           <a:p>
             <a:fld id="{36FE6EAF-707E-454E-841A-E111EB854EEC}" type="slidenum">
               <a:rPr lang="sv-SE" smtClean="0"/>
-              <a:t>‹Nr.›</a:t>
+              <a:t>‹#›</a:t>
             </a:fld>
             <a:endParaRPr lang="sv-SE"/>
           </a:p>
@@ -6478,7 +6826,7 @@
           <a:p>
             <a:fld id="{36FE6EAF-707E-454E-841A-E111EB854EEC}" type="slidenum">
               <a:rPr lang="sv-SE" smtClean="0"/>
-              <a:t>‹Nr.›</a:t>
+              <a:t>‹#›</a:t>
             </a:fld>
             <a:endParaRPr lang="sv-SE"/>
           </a:p>
@@ -6725,7 +7073,7 @@
           <a:p>
             <a:fld id="{36FE6EAF-707E-454E-841A-E111EB854EEC}" type="slidenum">
               <a:rPr lang="sv-SE" smtClean="0"/>
-              <a:t>‹Nr.›</a:t>
+              <a:t>‹#›</a:t>
             </a:fld>
             <a:endParaRPr lang="sv-SE"/>
           </a:p>
@@ -7138,7 +7486,7 @@
               <a:t>Oscar Törnquist </a:t>
             </a:r>
             <a:r>
-              <a:rPr lang="sv-SE" dirty="0" smtClean="0">
+              <a:rPr lang="sv-SE" dirty="0">
                 <a:hlinkClick r:id="rId7"/>
               </a:rPr>
               <a:t>tornquist93@gmail.com</a:t>
@@ -7176,13 +7524,6 @@
   <p:clrMapOvr>
     <a:masterClrMapping/>
   </p:clrMapOvr>
-  <p:timing>
-    <p:tnLst>
-      <p:par>
-        <p:cTn id="1" dur="indefinite" restart="never" nodeType="tmRoot"/>
-      </p:par>
-    </p:tnLst>
-  </p:timing>
 </p:sld>
 </file>
 
@@ -7341,13 +7682,6 @@
   <p:clrMapOvr>
     <a:masterClrMapping/>
   </p:clrMapOvr>
-  <p:timing>
-    <p:tnLst>
-      <p:par>
-        <p:cTn id="1" dur="indefinite" restart="never" nodeType="tmRoot"/>
-      </p:par>
-    </p:tnLst>
-  </p:timing>
 </p:sld>
 </file>
 
@@ -7506,13 +7840,6 @@
   <p:clrMapOvr>
     <a:masterClrMapping/>
   </p:clrMapOvr>
-  <p:timing>
-    <p:tnLst>
-      <p:par>
-        <p:cTn id="1" dur="indefinite" restart="never" nodeType="tmRoot"/>
-      </p:par>
-    </p:tnLst>
-  </p:timing>
 </p:sld>
 </file>
 
@@ -7583,7 +7910,7 @@
           <p:cNvPr id="8" name="Platshållare för innehåll 7">
             <a:extLst>
               <a:ext uri="{FF2B5EF4-FFF2-40B4-BE49-F238E27FC236}">
-                <a16:creationId xmlns:a16="http://schemas.microsoft.com/office/drawing/2014/main" xmlns="" id="{F4151D08-FA9D-4AC1-8C53-E69308777791}"/>
+                <a16:creationId xmlns:a16="http://schemas.microsoft.com/office/drawing/2014/main" id="{F4151D08-FA9D-4AC1-8C53-E69308777791}"/>
               </a:ext>
             </a:extLst>
           </p:cNvPr>
@@ -7640,7 +7967,7 @@
           <p:cNvPr id="10" name="Platshållare för innehåll 9" descr="En bild som visar skärmbild&#10;&#10;Beskrivning genererad med mycket hög exakthet">
             <a:extLst>
               <a:ext uri="{FF2B5EF4-FFF2-40B4-BE49-F238E27FC236}">
-                <a16:creationId xmlns:a16="http://schemas.microsoft.com/office/drawing/2014/main" xmlns="" id="{C928B2DA-6F41-475E-9F6A-C1A7518CAFD0}"/>
+                <a16:creationId xmlns:a16="http://schemas.microsoft.com/office/drawing/2014/main" id="{C928B2DA-6F41-475E-9F6A-C1A7518CAFD0}"/>
               </a:ext>
             </a:extLst>
           </p:cNvPr>
@@ -7683,13 +8010,6 @@
   <p:clrMapOvr>
     <a:masterClrMapping/>
   </p:clrMapOvr>
-  <p:timing>
-    <p:tnLst>
-      <p:par>
-        <p:cTn id="1" dur="indefinite" restart="never" nodeType="tmRoot"/>
-      </p:par>
-    </p:tnLst>
-  </p:timing>
 </p:sld>
 </file>
 
@@ -7782,7 +8102,7 @@
           <p:cNvPr id="18" name="Platshållare för innehåll 17" descr="En bild som visar skärmbild&#10;&#10;Beskrivning genererad med hög exakthet">
             <a:extLst>
               <a:ext uri="{FF2B5EF4-FFF2-40B4-BE49-F238E27FC236}">
-                <a16:creationId xmlns:a16="http://schemas.microsoft.com/office/drawing/2014/main" xmlns="" id="{CE98ADE7-97A3-46F9-BEDC-A38E54C3E1E8}"/>
+                <a16:creationId xmlns:a16="http://schemas.microsoft.com/office/drawing/2014/main" id="{CE98ADE7-97A3-46F9-BEDC-A38E54C3E1E8}"/>
               </a:ext>
             </a:extLst>
           </p:cNvPr>
@@ -7817,7 +8137,7 @@
           <p:cNvPr id="22" name="Platshållare för innehåll 21">
             <a:extLst>
               <a:ext uri="{FF2B5EF4-FFF2-40B4-BE49-F238E27FC236}">
-                <a16:creationId xmlns:a16="http://schemas.microsoft.com/office/drawing/2014/main" xmlns="" id="{5C3327C6-EFFD-46F1-97F7-D99EDFD25B6E}"/>
+                <a16:creationId xmlns:a16="http://schemas.microsoft.com/office/drawing/2014/main" id="{5C3327C6-EFFD-46F1-97F7-D99EDFD25B6E}"/>
               </a:ext>
             </a:extLst>
           </p:cNvPr>
@@ -7860,13 +8180,6 @@
   <p:clrMapOvr>
     <a:masterClrMapping/>
   </p:clrMapOvr>
-  <p:timing>
-    <p:tnLst>
-      <p:par>
-        <p:cTn id="1" dur="indefinite" restart="never" nodeType="tmRoot"/>
-      </p:par>
-    </p:tnLst>
-  </p:timing>
 </p:sld>
 </file>
 
@@ -7928,7 +8241,7 @@
               <a:buNone/>
             </a:pPr>
             <a:r>
-              <a:rPr lang="sv-SE" dirty="0" smtClean="0"/>
+              <a:rPr lang="sv-SE" dirty="0"/>
               <a:t>En av de bästa erfarenheten av TDD är att man får tänka till ordentligt när man skriver sin kod, det ger dig vissa begränsningar när man väl ska börja koda vilket hjälper en att hålla den röda tråden och ser till att du kan strukturera din kod korrekt. Men ibland kan den första tanken bli fel vilket gör att man får tänka om på hur man skrivit sin testkod/testfall och detta leder till att man kanske skriver enklare eller bättre kod än som var avsiktligt. </a:t>
             </a:r>
           </a:p>
@@ -7947,13 +8260,6 @@
   <p:clrMapOvr>
     <a:masterClrMapping/>
   </p:clrMapOvr>
-  <p:timing>
-    <p:tnLst>
-      <p:par>
-        <p:cTn id="1" dur="indefinite" restart="never" nodeType="tmRoot"/>
-      </p:par>
-    </p:tnLst>
-  </p:timing>
 </p:sld>
 </file>
 
@@ -8020,44 +8326,16 @@
               <a:t>Map</a:t>
             </a:r>
             <a:r>
-              <a:rPr lang="sv-SE" dirty="0" smtClean="0"/>
-              <a:t>. När </a:t>
-            </a:r>
-            <a:r>
               <a:rPr lang="sv-SE" dirty="0"/>
-              <a:t>man skapar </a:t>
-            </a:r>
-            <a:r>
-              <a:rPr lang="sv-SE" dirty="0" smtClean="0"/>
-              <a:t>en karta anges </a:t>
+              <a:t>. När man skapar en karta anges namnet på vad kartan ska heta samt bredden och höjden. Man kan tydligt dela upp detta i grupper och skapa begränsningar, därför har vi valt att utföra en </a:t>
+            </a:r>
+            <a:r>
+              <a:rPr lang="sv-SE" dirty="0" err="1"/>
+              <a:t>ekvalensklassuppdelning</a:t>
             </a:r>
             <a:r>
               <a:rPr lang="sv-SE" dirty="0"/>
-              <a:t>namnet på vad kartan ska heta samt bredden och </a:t>
-            </a:r>
-            <a:r>
-              <a:rPr lang="sv-SE" dirty="0" smtClean="0"/>
-              <a:t>höjden. Man kan tydligt dela upp detta i grupper och skapa begränsningar, därför har vi valt att utföra en </a:t>
-            </a:r>
-            <a:r>
-              <a:rPr lang="sv-SE" dirty="0" err="1" smtClean="0"/>
-              <a:t>ekvalensklassuppdelning</a:t>
-            </a:r>
-            <a:r>
-              <a:rPr lang="sv-SE" dirty="0" smtClean="0"/>
-              <a:t> här. </a:t>
-            </a:r>
-            <a:r>
-              <a:rPr lang="sv-SE" dirty="0"/>
-              <a:t>Vi har </a:t>
-            </a:r>
-            <a:r>
-              <a:rPr lang="sv-SE" dirty="0" smtClean="0"/>
-              <a:t>delat </a:t>
-            </a:r>
-            <a:r>
-              <a:rPr lang="sv-SE" dirty="0"/>
-              <a:t>upp ekvivalensklasserna i </a:t>
+              <a:t> här. Vi har delat upp ekvivalensklasserna i </a:t>
             </a:r>
             <a:r>
               <a:rPr lang="sv-SE" dirty="0" err="1"/>
@@ -8076,14 +8354,13 @@
               <a:t> och </a:t>
             </a:r>
             <a:r>
-              <a:rPr lang="sv-SE" dirty="0" err="1" smtClean="0"/>
+              <a:rPr lang="sv-SE" dirty="0" err="1"/>
               <a:t>mapWidth</a:t>
             </a:r>
             <a:r>
-              <a:rPr lang="sv-SE" dirty="0" smtClean="0"/>
+              <a:rPr lang="sv-SE" dirty="0"/>
               <a:t>. Där vi har gjort tydliga begränsningar så att man inte ska kunna skapa en för stor karta samt en karta som inte finns. Vi har även gjort att man inte ska kunna skapa en karta utan namn.</a:t>
             </a:r>
-            <a:endParaRPr lang="sv-SE" dirty="0"/>
           </a:p>
         </p:txBody>
       </p:sp>
@@ -8100,13 +8377,6 @@
   <p:clrMapOvr>
     <a:masterClrMapping/>
   </p:clrMapOvr>
-  <p:timing>
-    <p:tnLst>
-      <p:par>
-        <p:cTn id="1" dur="indefinite" restart="never" nodeType="tmRoot"/>
-      </p:par>
-    </p:tnLst>
-  </p:timing>
 </p:sld>
 </file>
 
@@ -8195,13 +8465,6 @@
   <p:clrMapOvr>
     <a:masterClrMapping/>
   </p:clrMapOvr>
-  <p:timing>
-    <p:tnLst>
-      <p:par>
-        <p:cTn id="1" dur="indefinite" restart="never" nodeType="tmRoot"/>
-      </p:par>
-    </p:tnLst>
-  </p:timing>
 </p:sld>
 </file>
 
@@ -8260,34 +8523,33 @@
           <a:lstStyle/>
           <a:p>
             <a:r>
-              <a:rPr lang="sv-SE" dirty="0" smtClean="0"/>
+              <a:rPr lang="sv-SE" dirty="0"/>
               <a:t>Vi har valt att tillämpa tillståndsmaskinen på karaktären då den är i peaceful state, overburdened, in combat, in combat overburdned och dead. Vi har valt att nå state coverage dvs täcka alla tillstånd. Vi tyckte det var intressant hur karaktären kan plocka upp items, bli overburdened och ändå ha möjligheten att gå in i combat. Sedan var det nödvändigt att testa om karaktären kan ta bort item och gå in i vanlig combat eller gå tillbaka till peaceful </a:t>
             </a:r>
             <a:r>
-              <a:rPr lang="sv-SE" dirty="0" err="1" smtClean="0"/>
+              <a:rPr lang="sv-SE" dirty="0" err="1"/>
               <a:t>state</a:t>
             </a:r>
             <a:r>
-              <a:rPr lang="sv-SE" dirty="0" smtClean="0"/>
+              <a:rPr lang="sv-SE" dirty="0"/>
               <a:t>. Vi såg även till att karaktären inte ska kunna plocka upp </a:t>
             </a:r>
             <a:r>
-              <a:rPr lang="sv-SE" dirty="0" err="1" smtClean="0"/>
+              <a:rPr lang="sv-SE" dirty="0" err="1"/>
               <a:t>items</a:t>
             </a:r>
             <a:r>
-              <a:rPr lang="sv-SE" dirty="0" smtClean="0"/>
+              <a:rPr lang="sv-SE" dirty="0"/>
               <a:t> då den är i </a:t>
             </a:r>
             <a:r>
-              <a:rPr lang="sv-SE" dirty="0" err="1" smtClean="0"/>
+              <a:rPr lang="sv-SE" dirty="0" err="1"/>
               <a:t>combat</a:t>
             </a:r>
             <a:r>
-              <a:rPr lang="sv-SE" dirty="0" smtClean="0"/>
+              <a:rPr lang="sv-SE" dirty="0"/>
               <a:t>. </a:t>
             </a:r>
-            <a:endParaRPr lang="sv-SE" dirty="0"/>
           </a:p>
         </p:txBody>
       </p:sp>
@@ -8304,13 +8566,6 @@
   <p:clrMapOvr>
     <a:masterClrMapping/>
   </p:clrMapOvr>
-  <p:timing>
-    <p:tnLst>
-      <p:par>
-        <p:cTn id="1" dur="indefinite" restart="never" nodeType="tmRoot"/>
-      </p:par>
-    </p:tnLst>
-  </p:timing>
 </p:sld>
 </file>
 
@@ -8400,13 +8655,6 @@
   <p:clrMapOvr>
     <a:masterClrMapping/>
   </p:clrMapOvr>
-  <p:timing>
-    <p:tnLst>
-      <p:par>
-        <p:cTn id="1" dur="indefinite" restart="never" nodeType="tmRoot"/>
-      </p:par>
-    </p:tnLst>
-  </p:timing>
 </p:sld>
 </file>
 
@@ -8477,28 +8725,28 @@
                 <a:gridCol w="2276061">
                   <a:extLst>
                     <a:ext uri="{9D8B030D-6E8A-4147-A177-3AD203B41FA5}">
-                      <a16:colId xmlns:a16="http://schemas.microsoft.com/office/drawing/2014/main" xmlns="" val="20000"/>
+                      <a16:colId xmlns:a16="http://schemas.microsoft.com/office/drawing/2014/main" val="20000"/>
                     </a:ext>
                   </a:extLst>
                 </a:gridCol>
                 <a:gridCol w="2276061">
                   <a:extLst>
                     <a:ext uri="{9D8B030D-6E8A-4147-A177-3AD203B41FA5}">
-                      <a16:colId xmlns:a16="http://schemas.microsoft.com/office/drawing/2014/main" xmlns="" val="20001"/>
+                      <a16:colId xmlns:a16="http://schemas.microsoft.com/office/drawing/2014/main" val="20001"/>
                     </a:ext>
                   </a:extLst>
                 </a:gridCol>
                 <a:gridCol w="2276061">
                   <a:extLst>
                     <a:ext uri="{9D8B030D-6E8A-4147-A177-3AD203B41FA5}">
-                      <a16:colId xmlns:a16="http://schemas.microsoft.com/office/drawing/2014/main" xmlns="" val="20002"/>
+                      <a16:colId xmlns:a16="http://schemas.microsoft.com/office/drawing/2014/main" val="20002"/>
                     </a:ext>
                   </a:extLst>
                 </a:gridCol>
                 <a:gridCol w="2276061">
                   <a:extLst>
                     <a:ext uri="{9D8B030D-6E8A-4147-A177-3AD203B41FA5}">
-                      <a16:colId xmlns:a16="http://schemas.microsoft.com/office/drawing/2014/main" xmlns="" val="20003"/>
+                      <a16:colId xmlns:a16="http://schemas.microsoft.com/office/drawing/2014/main" val="20003"/>
                     </a:ext>
                   </a:extLst>
                 </a:gridCol>
@@ -8510,10 +8758,9 @@
                     <a:lstStyle/>
                     <a:p>
                       <a:r>
-                        <a:rPr lang="sv-SE" dirty="0" smtClean="0"/>
+                        <a:rPr lang="sv-SE" dirty="0"/>
                         <a:t>ID</a:t>
                       </a:r>
-                      <a:endParaRPr lang="sv-SE" dirty="0"/>
                     </a:p>
                   </a:txBody>
                   <a:tcPr/>
@@ -8524,10 +8771,9 @@
                     <a:lstStyle/>
                     <a:p>
                       <a:r>
-                        <a:rPr lang="sv-SE" dirty="0" smtClean="0"/>
+                        <a:rPr lang="sv-SE" dirty="0"/>
                         <a:t>Beskrivning</a:t>
                       </a:r>
-                      <a:endParaRPr lang="sv-SE" dirty="0"/>
                     </a:p>
                   </a:txBody>
                   <a:tcPr/>
@@ -8538,11 +8784,11 @@
                     <a:lstStyle/>
                     <a:p>
                       <a:r>
-                        <a:rPr lang="sv-SE" dirty="0" smtClean="0"/>
+                        <a:rPr lang="sv-SE" dirty="0"/>
                         <a:t>Täckta</a:t>
                       </a:r>
                       <a:r>
-                        <a:rPr lang="sv-SE" baseline="0" dirty="0" smtClean="0"/>
+                        <a:rPr lang="sv-SE" baseline="0" dirty="0"/>
                         <a:t> tillstånd</a:t>
                       </a:r>
                       <a:endParaRPr lang="sv-SE" dirty="0"/>
@@ -8556,17 +8802,16 @@
                     <a:lstStyle/>
                     <a:p>
                       <a:r>
-                        <a:rPr lang="sv-SE" dirty="0" smtClean="0"/>
+                        <a:rPr lang="sv-SE" dirty="0"/>
                         <a:t>Täckta övergångar</a:t>
                       </a:r>
-                      <a:endParaRPr lang="sv-SE" dirty="0"/>
                     </a:p>
                   </a:txBody>
                   <a:tcPr/>
                 </a:tc>
                 <a:extLst>
                   <a:ext uri="{0D108BD9-81ED-4DB2-BD59-A6C34878D82A}">
-                    <a16:rowId xmlns:a16="http://schemas.microsoft.com/office/drawing/2014/main" xmlns="" val="10000"/>
+                    <a16:rowId xmlns:a16="http://schemas.microsoft.com/office/drawing/2014/main" val="10000"/>
                   </a:ext>
                 </a:extLst>
               </a:tr>
@@ -8577,10 +8822,9 @@
                     <a:lstStyle/>
                     <a:p>
                       <a:r>
-                        <a:rPr lang="sv-SE" dirty="0" smtClean="0"/>
+                        <a:rPr lang="sv-SE" dirty="0"/>
                         <a:t>1</a:t>
                       </a:r>
-                      <a:endParaRPr lang="sv-SE" dirty="0"/>
                     </a:p>
                   </a:txBody>
                   <a:tcPr/>
@@ -8594,11 +8838,11 @@
                         <a:buAutoNum type="arabicPeriod"/>
                       </a:pPr>
                       <a:r>
-                        <a:rPr lang="sv-SE" dirty="0" smtClean="0"/>
+                        <a:rPr lang="sv-SE" dirty="0"/>
                         <a:t>Plockar</a:t>
                       </a:r>
                       <a:r>
-                        <a:rPr lang="sv-SE" baseline="0" dirty="0" smtClean="0"/>
+                        <a:rPr lang="sv-SE" baseline="0" dirty="0"/>
                         <a:t> upp och blir OB</a:t>
                       </a:r>
                     </a:p>
@@ -8607,7 +8851,7 @@
                         <a:buAutoNum type="arabicPeriod"/>
                       </a:pPr>
                       <a:r>
-                        <a:rPr lang="sv-SE" baseline="0" dirty="0" smtClean="0"/>
+                        <a:rPr lang="sv-SE" baseline="0" dirty="0"/>
                         <a:t>Attackerar och går in i OB combat.</a:t>
                       </a:r>
                     </a:p>
@@ -8616,7 +8860,7 @@
                         <a:buAutoNum type="arabicPeriod"/>
                       </a:pPr>
                       <a:r>
-                        <a:rPr lang="sv-SE" baseline="0" dirty="0" smtClean="0"/>
+                        <a:rPr lang="sv-SE" baseline="0" dirty="0"/>
                         <a:t>Tar skada och dör</a:t>
                       </a:r>
                       <a:endParaRPr lang="sv-SE" dirty="0"/>
@@ -8630,45 +8874,45 @@
                     <a:lstStyle/>
                     <a:p>
                       <a:r>
-                        <a:rPr lang="sv-SE" dirty="0" smtClean="0"/>
+                        <a:rPr lang="sv-SE" dirty="0"/>
                         <a:t>Peaceful</a:t>
                       </a:r>
                       <a:r>
-                        <a:rPr lang="sv-SE" baseline="0" dirty="0" smtClean="0"/>
+                        <a:rPr lang="sv-SE" baseline="0" dirty="0"/>
                         <a:t> </a:t>
                       </a:r>
                       <a:r>
-                        <a:rPr lang="sv-SE" baseline="0" dirty="0" err="1" smtClean="0"/>
+                        <a:rPr lang="sv-SE" baseline="0" dirty="0" err="1"/>
                         <a:t>state</a:t>
                       </a:r>
                       <a:r>
-                        <a:rPr lang="sv-SE" baseline="0" dirty="0" smtClean="0"/>
+                        <a:rPr lang="sv-SE" baseline="0" dirty="0"/>
                         <a:t>,</a:t>
                       </a:r>
                     </a:p>
                     <a:p>
                       <a:r>
-                        <a:rPr lang="sv-SE" baseline="0" dirty="0" smtClean="0"/>
+                        <a:rPr lang="sv-SE" baseline="0" dirty="0"/>
                         <a:t>Overburdened,</a:t>
                       </a:r>
                     </a:p>
                     <a:p>
                       <a:r>
-                        <a:rPr lang="sv-SE" baseline="0" dirty="0" smtClean="0"/>
+                        <a:rPr lang="sv-SE" baseline="0" dirty="0"/>
                         <a:t>OB </a:t>
                       </a:r>
                       <a:r>
-                        <a:rPr lang="sv-SE" baseline="0" dirty="0" err="1" smtClean="0"/>
+                        <a:rPr lang="sv-SE" baseline="0" dirty="0" err="1"/>
                         <a:t>combat</a:t>
                       </a:r>
                       <a:r>
-                        <a:rPr lang="sv-SE" baseline="0" dirty="0" smtClean="0"/>
+                        <a:rPr lang="sv-SE" baseline="0" dirty="0"/>
                         <a:t>,</a:t>
                       </a:r>
                     </a:p>
                     <a:p>
                       <a:r>
-                        <a:rPr lang="sv-SE" baseline="0" dirty="0" err="1" smtClean="0"/>
+                        <a:rPr lang="sv-SE" baseline="0" dirty="0" err="1"/>
                         <a:t>Dead</a:t>
                       </a:r>
                       <a:endParaRPr lang="sv-SE" dirty="0"/>
@@ -8682,51 +8926,51 @@
                     <a:lstStyle/>
                     <a:p>
                       <a:r>
-                        <a:rPr lang="sv-SE" dirty="0" smtClean="0"/>
+                        <a:rPr lang="sv-SE" dirty="0"/>
                         <a:t>Pick </a:t>
                       </a:r>
                       <a:r>
-                        <a:rPr lang="sv-SE" dirty="0" err="1" smtClean="0"/>
+                        <a:rPr lang="sv-SE" dirty="0" err="1"/>
                         <a:t>up</a:t>
                       </a:r>
                       <a:r>
-                        <a:rPr lang="sv-SE" dirty="0" smtClean="0"/>
+                        <a:rPr lang="sv-SE" dirty="0"/>
                         <a:t> </a:t>
                       </a:r>
                       <a:r>
-                        <a:rPr lang="sv-SE" dirty="0" err="1" smtClean="0"/>
+                        <a:rPr lang="sv-SE" dirty="0" err="1"/>
                         <a:t>becomes</a:t>
                       </a:r>
                       <a:r>
-                        <a:rPr lang="sv-SE" baseline="0" dirty="0" smtClean="0"/>
+                        <a:rPr lang="sv-SE" baseline="0" dirty="0"/>
                         <a:t> OB, </a:t>
                       </a:r>
                     </a:p>
                     <a:p>
                       <a:r>
-                        <a:rPr lang="sv-SE" baseline="0" dirty="0" smtClean="0"/>
+                        <a:rPr lang="sv-SE" baseline="0" dirty="0"/>
                         <a:t>Attacks,</a:t>
                       </a:r>
                     </a:p>
                     <a:p>
                       <a:r>
-                        <a:rPr lang="sv-SE" baseline="0" dirty="0" err="1" smtClean="0"/>
+                        <a:rPr lang="sv-SE" baseline="0" dirty="0" err="1"/>
                         <a:t>Take</a:t>
                       </a:r>
                       <a:r>
-                        <a:rPr lang="sv-SE" baseline="0" dirty="0" smtClean="0"/>
+                        <a:rPr lang="sv-SE" baseline="0" dirty="0"/>
                         <a:t> </a:t>
                       </a:r>
                       <a:r>
-                        <a:rPr lang="sv-SE" baseline="0" dirty="0" err="1" smtClean="0"/>
+                        <a:rPr lang="sv-SE" baseline="0" dirty="0" err="1"/>
                         <a:t>damage</a:t>
                       </a:r>
                       <a:r>
-                        <a:rPr lang="sv-SE" baseline="0" dirty="0" smtClean="0"/>
+                        <a:rPr lang="sv-SE" baseline="0" dirty="0"/>
                         <a:t> </a:t>
                       </a:r>
                       <a:r>
-                        <a:rPr lang="sv-SE" baseline="0" dirty="0" err="1" smtClean="0"/>
+                        <a:rPr lang="sv-SE" baseline="0" dirty="0" err="1"/>
                         <a:t>dies</a:t>
                       </a:r>
                       <a:endParaRPr lang="sv-SE" dirty="0"/>
@@ -8736,7 +8980,7 @@
                 </a:tc>
                 <a:extLst>
                   <a:ext uri="{0D108BD9-81ED-4DB2-BD59-A6C34878D82A}">
-                    <a16:rowId xmlns:a16="http://schemas.microsoft.com/office/drawing/2014/main" xmlns="" val="10001"/>
+                    <a16:rowId xmlns:a16="http://schemas.microsoft.com/office/drawing/2014/main" val="10001"/>
                   </a:ext>
                 </a:extLst>
               </a:tr>
@@ -8747,10 +8991,9 @@
                     <a:lstStyle/>
                     <a:p>
                       <a:r>
-                        <a:rPr lang="sv-SE" dirty="0" smtClean="0"/>
+                        <a:rPr lang="sv-SE" dirty="0"/>
                         <a:t>2</a:t>
                       </a:r>
-                      <a:endParaRPr lang="sv-SE" dirty="0"/>
                     </a:p>
                   </a:txBody>
                   <a:tcPr/>
@@ -8764,7 +9007,7 @@
                         <a:buAutoNum type="arabicPeriod"/>
                       </a:pPr>
                       <a:r>
-                        <a:rPr lang="sv-SE" baseline="0" dirty="0" smtClean="0"/>
+                        <a:rPr lang="sv-SE" baseline="0" dirty="0"/>
                         <a:t>Attackerar </a:t>
                       </a:r>
                     </a:p>
@@ -8773,7 +9016,7 @@
                         <a:buAutoNum type="arabicPeriod"/>
                       </a:pPr>
                       <a:r>
-                        <a:rPr lang="sv-SE" baseline="0" dirty="0" smtClean="0"/>
+                        <a:rPr lang="sv-SE" baseline="0" dirty="0"/>
                         <a:t>Tar skada och dör</a:t>
                       </a:r>
                     </a:p>
@@ -8792,27 +9035,27 @@
                     <a:lstStyle/>
                     <a:p>
                       <a:r>
-                        <a:rPr lang="sv-SE" dirty="0" smtClean="0"/>
+                        <a:rPr lang="sv-SE" dirty="0"/>
                         <a:t>Peaceful </a:t>
                       </a:r>
                       <a:r>
-                        <a:rPr lang="sv-SE" dirty="0" err="1" smtClean="0"/>
+                        <a:rPr lang="sv-SE" dirty="0" err="1"/>
                         <a:t>state</a:t>
                       </a:r>
                       <a:r>
-                        <a:rPr lang="sv-SE" dirty="0" smtClean="0"/>
+                        <a:rPr lang="sv-SE" dirty="0"/>
                         <a:t>,</a:t>
                       </a:r>
                     </a:p>
                     <a:p>
                       <a:r>
-                        <a:rPr lang="sv-SE" dirty="0" smtClean="0"/>
+                        <a:rPr lang="sv-SE" dirty="0"/>
                         <a:t>In combat,</a:t>
                       </a:r>
                     </a:p>
                     <a:p>
                       <a:r>
-                        <a:rPr lang="sv-SE" dirty="0" err="1" smtClean="0"/>
+                        <a:rPr lang="sv-SE" dirty="0" err="1"/>
                         <a:t>dead</a:t>
                       </a:r>
                       <a:endParaRPr lang="sv-SE" dirty="0"/>
@@ -8826,29 +9069,29 @@
                     <a:lstStyle/>
                     <a:p>
                       <a:r>
-                        <a:rPr lang="sv-SE" dirty="0" smtClean="0"/>
+                        <a:rPr lang="sv-SE" dirty="0"/>
                         <a:t>Attack,</a:t>
                       </a:r>
                     </a:p>
                     <a:p>
                       <a:r>
-                        <a:rPr lang="sv-SE" dirty="0" err="1" smtClean="0"/>
+                        <a:rPr lang="sv-SE" dirty="0" err="1"/>
                         <a:t>Take</a:t>
                       </a:r>
                       <a:r>
-                        <a:rPr lang="sv-SE" dirty="0" smtClean="0"/>
+                        <a:rPr lang="sv-SE" dirty="0"/>
                         <a:t> </a:t>
                       </a:r>
                       <a:r>
-                        <a:rPr lang="sv-SE" dirty="0" err="1" smtClean="0"/>
+                        <a:rPr lang="sv-SE" dirty="0" err="1"/>
                         <a:t>damage</a:t>
                       </a:r>
                       <a:r>
-                        <a:rPr lang="sv-SE" dirty="0" smtClean="0"/>
+                        <a:rPr lang="sv-SE" dirty="0"/>
                         <a:t> </a:t>
                       </a:r>
                       <a:r>
-                        <a:rPr lang="sv-SE" dirty="0" err="1" smtClean="0"/>
+                        <a:rPr lang="sv-SE" dirty="0" err="1"/>
                         <a:t>dies</a:t>
                       </a:r>
                       <a:endParaRPr lang="sv-SE" dirty="0"/>
@@ -8858,7 +9101,7 @@
                 </a:tc>
                 <a:extLst>
                   <a:ext uri="{0D108BD9-81ED-4DB2-BD59-A6C34878D82A}">
-                    <a16:rowId xmlns:a16="http://schemas.microsoft.com/office/drawing/2014/main" xmlns="" val="10002"/>
+                    <a16:rowId xmlns:a16="http://schemas.microsoft.com/office/drawing/2014/main" val="10002"/>
                   </a:ext>
                 </a:extLst>
               </a:tr>
@@ -8869,10 +9112,9 @@
                     <a:lstStyle/>
                     <a:p>
                       <a:r>
-                        <a:rPr lang="sv-SE" dirty="0" smtClean="0"/>
+                        <a:rPr lang="sv-SE" dirty="0"/>
                         <a:t>3.</a:t>
                       </a:r>
-                      <a:endParaRPr lang="sv-SE" dirty="0"/>
                     </a:p>
                   </a:txBody>
                   <a:tcPr/>
@@ -8886,7 +9128,7 @@
                         <a:buAutoNum type="arabicPeriod"/>
                       </a:pPr>
                       <a:r>
-                        <a:rPr lang="sv-SE" baseline="0" dirty="0" smtClean="0"/>
+                        <a:rPr lang="sv-SE" baseline="0" dirty="0"/>
                         <a:t>Plockar upp och blir OB</a:t>
                       </a:r>
                     </a:p>
@@ -8895,7 +9137,7 @@
                         <a:buAutoNum type="arabicPeriod"/>
                       </a:pPr>
                       <a:r>
-                        <a:rPr lang="sv-SE" baseline="0" dirty="0" smtClean="0"/>
+                        <a:rPr lang="sv-SE" baseline="0" dirty="0"/>
                         <a:t>Attackerar och går in i OB combat</a:t>
                       </a:r>
                     </a:p>
@@ -8904,7 +9146,7 @@
                         <a:buAutoNum type="arabicPeriod"/>
                       </a:pPr>
                       <a:r>
-                        <a:rPr lang="sv-SE" baseline="0" dirty="0" smtClean="0"/>
+                        <a:rPr lang="sv-SE" baseline="0" dirty="0"/>
                         <a:t>Tar bort item går in i vanlig combat</a:t>
                       </a:r>
                     </a:p>
@@ -8913,7 +9155,7 @@
                         <a:buAutoNum type="arabicPeriod"/>
                       </a:pPr>
                       <a:r>
-                        <a:rPr lang="sv-SE" baseline="0" dirty="0" smtClean="0"/>
+                        <a:rPr lang="sv-SE" baseline="0" dirty="0"/>
                         <a:t>Dödar och går tillbaka till peaceful</a:t>
                       </a:r>
                     </a:p>
@@ -8932,44 +9174,44 @@
                     <a:lstStyle/>
                     <a:p>
                       <a:r>
-                        <a:rPr lang="sv-SE" dirty="0" smtClean="0"/>
+                        <a:rPr lang="sv-SE" dirty="0"/>
                         <a:t>Peaceful state,</a:t>
                       </a:r>
                     </a:p>
                     <a:p>
                       <a:r>
-                        <a:rPr lang="sv-SE" dirty="0" smtClean="0"/>
+                        <a:rPr lang="sv-SE" dirty="0"/>
                         <a:t>OB</a:t>
                       </a:r>
                       <a:r>
-                        <a:rPr lang="sv-SE" baseline="0" dirty="0" smtClean="0"/>
+                        <a:rPr lang="sv-SE" baseline="0" dirty="0"/>
                         <a:t> </a:t>
                       </a:r>
                       <a:r>
-                        <a:rPr lang="sv-SE" dirty="0" smtClean="0"/>
+                        <a:rPr lang="sv-SE" dirty="0"/>
                         <a:t>combat,</a:t>
                       </a:r>
                     </a:p>
                     <a:p>
                       <a:r>
-                        <a:rPr lang="sv-SE" i="0" dirty="0" smtClean="0"/>
+                        <a:rPr lang="sv-SE" i="0" dirty="0"/>
                         <a:t>I</a:t>
                       </a:r>
                       <a:r>
-                        <a:rPr lang="sv-SE" dirty="0" smtClean="0"/>
+                        <a:rPr lang="sv-SE" dirty="0"/>
                         <a:t>n</a:t>
                       </a:r>
                       <a:r>
-                        <a:rPr lang="sv-SE" baseline="0" dirty="0" smtClean="0"/>
+                        <a:rPr lang="sv-SE" baseline="0" dirty="0"/>
                         <a:t> combat,</a:t>
                       </a:r>
                     </a:p>
                     <a:p>
                       <a:r>
-                        <a:rPr lang="sv-SE" baseline="0" dirty="0" smtClean="0"/>
+                        <a:rPr lang="sv-SE" baseline="0" dirty="0"/>
                         <a:t>Overburdened</a:t>
                       </a:r>
-                      <a:endParaRPr lang="sv-SE" dirty="0" smtClean="0"/>
+                      <a:endParaRPr lang="sv-SE" dirty="0"/>
                     </a:p>
                     <a:p>
                       <a:endParaRPr lang="sv-SE" dirty="0"/>
@@ -8983,29 +9225,29 @@
                     <a:lstStyle/>
                     <a:p>
                       <a:r>
-                        <a:rPr lang="sv-SE" dirty="0" smtClean="0"/>
+                        <a:rPr lang="sv-SE" dirty="0"/>
                         <a:t>Pick up becomes</a:t>
                       </a:r>
                       <a:r>
-                        <a:rPr lang="sv-SE" baseline="0" dirty="0" smtClean="0"/>
+                        <a:rPr lang="sv-SE" baseline="0" dirty="0"/>
                         <a:t> OB, </a:t>
                       </a:r>
                     </a:p>
                     <a:p>
                       <a:r>
-                        <a:rPr lang="sv-SE" baseline="0" dirty="0" smtClean="0"/>
+                        <a:rPr lang="sv-SE" baseline="0" dirty="0"/>
                         <a:t>Attacks,</a:t>
                       </a:r>
                     </a:p>
                     <a:p>
                       <a:r>
-                        <a:rPr lang="sv-SE" dirty="0" smtClean="0"/>
+                        <a:rPr lang="sv-SE" dirty="0"/>
                         <a:t>Remove no longer OB,</a:t>
                       </a:r>
                     </a:p>
                     <a:p>
                       <a:r>
-                        <a:rPr lang="sv-SE" dirty="0" smtClean="0"/>
+                        <a:rPr lang="sv-SE" dirty="0"/>
                         <a:t>Attack kills</a:t>
                       </a:r>
                     </a:p>
@@ -9017,7 +9259,7 @@
                 </a:tc>
                 <a:extLst>
                   <a:ext uri="{0D108BD9-81ED-4DB2-BD59-A6C34878D82A}">
-                    <a16:rowId xmlns:a16="http://schemas.microsoft.com/office/drawing/2014/main" xmlns="" val="10003"/>
+                    <a16:rowId xmlns:a16="http://schemas.microsoft.com/office/drawing/2014/main" val="10003"/>
                   </a:ext>
                 </a:extLst>
               </a:tr>
@@ -9038,13 +9280,6 @@
   <p:clrMapOvr>
     <a:masterClrMapping/>
   </p:clrMapOvr>
-  <p:timing>
-    <p:tnLst>
-      <p:par>
-        <p:cTn id="1" dur="indefinite" restart="never" nodeType="tmRoot"/>
-      </p:par>
-    </p:tnLst>
-  </p:timing>
 </p:sld>
 </file>
 
@@ -9223,7 +9458,7 @@
               <a:t>Kodkritiksystem: </a:t>
             </a:r>
             <a:r>
-              <a:rPr lang="sv-SE" dirty="0" err="1" smtClean="0"/>
+              <a:rPr lang="sv-SE" dirty="0" err="1"/>
               <a:t>FindBugs</a:t>
             </a:r>
             <a:endParaRPr lang="sv-SE" b="1" dirty="0"/>
@@ -9287,13 +9522,8 @@
             </a:r>
             <a:r>
               <a:rPr lang="sv-SE" dirty="0"/>
-              <a:t> </a:t>
-            </a:r>
-            <a:r>
-              <a:rPr lang="sv-SE" dirty="0" smtClean="0"/>
-              <a:t>NetBeans Profiler</a:t>
-            </a:r>
-            <a:endParaRPr lang="sv-SE" dirty="0"/>
+              <a:t> NetBeans Profiler</a:t>
+            </a:r>
           </a:p>
         </p:txBody>
       </p:sp>
@@ -9310,13 +9540,6 @@
   <p:clrMapOvr>
     <a:masterClrMapping/>
   </p:clrMapOvr>
-  <p:timing>
-    <p:tnLst>
-      <p:par>
-        <p:cTn id="1" dur="indefinite" restart="never" nodeType="tmRoot"/>
-      </p:par>
-    </p:tnLst>
-  </p:timing>
 </p:sld>
 </file>
 
@@ -9353,10 +9576,9 @@
           <a:lstStyle/>
           <a:p>
             <a:r>
-              <a:rPr lang="sv-SE" dirty="0" smtClean="0"/>
+              <a:rPr lang="sv-SE" dirty="0"/>
               <a:t>Testfall</a:t>
             </a:r>
-            <a:endParaRPr lang="sv-SE" dirty="0"/>
           </a:p>
         </p:txBody>
       </p:sp>
@@ -9388,28 +9610,28 @@
                 <a:gridCol w="2276061">
                   <a:extLst>
                     <a:ext uri="{9D8B030D-6E8A-4147-A177-3AD203B41FA5}">
-                      <a16:colId xmlns:a16="http://schemas.microsoft.com/office/drawing/2014/main" xmlns="" val="20000"/>
+                      <a16:colId xmlns:a16="http://schemas.microsoft.com/office/drawing/2014/main" val="20000"/>
                     </a:ext>
                   </a:extLst>
                 </a:gridCol>
                 <a:gridCol w="2276061">
                   <a:extLst>
                     <a:ext uri="{9D8B030D-6E8A-4147-A177-3AD203B41FA5}">
-                      <a16:colId xmlns:a16="http://schemas.microsoft.com/office/drawing/2014/main" xmlns="" val="20001"/>
+                      <a16:colId xmlns:a16="http://schemas.microsoft.com/office/drawing/2014/main" val="20001"/>
                     </a:ext>
                   </a:extLst>
                 </a:gridCol>
                 <a:gridCol w="2276061">
                   <a:extLst>
                     <a:ext uri="{9D8B030D-6E8A-4147-A177-3AD203B41FA5}">
-                      <a16:colId xmlns:a16="http://schemas.microsoft.com/office/drawing/2014/main" xmlns="" val="20002"/>
+                      <a16:colId xmlns:a16="http://schemas.microsoft.com/office/drawing/2014/main" val="20002"/>
                     </a:ext>
                   </a:extLst>
                 </a:gridCol>
                 <a:gridCol w="2276061">
                   <a:extLst>
                     <a:ext uri="{9D8B030D-6E8A-4147-A177-3AD203B41FA5}">
-                      <a16:colId xmlns:a16="http://schemas.microsoft.com/office/drawing/2014/main" xmlns="" val="20003"/>
+                      <a16:colId xmlns:a16="http://schemas.microsoft.com/office/drawing/2014/main" val="20003"/>
                     </a:ext>
                   </a:extLst>
                 </a:gridCol>
@@ -9421,10 +9643,9 @@
                     <a:lstStyle/>
                     <a:p>
                       <a:r>
-                        <a:rPr lang="sv-SE" dirty="0" smtClean="0"/>
+                        <a:rPr lang="sv-SE" dirty="0"/>
                         <a:t>ID</a:t>
                       </a:r>
-                      <a:endParaRPr lang="sv-SE" dirty="0"/>
                     </a:p>
                   </a:txBody>
                   <a:tcPr/>
@@ -9435,10 +9656,9 @@
                     <a:lstStyle/>
                     <a:p>
                       <a:r>
-                        <a:rPr lang="sv-SE" dirty="0" smtClean="0"/>
+                        <a:rPr lang="sv-SE" dirty="0"/>
                         <a:t>Beskrivning</a:t>
                       </a:r>
-                      <a:endParaRPr lang="sv-SE" dirty="0"/>
                     </a:p>
                   </a:txBody>
                   <a:tcPr/>
@@ -9449,11 +9669,11 @@
                     <a:lstStyle/>
                     <a:p>
                       <a:r>
-                        <a:rPr lang="sv-SE" dirty="0" smtClean="0"/>
+                        <a:rPr lang="sv-SE" dirty="0"/>
                         <a:t>Täckta</a:t>
                       </a:r>
                       <a:r>
-                        <a:rPr lang="sv-SE" baseline="0" dirty="0" smtClean="0"/>
+                        <a:rPr lang="sv-SE" baseline="0" dirty="0"/>
                         <a:t> tillstånd</a:t>
                       </a:r>
                       <a:endParaRPr lang="sv-SE" dirty="0"/>
@@ -9467,17 +9687,16 @@
                     <a:lstStyle/>
                     <a:p>
                       <a:r>
-                        <a:rPr lang="sv-SE" dirty="0" smtClean="0"/>
+                        <a:rPr lang="sv-SE" dirty="0"/>
                         <a:t>Täckta övergångar</a:t>
                       </a:r>
-                      <a:endParaRPr lang="sv-SE" dirty="0"/>
                     </a:p>
                   </a:txBody>
                   <a:tcPr/>
                 </a:tc>
                 <a:extLst>
                   <a:ext uri="{0D108BD9-81ED-4DB2-BD59-A6C34878D82A}">
-                    <a16:rowId xmlns:a16="http://schemas.microsoft.com/office/drawing/2014/main" xmlns="" val="10000"/>
+                    <a16:rowId xmlns:a16="http://schemas.microsoft.com/office/drawing/2014/main" val="10000"/>
                   </a:ext>
                 </a:extLst>
               </a:tr>
@@ -9488,10 +9707,9 @@
                     <a:lstStyle/>
                     <a:p>
                       <a:r>
-                        <a:rPr lang="sv-SE" dirty="0" smtClean="0"/>
+                        <a:rPr lang="sv-SE" dirty="0"/>
                         <a:t>4</a:t>
                       </a:r>
-                      <a:endParaRPr lang="sv-SE" dirty="0"/>
                     </a:p>
                   </a:txBody>
                   <a:tcPr/>
@@ -9505,7 +9723,7 @@
                         <a:buAutoNum type="arabicPeriod"/>
                       </a:pPr>
                       <a:r>
-                        <a:rPr lang="sv-SE" baseline="0" dirty="0" smtClean="0"/>
+                        <a:rPr lang="sv-SE" baseline="0" dirty="0"/>
                         <a:t>Plockar upp item</a:t>
                       </a:r>
                     </a:p>
@@ -9514,7 +9732,7 @@
                         <a:buAutoNum type="arabicPeriod"/>
                       </a:pPr>
                       <a:r>
-                        <a:rPr lang="sv-SE" baseline="0" dirty="0" smtClean="0"/>
+                        <a:rPr lang="sv-SE" baseline="0" dirty="0"/>
                         <a:t>Kastar bort item ur väskan</a:t>
                       </a:r>
                     </a:p>
@@ -9523,7 +9741,7 @@
                         <a:buAutoNum type="arabicPeriod"/>
                       </a:pPr>
                       <a:r>
-                        <a:rPr lang="sv-SE" baseline="0" dirty="0" smtClean="0"/>
+                        <a:rPr lang="sv-SE" baseline="0" dirty="0"/>
                         <a:t>Plockar upp item</a:t>
                       </a:r>
                     </a:p>
@@ -9532,7 +9750,7 @@
                         <a:buAutoNum type="arabicPeriod"/>
                       </a:pPr>
                       <a:r>
-                        <a:rPr lang="sv-SE" baseline="0" dirty="0" smtClean="0"/>
+                        <a:rPr lang="sv-SE" baseline="0" dirty="0"/>
                         <a:t>Tar på sig item</a:t>
                       </a:r>
                     </a:p>
@@ -9545,11 +9763,11 @@
                     <a:lstStyle/>
                     <a:p>
                       <a:r>
-                        <a:rPr lang="sv-SE" dirty="0" smtClean="0"/>
+                        <a:rPr lang="sv-SE" dirty="0"/>
                         <a:t>Peaceful</a:t>
                       </a:r>
                       <a:r>
-                        <a:rPr lang="sv-SE" baseline="0" dirty="0" smtClean="0"/>
+                        <a:rPr lang="sv-SE" baseline="0" dirty="0"/>
                         <a:t> state</a:t>
                       </a:r>
                     </a:p>
@@ -9562,20 +9780,20 @@
                     <a:lstStyle/>
                     <a:p>
                       <a:r>
-                        <a:rPr lang="sv-SE" dirty="0" smtClean="0"/>
+                        <a:rPr lang="sv-SE" dirty="0"/>
                         <a:t>Pick up,</a:t>
                       </a:r>
-                      <a:endParaRPr lang="sv-SE" baseline="0" dirty="0" smtClean="0"/>
+                      <a:endParaRPr lang="sv-SE" baseline="0" dirty="0"/>
                     </a:p>
                     <a:p>
                       <a:r>
-                        <a:rPr lang="sv-SE" baseline="0" dirty="0" smtClean="0"/>
+                        <a:rPr lang="sv-SE" baseline="0" dirty="0"/>
                         <a:t>remove,</a:t>
                       </a:r>
                     </a:p>
                     <a:p>
                       <a:r>
-                        <a:rPr lang="sv-SE" baseline="0" dirty="0" smtClean="0"/>
+                        <a:rPr lang="sv-SE" baseline="0" dirty="0"/>
                         <a:t>equip</a:t>
                       </a:r>
                       <a:endParaRPr lang="sv-SE" dirty="0"/>
@@ -9585,7 +9803,7 @@
                 </a:tc>
                 <a:extLst>
                   <a:ext uri="{0D108BD9-81ED-4DB2-BD59-A6C34878D82A}">
-                    <a16:rowId xmlns:a16="http://schemas.microsoft.com/office/drawing/2014/main" xmlns="" val="10001"/>
+                    <a16:rowId xmlns:a16="http://schemas.microsoft.com/office/drawing/2014/main" val="10001"/>
                   </a:ext>
                 </a:extLst>
               </a:tr>
@@ -9632,7 +9850,7 @@
                 </a:tc>
                 <a:extLst>
                   <a:ext uri="{0D108BD9-81ED-4DB2-BD59-A6C34878D82A}">
-                    <a16:rowId xmlns:a16="http://schemas.microsoft.com/office/drawing/2014/main" xmlns="" val="10002"/>
+                    <a16:rowId xmlns:a16="http://schemas.microsoft.com/office/drawing/2014/main" val="10002"/>
                   </a:ext>
                 </a:extLst>
               </a:tr>
@@ -9679,7 +9897,7 @@
                 </a:tc>
                 <a:extLst>
                   <a:ext uri="{0D108BD9-81ED-4DB2-BD59-A6C34878D82A}">
-                    <a16:rowId xmlns:a16="http://schemas.microsoft.com/office/drawing/2014/main" xmlns="" val="10003"/>
+                    <a16:rowId xmlns:a16="http://schemas.microsoft.com/office/drawing/2014/main" val="10003"/>
                   </a:ext>
                 </a:extLst>
               </a:tr>
@@ -9700,13 +9918,6 @@
   <p:clrMapOvr>
     <a:masterClrMapping/>
   </p:clrMapOvr>
-  <p:timing>
-    <p:tnLst>
-      <p:par>
-        <p:cTn id="1" dur="indefinite" restart="never" nodeType="tmRoot"/>
-      </p:par>
-    </p:tnLst>
-  </p:timing>
 </p:sld>
 </file>
 
@@ -9768,7 +9979,7 @@
               <a:buNone/>
             </a:pPr>
             <a:r>
-              <a:rPr lang="sv-SE" dirty="0" smtClean="0"/>
+              <a:rPr lang="sv-SE" dirty="0"/>
               <a:t>Vi har utfört en formell teknisk inspektion där var  och en av gruppmedlemmarna systematisk gått igenom klassen ”GameCharacter” som är primärt skriven av Lukas Varli(Författare). Vi har använt oss av checklistan(Från Seminaretillfälle Två) som vår röda tråd för att underlätta granskningen och se till att vi jobbar inom tydliga ramar. </a:t>
             </a:r>
           </a:p>
@@ -9777,10 +9988,9 @@
               <a:buNone/>
             </a:pPr>
             <a:r>
-              <a:rPr lang="sv-SE" dirty="0" smtClean="0"/>
+              <a:rPr lang="sv-SE" dirty="0"/>
               <a:t>Den primära anledningen för att vi valde just ”GameCharacter” var för att den klassen mätt i antalet metoder är den största klassen och att den kan ses som en integrationshub för hela programmet, vilket ökar risken till att den har fler defekter än de andra klasserna.  </a:t>
             </a:r>
-            <a:endParaRPr lang="sv-SE" dirty="0"/>
           </a:p>
         </p:txBody>
       </p:sp>
@@ -9797,13 +10007,6 @@
   <p:clrMapOvr>
     <a:masterClrMapping/>
   </p:clrMapOvr>
-  <p:timing>
-    <p:tnLst>
-      <p:par>
-        <p:cTn id="1" dur="indefinite" restart="never" nodeType="tmRoot"/>
-      </p:par>
-    </p:tnLst>
-  </p:timing>
 </p:sld>
 </file>
 
@@ -9862,30 +10065,27 @@
           <a:lstStyle/>
           <a:p>
             <a:r>
-              <a:rPr lang="sv-SE" dirty="0" smtClean="0"/>
+              <a:rPr lang="sv-SE" dirty="0"/>
               <a:t>En metod ”hpCounter” hittades som inte uppfyllde någon funktion. Den användes tidigare i projeket för testing av HP men ersattes senare av takeDamage som uppfyller samma funktion på ett effektivare sätt.</a:t>
             </a:r>
           </a:p>
           <a:p>
             <a:r>
-              <a:rPr lang="sv-SE" dirty="0" smtClean="0"/>
+              <a:rPr lang="sv-SE" dirty="0"/>
               <a:t>Nament på metoden unWield bör specificeras, till exempel unWieldWeapon för att undvika förvirring. </a:t>
             </a:r>
-            <a:endParaRPr lang="sv-SE" dirty="0"/>
-          </a:p>
-          <a:p>
-            <a:r>
-              <a:rPr lang="sv-SE" dirty="0" smtClean="0"/>
+          </a:p>
+          <a:p>
+            <a:r>
+              <a:rPr lang="sv-SE" dirty="0"/>
               <a:t>Namnet på metoden nameCheck bör specificeras. För att tydliggöra dess funktion kan man ändra till checkValidName  </a:t>
             </a:r>
-            <a:endParaRPr lang="sv-SE" dirty="0"/>
-          </a:p>
-          <a:p>
-            <a:r>
-              <a:rPr lang="sv-SE" dirty="0" smtClean="0"/>
+          </a:p>
+          <a:p>
+            <a:r>
+              <a:rPr lang="sv-SE" dirty="0"/>
               <a:t>Namnet på metoden makeCharachterInPeacefulStance skulle kunna förenklas till notInCombat eller outOfCombat.</a:t>
             </a:r>
-            <a:endParaRPr lang="sv-SE" dirty="0"/>
           </a:p>
         </p:txBody>
       </p:sp>
@@ -9902,13 +10102,6 @@
   <p:clrMapOvr>
     <a:masterClrMapping/>
   </p:clrMapOvr>
-  <p:timing>
-    <p:tnLst>
-      <p:par>
-        <p:cTn id="1" dur="indefinite" restart="never" nodeType="tmRoot"/>
-      </p:par>
-    </p:tnLst>
-  </p:timing>
 </p:sld>
 </file>
 
@@ -9972,7 +10165,7 @@
               <a:buNone/>
             </a:pPr>
             <a:r>
-              <a:rPr lang="sv-SE" dirty="0" smtClean="0"/>
+              <a:rPr lang="sv-SE" dirty="0"/>
               <a:t>Mer allvarliga</a:t>
             </a:r>
           </a:p>
@@ -9987,20 +10180,18 @@
               <a:rPr lang="sv-SE" dirty="0"/>
               <a:t>Metoden hasEquipped() kan förenklas genom att slå ihop if sattserna med en &amp;&amp; </a:t>
             </a:r>
-            <a:endParaRPr lang="sv-SE" dirty="0" smtClean="0"/>
-          </a:p>
-          <a:p>
-            <a:endParaRPr lang="sv-SE" dirty="0" smtClean="0"/>
+          </a:p>
+          <a:p>
+            <a:endParaRPr lang="sv-SE" dirty="0"/>
           </a:p>
           <a:p>
             <a:pPr marL="0" indent="0">
               <a:buNone/>
             </a:pPr>
             <a:r>
-              <a:rPr lang="sv-SE" dirty="0" smtClean="0"/>
+              <a:rPr lang="sv-SE" dirty="0"/>
               <a:t>Mindre allvarliga </a:t>
             </a:r>
-            <a:endParaRPr lang="sv-SE" dirty="0"/>
           </a:p>
           <a:p>
             <a:pPr fontAlgn="base"/>
@@ -10011,10 +10202,6 @@
           </a:p>
           <a:p>
             <a:pPr fontAlgn="base"/>
-            <a:r>
-              <a:rPr lang="sv-SE" dirty="0"/>
-              <a:t/>
-            </a:r>
             <a:br>
               <a:rPr lang="sv-SE" dirty="0"/>
             </a:br>
@@ -10025,10 +10212,6 @@
           </a:p>
           <a:p>
             <a:pPr fontAlgn="base"/>
-            <a:r>
-              <a:rPr lang="sv-SE" dirty="0"/>
-              <a:t/>
-            </a:r>
             <a:br>
               <a:rPr lang="sv-SE" dirty="0"/>
             </a:br>
@@ -10039,10 +10222,6 @@
           </a:p>
           <a:p>
             <a:pPr fontAlgn="base"/>
-            <a:r>
-              <a:rPr lang="sv-SE" dirty="0"/>
-              <a:t/>
-            </a:r>
             <a:br>
               <a:rPr lang="sv-SE" dirty="0"/>
             </a:br>
@@ -10053,10 +10232,6 @@
           </a:p>
           <a:p>
             <a:pPr fontAlgn="base"/>
-            <a:r>
-              <a:rPr lang="sv-SE" dirty="0"/>
-              <a:t/>
-            </a:r>
             <a:br>
               <a:rPr lang="sv-SE" dirty="0"/>
             </a:br>
@@ -10074,10 +10249,6 @@
           </a:p>
           <a:p>
             <a:pPr fontAlgn="base"/>
-            <a:r>
-              <a:rPr lang="sv-SE" dirty="0"/>
-              <a:t/>
-            </a:r>
             <a:br>
               <a:rPr lang="sv-SE" dirty="0"/>
             </a:br>
@@ -10088,22 +10259,13 @@
           </a:p>
           <a:p>
             <a:pPr fontAlgn="base"/>
-            <a:r>
-              <a:rPr lang="sv-SE" dirty="0"/>
-              <a:t/>
-            </a:r>
             <a:br>
               <a:rPr lang="sv-SE" dirty="0"/>
             </a:br>
             <a:r>
               <a:rPr lang="sv-SE" dirty="0"/>
-              <a:t>Metod namnet “pickUp” skulle kunna döpas till “pickUpItem” för att specificera dess funktion</a:t>
-            </a:r>
-            <a:r>
-              <a:rPr lang="sv-SE" dirty="0" smtClean="0"/>
-              <a:t>.</a:t>
-            </a:r>
-            <a:endParaRPr lang="sv-SE" dirty="0"/>
+              <a:t>Metod namnet “pickUp” skulle kunna döpas till “pickUpItem” för att specificera dess funktion.</a:t>
+            </a:r>
           </a:p>
           <a:p>
             <a:pPr fontAlgn="base"/>
@@ -10143,13 +10305,6 @@
   <p:clrMapOvr>
     <a:masterClrMapping/>
   </p:clrMapOvr>
-  <p:timing>
-    <p:tnLst>
-      <p:par>
-        <p:cTn id="1" dur="indefinite" restart="never" nodeType="tmRoot"/>
-      </p:par>
-    </p:tnLst>
-  </p:timing>
 </p:sld>
 </file>
 
@@ -10217,18 +10372,14 @@
             </a:pPr>
             <a:r>
               <a:rPr lang="sv-SE" sz="2400" dirty="0"/>
-              <a:t>Den största erfarenheten vi kunde dra av att utföra en formell teknisk inspektion var hur effektiv den var när det kommer till att hitta fel. Att först enskilt gå igenom koden noggrant steg för steg och sedan gå igenom den tillsammans visade sig vara väldigt effektivt. Det gav oss en möjlighet att gå igenom koden för att se till att allting ser bra ut och fungerar som det ska. Det är ett bra sätt att se hur varandras kod ser ut i minsta detalj och hur man har jobbat</a:t>
-            </a:r>
-            <a:r>
-              <a:rPr lang="sv-SE" sz="2400" dirty="0" smtClean="0"/>
-              <a:t>.</a:t>
+              <a:t>Den största erfarenheten vi kunde dra av att utföra en formell teknisk inspektion var hur effektiv den var när det kommer till att hitta fel. Att först enskilt gå igenom koden noggrant steg för steg och sedan gå igenom den tillsammans visade sig vara väldigt effektivt. Det gav oss en möjlighet att gå igenom koden för att se till att allting ser bra ut och fungerar som det ska. Det är ett bra sätt att se hur varandras kod ser ut i minsta detalj och hur man har jobbat.</a:t>
             </a:r>
           </a:p>
           <a:p>
             <a:pPr marL="0" indent="0">
               <a:buNone/>
             </a:pPr>
-            <a:endParaRPr lang="sv-SE" sz="2400" dirty="0" smtClean="0"/>
+            <a:endParaRPr lang="sv-SE" sz="2400" dirty="0"/>
           </a:p>
           <a:p>
             <a:pPr marL="0" indent="0">
@@ -10251,13 +10402,6 @@
   <p:clrMapOvr>
     <a:masterClrMapping/>
   </p:clrMapOvr>
-  <p:timing>
-    <p:tnLst>
-      <p:par>
-        <p:cTn id="1" dur="indefinite" restart="never" nodeType="tmRoot"/>
-      </p:par>
-    </p:tnLst>
-  </p:timing>
 </p:sld>
 </file>
 
@@ -10318,102 +10462,101 @@
           <a:lstStyle/>
           <a:p>
             <a:r>
-              <a:rPr lang="sv-SE" sz="1800" dirty="0" smtClean="0"/>
+              <a:rPr lang="sv-SE" sz="1800" dirty="0"/>
               <a:t>Några av felen vi hittade i </a:t>
             </a:r>
             <a:r>
-              <a:rPr lang="sv-SE" sz="1800" dirty="0" err="1" smtClean="0"/>
+              <a:rPr lang="sv-SE" sz="1800" dirty="0" err="1"/>
               <a:t>FindBugs</a:t>
             </a:r>
             <a:r>
-              <a:rPr lang="sv-SE" sz="1800" dirty="0" smtClean="0"/>
+              <a:rPr lang="sv-SE" sz="1800" dirty="0"/>
               <a:t> visar att under granskningen så fokuserade vi på annat än vad som kan va relevant för funktionen i programmet. Huvudfokus i granskningen var att göra koden lätt att förstå och </a:t>
             </a:r>
             <a:r>
-              <a:rPr lang="sv-SE" sz="1800" dirty="0" err="1" smtClean="0"/>
+              <a:rPr lang="sv-SE" sz="1800" dirty="0" err="1"/>
               <a:t>refaktorera</a:t>
             </a:r>
             <a:r>
-              <a:rPr lang="sv-SE" sz="1800" dirty="0" smtClean="0"/>
+              <a:rPr lang="sv-SE" sz="1800" dirty="0"/>
               <a:t> metoder med svåra namn. </a:t>
             </a:r>
             <a:r>
-              <a:rPr lang="sv-SE" sz="1800" dirty="0" err="1" smtClean="0"/>
+              <a:rPr lang="sv-SE" sz="1800" dirty="0" err="1"/>
               <a:t>FindBugs</a:t>
             </a:r>
             <a:r>
-              <a:rPr lang="sv-SE" sz="1800" dirty="0" smtClean="0"/>
+              <a:rPr lang="sv-SE" sz="1800" dirty="0"/>
               <a:t> hittade mer fel såsom ”\n” kunde ersättas med ”%n” i en </a:t>
             </a:r>
             <a:r>
-              <a:rPr lang="sv-SE" sz="1800" dirty="0" err="1" smtClean="0"/>
+              <a:rPr lang="sv-SE" sz="1800" dirty="0" err="1"/>
               <a:t>printf</a:t>
             </a:r>
             <a:r>
-              <a:rPr lang="sv-SE" sz="1800" dirty="0" smtClean="0"/>
+              <a:rPr lang="sv-SE" sz="1800" dirty="0"/>
               <a:t>() för att säkra funktionaliteten över flera operativsystem och miljöer.</a:t>
             </a:r>
           </a:p>
           <a:p>
             <a:r>
-              <a:rPr lang="sv-SE" sz="1800" dirty="0" smtClean="0"/>
+              <a:rPr lang="sv-SE" sz="1800" dirty="0"/>
               <a:t>Kodkritiksystemet har varit inställt på högsta  känslighet både före och efter granskningen, dock så hittade det inte något kritiskt som behövdes åtgärdas när vi korrigerat allt från </a:t>
             </a:r>
             <a:r>
-              <a:rPr lang="sv-SE" sz="1800" dirty="0" err="1" smtClean="0"/>
+              <a:rPr lang="sv-SE" sz="1800" dirty="0" err="1"/>
               <a:t>granskningrapporten</a:t>
             </a:r>
             <a:r>
-              <a:rPr lang="sv-SE" sz="1800" dirty="0" smtClean="0"/>
+              <a:rPr lang="sv-SE" sz="1800" dirty="0"/>
               <a:t> samt första körningen av </a:t>
             </a:r>
             <a:r>
-              <a:rPr lang="sv-SE" sz="1800" dirty="0" err="1" smtClean="0"/>
+              <a:rPr lang="sv-SE" sz="1800" dirty="0" err="1"/>
               <a:t>FindBugs</a:t>
             </a:r>
             <a:r>
-              <a:rPr lang="sv-SE" sz="1800" dirty="0" smtClean="0"/>
+              <a:rPr lang="sv-SE" sz="1800" dirty="0"/>
               <a:t>.</a:t>
             </a:r>
           </a:p>
           <a:p>
             <a:r>
-              <a:rPr lang="sv-SE" sz="1800" dirty="0" smtClean="0"/>
+              <a:rPr lang="sv-SE" sz="1800" dirty="0"/>
               <a:t>Det felet som </a:t>
             </a:r>
             <a:r>
-              <a:rPr lang="sv-SE" sz="1800" dirty="0" err="1" smtClean="0"/>
+              <a:rPr lang="sv-SE" sz="1800" dirty="0" err="1"/>
               <a:t>FindBugs</a:t>
             </a:r>
             <a:r>
-              <a:rPr lang="sv-SE" sz="1800" dirty="0" smtClean="0"/>
+              <a:rPr lang="sv-SE" sz="1800" dirty="0"/>
               <a:t> hittat är att returvärdet i </a:t>
             </a:r>
             <a:r>
-              <a:rPr lang="sv-SE" sz="1800" dirty="0" err="1" smtClean="0"/>
+              <a:rPr lang="sv-SE" sz="1800" dirty="0" err="1"/>
               <a:t>getMaxHp</a:t>
             </a:r>
             <a:r>
-              <a:rPr lang="sv-SE" sz="1800" dirty="0" smtClean="0"/>
+              <a:rPr lang="sv-SE" sz="1800" dirty="0"/>
               <a:t>() ignoreras, om vi tolkat uppgifterna rätt. I nuläget används inte metoden för mer än testning av variabeln </a:t>
             </a:r>
             <a:r>
-              <a:rPr lang="sv-SE" sz="1800" dirty="0" err="1" smtClean="0"/>
+              <a:rPr lang="sv-SE" sz="1800" dirty="0" err="1"/>
               <a:t>maxHp</a:t>
             </a:r>
             <a:r>
-              <a:rPr lang="sv-SE" sz="1800" dirty="0" smtClean="0"/>
+              <a:rPr lang="sv-SE" sz="1800" dirty="0"/>
               <a:t>, dock så kommer den vara till stor nytta när man i framtiden ska kunna lägga möjlighet att </a:t>
             </a:r>
             <a:r>
-              <a:rPr lang="sv-SE" sz="1800" dirty="0" err="1" smtClean="0"/>
+              <a:rPr lang="sv-SE" sz="1800" dirty="0" err="1"/>
               <a:t>heala</a:t>
             </a:r>
             <a:r>
-              <a:rPr lang="sv-SE" sz="1800" dirty="0" smtClean="0"/>
+              <a:rPr lang="sv-SE" sz="1800" dirty="0"/>
               <a:t> karaktären så livet inte överstiger max. Därav är det viktigt att ha det maximala värdet uppdaterat varje gång metoden kallas på.</a:t>
             </a:r>
-            <a:endParaRPr lang="sv-SE" sz="1800" dirty="0" smtClean="0"/>
           </a:p>
         </p:txBody>
       </p:sp>
@@ -10426,7 +10569,7 @@
           <p:nvPr/>
         </p:nvPicPr>
         <p:blipFill>
-          <a:blip r:embed="rId4">
+          <a:blip r:embed="rId4" cstate="print">
             <a:extLst>
               <a:ext uri="{28A0092B-C50C-407E-A947-70E740481C1C}">
                 <a14:useLocalDpi xmlns:a14="http://schemas.microsoft.com/office/drawing/2010/main" val="0"/>
@@ -10490,13 +10633,6 @@
   <p:clrMapOvr>
     <a:masterClrMapping/>
   </p:clrMapOvr>
-  <p:timing>
-    <p:tnLst>
-      <p:par>
-        <p:cTn id="1" dur="indefinite" restart="never" nodeType="tmRoot"/>
-      </p:par>
-    </p:tnLst>
-  </p:timing>
 </p:sld>
 </file>
 
@@ -10554,10 +10690,164 @@
           <a:bodyPr/>
           <a:lstStyle/>
           <a:p>
-            <a:endParaRPr lang="sv-SE"/>
-          </a:p>
-        </p:txBody>
-      </p:sp>
+            <a:pPr marL="0" indent="0">
+              <a:buNone/>
+            </a:pPr>
+            <a:r>
+              <a:rPr lang="sv-SE" dirty="0"/>
+              <a:t>Vi har valt följande mått:</a:t>
+            </a:r>
+          </a:p>
+          <a:p>
+            <a:pPr marL="0" indent="0">
+              <a:buNone/>
+            </a:pPr>
+            <a:r>
+              <a:rPr lang="sv-SE" dirty="0" err="1"/>
+              <a:t>Coupling</a:t>
+            </a:r>
+            <a:r>
+              <a:rPr lang="sv-SE" dirty="0"/>
+              <a:t> </a:t>
+            </a:r>
+            <a:r>
+              <a:rPr lang="sv-SE" dirty="0" err="1"/>
+              <a:t>Factor</a:t>
+            </a:r>
+            <a:r>
+              <a:rPr lang="sv-SE" dirty="0"/>
+              <a:t> (CF): 29,52%</a:t>
+            </a:r>
+          </a:p>
+          <a:p>
+            <a:pPr marL="0" indent="0">
+              <a:buNone/>
+            </a:pPr>
+            <a:r>
+              <a:rPr lang="sv-SE" dirty="0" err="1"/>
+              <a:t>Comment</a:t>
+            </a:r>
+            <a:r>
+              <a:rPr lang="sv-SE" dirty="0"/>
+              <a:t> </a:t>
+            </a:r>
+            <a:r>
+              <a:rPr lang="sv-SE" dirty="0" err="1"/>
+              <a:t>ratio</a:t>
+            </a:r>
+            <a:r>
+              <a:rPr lang="sv-SE" dirty="0"/>
+              <a:t> (COM_RAT) : 3,69%</a:t>
+            </a:r>
+          </a:p>
+          <a:p>
+            <a:pPr marL="0" indent="0">
+              <a:buNone/>
+            </a:pPr>
+            <a:r>
+              <a:rPr lang="sv-SE" dirty="0"/>
+              <a:t>Lines </a:t>
+            </a:r>
+            <a:r>
+              <a:rPr lang="sv-SE" dirty="0" err="1"/>
+              <a:t>of</a:t>
+            </a:r>
+            <a:r>
+              <a:rPr lang="sv-SE" dirty="0"/>
+              <a:t> Product </a:t>
+            </a:r>
+            <a:r>
+              <a:rPr lang="sv-SE" dirty="0" err="1"/>
+              <a:t>Code</a:t>
+            </a:r>
+            <a:r>
+              <a:rPr lang="sv-SE" dirty="0"/>
+              <a:t> (</a:t>
+            </a:r>
+            <a:r>
+              <a:rPr lang="sv-SE" dirty="0" err="1"/>
+              <a:t>LOCp</a:t>
+            </a:r>
+            <a:r>
+              <a:rPr lang="sv-SE" dirty="0"/>
+              <a:t>) : 646</a:t>
+            </a:r>
+          </a:p>
+          <a:p>
+            <a:pPr marL="0" indent="0">
+              <a:buNone/>
+            </a:pPr>
+            <a:r>
+              <a:rPr lang="sv-SE" dirty="0"/>
+              <a:t>Lines </a:t>
+            </a:r>
+            <a:r>
+              <a:rPr lang="sv-SE" dirty="0" err="1"/>
+              <a:t>of</a:t>
+            </a:r>
+            <a:r>
+              <a:rPr lang="sv-SE" dirty="0"/>
+              <a:t> Test </a:t>
+            </a:r>
+            <a:r>
+              <a:rPr lang="sv-SE" dirty="0" err="1"/>
+              <a:t>Code</a:t>
+            </a:r>
+            <a:r>
+              <a:rPr lang="sv-SE" dirty="0"/>
+              <a:t> (</a:t>
+            </a:r>
+            <a:r>
+              <a:rPr lang="sv-SE" dirty="0" err="1"/>
+              <a:t>LOCt</a:t>
+            </a:r>
+            <a:r>
+              <a:rPr lang="sv-SE"/>
+              <a:t>): </a:t>
+            </a:r>
+            <a:r>
+              <a:rPr lang="sv-SE" dirty="0"/>
+              <a:t>950</a:t>
+            </a:r>
+          </a:p>
+        </p:txBody>
+      </p:sp>
+      <p:pic>
+        <p:nvPicPr>
+          <p:cNvPr id="9" name="Bildobjekt 8">
+            <a:extLst>
+              <a:ext uri="{FF2B5EF4-FFF2-40B4-BE49-F238E27FC236}">
+                <a16:creationId xmlns:a16="http://schemas.microsoft.com/office/drawing/2014/main" id="{DA2C054A-9555-46DC-A370-8C098709AAF2}"/>
+              </a:ext>
+            </a:extLst>
+          </p:cNvPr>
+          <p:cNvPicPr>
+            <a:picLocks noChangeAspect="1"/>
+          </p:cNvPicPr>
+          <p:nvPr/>
+        </p:nvPicPr>
+        <p:blipFill>
+          <a:blip r:embed="rId4">
+            <a:extLst>
+              <a:ext uri="{28A0092B-C50C-407E-A947-70E740481C1C}">
+                <a14:useLocalDpi xmlns:a14="http://schemas.microsoft.com/office/drawing/2010/main" val="0"/>
+              </a:ext>
+            </a:extLst>
+          </a:blip>
+          <a:stretch>
+            <a:fillRect/>
+          </a:stretch>
+        </p:blipFill>
+        <p:spPr>
+          <a:xfrm>
+            <a:off x="838200" y="4437135"/>
+            <a:ext cx="9835718" cy="1080438"/>
+          </a:xfrm>
+          <a:prstGeom prst="rect">
+            <a:avLst/>
+          </a:prstGeom>
+        </p:spPr>
+      </p:pic>
     </p:spTree>
     <p:custDataLst>
       <p:tags r:id="rId1"/>
@@ -10571,17 +10861,623 @@
   <p:clrMapOvr>
     <a:masterClrMapping/>
   </p:clrMapOvr>
-  <p:timing>
-    <p:tnLst>
-      <p:par>
-        <p:cTn id="1" dur="indefinite" restart="never" nodeType="tmRoot"/>
-      </p:par>
-    </p:tnLst>
-  </p:timing>
 </p:sld>
 </file>
 
 <file path=ppt/slides/slide27.xml><?xml version="1.0" encoding="utf-8"?>
+<p:sld xmlns:a="http://schemas.openxmlformats.org/drawingml/2006/main" xmlns:r="http://schemas.openxmlformats.org/officeDocument/2006/relationships" xmlns:p="http://schemas.openxmlformats.org/presentationml/2006/main">
+  <p:cSld>
+    <p:spTree>
+      <p:nvGrpSpPr>
+        <p:cNvPr id="1" name=""/>
+        <p:cNvGrpSpPr/>
+        <p:nvPr/>
+      </p:nvGrpSpPr>
+      <p:grpSpPr>
+        <a:xfrm>
+          <a:off x="0" y="0"/>
+          <a:ext cx="0" cy="0"/>
+          <a:chOff x="0" y="0"/>
+          <a:chExt cx="0" cy="0"/>
+        </a:xfrm>
+      </p:grpSpPr>
+      <p:sp>
+        <p:nvSpPr>
+          <p:cNvPr id="2" name="Rubrik 1"/>
+          <p:cNvSpPr>
+            <a:spLocks noGrp="1"/>
+          </p:cNvSpPr>
+          <p:nvPr>
+            <p:ph type="title"/>
+          </p:nvPr>
+        </p:nvSpPr>
+        <p:spPr/>
+        <p:txBody>
+          <a:bodyPr/>
+          <a:lstStyle/>
+          <a:p>
+            <a:r>
+              <a:rPr lang="sv-SE" dirty="0"/>
+              <a:t>Statiska mått</a:t>
+            </a:r>
+          </a:p>
+        </p:txBody>
+      </p:sp>
+      <p:sp>
+        <p:nvSpPr>
+          <p:cNvPr id="3" name="Platshållare för innehåll 2"/>
+          <p:cNvSpPr>
+            <a:spLocks noGrp="1"/>
+          </p:cNvSpPr>
+          <p:nvPr>
+            <p:ph idx="1"/>
+          </p:nvPr>
+        </p:nvSpPr>
+        <p:spPr/>
+        <p:txBody>
+          <a:bodyPr>
+            <a:normAutofit/>
+          </a:bodyPr>
+          <a:lstStyle/>
+          <a:p>
+            <a:pPr marL="0" indent="0">
+              <a:buNone/>
+            </a:pPr>
+            <a:r>
+              <a:rPr lang="sv-SE" dirty="0" err="1"/>
+              <a:t>Coupling</a:t>
+            </a:r>
+            <a:r>
+              <a:rPr lang="sv-SE" dirty="0"/>
+              <a:t> </a:t>
+            </a:r>
+            <a:r>
+              <a:rPr lang="sv-SE" dirty="0" err="1"/>
+              <a:t>factor</a:t>
+            </a:r>
+            <a:r>
+              <a:rPr lang="sv-SE" dirty="0"/>
+              <a:t> (CF)</a:t>
+            </a:r>
+          </a:p>
+          <a:p>
+            <a:pPr marL="0" indent="0">
+              <a:buNone/>
+            </a:pPr>
+            <a:r>
+              <a:rPr lang="sv-SE" dirty="0"/>
+              <a:t>Vi valde detta mått eftersom vi ville veta hur beroende klasserna är av varandra. I ett större projekt så hade detta mått haft en hög prioritet då en låg CF gör det enklare att bygga om systemet då man inte stöter på lika många problemen. </a:t>
+            </a:r>
+          </a:p>
+          <a:p>
+            <a:pPr marL="0" indent="0">
+              <a:buNone/>
+            </a:pPr>
+            <a:r>
+              <a:rPr lang="sv-SE" dirty="0"/>
+              <a:t>Detta mått borde fungera bäst när man mäter klass för klass då kan man veta vilka klasser som är sårbara och då kan man rikta mer resurser till för att fixa till när man väl börjar göra några ändringar. </a:t>
+            </a:r>
+          </a:p>
+          <a:p>
+            <a:pPr marL="0" indent="0">
+              <a:buNone/>
+            </a:pPr>
+            <a:r>
+              <a:rPr lang="sv-SE" dirty="0"/>
+              <a:t>	</a:t>
+            </a:r>
+          </a:p>
+        </p:txBody>
+      </p:sp>
+      <p:pic>
+        <p:nvPicPr>
+          <p:cNvPr id="9" name="Bildobjekt 8">
+            <a:extLst>
+              <a:ext uri="{FF2B5EF4-FFF2-40B4-BE49-F238E27FC236}">
+                <a16:creationId xmlns:a16="http://schemas.microsoft.com/office/drawing/2014/main" id="{DA2C054A-9555-46DC-A370-8C098709AAF2}"/>
+              </a:ext>
+            </a:extLst>
+          </p:cNvPr>
+          <p:cNvPicPr>
+            <a:picLocks noChangeAspect="1"/>
+          </p:cNvPicPr>
+          <p:nvPr/>
+        </p:nvPicPr>
+        <p:blipFill>
+          <a:blip r:embed="rId4">
+            <a:extLst>
+              <a:ext uri="{28A0092B-C50C-407E-A947-70E740481C1C}">
+                <a14:useLocalDpi xmlns:a14="http://schemas.microsoft.com/office/drawing/2010/main" val="0"/>
+              </a:ext>
+            </a:extLst>
+          </a:blip>
+          <a:stretch>
+            <a:fillRect/>
+          </a:stretch>
+        </p:blipFill>
+        <p:spPr>
+          <a:xfrm>
+            <a:off x="4185123" y="696407"/>
+            <a:ext cx="6035563" cy="662997"/>
+          </a:xfrm>
+          <a:prstGeom prst="rect">
+            <a:avLst/>
+          </a:prstGeom>
+        </p:spPr>
+      </p:pic>
+    </p:spTree>
+    <p:custDataLst>
+      <p:tags r:id="rId1"/>
+    </p:custDataLst>
+    <p:extLst>
+      <p:ext uri="{BB962C8B-B14F-4D97-AF65-F5344CB8AC3E}">
+        <p14:creationId xmlns:p14="http://schemas.microsoft.com/office/powerpoint/2010/main" val="2302435364"/>
+      </p:ext>
+    </p:extLst>
+  </p:cSld>
+  <p:clrMapOvr>
+    <a:masterClrMapping/>
+  </p:clrMapOvr>
+</p:sld>
+</file>
+
+<file path=ppt/slides/slide28.xml><?xml version="1.0" encoding="utf-8"?>
+<p:sld xmlns:a="http://schemas.openxmlformats.org/drawingml/2006/main" xmlns:r="http://schemas.openxmlformats.org/officeDocument/2006/relationships" xmlns:p="http://schemas.openxmlformats.org/presentationml/2006/main">
+  <p:cSld>
+    <p:spTree>
+      <p:nvGrpSpPr>
+        <p:cNvPr id="1" name=""/>
+        <p:cNvGrpSpPr/>
+        <p:nvPr/>
+      </p:nvGrpSpPr>
+      <p:grpSpPr>
+        <a:xfrm>
+          <a:off x="0" y="0"/>
+          <a:ext cx="0" cy="0"/>
+          <a:chOff x="0" y="0"/>
+          <a:chExt cx="0" cy="0"/>
+        </a:xfrm>
+      </p:grpSpPr>
+      <p:sp>
+        <p:nvSpPr>
+          <p:cNvPr id="2" name="Rubrik 1"/>
+          <p:cNvSpPr>
+            <a:spLocks noGrp="1"/>
+          </p:cNvSpPr>
+          <p:nvPr>
+            <p:ph type="title"/>
+          </p:nvPr>
+        </p:nvSpPr>
+        <p:spPr/>
+        <p:txBody>
+          <a:bodyPr/>
+          <a:lstStyle/>
+          <a:p>
+            <a:r>
+              <a:rPr lang="sv-SE" dirty="0"/>
+              <a:t>Statiska mått</a:t>
+            </a:r>
+          </a:p>
+        </p:txBody>
+      </p:sp>
+      <p:sp>
+        <p:nvSpPr>
+          <p:cNvPr id="3" name="Platshållare för innehåll 2"/>
+          <p:cNvSpPr>
+            <a:spLocks noGrp="1"/>
+          </p:cNvSpPr>
+          <p:nvPr>
+            <p:ph idx="1"/>
+          </p:nvPr>
+        </p:nvSpPr>
+        <p:spPr/>
+        <p:txBody>
+          <a:bodyPr>
+            <a:normAutofit fontScale="92500" lnSpcReduction="20000"/>
+          </a:bodyPr>
+          <a:lstStyle/>
+          <a:p>
+            <a:pPr marL="0" indent="0">
+              <a:buNone/>
+            </a:pPr>
+            <a:r>
+              <a:rPr lang="sv-SE" dirty="0" err="1"/>
+              <a:t>Comment</a:t>
+            </a:r>
+            <a:r>
+              <a:rPr lang="sv-SE" dirty="0"/>
+              <a:t> </a:t>
+            </a:r>
+            <a:r>
+              <a:rPr lang="sv-SE" dirty="0" err="1"/>
+              <a:t>Ratio</a:t>
+            </a:r>
+            <a:endParaRPr lang="sv-SE" dirty="0"/>
+          </a:p>
+          <a:p>
+            <a:pPr marL="0" indent="0">
+              <a:buNone/>
+            </a:pPr>
+            <a:r>
+              <a:rPr lang="sv-SE" dirty="0"/>
+              <a:t>Detta mått är ganska låg vilket kan indikera på bristfällig dokumentation i koden.</a:t>
+            </a:r>
+          </a:p>
+          <a:p>
+            <a:pPr marL="0" indent="0">
+              <a:buNone/>
+            </a:pPr>
+            <a:r>
+              <a:rPr lang="sv-SE" dirty="0"/>
+              <a:t>Mer dokumentation i koden gör det enklare att förstå syftet med klassen uppgifterna som den utför, vilket kan vara hjälpsamt om en annan aktör behöver lära sig hur koden fungerar.</a:t>
+            </a:r>
+          </a:p>
+          <a:p>
+            <a:pPr marL="0" indent="0">
+              <a:buNone/>
+            </a:pPr>
+            <a:r>
+              <a:rPr lang="sv-SE" dirty="0"/>
+              <a:t>Detta mått blir då viktigt när man vill spåra hur mycket av programmet man dokumenterat och om siffran blir för låg och man märker av det i de tidigaste stadierna av utvecklingsprocessen så kan man lätt se till att utvecklarna lägger mer tid på att dokumentera sin kod. </a:t>
+            </a:r>
+          </a:p>
+          <a:p>
+            <a:pPr marL="0" indent="0">
+              <a:buNone/>
+            </a:pPr>
+            <a:r>
+              <a:rPr lang="sv-SE" dirty="0"/>
+              <a:t>Ett högt värde kan även vara en indikation på många onödiga eller redundanta kommentarer eller att specifika bitar av koden är dåligt skriva och svåra att förstå.</a:t>
+            </a:r>
+          </a:p>
+        </p:txBody>
+      </p:sp>
+      <p:pic>
+        <p:nvPicPr>
+          <p:cNvPr id="9" name="Bildobjekt 8">
+            <a:extLst>
+              <a:ext uri="{FF2B5EF4-FFF2-40B4-BE49-F238E27FC236}">
+                <a16:creationId xmlns:a16="http://schemas.microsoft.com/office/drawing/2014/main" id="{DA2C054A-9555-46DC-A370-8C098709AAF2}"/>
+              </a:ext>
+            </a:extLst>
+          </p:cNvPr>
+          <p:cNvPicPr>
+            <a:picLocks noChangeAspect="1"/>
+          </p:cNvPicPr>
+          <p:nvPr/>
+        </p:nvPicPr>
+        <p:blipFill>
+          <a:blip r:embed="rId4">
+            <a:extLst>
+              <a:ext uri="{28A0092B-C50C-407E-A947-70E740481C1C}">
+                <a14:useLocalDpi xmlns:a14="http://schemas.microsoft.com/office/drawing/2010/main" val="0"/>
+              </a:ext>
+            </a:extLst>
+          </a:blip>
+          <a:stretch>
+            <a:fillRect/>
+          </a:stretch>
+        </p:blipFill>
+        <p:spPr>
+          <a:xfrm>
+            <a:off x="4185123" y="696407"/>
+            <a:ext cx="6035563" cy="662997"/>
+          </a:xfrm>
+          <a:prstGeom prst="rect">
+            <a:avLst/>
+          </a:prstGeom>
+        </p:spPr>
+      </p:pic>
+    </p:spTree>
+    <p:custDataLst>
+      <p:tags r:id="rId1"/>
+    </p:custDataLst>
+    <p:extLst>
+      <p:ext uri="{BB962C8B-B14F-4D97-AF65-F5344CB8AC3E}">
+        <p14:creationId xmlns:p14="http://schemas.microsoft.com/office/powerpoint/2010/main" val="3109467782"/>
+      </p:ext>
+    </p:extLst>
+  </p:cSld>
+  <p:clrMapOvr>
+    <a:masterClrMapping/>
+  </p:clrMapOvr>
+</p:sld>
+</file>
+
+<file path=ppt/slides/slide29.xml><?xml version="1.0" encoding="utf-8"?>
+<p:sld xmlns:a="http://schemas.openxmlformats.org/drawingml/2006/main" xmlns:r="http://schemas.openxmlformats.org/officeDocument/2006/relationships" xmlns:p="http://schemas.openxmlformats.org/presentationml/2006/main">
+  <p:cSld>
+    <p:spTree>
+      <p:nvGrpSpPr>
+        <p:cNvPr id="1" name=""/>
+        <p:cNvGrpSpPr/>
+        <p:nvPr/>
+      </p:nvGrpSpPr>
+      <p:grpSpPr>
+        <a:xfrm>
+          <a:off x="0" y="0"/>
+          <a:ext cx="0" cy="0"/>
+          <a:chOff x="0" y="0"/>
+          <a:chExt cx="0" cy="0"/>
+        </a:xfrm>
+      </p:grpSpPr>
+      <p:sp>
+        <p:nvSpPr>
+          <p:cNvPr id="2" name="Rubrik 1"/>
+          <p:cNvSpPr>
+            <a:spLocks noGrp="1"/>
+          </p:cNvSpPr>
+          <p:nvPr>
+            <p:ph type="title"/>
+          </p:nvPr>
+        </p:nvSpPr>
+        <p:spPr/>
+        <p:txBody>
+          <a:bodyPr/>
+          <a:lstStyle/>
+          <a:p>
+            <a:r>
+              <a:rPr lang="sv-SE" dirty="0"/>
+              <a:t>Statiska mått</a:t>
+            </a:r>
+          </a:p>
+        </p:txBody>
+      </p:sp>
+      <p:sp>
+        <p:nvSpPr>
+          <p:cNvPr id="3" name="Platshållare för innehåll 2"/>
+          <p:cNvSpPr>
+            <a:spLocks noGrp="1"/>
+          </p:cNvSpPr>
+          <p:nvPr>
+            <p:ph idx="1"/>
+          </p:nvPr>
+        </p:nvSpPr>
+        <p:spPr/>
+        <p:txBody>
+          <a:bodyPr>
+            <a:normAutofit fontScale="92500" lnSpcReduction="20000"/>
+          </a:bodyPr>
+          <a:lstStyle/>
+          <a:p>
+            <a:pPr marL="0" indent="0">
+              <a:buNone/>
+            </a:pPr>
+            <a:r>
+              <a:rPr lang="sv-SE" dirty="0"/>
+              <a:t>Lines </a:t>
+            </a:r>
+            <a:r>
+              <a:rPr lang="sv-SE" dirty="0" err="1"/>
+              <a:t>of</a:t>
+            </a:r>
+            <a:r>
+              <a:rPr lang="sv-SE" dirty="0"/>
+              <a:t> </a:t>
+            </a:r>
+            <a:r>
+              <a:rPr lang="sv-SE" dirty="0" err="1"/>
+              <a:t>codes</a:t>
+            </a:r>
+            <a:endParaRPr lang="sv-SE" dirty="0"/>
+          </a:p>
+          <a:p>
+            <a:pPr marL="0" indent="0">
+              <a:buNone/>
+            </a:pPr>
+            <a:r>
+              <a:rPr lang="sv-SE" dirty="0"/>
+              <a:t>Dessa mått är inte så intressanta var för sig men tillsammans så tillåter de oss att se förhållandet mellan produkt koden samt test koden.</a:t>
+            </a:r>
+          </a:p>
+          <a:p>
+            <a:pPr marL="0" indent="0">
+              <a:buNone/>
+            </a:pPr>
+            <a:r>
+              <a:rPr lang="sv-SE" dirty="0"/>
+              <a:t>950/646 = 1.4705…</a:t>
+            </a:r>
+          </a:p>
+          <a:p>
+            <a:pPr marL="0" indent="0">
+              <a:buNone/>
+            </a:pPr>
+            <a:r>
+              <a:rPr lang="sv-SE" dirty="0"/>
+              <a:t>Förhållandet mellan de är ungefär 1:1.47</a:t>
+            </a:r>
+          </a:p>
+          <a:p>
+            <a:pPr marL="0" indent="0">
+              <a:buNone/>
+            </a:pPr>
+            <a:r>
+              <a:rPr lang="sv-SE" dirty="0"/>
+              <a:t>Vi har alltså ~47% mer test kod än produkt kod enligt diskussioner som vi har hittat online så är det normal att förhållandet brukar ligga mellan 1:1-1:3. Dessa mått är intressanta som en komplettering för </a:t>
+            </a:r>
+            <a:r>
+              <a:rPr lang="sv-SE" dirty="0" err="1"/>
+              <a:t>coverage</a:t>
+            </a:r>
+            <a:r>
+              <a:rPr lang="sv-SE" dirty="0"/>
+              <a:t> då </a:t>
+            </a:r>
+            <a:r>
+              <a:rPr lang="sv-SE" dirty="0" err="1"/>
+              <a:t>code</a:t>
+            </a:r>
+            <a:r>
+              <a:rPr lang="sv-SE" dirty="0"/>
+              <a:t> </a:t>
+            </a:r>
+            <a:r>
+              <a:rPr lang="sv-SE" dirty="0" err="1"/>
+              <a:t>coverage</a:t>
+            </a:r>
+            <a:r>
+              <a:rPr lang="sv-SE" dirty="0"/>
+              <a:t> bara visar om man täcker delar av koden, den berättar inte om man täckt alla möjliga vägar.</a:t>
+            </a:r>
+          </a:p>
+          <a:p>
+            <a:pPr marL="0" indent="0">
+              <a:buNone/>
+            </a:pPr>
+            <a:r>
+              <a:rPr lang="sv-SE" dirty="0"/>
+              <a:t>Ett lågt förhållande är en indikator av att man kanske bör lägga till fler testfall medans för höga värden kan vara en indikation på redundanta test eller gamla testfall som kanske bör tas bort eller </a:t>
+            </a:r>
+            <a:r>
+              <a:rPr lang="sv-SE" dirty="0" err="1"/>
+              <a:t>refaktoreras</a:t>
+            </a:r>
+            <a:r>
+              <a:rPr lang="sv-SE" dirty="0"/>
+              <a:t>.</a:t>
+            </a:r>
+          </a:p>
+        </p:txBody>
+      </p:sp>
+      <p:pic>
+        <p:nvPicPr>
+          <p:cNvPr id="9" name="Bildobjekt 8">
+            <a:extLst>
+              <a:ext uri="{FF2B5EF4-FFF2-40B4-BE49-F238E27FC236}">
+                <a16:creationId xmlns:a16="http://schemas.microsoft.com/office/drawing/2014/main" id="{DA2C054A-9555-46DC-A370-8C098709AAF2}"/>
+              </a:ext>
+            </a:extLst>
+          </p:cNvPr>
+          <p:cNvPicPr>
+            <a:picLocks noChangeAspect="1"/>
+          </p:cNvPicPr>
+          <p:nvPr/>
+        </p:nvPicPr>
+        <p:blipFill>
+          <a:blip r:embed="rId4">
+            <a:extLst>
+              <a:ext uri="{28A0092B-C50C-407E-A947-70E740481C1C}">
+                <a14:useLocalDpi xmlns:a14="http://schemas.microsoft.com/office/drawing/2010/main" val="0"/>
+              </a:ext>
+            </a:extLst>
+          </a:blip>
+          <a:stretch>
+            <a:fillRect/>
+          </a:stretch>
+        </p:blipFill>
+        <p:spPr>
+          <a:xfrm>
+            <a:off x="4185123" y="696407"/>
+            <a:ext cx="6035563" cy="662997"/>
+          </a:xfrm>
+          <a:prstGeom prst="rect">
+            <a:avLst/>
+          </a:prstGeom>
+        </p:spPr>
+      </p:pic>
+    </p:spTree>
+    <p:custDataLst>
+      <p:tags r:id="rId1"/>
+    </p:custDataLst>
+    <p:extLst>
+      <p:ext uri="{BB962C8B-B14F-4D97-AF65-F5344CB8AC3E}">
+        <p14:creationId xmlns:p14="http://schemas.microsoft.com/office/powerpoint/2010/main" val="156245330"/>
+      </p:ext>
+    </p:extLst>
+  </p:cSld>
+  <p:clrMapOvr>
+    <a:masterClrMapping/>
+  </p:clrMapOvr>
+</p:sld>
+</file>
+
+<file path=ppt/slides/slide3.xml><?xml version="1.0" encoding="utf-8"?>
+<p:sld xmlns:a="http://schemas.openxmlformats.org/drawingml/2006/main" xmlns:r="http://schemas.openxmlformats.org/officeDocument/2006/relationships" xmlns:p="http://schemas.openxmlformats.org/presentationml/2006/main">
+  <p:cSld>
+    <p:spTree>
+      <p:nvGrpSpPr>
+        <p:cNvPr id="1" name=""/>
+        <p:cNvGrpSpPr/>
+        <p:nvPr/>
+      </p:nvGrpSpPr>
+      <p:grpSpPr>
+        <a:xfrm>
+          <a:off x="0" y="0"/>
+          <a:ext cx="0" cy="0"/>
+          <a:chOff x="0" y="0"/>
+          <a:chExt cx="0" cy="0"/>
+        </a:xfrm>
+      </p:grpSpPr>
+      <p:sp>
+        <p:nvSpPr>
+          <p:cNvPr id="2" name="Rubrik 1"/>
+          <p:cNvSpPr>
+            <a:spLocks noGrp="1"/>
+          </p:cNvSpPr>
+          <p:nvPr>
+            <p:ph type="title"/>
+          </p:nvPr>
+        </p:nvSpPr>
+        <p:spPr/>
+        <p:txBody>
+          <a:bodyPr/>
+          <a:lstStyle/>
+          <a:p>
+            <a:r>
+              <a:rPr lang="sv-SE" dirty="0"/>
+              <a:t>Slutlig design</a:t>
+            </a:r>
+          </a:p>
+        </p:txBody>
+      </p:sp>
+      <p:pic>
+        <p:nvPicPr>
+          <p:cNvPr id="8" name="Picture 7"/>
+          <p:cNvPicPr>
+            <a:picLocks noChangeAspect="1"/>
+          </p:cNvPicPr>
+          <p:nvPr/>
+        </p:nvPicPr>
+        <p:blipFill>
+          <a:blip r:embed="rId4">
+            <a:extLst>
+              <a:ext uri="{28A0092B-C50C-407E-A947-70E740481C1C}">
+                <a14:useLocalDpi xmlns:a14="http://schemas.microsoft.com/office/drawing/2010/main" val="0"/>
+              </a:ext>
+            </a:extLst>
+          </a:blip>
+          <a:stretch>
+            <a:fillRect/>
+          </a:stretch>
+        </p:blipFill>
+        <p:spPr>
+          <a:xfrm>
+            <a:off x="4348584" y="0"/>
+            <a:ext cx="7393473" cy="6858000"/>
+          </a:xfrm>
+          <a:prstGeom prst="rect">
+            <a:avLst/>
+          </a:prstGeom>
+        </p:spPr>
+      </p:pic>
+    </p:spTree>
+    <p:custDataLst>
+      <p:tags r:id="rId1"/>
+    </p:custDataLst>
+    <p:extLst>
+      <p:ext uri="{BB962C8B-B14F-4D97-AF65-F5344CB8AC3E}">
+        <p14:creationId xmlns:p14="http://schemas.microsoft.com/office/powerpoint/2010/main" val="3617610750"/>
+      </p:ext>
+    </p:extLst>
+  </p:cSld>
+  <p:clrMapOvr>
+    <a:masterClrMapping/>
+  </p:clrMapOvr>
+</p:sld>
+</file>
+
+<file path=ppt/slides/slide30.xml><?xml version="1.0" encoding="utf-8"?>
 <p:sld xmlns:a="http://schemas.openxmlformats.org/drawingml/2006/main" xmlns:r="http://schemas.openxmlformats.org/officeDocument/2006/relationships" xmlns:p="http://schemas.openxmlformats.org/presentationml/2006/main">
   <p:cSld>
     <p:spTree>
@@ -10663,17 +11559,10 @@
   <p:clrMapOvr>
     <a:masterClrMapping/>
   </p:clrMapOvr>
-  <p:timing>
-    <p:tnLst>
-      <p:par>
-        <p:cTn id="1" dur="indefinite" restart="never" nodeType="tmRoot"/>
-      </p:par>
-    </p:tnLst>
-  </p:timing>
 </p:sld>
 </file>
 
-<file path=ppt/slides/slide28.xml><?xml version="1.0" encoding="utf-8"?>
+<file path=ppt/slides/slide31.xml><?xml version="1.0" encoding="utf-8"?>
 <p:sld xmlns:a="http://schemas.openxmlformats.org/drawingml/2006/main" xmlns:r="http://schemas.openxmlformats.org/officeDocument/2006/relationships" xmlns:p="http://schemas.openxmlformats.org/presentationml/2006/main">
   <p:cSld>
     <p:spTree>
@@ -10744,17 +11633,10 @@
   <p:clrMapOvr>
     <a:masterClrMapping/>
   </p:clrMapOvr>
-  <p:timing>
-    <p:tnLst>
-      <p:par>
-        <p:cTn id="1" dur="indefinite" restart="never" nodeType="tmRoot"/>
-      </p:par>
-    </p:tnLst>
-  </p:timing>
 </p:sld>
 </file>
 
-<file path=ppt/slides/slide29.xml><?xml version="1.0" encoding="utf-8"?>
+<file path=ppt/slides/slide32.xml><?xml version="1.0" encoding="utf-8"?>
 <p:sld xmlns:a="http://schemas.openxmlformats.org/drawingml/2006/main" xmlns:r="http://schemas.openxmlformats.org/officeDocument/2006/relationships" xmlns:p="http://schemas.openxmlformats.org/presentationml/2006/main">
   <p:cSld>
     <p:spTree>
@@ -10817,10 +11699,9 @@
               <a:buNone/>
             </a:pPr>
             <a:r>
-              <a:rPr lang="sv-SE" dirty="0" smtClean="0"/>
+              <a:rPr lang="sv-SE" dirty="0"/>
               <a:t>Vi började med att köra profilern på alla klasser i programmet för att undersöka vilka klasser och metoder som hade längst körtid</a:t>
             </a:r>
-            <a:endParaRPr lang="sv-SE" dirty="0"/>
           </a:p>
         </p:txBody>
       </p:sp>
@@ -10915,17 +11796,10 @@
   <p:clrMapOvr>
     <a:masterClrMapping/>
   </p:clrMapOvr>
-  <p:timing>
-    <p:tnLst>
-      <p:par>
-        <p:cTn id="1" dur="indefinite" restart="never" nodeType="tmRoot"/>
-      </p:par>
-    </p:tnLst>
-  </p:timing>
 </p:sld>
 </file>
 
-<file path=ppt/slides/slide3.xml><?xml version="1.0" encoding="utf-8"?>
+<file path=ppt/slides/slide33.xml><?xml version="1.0" encoding="utf-8"?>
 <p:sld xmlns:a="http://schemas.openxmlformats.org/drawingml/2006/main" xmlns:r="http://schemas.openxmlformats.org/officeDocument/2006/relationships" xmlns:p="http://schemas.openxmlformats.org/presentationml/2006/main">
   <p:cSld>
     <p:spTree>
@@ -10944,98 +11818,6 @@
       </p:grpSpPr>
       <p:sp>
         <p:nvSpPr>
-          <p:cNvPr id="2" name="Rubrik 1"/>
-          <p:cNvSpPr>
-            <a:spLocks noGrp="1"/>
-          </p:cNvSpPr>
-          <p:nvPr>
-            <p:ph type="title"/>
-          </p:nvPr>
-        </p:nvSpPr>
-        <p:spPr/>
-        <p:txBody>
-          <a:bodyPr/>
-          <a:lstStyle/>
-          <a:p>
-            <a:r>
-              <a:rPr lang="sv-SE" dirty="0"/>
-              <a:t>Slutlig design</a:t>
-            </a:r>
-          </a:p>
-        </p:txBody>
-      </p:sp>
-      <p:pic>
-        <p:nvPicPr>
-          <p:cNvPr id="8" name="Picture 7"/>
-          <p:cNvPicPr>
-            <a:picLocks noChangeAspect="1"/>
-          </p:cNvPicPr>
-          <p:nvPr/>
-        </p:nvPicPr>
-        <p:blipFill>
-          <a:blip r:embed="rId4">
-            <a:extLst>
-              <a:ext uri="{28A0092B-C50C-407E-A947-70E740481C1C}">
-                <a14:useLocalDpi xmlns:a14="http://schemas.microsoft.com/office/drawing/2010/main" val="0"/>
-              </a:ext>
-            </a:extLst>
-          </a:blip>
-          <a:stretch>
-            <a:fillRect/>
-          </a:stretch>
-        </p:blipFill>
-        <p:spPr>
-          <a:xfrm>
-            <a:off x="4348584" y="0"/>
-            <a:ext cx="7393473" cy="6858000"/>
-          </a:xfrm>
-          <a:prstGeom prst="rect">
-            <a:avLst/>
-          </a:prstGeom>
-        </p:spPr>
-      </p:pic>
-    </p:spTree>
-    <p:custDataLst>
-      <p:tags r:id="rId1"/>
-    </p:custDataLst>
-    <p:extLst>
-      <p:ext uri="{BB962C8B-B14F-4D97-AF65-F5344CB8AC3E}">
-        <p14:creationId xmlns:p14="http://schemas.microsoft.com/office/powerpoint/2010/main" val="3617610750"/>
-      </p:ext>
-    </p:extLst>
-  </p:cSld>
-  <p:clrMapOvr>
-    <a:masterClrMapping/>
-  </p:clrMapOvr>
-  <p:timing>
-    <p:tnLst>
-      <p:par>
-        <p:cTn id="1" dur="indefinite" restart="never" nodeType="tmRoot"/>
-      </p:par>
-    </p:tnLst>
-  </p:timing>
-</p:sld>
-</file>
-
-<file path=ppt/slides/slide30.xml><?xml version="1.0" encoding="utf-8"?>
-<p:sld xmlns:a="http://schemas.openxmlformats.org/drawingml/2006/main" xmlns:r="http://schemas.openxmlformats.org/officeDocument/2006/relationships" xmlns:p="http://schemas.openxmlformats.org/presentationml/2006/main">
-  <p:cSld>
-    <p:spTree>
-      <p:nvGrpSpPr>
-        <p:cNvPr id="1" name=""/>
-        <p:cNvGrpSpPr/>
-        <p:nvPr/>
-      </p:nvGrpSpPr>
-      <p:grpSpPr>
-        <a:xfrm>
-          <a:off x="0" y="0"/>
-          <a:ext cx="0" cy="0"/>
-          <a:chOff x="0" y="0"/>
-          <a:chExt cx="0" cy="0"/>
-        </a:xfrm>
-      </p:grpSpPr>
-      <p:sp>
-        <p:nvSpPr>
           <p:cNvPr id="3" name="Content Placeholder 2"/>
           <p:cNvSpPr>
             <a:spLocks noGrp="1"/>
@@ -11058,10 +11840,9 @@
               <a:buNone/>
             </a:pPr>
             <a:r>
-              <a:rPr lang="sv-SE" dirty="0" smtClean="0"/>
+              <a:rPr lang="sv-SE" dirty="0"/>
               <a:t>Efter flera körningar med någorlunda varierande resultat så stod det klart att det var GameCharacter classen, dens konstruktor samt metoden unEquip som krävde mest CPU tid. Därför valde vi att undersöka den närmare och köra profilern på bara den klassen</a:t>
             </a:r>
-            <a:endParaRPr lang="sv-SE" dirty="0"/>
           </a:p>
         </p:txBody>
       </p:sp>
@@ -11153,17 +11934,10 @@
   <p:clrMapOvr>
     <a:masterClrMapping/>
   </p:clrMapOvr>
-  <p:timing>
-    <p:tnLst>
-      <p:par>
-        <p:cTn id="1" dur="indefinite" restart="never" nodeType="tmRoot"/>
-      </p:par>
-    </p:tnLst>
-  </p:timing>
 </p:sld>
 </file>
 
-<file path=ppt/slides/slide31.xml><?xml version="1.0" encoding="utf-8"?>
+<file path=ppt/slides/slide34.xml><?xml version="1.0" encoding="utf-8"?>
 <p:sld xmlns:a="http://schemas.openxmlformats.org/drawingml/2006/main" xmlns:r="http://schemas.openxmlformats.org/officeDocument/2006/relationships" xmlns:p="http://schemas.openxmlformats.org/presentationml/2006/main">
   <p:cSld>
     <p:spTree>
@@ -11220,17 +11994,10 @@
   <p:clrMapOvr>
     <a:masterClrMapping/>
   </p:clrMapOvr>
-  <p:timing>
-    <p:tnLst>
-      <p:par>
-        <p:cTn id="1" dur="indefinite" restart="never" nodeType="tmRoot"/>
-      </p:par>
-    </p:tnLst>
-  </p:timing>
 </p:sld>
 </file>
 
-<file path=ppt/slides/slide32.xml><?xml version="1.0" encoding="utf-8"?>
+<file path=ppt/slides/slide35.xml><?xml version="1.0" encoding="utf-8"?>
 <p:sld xmlns:a="http://schemas.openxmlformats.org/drawingml/2006/main" xmlns:r="http://schemas.openxmlformats.org/officeDocument/2006/relationships" xmlns:p="http://schemas.openxmlformats.org/presentationml/2006/main">
   <p:cSld>
     <p:spTree>
@@ -11301,10 +12068,9 @@
               <a:buNone/>
             </a:pPr>
             <a:r>
-              <a:rPr lang="sv-SE" dirty="0" smtClean="0"/>
+              <a:rPr lang="sv-SE" dirty="0"/>
               <a:t>Enum Type tar upp mest plats WTF</a:t>
             </a:r>
-            <a:endParaRPr lang="sv-SE" dirty="0"/>
           </a:p>
         </p:txBody>
       </p:sp>
@@ -11348,17 +12114,10 @@
   <p:clrMapOvr>
     <a:masterClrMapping/>
   </p:clrMapOvr>
-  <p:timing>
-    <p:tnLst>
-      <p:par>
-        <p:cTn id="1" dur="indefinite" restart="never" nodeType="tmRoot"/>
-      </p:par>
-    </p:tnLst>
-  </p:timing>
 </p:sld>
 </file>
 
-<file path=ppt/slides/slide33.xml><?xml version="1.0" encoding="utf-8"?>
+<file path=ppt/slides/slide36.xml><?xml version="1.0" encoding="utf-8"?>
 <p:sld xmlns:a="http://schemas.openxmlformats.org/drawingml/2006/main" xmlns:r="http://schemas.openxmlformats.org/officeDocument/2006/relationships" xmlns:p="http://schemas.openxmlformats.org/presentationml/2006/main">
   <p:cSld>
     <p:spTree>
@@ -11399,10 +12158,9 @@
               <a:buNone/>
             </a:pPr>
             <a:r>
-              <a:rPr lang="sv-SE" dirty="0" smtClean="0"/>
+              <a:rPr lang="sv-SE" dirty="0"/>
               <a:t>Kan finnas ett samband mellan att unequip är långsam och att equipment och dens enum tar upp mycket plats, eller så är jag bara sämst på att skriva kod</a:t>
             </a:r>
-            <a:endParaRPr lang="sv-SE" dirty="0"/>
           </a:p>
         </p:txBody>
       </p:sp>
@@ -11416,17 +12174,10 @@
   <p:clrMapOvr>
     <a:masterClrMapping/>
   </p:clrMapOvr>
-  <p:timing>
-    <p:tnLst>
-      <p:par>
-        <p:cTn id="1" dur="indefinite" restart="never" nodeType="tmRoot"/>
-      </p:par>
-    </p:tnLst>
-  </p:timing>
 </p:sld>
 </file>
 
-<file path=ppt/slides/slide34.xml><?xml version="1.0" encoding="utf-8"?>
+<file path=ppt/slides/slide37.xml><?xml version="1.0" encoding="utf-8"?>
 <p:sld xmlns:a="http://schemas.openxmlformats.org/drawingml/2006/main" xmlns:r="http://schemas.openxmlformats.org/officeDocument/2006/relationships" xmlns:p="http://schemas.openxmlformats.org/presentationml/2006/main">
   <p:cSld>
     <p:spTree>
@@ -11509,17 +12260,10 @@
   <p:clrMapOvr>
     <a:masterClrMapping/>
   </p:clrMapOvr>
-  <p:timing>
-    <p:tnLst>
-      <p:par>
-        <p:cTn id="1" dur="indefinite" restart="never" nodeType="tmRoot"/>
-      </p:par>
-    </p:tnLst>
-  </p:timing>
 </p:sld>
 </file>
 
-<file path=ppt/slides/slide35.xml><?xml version="1.0" encoding="utf-8"?>
+<file path=ppt/slides/slide38.xml><?xml version="1.0" encoding="utf-8"?>
 <p:sld xmlns:a="http://schemas.openxmlformats.org/drawingml/2006/main" xmlns:r="http://schemas.openxmlformats.org/officeDocument/2006/relationships" xmlns:p="http://schemas.openxmlformats.org/presentationml/2006/main">
   <p:cSld>
     <p:spTree>
@@ -11597,7 +12341,7 @@
           <p:cNvPr id="2" name="Pil: höger 1">
             <a:extLst>
               <a:ext uri="{FF2B5EF4-FFF2-40B4-BE49-F238E27FC236}">
-                <a16:creationId xmlns:a16="http://schemas.microsoft.com/office/drawing/2014/main" xmlns="" id="{5BED2071-56FA-4E12-93ED-D5F1E015E9AB}"/>
+                <a16:creationId xmlns:a16="http://schemas.microsoft.com/office/drawing/2014/main" id="{5BED2071-56FA-4E12-93ED-D5F1E015E9AB}"/>
               </a:ext>
             </a:extLst>
           </p:cNvPr>
@@ -11667,7 +12411,7 @@
           <p:cNvPr id="5" name="Pil: höger 4">
             <a:extLst>
               <a:ext uri="{FF2B5EF4-FFF2-40B4-BE49-F238E27FC236}">
-                <a16:creationId xmlns:a16="http://schemas.microsoft.com/office/drawing/2014/main" xmlns="" id="{DC33DE33-4EEE-4AAE-971A-9ECC8EEE5EF1}"/>
+                <a16:creationId xmlns:a16="http://schemas.microsoft.com/office/drawing/2014/main" id="{DC33DE33-4EEE-4AAE-971A-9ECC8EEE5EF1}"/>
               </a:ext>
             </a:extLst>
           </p:cNvPr>
@@ -11737,7 +12481,7 @@
           <p:cNvPr id="6" name="Pil: höger 5">
             <a:extLst>
               <a:ext uri="{FF2B5EF4-FFF2-40B4-BE49-F238E27FC236}">
-                <a16:creationId xmlns:a16="http://schemas.microsoft.com/office/drawing/2014/main" xmlns="" id="{079D7526-A6BE-430A-8F83-1E17E1718B8F}"/>
+                <a16:creationId xmlns:a16="http://schemas.microsoft.com/office/drawing/2014/main" id="{079D7526-A6BE-430A-8F83-1E17E1718B8F}"/>
               </a:ext>
             </a:extLst>
           </p:cNvPr>
@@ -11807,7 +12551,7 @@
           <p:cNvPr id="7" name="Pil: höger 6">
             <a:extLst>
               <a:ext uri="{FF2B5EF4-FFF2-40B4-BE49-F238E27FC236}">
-                <a16:creationId xmlns:a16="http://schemas.microsoft.com/office/drawing/2014/main" xmlns="" id="{C612D35E-3946-4792-9C94-3ADB79886997}"/>
+                <a16:creationId xmlns:a16="http://schemas.microsoft.com/office/drawing/2014/main" id="{C612D35E-3946-4792-9C94-3ADB79886997}"/>
               </a:ext>
             </a:extLst>
           </p:cNvPr>
@@ -11877,7 +12621,7 @@
           <p:cNvPr id="8" name="Pil: höger 7">
             <a:extLst>
               <a:ext uri="{FF2B5EF4-FFF2-40B4-BE49-F238E27FC236}">
-                <a16:creationId xmlns:a16="http://schemas.microsoft.com/office/drawing/2014/main" xmlns="" id="{5BD09438-3B93-47E0-BC3B-379F80A1ECA7}"/>
+                <a16:creationId xmlns:a16="http://schemas.microsoft.com/office/drawing/2014/main" id="{5BD09438-3B93-47E0-BC3B-379F80A1ECA7}"/>
               </a:ext>
             </a:extLst>
           </p:cNvPr>
@@ -11947,7 +12691,7 @@
           <p:cNvPr id="10" name="Pil: höger 9">
             <a:extLst>
               <a:ext uri="{FF2B5EF4-FFF2-40B4-BE49-F238E27FC236}">
-                <a16:creationId xmlns:a16="http://schemas.microsoft.com/office/drawing/2014/main" xmlns="" id="{5E1CDCBD-85A1-479E-827B-CE49B4497796}"/>
+                <a16:creationId xmlns:a16="http://schemas.microsoft.com/office/drawing/2014/main" id="{5E1CDCBD-85A1-479E-827B-CE49B4497796}"/>
               </a:ext>
             </a:extLst>
           </p:cNvPr>
@@ -12017,7 +12761,7 @@
           <p:cNvPr id="12" name="Pil: höger 11">
             <a:extLst>
               <a:ext uri="{FF2B5EF4-FFF2-40B4-BE49-F238E27FC236}">
-                <a16:creationId xmlns:a16="http://schemas.microsoft.com/office/drawing/2014/main" xmlns="" id="{8731D112-5CF6-4435-8FC0-5ABB9AFA1AC7}"/>
+                <a16:creationId xmlns:a16="http://schemas.microsoft.com/office/drawing/2014/main" id="{8731D112-5CF6-4435-8FC0-5ABB9AFA1AC7}"/>
               </a:ext>
             </a:extLst>
           </p:cNvPr>
@@ -12087,7 +12831,7 @@
           <p:cNvPr id="13" name="Pil: höger 12">
             <a:extLst>
               <a:ext uri="{FF2B5EF4-FFF2-40B4-BE49-F238E27FC236}">
-                <a16:creationId xmlns:a16="http://schemas.microsoft.com/office/drawing/2014/main" xmlns="" id="{6353E274-CA98-4BA5-9F0C-F86B0EAE5578}"/>
+                <a16:creationId xmlns:a16="http://schemas.microsoft.com/office/drawing/2014/main" id="{6353E274-CA98-4BA5-9F0C-F86B0EAE5578}"/>
               </a:ext>
             </a:extLst>
           </p:cNvPr>
@@ -12165,13 +12909,6 @@
   <p:clrMapOvr>
     <a:masterClrMapping/>
   </p:clrMapOvr>
-  <p:timing>
-    <p:tnLst>
-      <p:par>
-        <p:cTn id="1" dur="indefinite" restart="never" nodeType="tmRoot"/>
-      </p:par>
-    </p:tnLst>
-  </p:timing>
 </p:sld>
 </file>
 
@@ -12274,7 +13011,7 @@
           <p:cNvPr id="8" name="Rectangle 2">
             <a:extLst>
               <a:ext uri="{FF2B5EF4-FFF2-40B4-BE49-F238E27FC236}">
-                <a16:creationId xmlns:a16="http://schemas.microsoft.com/office/drawing/2014/main" xmlns="" id="{1FC9AD1E-4A52-4998-A5A3-BAEC1C827718}"/>
+                <a16:creationId xmlns:a16="http://schemas.microsoft.com/office/drawing/2014/main" id="{1FC9AD1E-4A52-4998-A5A3-BAEC1C827718}"/>
               </a:ext>
             </a:extLst>
           </p:cNvPr>
@@ -12789,7 +13526,7 @@
           <p:cNvPr id="12" name="Rectangle 2">
             <a:extLst>
               <a:ext uri="{FF2B5EF4-FFF2-40B4-BE49-F238E27FC236}">
-                <a16:creationId xmlns:a16="http://schemas.microsoft.com/office/drawing/2014/main" xmlns="" id="{390B7AF8-02CC-4EF9-A9A5-59849FC5BA99}"/>
+                <a16:creationId xmlns:a16="http://schemas.microsoft.com/office/drawing/2014/main" id="{390B7AF8-02CC-4EF9-A9A5-59849FC5BA99}"/>
               </a:ext>
             </a:extLst>
           </p:cNvPr>
@@ -12862,20 +13599,6 @@
               <a:buNone/>
               <a:tabLst/>
             </a:pPr>
-            <a:r>
-              <a:rPr kumimoji="0" lang="sv-SE" altLang="sv-SE" sz="1000" b="0" i="0" u="none" strike="noStrike" cap="none" normalizeH="0" baseline="0" dirty="0">
-                <a:ln>
-                  <a:noFill/>
-                </a:ln>
-                <a:solidFill>
-                  <a:srgbClr val="A9B7C6"/>
-                </a:solidFill>
-                <a:effectLst/>
-                <a:latin typeface="Courier New" panose="02070309020205020404" pitchFamily="49" charset="0"/>
-                <a:cs typeface="Courier New" panose="02070309020205020404" pitchFamily="49" charset="0"/>
-              </a:rPr>
-              <a:t/>
-            </a:r>
             <a:br>
               <a:rPr kumimoji="0" lang="sv-SE" altLang="sv-SE" sz="1000" b="0" i="0" u="none" strike="noStrike" cap="none" normalizeH="0" baseline="0" dirty="0">
                 <a:ln>
@@ -14426,20 +15149,6 @@
                 <a:cs typeface="Courier New" panose="02070309020205020404" pitchFamily="49" charset="0"/>
               </a:rPr>
             </a:br>
-            <a:r>
-              <a:rPr kumimoji="0" lang="sv-SE" altLang="sv-SE" sz="1000" b="0" i="0" u="none" strike="noStrike" cap="none" normalizeH="0" baseline="0" dirty="0">
-                <a:ln>
-                  <a:noFill/>
-                </a:ln>
-                <a:solidFill>
-                  <a:srgbClr val="CC7832"/>
-                </a:solidFill>
-                <a:effectLst/>
-                <a:latin typeface="Courier New" panose="02070309020205020404" pitchFamily="49" charset="0"/>
-                <a:cs typeface="Courier New" panose="02070309020205020404" pitchFamily="49" charset="0"/>
-              </a:rPr>
-              <a:t/>
-            </a:r>
             <a:br>
               <a:rPr kumimoji="0" lang="sv-SE" altLang="sv-SE" sz="1000" b="0" i="0" u="none" strike="noStrike" cap="none" normalizeH="0" baseline="0" dirty="0">
                 <a:ln>
@@ -14480,20 +15189,6 @@
                 <a:cs typeface="Courier New" panose="02070309020205020404" pitchFamily="49" charset="0"/>
               </a:rPr>
             </a:br>
-            <a:r>
-              <a:rPr kumimoji="0" lang="sv-SE" altLang="sv-SE" sz="1000" b="0" i="0" u="none" strike="noStrike" cap="none" normalizeH="0" baseline="0" dirty="0">
-                <a:ln>
-                  <a:noFill/>
-                </a:ln>
-                <a:solidFill>
-                  <a:srgbClr val="A9B7C6"/>
-                </a:solidFill>
-                <a:effectLst/>
-                <a:latin typeface="Courier New" panose="02070309020205020404" pitchFamily="49" charset="0"/>
-                <a:cs typeface="Courier New" panose="02070309020205020404" pitchFamily="49" charset="0"/>
-              </a:rPr>
-              <a:t/>
-            </a:r>
             <a:br>
               <a:rPr kumimoji="0" lang="sv-SE" altLang="sv-SE" sz="1000" b="0" i="0" u="none" strike="noStrike" cap="none" normalizeH="0" baseline="0" dirty="0">
                 <a:ln>
@@ -15337,13 +16032,6 @@
   <p:clrMapOvr>
     <a:masterClrMapping/>
   </p:clrMapOvr>
-  <p:timing>
-    <p:tnLst>
-      <p:par>
-        <p:cTn id="1" dur="indefinite" restart="never" nodeType="tmRoot"/>
-      </p:par>
-    </p:tnLst>
-  </p:timing>
 </p:sld>
 </file>
 
@@ -15441,7 +16129,7 @@
           <p:cNvPr id="13" name="Rectangle 3">
             <a:extLst>
               <a:ext uri="{FF2B5EF4-FFF2-40B4-BE49-F238E27FC236}">
-                <a16:creationId xmlns:a16="http://schemas.microsoft.com/office/drawing/2014/main" xmlns="" id="{C08EF8EF-E887-46B2-8D83-1FD183E46154}"/>
+                <a16:creationId xmlns:a16="http://schemas.microsoft.com/office/drawing/2014/main" id="{C08EF8EF-E887-46B2-8D83-1FD183E46154}"/>
               </a:ext>
             </a:extLst>
           </p:cNvPr>
@@ -16078,7 +16766,7 @@
           <p:cNvPr id="7" name="Rectangle 1">
             <a:extLst>
               <a:ext uri="{FF2B5EF4-FFF2-40B4-BE49-F238E27FC236}">
-                <a16:creationId xmlns:a16="http://schemas.microsoft.com/office/drawing/2014/main" xmlns="" id="{3199D4B4-952F-47D5-A8B5-DFCEF934D87B}"/>
+                <a16:creationId xmlns:a16="http://schemas.microsoft.com/office/drawing/2014/main" id="{3199D4B4-952F-47D5-A8B5-DFCEF934D87B}"/>
               </a:ext>
             </a:extLst>
           </p:cNvPr>
@@ -16561,20 +17249,6 @@
                 <a:cs typeface="Courier New" panose="02070309020205020404" pitchFamily="49" charset="0"/>
               </a:rPr>
             </a:br>
-            <a:r>
-              <a:rPr kumimoji="0" lang="sv-SE" altLang="sv-SE" sz="1000" b="0" i="0" u="none" strike="noStrike" cap="none" normalizeH="0" baseline="0">
-                <a:ln>
-                  <a:noFill/>
-                </a:ln>
-                <a:solidFill>
-                  <a:srgbClr val="A9B7C6"/>
-                </a:solidFill>
-                <a:effectLst/>
-                <a:latin typeface="Courier New" panose="02070309020205020404" pitchFamily="49" charset="0"/>
-                <a:cs typeface="Courier New" panose="02070309020205020404" pitchFamily="49" charset="0"/>
-              </a:rPr>
-              <a:t/>
-            </a:r>
             <a:br>
               <a:rPr kumimoji="0" lang="sv-SE" altLang="sv-SE" sz="1000" b="0" i="0" u="none" strike="noStrike" cap="none" normalizeH="0" baseline="0">
                 <a:ln>
@@ -17016,20 +17690,6 @@
                 <a:cs typeface="Courier New" panose="02070309020205020404" pitchFamily="49" charset="0"/>
               </a:rPr>
             </a:br>
-            <a:r>
-              <a:rPr kumimoji="0" lang="sv-SE" altLang="sv-SE" sz="1000" b="0" i="0" u="none" strike="noStrike" cap="none" normalizeH="0" baseline="0">
-                <a:ln>
-                  <a:noFill/>
-                </a:ln>
-                <a:solidFill>
-                  <a:srgbClr val="A9B7C6"/>
-                </a:solidFill>
-                <a:effectLst/>
-                <a:latin typeface="Courier New" panose="02070309020205020404" pitchFamily="49" charset="0"/>
-                <a:cs typeface="Courier New" panose="02070309020205020404" pitchFamily="49" charset="0"/>
-              </a:rPr>
-              <a:t/>
-            </a:r>
             <a:br>
               <a:rPr kumimoji="0" lang="sv-SE" altLang="sv-SE" sz="1000" b="0" i="0" u="none" strike="noStrike" cap="none" normalizeH="0" baseline="0">
                 <a:ln>
@@ -17484,13 +18144,6 @@
   <p:clrMapOvr>
     <a:masterClrMapping/>
   </p:clrMapOvr>
-  <p:timing>
-    <p:tnLst>
-      <p:par>
-        <p:cTn id="1" dur="indefinite" restart="never" nodeType="tmRoot"/>
-      </p:par>
-    </p:tnLst>
-  </p:timing>
 </p:sld>
 </file>
 
@@ -17660,13 +18313,6 @@
   <p:clrMapOvr>
     <a:masterClrMapping/>
   </p:clrMapOvr>
-  <p:timing>
-    <p:tnLst>
-      <p:par>
-        <p:cTn id="1" dur="indefinite" restart="never" nodeType="tmRoot"/>
-      </p:par>
-    </p:tnLst>
-  </p:timing>
 </p:sld>
 </file>
 
@@ -17836,13 +18482,6 @@
   <p:clrMapOvr>
     <a:masterClrMapping/>
   </p:clrMapOvr>
-  <p:timing>
-    <p:tnLst>
-      <p:par>
-        <p:cTn id="1" dur="indefinite" restart="never" nodeType="tmRoot"/>
-      </p:par>
-    </p:tnLst>
-  </p:timing>
 </p:sld>
 </file>
 
@@ -18006,13 +18645,6 @@
   <p:clrMapOvr>
     <a:masterClrMapping/>
   </p:clrMapOvr>
-  <p:timing>
-    <p:tnLst>
-      <p:par>
-        <p:cTn id="1" dur="indefinite" restart="never" nodeType="tmRoot"/>
-      </p:par>
-    </p:tnLst>
-  </p:timing>
 </p:sld>
 </file>
 
@@ -18176,13 +18808,6 @@
   <p:clrMapOvr>
     <a:masterClrMapping/>
   </p:clrMapOvr>
-  <p:timing>
-    <p:tnLst>
-      <p:par>
-        <p:cTn id="1" dur="indefinite" restart="never" nodeType="tmRoot"/>
-      </p:par>
-    </p:tnLst>
-  </p:timing>
 </p:sld>
 </file>
 
@@ -18332,6 +18957,24 @@
 </file>
 
 <file path=ppt/tags/tag31.xml><?xml version="1.0" encoding="utf-8"?>
+<p:tagLst xmlns:a="http://schemas.openxmlformats.org/drawingml/2006/main" xmlns:r="http://schemas.openxmlformats.org/officeDocument/2006/relationships" xmlns:p="http://schemas.openxmlformats.org/presentationml/2006/main">
+  <p:tag name="ARTICULATE_SLIDE_THUMBNAIL_REFRESH" val="1"/>
+</p:tagLst>
+</file>
+
+<file path=ppt/tags/tag32.xml><?xml version="1.0" encoding="utf-8"?>
+<p:tagLst xmlns:a="http://schemas.openxmlformats.org/drawingml/2006/main" xmlns:r="http://schemas.openxmlformats.org/officeDocument/2006/relationships" xmlns:p="http://schemas.openxmlformats.org/presentationml/2006/main">
+  <p:tag name="ARTICULATE_SLIDE_THUMBNAIL_REFRESH" val="1"/>
+</p:tagLst>
+</file>
+
+<file path=ppt/tags/tag33.xml><?xml version="1.0" encoding="utf-8"?>
+<p:tagLst xmlns:a="http://schemas.openxmlformats.org/drawingml/2006/main" xmlns:r="http://schemas.openxmlformats.org/officeDocument/2006/relationships" xmlns:p="http://schemas.openxmlformats.org/presentationml/2006/main">
+  <p:tag name="ARTICULATE_SLIDE_THUMBNAIL_REFRESH" val="1"/>
+</p:tagLst>
+</file>
+
+<file path=ppt/tags/tag34.xml><?xml version="1.0" encoding="utf-8"?>
 <p:tagLst xmlns:a="http://schemas.openxmlformats.org/drawingml/2006/main" xmlns:r="http://schemas.openxmlformats.org/officeDocument/2006/relationships" xmlns:p="http://schemas.openxmlformats.org/presentationml/2006/main">
   <p:tag name="ARTICULATE_SLIDE_THUMBNAIL_REFRESH" val="1"/>
 </p:tagLst>

</xml_diff>